<commit_message>
Fortran finished and images created
</commit_message>
<xml_diff>
--- a/PearProjectPresentation.pptx
+++ b/PearProjectPresentation.pptx
@@ -6,10 +6,10 @@
     <p:sldMasterId id="2147483694" r:id="rId2"/>
   </p:sldMasterIdLst>
   <p:notesMasterIdLst>
-    <p:notesMasterId r:id="rId21"/>
+    <p:notesMasterId r:id="rId22"/>
   </p:notesMasterIdLst>
   <p:handoutMasterIdLst>
-    <p:handoutMasterId r:id="rId22"/>
+    <p:handoutMasterId r:id="rId23"/>
   </p:handoutMasterIdLst>
   <p:sldIdLst>
     <p:sldId id="261" r:id="rId3"/>
@@ -22,14 +22,15 @@
     <p:sldId id="301" r:id="rId10"/>
     <p:sldId id="302" r:id="rId11"/>
     <p:sldId id="303" r:id="rId12"/>
-    <p:sldId id="304" r:id="rId13"/>
-    <p:sldId id="296" r:id="rId14"/>
-    <p:sldId id="305" r:id="rId15"/>
-    <p:sldId id="298" r:id="rId16"/>
-    <p:sldId id="299" r:id="rId17"/>
-    <p:sldId id="306" r:id="rId18"/>
-    <p:sldId id="300" r:id="rId19"/>
-    <p:sldId id="270" r:id="rId20"/>
+    <p:sldId id="298" r:id="rId13"/>
+    <p:sldId id="304" r:id="rId14"/>
+    <p:sldId id="296" r:id="rId15"/>
+    <p:sldId id="305" r:id="rId16"/>
+    <p:sldId id="307" r:id="rId17"/>
+    <p:sldId id="299" r:id="rId18"/>
+    <p:sldId id="306" r:id="rId19"/>
+    <p:sldId id="300" r:id="rId20"/>
+    <p:sldId id="270" r:id="rId21"/>
   </p:sldIdLst>
   <p:sldSz cx="12192000" cy="6858000"/>
   <p:notesSz cx="6858000" cy="9144000"/>
@@ -221,7 +222,7 @@
           <a:p>
             <a:fld id="{8F591CCF-F6FD-734B-854A-5BC033593B1E}" type="datetimeFigureOut">
               <a:rPr lang="nl-NL" smtClean="0"/>
-              <a:t>26-3-2019</a:t>
+              <a:t>8-4-2019</a:t>
             </a:fld>
             <a:endParaRPr lang="nl-NL"/>
           </a:p>
@@ -599,7 +600,7 @@
     </inkml:brush>
   </inkml:definitions>
   <inkml:trace contextRef="#ctx0" brushRef="#br0">10 141 4736,'-9'-4'6901,"11"-6"-6485,0 4-311,1-1 0,0 1 0,0 0 0,0 0-1,0 0 1,1 0 0,0 1 0,1-1 0,-1 1 0,1 0 0,0 1 0,0-1-1,0 1 1,1 0 0,0 0 0,-1 0 0,1 1 0,1 0 0,-1 0 0,0 1 0,3-1-105,5-2-70,-9 2 76,0 1 1,0-1 0,0 1 0,0 0-1,0 1 1,0-1 0,1 1 0,-1 0-1,0 0 1,1 1 0,-1-1 0,0 1-1,1 1 1,-1-1 0,1 1 0,-1 0-1,0 0 1,1 0 0,-1 1 0,0 0-1,0 0 1,0 0 0,1 1-7,-5 0 8,0 1 0,0-1-1,0 0 1,0 1 0,-1-1 0,1 1 0,-1-1-1,0 1 1,0-1 0,0 1 0,-1-1 0,1 1-1,-1-1 1,0 0 0,0 1 0,0-1 0,0 0 0,-1 0-1,1 1 1,-1-1 0,0 0 0,0-1 0,0 1-1,0 0 1,0-1 0,-1 1 0,1-1 0,-1 1 0,-1 0-8,-10 17 72,4-4-56,1 1 0,1 1 0,1-1 0,0 2 0,1-1 0,1 0 0,1 1 0,0 0 0,2 0 0,0 1 0,1-1 0,1 0 0,2 10-16,-2-25 18,0 0 1,1 0 0,-1 0-1,1 0 1,0 0 0,0 0-1,1 0 1,-1 0 0,1 0-1,0-1 1,-1 1 0,2-1-1,-1 1 1,0-1 0,1 0-1,0 0 1,-1 0 0,1 0-1,1 0 1,-1-1 0,0 1-1,0-1 1,1 0 0,0 0-1,-1 0 1,1-1 0,0 1-1,0-1 1,0 0 0,1 0-19,14 2-77,1 0 0,1-2 0,-1 0 0,0-1 1,19-3 76,-9-4-3340,-3-3-3299,-16 5 3546</inkml:trace>
-  <inkml:trace contextRef="#ctx0" brushRef="#br0" timeOffset="1063.142">520 160 3712,'4'10'6716,"7"-6"-3344,35-8-3021,-32 2 159,56-2-126,-62 3-34,0 0-1604,-9 1-5261,-1 0 3913</inkml:trace>
+  <inkml:trace contextRef="#ctx0" brushRef="#br0" timeOffset="1063.141">520 160 3712,'4'10'6716,"7"-6"-3344,35-8-3021,-32 2 159,56-2-126,-62 3-34,0 0-1604,-9 1-5261,-1 0 3913</inkml:trace>
   <inkml:trace contextRef="#ctx0" brushRef="#br0" timeOffset="1779.815">553 259 4352,'0'3'4284,"2"6"-1507,108 1 956,-53-2-2714,-47-5-2278,-1 0-3631,-8-3 3098</inkml:trace>
 </inkml:ink>
 </file>
@@ -966,7 +967,7 @@
   </inkml:definitions>
   <inkml:trace contextRef="#ctx0" brushRef="#br0">203 221 4864,'38'-31'7466,"-55"46"-3807,-90 43-1830,97-51-1845,0 1-1,1 0 1,0 0 0,0 1-1,1 0 1,0 0 0,1 1-1,0 0 1,0 1 0,1-1-1,1 1 1,0 1 0,0-1-1,1 1 1,0-1 0,1 1 16,3-5-14,-1 0 1,1 0-1,1 0 1,-1-1-1,1 1 1,1 0-1,-1-1 1,1 1-1,0-1 1,0 1-1,1-1 0,0 0 1,0 0-1,0 0 1,1 0-1,0-1 1,0 0-1,1 1 1,-1-1-1,1-1 1,0 1-1,0-1 1,1 0-1,-1 0 1,6 3 13,65 17-2531,-19-34-3773,-43 2 3808</inkml:trace>
   <inkml:trace contextRef="#ctx0" brushRef="#br0" timeOffset="565.764">448 10 4736,'0'-10'8731,"0"24"-6948,2 11-1796,14 67-1656,-15-89 692,-3-2-7086,1-3 5359</inkml:trace>
-  <inkml:trace contextRef="#ctx0" brushRef="#br0" timeOffset="960.917">382 116 5888,'19'-6'8084,"9"-18"-6156,-8 7-1679,14-3 23,-3 2-573,-12 4-2849,-18 11-1292,-1 2 1610</inkml:trace>
+  <inkml:trace contextRef="#ctx0" brushRef="#br0" timeOffset="960.916">382 116 5888,'19'-6'8084,"9"-18"-6156,-8 7-1679,14-3 23,-3 2-573,-12 4-2849,-18 11-1292,-1 2 1610</inkml:trace>
   <inkml:trace contextRef="#ctx0" brushRef="#br0" timeOffset="1364.878">398 23 6400,'-24'-15'4997,"24"15"-4165,0 0-240,38 26 0,-22-19-582,-1 1 0,0 1 0,0 0 0,-1 1-1,0 0 1,-1 2 0,3 2-10,2-2-574,-8-7-1683,-1 2-4725,-6-4 4657</inkml:trace>
   <inkml:trace contextRef="#ctx0" brushRef="#br0" timeOffset="2684.375">380 632 5248,'-9'17'7872,"1"82"-6694,9-84-1192,0 1-1,0-1 0,1 0 1,1 0-1,1 0 0,0 0 1,1 0-1,4 6 15,-9-20 15,1 0 0,-1 0 0,0 0 1,1 0-1,0 0 0,-1 0 0,1 0 0,0 0 1,-1 0-1,1 0 0,0 0 0,0 0 0,0-1 0,0 1 1,-1 0-1,1-1 0,0 1 0,0 0 0,1-1 0,-1 1 1,0-1-1,0 0 0,0 1 0,0-1 0,0 0 1,0 0-1,1 0 0,-1 0 0,0 0 0,0 0 0,0 0 1,0 0-1,0 0 0,1 0 0,-1-1 0,0 1 1,0 0-1,0-1 0,0 1 0,0-1 0,0 1 0,0-1 1,0 0-16,37-37 2008,-7-58-806,-25 69-3677,2 1-3420,-7 22 3325,1 1-22</inkml:trace>
 </inkml:ink>
@@ -1024,7 +1025,7 @@
     </inkml:brush>
   </inkml:definitions>
   <inkml:trace contextRef="#ctx0" brushRef="#br0">264 123 3456,'-5'3'8078,"-9"5"-4725,0 1-2299,-8 2 391,15-9-1422,0 1-1,0-1 1,0 1-1,1 1 1,-1-1-1,1 1 1,0 1-1,0-1 1,0 1-1,1 0 1,0 0-1,0 0 1,0 1-1,0 0 1,1 0-1,0 0 1,0 0-1,1 1 0,0-1 1,0 1-1,0 0 1,1 0-1,0 2-22,3-5-60,0 1 0,1-1 0,-1 1-1,1-1 1,0 0 0,1 0 0,-1 0-1,1 0 1,-1 0 0,1 0 0,1-1 0,-1 0-1,0 1 1,1-1 0,-1 0 0,1-1-1,0 1 1,0-1 0,0 1 0,1-1-1,-1 0 1,0-1 0,1 1 0,-1-1-1,1 0 1,-1 0 0,3 0 60,73-4-528,-80 3 581,0 0-5,0 0 48,-22 7 1397,11-3-1402,3-3-90,-1 0-1,1 1 0,-1 0 1,1 1-1,0 0 0,0 0 0,0 1 1,0 0-1,1 0 0,-1 1 0,1 0 1,0 0-1,1 1 0,-1 0 1,1 0-1,0 0 0,0 1 0,-4 7 0,10-10-9,0-1 0,0 1-1,0-1 1,0 1-1,0 0 1,1-1-1,0 1 1,0-1 0,0 1-1,0-1 1,0 0-1,1 1 1,-1-1-1,1 0 1,0 0-1,0 0 1,0 0 0,0 0-1,1 0 1,-1-1-1,1 1 1,-1-1-1,1 0 1,0 0 0,0 0-1,3 2 10,15 10-31,-12-8 34,1 0 1,-1 1-1,0 0 0,0 1 0,-1 0 0,0 0 1,0 1-1,0 1-3,53 88 661,-61-96-539,0-1-1,1 1 1,-1 0 0,0 0-1,0-1 1,0 1-1,0 0 1,0 0 0,0 0-1,-1-1 1,1 1-1,-1 0 1,1 0 0,-1-1-1,1 1 1,-1 0 0,0-1-1,0 1 1,0-1-1,0 1 1,0-1 0,0 1-1,-1-1 1,1 0-1,0 0 1,-1 0 0,1 1-1,0-1 1,-1 0-1,0-1 1,1 1 0,-1 0-122,-59 19 695,-55-17-2774,78-10-2480,3-6-4200,19 4 4471</inkml:trace>
-  <inkml:trace contextRef="#ctx0" brushRef="#br0" timeOffset="1033.67">242 124 384,'-3'10'10386,"-21"3"-8154,17-13-1942,-1-1 1,1-1-1,-1 1 0,1-1 0,0 0 0,0-1 0,0 0 0,0 0 0,0 0 1,1-1-1,-1 0 0,1 0 0,0-1 0,0 1 0,1-1 0,-1-1 0,-1-1-290,-22-30-2199,9-3-5072,17 29 4183</inkml:trace>
+  <inkml:trace contextRef="#ctx0" brushRef="#br0" timeOffset="1033.669">242 124 384,'-3'10'10386,"-21"3"-8154,17-13-1942,-1-1 1,1-1-1,-1 1 0,1-1 0,0 0 0,0-1 0,0 0 0,0 0 0,0 0 1,1-1-1,-1 0 0,1 0 0,0-1 0,0 1 0,1-1 0,-1-1 0,-1-1-290,-22-30-2199,9-3-5072,17 29 4183</inkml:trace>
 </inkml:ink>
 </file>
 
@@ -1109,8 +1110,8 @@
   <inkml:trace contextRef="#ctx0" brushRef="#br0">65 129 4480,'-5'1'6059,"-17"36"-4502,14-13-971,0-1 1,2 1 0,1 0-1,1 1 1,1 0 0,1-1-1,1 15-586,1-32-23,1 0 0,0 0 0,0 0 0,0 0 0,1 0 0,0 0 0,1 0 0,0 0 0,0-1 0,0 0 0,1 1 0,-1-1 0,2 0 0,-1-1 0,3 4 23,-3-5-446,0 0 1,0 0-1,1 0 1,-1-1 0,1 0-1,0 0 1,0 0-1,0 0 1,0-1 0,0 0-1,0 0 1,5 1 445,5 0-3088</inkml:trace>
   <inkml:trace contextRef="#ctx0" brushRef="#br0" timeOffset="2319.974">628 443 3712,'12'30'4032,"-8"-21"-3105,-1 0 0,0 1 0,0 0 0,-1-1 0,0 1 0,-1 0 0,0 0 1,-1 9-928,0-15 245,0 0 1,0-1-1,0 1 1,-1 0 0,0 0-1,0-1 1,0 1-1,0-1 1,0 1 0,-1-1-1,1 0 1,-1 1-1,0-1 1,0 0 0,0 0-1,-1 0 1,1 0-1,-1-1 1,1 1 0,-1 0-1,0-1 1,0 0-1,0 0 1,0 0 0,-1 0-246,-45 15-355,31-17-3573,3-6-4589,11 3 5008</inkml:trace>
   <inkml:trace contextRef="#ctx0" brushRef="#br0" timeOffset="4002.709">1155 1 5376,'3'3'6753,"6"10"-5048,-1-3-1529,4 5-49,-1 1-1,-1 0 0,-1 0 0,0 1 1,-2 0-1,1 1 0,1 8-126,11 24 658,-16-42-477,-1 1 0,1-1 1,-1 1-1,-1 0 0,1 0 0,-2 0 1,1 0-1,-1 0 0,-1 0 1,1 1-1,-2-1 0,1 0 1,-1 0-1,-1 0 0,1 0 1,-1 0-1,-1 0 0,0 0 1,0-1-1,-1 1 0,-4 6-181,-44 54-2169,11-29-5997,28-29 4614</inkml:trace>
-  <inkml:trace contextRef="#ctx0" brushRef="#br0" timeOffset="476139.026">221 9 4096,'-1'2'172,"0"-1"-1,0 1 1,0 0 0,0-1 0,0 1 0,0 0-1,1 0 1,-1 0 0,1-1 0,-1 1 0,1 0-1,0 0 1,0 0 0,0 0 0,0 0-1,0 0 1,0-1 0,0 1 0,1 0 0,-1 0-1,1 0 1,-1 0 0,1-1 0,0 1-1,0 0 1,0-1 0,0 1 0,0 0 0,0-1-1,0 1 1,0-1 0,1 0 0,-1 1 0,0-1-1,1 0 1,-1 0 0,1 0 0,0 1-172,6 3 154,-1 1 0,2-1 0,-1 0 0,0-1 0,1 0 0,0 0 0,0-1 0,0 0 0,0 0 0,0-1 0,1-1 0,-1 1 0,1-2 0,-1 1 0,1-1 0,3-1-154,-13 1 272,0 0-59,-20 10 731,9-5-959,1 0 0,-1 1 0,1 0 0,0 1 0,0 0 0,1 0 0,0 1 0,1 0 0,-1 1 1,-3 5 14,11-12-13,0-1 0,0 1 0,0 0 0,0 0 1,1-1-1,-1 1 0,1 0 0,-1 0 0,1 0 0,-1 0 1,1 0-1,0 0 0,0 0 0,0 0 0,0-1 1,0 1-1,1 0 0,-1 0 0,0 0 0,1 0 1,-1 0-1,1 0 0,0-1 0,0 1 0,0 0 0,0-1 1,0 1-1,0 0 0,0-1 0,0 1 0,1-1 1,-1 0-1,1 1 0,-1-1 0,1 0 13,1 2 3,1 0 0,0 0-1,0-1 1,0 0 0,0 1-1,0-1 1,0-1 0,1 1-1,-1-1 1,0 1 0,1-1 0,0-1-1,-1 1 1,2-1-3,1 0-43,-7 1 55,0-1-1,0 0 1,-1 0-1,1 0 1,0 0-1,0 1 1,0-1-1,0 0 1,0 0 0,0 1-1,0-1 1,0 0-1,0 0 1,-1 1-1,1-1 1,0 0-1,0 0 1,0 1-1,0-1 1,0 0-1,0 0 1,1 0-1,-1 1 1,0-1-1,0 0 1,0 0-1,0 1 1,0-1 0,0 0-1,0 0 1,0 1-12,-23 11 219,19-12-220,0 1 1,0 0-1,1 1 1,-1-1-1,0 1 1,1 0-1,-1-1 1,1 2-1,-1-1 0,1 0 1,0 1-1,0-1 1,0 1-1,0 0 1,0 0-1,1 0 1,-1 0-1,1 1 1,0-1-1,0 1 1,0-1-1,1 1 0,-1 0 1,1 0-1,0 0 1,0-1-1,0 1 1,0 0-1,1 0 1,-1 0-1,1 2 1,2-3-12,-1 0-1,1-1 1,-1 0 0,1 1-1,0-1 1,0 0-1,0 0 1,0 0 0,0 0-1,0 0 1,1 0-1,-1-1 1,1 1 0,-1-1-1,1 1 1,0-1-1,2 1 13,19 12 174,4 7-172,-21-16 60,0-1 0,0 1 0,0 1 0,-1-1 1,1 1-1,-2 0 0,1 1 0,-1-1 1,1 1-1,-2 0 0,1 0 0,-1 1 1,3 6-63,-7-11 157,1-1 1,-1 1 0,0 0 0,0-1 0,0 1-1,0 0 1,0 0 0,-1-1 0,1 1 0,-1-1-1,0 1 1,0 0 0,0-1 0,0 1 0,0-1 0,0 0-1,-1 1 1,1-1 0,-1 0 0,1 0 0,-1 0-1,0 0 1,0 0 0,0 0 0,0 0 0,0-1-1,0 1 1,-1-1 0,1 0 0,-1 1 0,1-1-1,-1 0 1,0 0-158,-45 16-2145,4-10-5285,30-6 3494</inkml:trace>
-  <inkml:trace contextRef="#ctx0" brushRef="#br0" timeOffset="479399.337">806 208 6144,'0'4'5527,"2"7"-5300,39 116 979,-41-127-1113,1 0 0,-1 0 0,0-1 1,0 1-1,1 0 0,-1 0 0,0 0 1,1 0-1,-1 0 0,0 0 1,0 0-1,1 0 0,-1 0 0,0 0 1,0 1-1,1-1 0,-1 0 0,0 0 1,0 0-1,1 0 0,-1 0 0,0 0 1,0 1-1,1-1 0,-1 0 1,0 0-1,0 0 0,0 1 0,1-1 1,-1 0-1,0 0 0,0 0-93,-2-29 1026,0 24-1027,0-1 1,1 0-1,0 0 0,0 1 1,0-1-1,1 0 0,0 0 1,0 0-1,0 0 0,1 0 0,0 0 1,0 1-1,0-1 0,1 0 1,0 1-1,0-1 0,0 1 1,1-1-1,0 1 0,0 0 1,0 0-1,1 0 0,2-2 1,-4 7-3,1 1 0,-1-1 0,0 1-1,0 0 1,0 0 0,1 0 0,-1 0 0,0 0 0,-1 1-1,1-1 1,0 1 0,0-1 0,0 1 0,-1-1-1,1 1 1,-1 0 0,1 0 0,-1 0 0,0 0 0,0 0-1,0 0 1,0 0 0,0 0 0,0 1 0,0 1 3,-1-3 4,14 36-112,-1 1-1,-2 0 0,-2 1 1,-2 0-1,-1 0 0,-2 1 0,-2-1 1,-2 1-1,-1 9 109,3 41-691,0-20-3485,-2-53 774</inkml:trace>
+  <inkml:trace contextRef="#ctx0" brushRef="#br0" timeOffset="46642.296">221 9 4096,'-1'2'172,"0"-1"-1,0 1 1,0 0 0,0-1 0,0 1 0,0 0-1,1 0 1,-1 0 0,1-1 0,-1 1 0,1 0-1,0 0 1,0 0 0,0 0 0,0 0-1,0 0 1,0-1 0,0 1 0,1 0 0,-1 0-1,1 0 1,-1 0 0,1-1 0,0 1-1,0 0 1,0-1 0,0 1 0,0 0 0,0-1-1,0 1 1,0-1 0,1 0 0,-1 1 0,0-1-1,1 0 1,-1 0 0,1 0 0,0 1-172,6 3 154,-1 1 0,2-1 0,-1 0 0,0-1 0,1 0 0,0 0 0,0-1 0,0 0 0,0 0 0,0-1 0,1-1 0,-1 1 0,1-2 0,-1 1 0,1-1 0,3-1-154,-13 1 272,0 0-59,-20 10 731,9-5-959,1 0 0,-1 1 0,1 0 0,0 1 0,0 0 0,1 0 0,0 1 0,1 0 0,-1 1 1,-3 5 14,11-12-13,0-1 0,0 1 0,0 0 0,0 0 1,1-1-1,-1 1 0,1 0 0,-1 0 0,1 0 0,-1 0 1,1 0-1,0 0 0,0 0 0,0 0 0,0-1 1,0 1-1,1 0 0,-1 0 0,0 0 0,1 0 1,-1 0-1,1 0 0,0-1 0,0 1 0,0 0 0,0-1 1,0 1-1,0 0 0,0-1 0,0 1 0,1-1 1,-1 0-1,1 1 0,-1-1 0,1 0 13,1 2 3,1 0 0,0 0-1,0-1 1,0 0 0,0 1-1,0-1 1,0-1 0,1 1-1,-1-1 1,0 1 0,1-1 0,0-1-1,-1 1 1,2-1-3,1 0-43,-7 1 55,0-1-1,0 0 1,-1 0-1,1 0 1,0 0-1,0 1 1,0-1-1,0 0 1,0 0 0,0 1-1,0-1 1,0 0-1,0 0 1,-1 1-1,1-1 1,0 0-1,0 0 1,0 1-1,0-1 1,0 0-1,0 0 1,1 0-1,-1 1 1,0-1-1,0 0 1,0 0-1,0 1 1,0-1 0,0 0-1,0 0 1,0 1-12,-23 11 219,19-12-220,0 1 1,0 0-1,1 1 1,-1-1-1,0 1 1,1 0-1,-1-1 1,1 2-1,-1-1 0,1 0 1,0 1-1,0-1 1,0 1-1,0 0 1,0 0-1,1 0 1,-1 0-1,1 1 1,0-1-1,0 1 1,0-1-1,1 1 0,-1 0 1,1 0-1,0 0 1,0-1-1,0 1 1,0 0-1,1 0 1,-1 0-1,1 2 1,2-3-12,-1 0-1,1-1 1,-1 0 0,1 1-1,0-1 1,0 0-1,0 0 1,0 0 0,0 0-1,0 0 1,1 0-1,-1-1 1,1 1 0,-1-1-1,1 1 1,0-1-1,2 1 13,19 12 174,4 7-172,-21-16 60,0-1 0,0 1 0,0 1 0,-1-1 1,1 1-1,-2 0 0,1 1 0,-1-1 1,1 1-1,-2 0 0,1 0 0,-1 1 1,3 6-63,-7-11 157,1-1 1,-1 1 0,0 0 0,0-1 0,0 1-1,0 0 1,0 0 0,-1-1 0,1 1 0,-1-1-1,0 1 1,0 0 0,0-1 0,0 1 0,0-1 0,0 0-1,-1 1 1,1-1 0,-1 0 0,1 0 0,-1 0-1,0 0 1,0 0 0,0 0 0,0 0 0,0-1-1,0 1 1,-1-1 0,1 0 0,-1 1 0,1-1-1,-1 0 1,0 0-158,-45 16-2145,4-10-5285,30-6 3494</inkml:trace>
+  <inkml:trace contextRef="#ctx0" brushRef="#br0" timeOffset="49902.607">806 208 6144,'0'4'5527,"2"7"-5300,39 116 979,-41-127-1113,1 0 0,-1 0 0,0-1 1,0 1-1,1 0 0,-1 0 0,0 0 1,1 0-1,-1 0 0,0 0 1,0 0-1,1 0 0,-1 0 0,0 0 1,0 1-1,1-1 0,-1 0 0,0 0 1,0 0-1,1 0 0,-1 0 0,0 0 1,0 1-1,1-1 0,-1 0 1,0 0-1,0 0 0,0 1 0,1-1 1,-1 0-1,0 0 0,0 0-93,-2-29 1026,0 24-1027,0-1 1,1 0-1,0 0 0,0 1 1,0-1-1,1 0 0,0 0 1,0 0-1,0 0 0,1 0 0,0 0 1,0 1-1,0-1 0,1 0 1,0 1-1,0-1 0,0 1 1,1-1-1,0 1 0,0 0 1,0 0-1,1 0 0,2-2 1,-4 7-3,1 1 0,-1-1 0,0 1-1,0 0 1,0 0 0,1 0 0,-1 0 0,0 0 0,-1 1-1,1-1 1,0 1 0,0-1 0,0 1 0,-1-1-1,1 1 1,-1 0 0,1 0 0,-1 0 0,0 0 0,0 0-1,0 0 1,0 0 0,0 0 0,0 1 0,0 1 3,-1-3 4,14 36-112,-1 1-1,-2 0 0,-2 1 1,-2 0-1,-1 0 0,-2 1 0,-2-1 1,-2 1-1,-1 9 109,3 41-691,0-20-3485,-2-53 774</inkml:trace>
 </inkml:ink>
 </file>
 
@@ -1139,9 +1140,9 @@
   </inkml:definitions>
   <inkml:trace contextRef="#ctx0" brushRef="#br0">120 117 4480,'4'-1'5800,"-11"6"-3329,-6 5-1596,2 2-663,0-1-1,2 2 1,-1 0-1,2 0 1,0 0 0,0 1-1,1 0 1,1 1-1,0-1 1,1 1-1,1 0 1,-2 11-212,4-14 43,1 0 1,0 0-1,1 1 1,0-1 0,1 0-1,0 1 1,1-1-1,1 0 1,0 2-44,28 25-2819,-27-37 2091,0-1-1,1 1 0,-1-1 1,0 0-1,1-1 1,-1 1-1,1-1 1,-1 0-1,1 0 0,-1 0 1,1 0-1,-1-1 1,1 0 728,12 0-2539</inkml:trace>
   <inkml:trace contextRef="#ctx0" brushRef="#br0" timeOffset="1535.971">621 440 5120,'12'48'8350,"-12"-40"-8136,1-1-1,-1 1 1,-1 0-1,0 0 1,0 0-1,0-1 0,-1 1 1,0 0-1,-1-1 1,1 0-1,-1 1 0,-1-1 1,-1 2-214,3-6 66,0-1 1,0 1-1,-1-1 1,1 1 0,-1-1-1,1 0 1,-1 0-1,0 0 1,0 0-1,0 0 1,0-1-1,0 0 1,0 1-1,-1-1 1,1 0 0,0-1-1,-1 1 1,1 0-1,-2-1-66,-39-3-5984,35 0 2459</inkml:trace>
-  <inkml:trace contextRef="#ctx0" brushRef="#br0" timeOffset="484444.086">259 1 4736,'-9'9'4004,"8"16"-3491,2-21-488,0 1 1,0-1-1,0 1 1,1-1-1,0 1 1,0-1-1,0 0 0,1 0 1,-1 0-1,1 0 1,0 0-1,0-1 1,0 1-1,0-1 0,1 0 1,0 0-1,-1 0 1,1 0-1,0-1 0,0 1 1,1-1-1,-1 0 1,0 0-1,1-1 1,-1 1-1,1-1 0,0 0 1,-1 0-1,1-1 1,3 1-26,39 3 1877,-52-3-1903,-1-1 0,0 1 0,1 0 1,-1 1-1,1-1 0,-1 1 0,1 0 0,0 0 0,0 1 1,0 0-1,0 0 0,0 0 0,1 0 0,-1 1 0,1 0 1,0 0-1,0 0 0,0 0 0,0 0 0,1 1 0,0 0 1,0 0-1,0 0 0,1 0 0,-1 0 0,1 0 0,0 1 1,1-1-1,0 1 0,-1-1 0,2 1 0,-1 4 26,1-8-32,0 0-1,0 0 0,1 0 0,-1 0 0,1 0 1,-1 0-1,1-1 0,0 1 0,0 0 0,-1 0 1,2-1-1,-1 1 0,0 0 0,0-1 1,0 1-1,1-1 0,-1 0 0,0 1 0,1-1 1,0 0-1,-1 0 0,1 0 0,0 0 0,-1 0 1,1 0-1,0 0 0,0-1 0,0 1 1,0-1-1,1 1 33,61 6-489,-52-9 312,-1 1 308,-19 6 70,1-2-68,1-2-117,0 1 0,0 0 1,0 0-1,0 1 0,1 0 1,-1 0-1,1 0 0,-1 1 0,1 0 1,0 0-1,1 0 0,-1 0 0,1 1 1,-1 0-1,1 0 0,1 0 1,-1 0-1,1 1 0,0-1 0,0 1 1,-1 5-17,3-8-13,1 1 0,0-1 0,0 1 0,0 0 0,1-1 0,-1 1 0,1 0 1,0-1-1,0 1 0,0-1 0,0 1 0,1-1 0,0 0 0,-1 0 0,1 1 0,0-1 1,0 0-1,1-1 0,-1 1 0,1 0 0,-1-1 0,1 1 0,0-1 0,0 0 0,0 0 1,2 1 12,-1-1 8,-1 0 1,0 0-1,0 1 1,0-1 0,0 1-1,-1-1 1,1 1 0,-1 0-1,1 0 1,-1 0-1,0 0 1,0 1 0,-1-1-1,1 1 1,0-1 0,-1 1-1,0-1 1,0 1 0,0 0-1,-1-1 1,1 1-1,-1 0 1,0 0 0,0 2-9,-2 1 66,0-1 0,0 1 1,-1-1-1,0 1 1,0-1-1,-1 0 0,1 0 1,-1 0-1,-1-1 0,1 1 1,-1-1-1,0 0 0,0-1 1,0 1-1,-1-1 0,0 0 1,0 0-1,0-1 1,0 1-1,0-1 0,-1-1 1,-3 2-67,-56 14-4415,49-17 885,4-3 1231</inkml:trace>
-  <inkml:trace contextRef="#ctx0" brushRef="#br0" timeOffset="487313.109">778 291 5248,'-14'-11'6938,"21"30"-6282,12 76 203,-37-123 1829,9-41-2451,9 68-242,0-1-1,0 0 0,1 1 0,-1-1 0,0 1 0,1-1 0,-1 1 0,0-1 0,1 1 0,0-1 0,-1 1 0,1-1 0,0 1 1,0 0-1,0-1 0,0 1 0,0 0 0,0 0 0,0-1 0,0 1 0,0 0 0,1 0 0,-1 1 0,0-1 0,1 0 0,-1 0 0,1 1 1,-1-1-1,1 0 0,-1 1 0,1 0 0,-1-1 0,1 1 0,0 0 0,-1 0 0,1 0 0,-1 0 0,1 0 0,-1 0 0,1 0 1,1 1 5,1 1-10,1 0 1,-1 0 0,0 0 0,0 1 0,0 0-1,0 0 1,0 0 0,-1 0 0,0 1 0,1-1-1,-1 1 1,0 0 0,-1 0 0,1 0 0,-1 0-1,1 1 1,-1-1 0,-1 0 0,1 1 0,0 2 9,6 11-206,2 7 177,-2 1 0,0 0 0,-2 0 0,-1 1 0,-1 0 0,-1 0 0,-2 0 0,-1 0 0,-1 7 29,6 88-4917,-3-109 1557</inkml:trace>
-  <inkml:trace contextRef="#ctx0" brushRef="#br0" timeOffset="670775.192">1068 35 3712,'-6'3'6946,"6"14"-5855,3-8-762,1 0 0,0 0 1,0-1-1,1 1 0,0-1 0,0 0 1,1 0-1,0-1 0,1 1 0,-1-1 0,1-1 1,5 4-330,-4-3-31,2 6 112,-1 1 0,0 0 0,-1 1 0,0-1-1,-1 1 1,0 1 0,-2 0 0,0-1 0,-1 2 0,0-1 0,-1 0 0,0 13-81,1-8 10,-3-8 91,-1 0 0,0 0 0,-1 0 0,0 0 0,-1 0 0,-1 0-1,0 0 1,-1-1 0,0 0 0,0 0 0,-2 0 0,1 0 0,-5 5-101,2 0 21,-20 17-5796,25-29 4031</inkml:trace>
+  <inkml:trace contextRef="#ctx0" brushRef="#br0" timeOffset="54947.356">259 1 4736,'-9'9'4004,"8"16"-3491,2-21-488,0 1 1,0-1-1,0 1 1,1-1-1,0 1 1,0-1-1,0 0 0,1 0 1,-1 0-1,1 0 1,0 0-1,0-1 1,0 1-1,0-1 0,1 0 1,0 0-1,-1 0 1,1 0-1,0-1 0,0 1 1,1-1-1,-1 0 1,0 0-1,1-1 1,-1 1-1,1-1 0,0 0 1,-1 0-1,1-1 1,3 1-26,39 3 1877,-52-3-1903,-1-1 0,0 1 0,1 0 1,-1 1-1,1-1 0,-1 1 0,1 0 0,0 0 0,0 1 1,0 0-1,0 0 0,0 0 0,1 0 0,-1 1 0,1 0 1,0 0-1,0 0 0,0 0 0,0 0 0,1 1 0,0 0 1,0 0-1,0 0 0,1 0 0,-1 0 0,1 0 0,0 1 1,1-1-1,0 1 0,-1-1 0,2 1 0,-1 4 26,1-8-32,0 0-1,0 0 0,1 0 0,-1 0 0,1 0 1,-1 0-1,1-1 0,0 1 0,0 0 0,-1 0 1,2-1-1,-1 1 0,0 0 0,0-1 1,0 1-1,1-1 0,-1 0 0,0 1 0,1-1 1,0 0-1,-1 0 0,1 0 0,0 0 0,-1 0 1,1 0-1,0 0 0,0-1 0,0 1 1,0-1-1,1 1 33,61 6-489,-52-9 312,-1 1 308,-19 6 70,1-2-68,1-2-117,0 1 0,0 0 1,0 0-1,0 1 0,1 0 1,-1 0-1,1 0 0,-1 1 0,1 0 1,0 0-1,1 0 0,-1 0 0,1 1 1,-1 0-1,1 0 0,1 0 1,-1 0-1,1 1 0,0-1 0,0 1 1,-1 5-17,3-8-13,1 1 0,0-1 0,0 1 0,0 0 0,1-1 0,-1 1 0,1 0 1,0-1-1,0 1 0,0-1 0,0 1 0,1-1 0,0 0 0,-1 0 0,1 1 0,0-1 1,0 0-1,1-1 0,-1 1 0,1 0 0,-1-1 0,1 1 0,0-1 0,0 0 0,0 0 1,2 1 12,-1-1 8,-1 0 1,0 0-1,0 1 1,0-1 0,0 1-1,-1-1 1,1 1 0,-1 0-1,1 0 1,-1 0-1,0 0 1,0 1 0,-1-1-1,1 1 1,0-1 0,-1 1-1,0-1 1,0 1 0,0 0-1,-1-1 1,1 1-1,-1 0 1,0 0 0,0 2-9,-2 1 66,0-1 0,0 1 1,-1-1-1,0 1 1,0-1-1,-1 0 0,1 0 1,-1 0-1,-1-1 0,1 1 1,-1-1-1,0 0 0,0-1 1,0 1-1,-1-1 0,0 0 1,0 0-1,0-1 1,0 1-1,0-1 0,-1-1 1,-3 2-67,-56 14-4415,49-17 885,4-3 1231</inkml:trace>
+  <inkml:trace contextRef="#ctx0" brushRef="#br0" timeOffset="57816.379">778 291 5248,'-14'-11'6938,"21"30"-6282,12 76 203,-37-123 1829,9-41-2451,9 68-242,0-1-1,0 0 0,1 1 0,-1-1 0,0 1 0,1-1 0,-1 1 0,0-1 0,1 1 0,0-1 0,-1 1 0,1-1 0,0 1 1,0 0-1,0-1 0,0 1 0,0 0 0,0 0 0,0-1 0,0 1 0,0 0 0,1 0 0,-1 1 0,0-1 0,1 0 0,-1 0 0,1 1 1,-1-1-1,1 0 0,-1 1 0,1 0 0,-1-1 0,1 1 0,0 0 0,-1 0 0,1 0 0,-1 0 0,1 0 0,-1 0 0,1 0 1,1 1 5,1 1-10,1 0 1,-1 0 0,0 0 0,0 1 0,0 0-1,0 0 1,0 0 0,-1 0 0,0 1 0,1-1-1,-1 1 1,0 0 0,-1 0 0,1 0 0,-1 0-1,1 1 1,-1-1 0,-1 0 0,1 1 0,0 2 9,6 11-206,2 7 177,-2 1 0,0 0 0,-2 0 0,-1 1 0,-1 0 0,-1 0 0,-2 0 0,-1 0 0,-1 7 29,6 88-4917,-3-109 1557</inkml:trace>
+  <inkml:trace contextRef="#ctx0" brushRef="#br0" timeOffset="-188218.269">1068 35 3712,'-6'3'6946,"6"14"-5855,3-8-762,1 0 0,0 0 1,0-1-1,1 1 0,0-1 0,0 0 1,1 0-1,0-1 0,1 1 0,-1-1 0,1-1 1,5 4-330,-4-3-31,2 6 112,-1 1 0,0 0 0,-1 1 0,0-1-1,-1 1 1,0 1 0,-2 0 0,0-1 0,-1 2 0,0-1 0,-1 0 0,0 13-81,1-8 10,-3-8 91,-1 0 0,0 0 0,-1 0 0,0 0 0,-1 0 0,-1 0-1,0 0 1,-1-1 0,0 0 0,0 0 0,-2 0 0,1 0 0,-5 5-101,2 0 21,-20 17-5796,25-29 4031</inkml:trace>
 </inkml:ink>
 </file>
 
@@ -1169,7 +1170,7 @@
     </inkml:brush>
   </inkml:definitions>
   <inkml:trace contextRef="#ctx0" brushRef="#br0">12258 2070 7552,'2'-1'2448,"87"-39"-3478,-33 25 1265,0 2 0,1 3 0,1 2-1,-1 3 1,1 2 0,22 3-235,-64 0 58,689 13 238,-141 1 389,722-69-1389,-1224 50-373,-15-2-1520</inkml:trace>
-  <inkml:trace contextRef="#ctx0" brushRef="#br0" timeOffset="929.845">13138 2787 5120,'6'-3'466,"0"0"-1,-1 0 1,1-1 0,-1 0 0,0 0-1,0 0 1,0 0 0,0-1 0,-1 0-1,0 0 1,0 0 0,1-2-466,-3 4-10,-1 0-1,1 0 1,-1 1-1,0-1 1,0 0-1,0 0 1,0-1-1,0 1 1,-1 0-1,1 0 1,-1 0-1,0 0 1,0-1-1,0 1 1,-1 0 0,1 0-1,-1 0 1,1 0-1,-1 0 1,0-1-1,0 1 1,0 1-1,-1-1 1,1 0-1,-1 0 1,0 0-1,-1-2 11,-2 0 45,1 0 0,0 1-1,-1-1 1,0 1 0,0 0-1,0 0 1,-1 0-1,1 1 1,-1 0 0,0 0-1,0 0 1,0 1 0,0 0-1,0 0 1,-1 0 0,1 1-1,-1 0 1,1 0 0,-1 1-1,1 0 1,-1 0-1,1 0 1,-1 1 0,1 0-1,-1 0 1,1 1 0,-1 0-45,-1 0-15,0 1 0,-1 0 0,1 0 0,1 1 1,-1 0-1,0 0 0,1 1 0,0 0 0,0 0 0,0 1 1,1 0-1,0 0 0,-2 3 15,6-7 26,-1 1 0,1 1-1,-1-1 1,1 0 0,0 0 0,0 1 0,1-1-1,-1 1 1,1 0 0,0 0 0,0-1 0,0 1-1,0 0 1,0 0 0,1 0 0,0 0 0,0 0-1,0 0 1,0 0 0,1-1 0,-1 1 0,1 0-1,0 0 1,0 0 0,1-1 0,-1 1 0,1 0-1,0-1 1,-1 1 0,2 0-26,2 3 38,1-1 0,0 1 1,0-1-1,0-1 0,1 1 1,-1-1-1,1 0 0,1 0 0,-1-1 1,1 0-1,-1 0 0,1-1 0,0 0 1,0-1-1,1 1 0,-1-2 0,0 1 1,1-1-1,3 0-38,6 0 3,0 0 0,0-2 0,0 0 0,0-1 1,0-1-1,0 0 0,-1-1 0,14-6-3,-22 7 19,0-2 1,1 1-1,-2-2 1,1 1-1,-1-1 1,1 0-1,-2-1 1,1 1-1,-1-2 1,0 1-1,0-1 1,-1 0-1,0 0 1,-1-1-1,0 0 0,0 0 1,0 0-1,-2 0 1,1-1-1,-1 0 1,0 0-1,-1 0 1,1-6-20,-1 0 104,0 0 0,-1 0 0,0 0 0,-1 0 0,-1 0 0,-1 0 0,0 1 0,-1-1 0,-1 1 0,0-1 0,-1 1 0,-1 0 0,0 0 0,-8-12-104,4 13-91,0 2 1,-1-1-1,0 1 0,-1 1 1,0 0-1,-1 1 0,-1 0 1,1 1-1,-1 0 0,-1 1 1,1 1-1,-2 0 0,1 1 1,0 1-1,-1 0 0,0 1 1,0 1-1,-1 1 0,1 0 1,0 1-1,-1 0 0,1 2 1,-1 0-1,1 1 0,0 0 1,-1 1-1,1 1 0,-4 2 91,-183 65-6058,172-55 3087,12 0 918</inkml:trace>
+  <inkml:trace contextRef="#ctx0" brushRef="#br0" timeOffset="929.844">13138 2787 5120,'6'-3'466,"0"0"-1,-1 0 1,1-1 0,-1 0 0,0 0-1,0 0 1,0 0 0,0-1 0,-1 0-1,0 0 1,0 0 0,1-2-466,-3 4-10,-1 0-1,1 0 1,-1 1-1,0-1 1,0 0-1,0 0 1,0-1-1,0 1 1,-1 0-1,1 0 1,-1 0-1,0 0 1,0-1-1,0 1 1,-1 0 0,1 0-1,-1 0 1,1 0-1,-1 0 1,0-1-1,0 1 1,0 1-1,-1-1 1,1 0-1,-1 0 1,0 0-1,-1-2 11,-2 0 45,1 0 0,0 1-1,-1-1 1,0 1 0,0 0-1,0 0 1,-1 0-1,1 1 1,-1 0 0,0 0-1,0 0 1,0 1 0,0 0-1,0 0 1,-1 0 0,1 1-1,-1 0 1,1 0 0,-1 1-1,1 0 1,-1 0-1,1 0 1,-1 1 0,1 0-1,-1 0 1,1 1 0,-1 0-45,-1 0-15,0 1 0,-1 0 0,1 0 0,1 1 1,-1 0-1,0 0 0,1 1 0,0 0 0,0 0 0,0 1 1,1 0-1,0 0 0,-2 3 15,6-7 26,-1 1 0,1 1-1,-1-1 1,1 0 0,0 0 0,0 1 0,1-1-1,-1 1 1,1 0 0,0 0 0,0-1 0,0 1-1,0 0 1,0 0 0,1 0 0,0 0 0,0 0-1,0 0 1,0 0 0,1-1 0,-1 1 0,1 0-1,0 0 1,0 0 0,1-1 0,-1 1 0,1 0-1,0-1 1,-1 1 0,2 0-26,2 3 38,1-1 0,0 1 1,0-1-1,0-1 0,1 1 1,-1-1-1,1 0 0,1 0 0,-1-1 1,1 0-1,-1 0 0,1-1 0,0 0 1,0-1-1,1 1 0,-1-2 0,0 1 1,1-1-1,3 0-38,6 0 3,0 0 0,0-2 0,0 0 0,0-1 1,0-1-1,0 0 0,-1-1 0,14-6-3,-22 7 19,0-2 1,1 1-1,-2-2 1,1 1-1,-1-1 1,1 0-1,-2-1 1,1 1-1,-1-2 1,0 1-1,0-1 1,-1 0-1,0 0 1,-1-1-1,0 0 0,0 0 1,0 0-1,-2 0 1,1-1-1,-1 0 1,0 0-1,-1 0 1,1-6-20,-1 0 104,0 0 0,-1 0 0,0 0 0,-1 0 0,-1 0 0,-1 0 0,0 1 0,-1-1 0,-1 1 0,0-1 0,-1 1 0,-1 0 0,0 0 0,-8-12-104,4 13-91,0 2 1,-1-1-1,0 1 0,-1 1 1,0 0-1,-1 1 0,-1 0 1,1 1-1,-1 0 0,-1 1 1,1 1-1,-2 0 0,1 1 1,0 1-1,-1 0 0,0 1 1,0 1-1,-1 1 0,1 0 1,0 1-1,-1 0 0,1 2 1,-1 0-1,1 1 0,0 0 1,-1 1-1,1 1 0,-4 2 91,-183 65-6058,172-55 3087,12 0 918</inkml:trace>
   <inkml:trace contextRef="#ctx0" brushRef="#br0" timeOffset="1621.851">13948 2447 5632,'3'0'1535,"6"-11"-1045,-8 9-361,0 0-36,-1 0 0,1 0 0,0 0 0,-1 0 0,0-1 0,1 1 0,-1 0 0,0 0-1,0-1 1,0 1 0,-1 0 0,1 0 0,0-1 0,-1 1 0,1 0 0,-1 0 0,0 0-1,0 0 1,0-1 0,0 1 0,0 1 0,0-1 0,-1 0 0,1 0 0,-1 0 0,1 1 0,-1-1-1,1 1 1,-1-1 0,0 1 0,0-1 0,0 1 0,-1 0-93,-2-2 200,0 1 1,-1 0-1,1 1 1,-1-1 0,1 1-1,-1 0 1,0 0-1,1 1 1,-1 0-1,0 0 1,1 0-1,-6 1-200,-10 4 232,-1 0-1,1 1 1,0 1-1,0 1 1,1 1-1,0 1 0,0 1 1,1 0-1,1 2 1,-1 1-232,12-10 4,1 0-1,0 0 1,0 1 0,0 0-1,1 0 1,0 0 0,0 1-1,0 0 1,1 0 0,-1 0-1,1 0 1,1 1 0,-1 0 0,1-1-1,0 1 1,1 0 0,0 1-1,0-1 1,0 0 0,1 1-1,0-1 1,1 1 0,0-1-1,0 1 1,0-1 0,1 1 0,0-1-1,0 1 1,1-1 0,0 0-1,0 0 1,1 0 0,0 0-1,0 0 1,1 0 0,0-1-1,0 0 1,0 0 0,1 1-4,3-1-78,0 0 0,0 0 0,1-1 0,0 0 0,0 0 0,0-1 0,0 0 0,1-1 0,-1 0 0,1 0 0,0-1-1,0 0 1,0-1 0,0 0 0,2-1 78,154-13-2285,-132 7 1072,0-1-1,-1-2 1,0-2 0,6-3 1213,10-9-2448</inkml:trace>
   <inkml:trace contextRef="#ctx0" brushRef="#br0" timeOffset="2369.939">14190 2652 6400,'24'-3'3745,"22"2"-2232,-41 3-1328,0 1-1,0-1 1,0 1-1,0 0 1,0 0-1,-1 0 1,0 1-1,0-1 1,0 1-1,0 0 1,0 0-1,-1 1 1,1-1-1,-1 1 0,0-1 1,-1 1-1,1 0 1,-1 0-1,0 1 1,0-1-1,-1 0 1,1 4-185,52 172 453,-37-121 182,-15-60-629,-1 0-1,1 0 1,-1 0 0,0 0 0,1 0-1,-1 0 1,0-1 0,1 1 0,-1 0 0,0-1-1,1 1 1,-1-1 0,0 1 0,1-1-1,-1 0 1,0 1 0,0-1 0,0 0 0,0 0-1,0 0 1,0 0 0,0 0 0,0 0-1,0 0 1,0 0 0,-1 0 0,1-1-1,0 1 1,-1 0 0,1 0 0,-1-1 0,1 1-1,-1 0 1,0-1 0,1 1 0,-1-1-6,4-5 0,93-183-86,-87 170-4,1-2-588,-1 1-1,-1-2 1,-1 1-1,-1-1 1,0-3 678,-7 25-1,1-10-1755,-11 3-4983,-3 11 3742</inkml:trace>
   <inkml:trace contextRef="#ctx0" brushRef="#br0" timeOffset="-2779.657">13484 1225 1152,'36'9'464,"-36"-30"4960,-2 17-5185,0 0 0,0 0 1,0 0-1,-1 0 0,0 1 0,1-1 1,-2 1-1,1-1 0,0 1 0,-1 0 1,1 0-1,-1 0 0,0 1 0,0 0 1,0-1-1,0 1 0,0 0 1,0 1-1,-1-1 0,1 1 0,-1 0 1,0 0-240,-178-46 688,165 43-718,-1 1 1,1 1 0,-1 0-1,1 1 1,-1 2 0,0 0-1,1 0 1,-16 5 29,30-5-28,0 1 0,0 0 0,0 0 0,1 0 0,-1 1 0,0-1-1,1 1 1,0 0 0,-1 0 0,1 0 0,0 1 0,1-1 0,-1 1 0,0-1 0,1 1 0,0 0 0,0 0 0,0 0 0,1 0 0,-1 0-1,1 0 1,0 1 0,0-1 0,0 0 0,1 1 0,-1-1 0,1 1 0,0-1 0,1 0 0,-1 1 0,1-1 0,0 1 0,0-1 0,0 0 0,0 0-1,1 0 1,0 1 0,1 2 28,3 6 20,0-1 1,1 0-1,0 0 0,0-1 0,2 0 0,-1 0 1,1 0-1,1-1 0,0-1 0,0 0 0,1 0 0,0-1 1,0 0-1,1-1 0,0 0 0,1-1 0,-1-1 0,1 0 1,0 0-1,0-1 0,1-1 0,-1 0 0,5-1-20,-9-1 28,1-1-1,0 0 1,0-1-1,0 0 1,0 0-1,-1-1 1,1 0-1,-1-1 1,1 0-1,-1-1 1,0 0-1,0 0 0,0-1 1,-1 0-1,0 0 1,0-1-1,0 0 1,-1-1-1,1 0 1,-2 0-1,5-5-27,1-4 70,0 0 0,-1-1 0,-1 0-1,0-1 1,-2 0 0,0-1 0,-1 0-1,0 0 1,-2 0 0,0-3-70,0 1 172,-1 1-1,-2-1 1,0 0 0,-1 0 0,-1 0-1,-1 0 1,-1 0 0,-1 1-1,0-1 1,-2 1 0,0-1 0,-2 1-1,0 1 1,-1-1 0,-1 1 0,0 1-1,-2 0 1,0 0 0,-1 1-1,-8-9-171,-1 6-67,0 1-1,-1 1 0,-1 0 0,-1 2 0,-1 1 1,0 0-1,-1 2 0,0 1 0,-1 2 0,-2-1 68,-3 1-564,0 1-1,0 2 1,-1 1-1,0 2 1,0 1-1,0 1 1,0 2-1,-22 3 565,-51 16-3333,64-4 757</inkml:trace>
@@ -1179,27 +1180,27 @@
   <inkml:trace contextRef="#ctx0" brushRef="#br0" timeOffset="-24298.919">3114 1527 6528,'16'9'3268,"16"-6"-3079,-26-3 28,154-12-57,171-16-316,-191 12-5095,-98 9 2408</inkml:trace>
   <inkml:trace contextRef="#ctx0" brushRef="#br0" timeOffset="-24016.866">3149 1963 9856,'-18'23'3680,"18"-19"-2848,13 4-384,-8-4-320,8-4-480,5 0-96,9-4-320,10 1-96,6-6 480,11-3-288,14 1-32,11-1 320,11 0 192,8 0-224,-5 0-32,1 0-1184,-5 5-1504,1 2 576</inkml:trace>
   <inkml:trace contextRef="#ctx0" brushRef="#br0" timeOffset="-20350.955">5343 8 5376,'-18'0'2432,"18"0"-2171,0 0-202,-9 0-651,-53 12 1514,-49-7 1233,-15-13-1627,60 0-464,-1 2 0,-67 4-64,126 2 94,1 1 0,-1 0 0,1 1 0,-1-1 0,1 2 0,0-1 0,0 1 0,0 0 1,0 0-1,0 1 0,1 0 0,-1 0 0,1 1 0,0-1 0,1 1 0,-1 1 0,1-1 0,0 1 0,0 0 0,0 0 0,1 0 0,-2 5-94,0 56 734,6-47-625,-27 607 750,9-402-886,-16 49 27,-32 38 1233,41-215-656,5 0 1,3 2-1,-2 85-577,10 216 272,3-351-135,2 1 0,3 0 0,1-1 0,3 1 0,2-1-1,2 2-136,4 2-14,2 4 21,-3 0-1,-3 0 1,0 43-7,-11 44 129,4 98 222,3-203-329,4 15 31,-4 1 0,-1 0 1,-3 0-1,-3-1 0,-2 2-53,-4 0-11,-16 151 294,35 133 5,-21-108-131,3-131-128,0-18-130,-9-16 96,-30 52 211,39-100-263,8-18 41,0 0 0,0 1 0,0-1 0,1 0 1,-1 1-1,0-1 0,1 0 0,-1 1 0,1-1 0,0 1 0,0-1 0,-1 1 0,1-1 1,0 1-1,0-1 0,0 1 0,0-1 0,1 1 0,-1-1 0,0 0 0,1 1 0,-1-1 1,1 1-1,-1-1 0,1 0 0,-1 1 0,1-1 0,0 0 0,0 1 0,0-1 0,0 0 0,0 0 1,0 0-1,0 0 0,0 0 0,0 0 0,0 0 0,1 0 0,-1-1 0,0 1 0,1 0 1,-1-1-1,0 1 0,1-1 0,-1 0 0,1 1 0,-1-1 0,1 0 0,-1 0 0,1 0 16,137 22-442,2-3-57,0-6 0,52-6 499,-141-7-536,152-3-2534,-65-10-6827,-92 5 6921</inkml:trace>
-  <inkml:trace contextRef="#ctx0" brushRef="#br0" timeOffset="-19177.242">5139 659 7424,'-6'4'3305,"6"-4"-3280,5 4 879,22 11 1987,-5 10-1819,-12 3-1005,0 2 0,-2-1 0,-2 1 1,0 0-1,-2 1 0,0 12-67,2 17 130,61 495 30,-42-208 0,-24-322-101,-1 1-1,-2-1 1,0 0 0,-1 1-1,-2-2 1,-1 1 0,-2 5-59,-9 2-584,16-31 525,1-1 0,0 1 0,-1-1 0,1 1 0,-1-1 0,1 1 0,-1-1 1,1 1-1,-1-1 0,1 1 0,-1-1 0,1 0 0,-1 1 0,0-1 0,1 0 0,-1 0 0,0 1 0,1-1 0,-1 0 0,0 0 0,1 0 0,-1 0 0,0 0 0,1 0 0,-1 0 0,0 0 1,1 0-1,-1 0 0,0 0 0,1-1 0,-1 1 0,0 0 0,1 0 0,-1-1 0,1 1 0,-1 0 0,0-1 0,1 1 0,-1 0 0,1-1 0,-1 1 0,1-1 0,-1 1 0,1-1 0,0 1 1,-1-1-1,1 1 0,-1-2 59,-31-63-7867,15 37 4598</inkml:trace>
-  <inkml:trace contextRef="#ctx0" brushRef="#br0" timeOffset="-18680.967">5191 1725 5248,'19'4'4965,"-14"-5"-4847,0 1 0,0 0 0,0 0 0,-1 0 0,1 0 0,0 1 0,0 0 0,0 0 0,-1 1 0,1-1 0,0 1 0,-1 0 0,1 0 0,-1 0 0,0 1-118,15 6 411,203 92 1269,-79-27-973,4-6 0,66 17-707,-206-84 16,-1 1 1,0 0 0,1 0 0,-1 1 0,0 0 0,-1 0 0,1 0 0,0 1 0,-1 0 0,0 0 0,0 0 0,0 1 0,0-1 0,-1 1 0,1 0 0,-1 1 0,1 1-17,-6-6-85,1 0 1,-1-1-1,1 1 1,-1-1 0,0 1-1,1-1 1,-1 1-1,0-1 1,0 1 0,1-1-1,-1 1 1,0-1-1,0 0 1,1 1 0,-1-1-1,0 0 1,0 0-1,0 0 1,0 0 0,1 0-1,-1 1 1,0-2-1,0 1 1,0 0 0,0 0-1,0 0 1,1 0-1,-1 0 1,0-1 0,0 1-1,0 0 1,1-1-1,-1 1 1,0-1 0,0 1-1,1-1 1,-1 1-1,0-1 1,1 1 0,-1-1 84,-61-54-8976,35 24 6768</inkml:trace>
-  <inkml:trace contextRef="#ctx0" brushRef="#br0" timeOffset="-18350.708">5268 1809 5760,'48'-17'3328,"-42"11"-3177,-1 0 1,0 0 0,0 0-1,0-1 1,-1 0-1,0 0 1,0 0-1,0 0 1,-1-1 0,0 1-1,-1-1 1,1-1-152,12-31 645,23-34-212,3 1 1,4 2 0,4-1-434,130-216-4208,-134 208 1547</inkml:trace>
-  <inkml:trace contextRef="#ctx0" brushRef="#br0" timeOffset="-17808.993">6096 1609 5504,'4'0'2112,"-4"9"-1664,5-6 96,-5 6 0</inkml:trace>
+  <inkml:trace contextRef="#ctx0" brushRef="#br0" timeOffset="-19177.243">5139 659 7424,'-6'4'3305,"6"-4"-3280,5 4 879,22 11 1987,-5 10-1819,-12 3-1005,0 2 0,-2-1 0,-2 1 1,0 0-1,-2 1 0,0 12-67,2 17 130,61 495 30,-42-208 0,-24-322-101,-1 1-1,-2-1 1,0 0 0,-1 1-1,-2-2 1,-1 1 0,-2 5-59,-9 2-584,16-31 525,1-1 0,0 1 0,-1-1 0,1 1 0,-1-1 0,1 1 0,-1-1 1,1 1-1,-1-1 0,1 1 0,-1-1 0,1 0 0,-1 1 0,0-1 0,1 0 0,-1 0 0,0 1 0,1-1 0,-1 0 0,0 0 0,1 0 0,-1 0 0,0 0 0,1 0 0,-1 0 0,0 0 1,1 0-1,-1 0 0,0 0 0,1-1 0,-1 1 0,0 0 0,1 0 0,-1-1 0,1 1 0,-1 0 0,0-1 0,1 1 0,-1 0 0,1-1 0,-1 1 0,1-1 0,-1 1 0,1-1 0,0 1 1,-1-1-1,1 1 0,-1-2 59,-31-63-7867,15 37 4598</inkml:trace>
+  <inkml:trace contextRef="#ctx0" brushRef="#br0" timeOffset="-18680.968">5191 1725 5248,'19'4'4965,"-14"-5"-4847,0 1 0,0 0 0,0 0 0,-1 0 0,1 0 0,0 1 0,0 0 0,0 0 0,-1 1 0,1-1 0,0 1 0,-1 0 0,1 0 0,-1 0 0,0 1-118,15 6 411,203 92 1269,-79-27-973,4-6 0,66 17-707,-206-84 16,-1 1 1,0 0 0,1 0 0,-1 1 0,0 0 0,-1 0 0,1 0 0,0 1 0,-1 0 0,0 0 0,0 0 0,0 1 0,0-1 0,-1 1 0,1 0 0,-1 1 0,1 1-17,-6-6-85,1 0 1,-1-1-1,1 1 1,-1-1 0,0 1-1,1-1 1,-1 1-1,0-1 1,0 1 0,1-1-1,-1 1 1,0-1-1,0 0 1,1 1 0,-1-1-1,0 0 1,0 0-1,0 0 1,0 0 0,1 0-1,-1 1 1,0-2-1,0 1 1,0 0 0,0 0-1,0 0 1,1 0-1,-1 0 1,0-1 0,0 1-1,0 0 1,1-1-1,-1 1 1,0-1 0,0 1-1,1-1 1,-1 1-1,0-1 1,1 1 0,-1-1 84,-61-54-8976,35 24 6768</inkml:trace>
+  <inkml:trace contextRef="#ctx0" brushRef="#br0" timeOffset="-18350.709">5268 1809 5760,'48'-17'3328,"-42"11"-3177,-1 0 1,0 0 0,0 0-1,0-1 1,-1 0-1,0 0 1,0 0-1,0 0 1,-1-1 0,0 1-1,-1-1 1,1-1-152,12-31 645,23-34-212,3 1 1,4 2 0,4-1-434,130-216-4208,-134 208 1547</inkml:trace>
+  <inkml:trace contextRef="#ctx0" brushRef="#br0" timeOffset="-17808.994">6096 1609 5504,'4'0'2112,"-4"9"-1664,5-6 96,-5 6 0</inkml:trace>
   <inkml:trace contextRef="#ctx0" brushRef="#br0" timeOffset="-17290.338">6109 1653 9888,'63'159'1984,"-13"-24"-1968,-45-119-18,1 0 1,1 0-1,0 0 1,1-1-1,1-1 0,0 1 1,1-1-1,1-1 1,0 0-1,1 0 1,0-1-1,1-1 1,0 0-1,6 3 2,-17-12-16,0-1 0,1 0 0,-1 1 0,1-1 0,0 0 0,-1 0 0,1-1 0,0 1 0,-1-1 0,1 1 0,0-1 0,0 0 0,0 0 0,-1 0 0,1 0 0,0 0 0,0-1 0,-1 0 0,1 1 0,0-1 0,0 0 0,-1 0 0,1 0 0,-1-1 0,1 1 0,-1 0 0,0-1 0,1 0 0,-1 1 0,0-1 0,0 0 0,0 0 0,0-1 0,-1 1 0,1 0 0,-1 0 0,1-1 0,-1 1 0,0-1 0,1-2 16,4-13-4,-1-1 0,-1 0 0,-1 0 0,0 0-1,-2 0 1,0-12 4,4-41 1279,0-103 1777,-3 185-3051,0 0 0,1-1 1,0 1-1,1-1 1,0 1-1,1-1 0,0-1 1,3 6-6,18 36-86,-19-31-24,0 0 0,2-1 0,0 0 0,0 0 1,2-1-1,0-1 0,1 0 0,1 0 0,0-1 0,1-1 0,1 0 1,0-1-1,1-1 0,0 0 0,1-1 0,0-1 0,1 0 0,0-1 0,0-1 1,11 2 109,-22-9-309,0 1 0,1-1 0,-1-1 0,1 0 0,-1 0 1,1 0-1,-1-1 0,1 0 0,-1 0 0,0-1 0,6-2 309,41-18-2986</inkml:trace>
   <inkml:trace contextRef="#ctx0" brushRef="#br0" timeOffset="-16531.14">7484 1068 8576,'10'14'4522,"19"46"-3658,7 187-357,31 52-390,-65-289-153,0-6-71,-1 0 1,0 0-1,0 0 0,0 0 0,0 1 1,-1-1-1,0 0 0,1 0 0,-2 0 1,1 0-1,0 1 0,-1-1 0,0 0 1,0 0-1,-1 3 107,1-6-168,0-1 0,0 1 1,-1 0-1,1-1 0,0 1 1,-1-1-1,1 0 0,0 1 0,-1-1 1,1 0-1,0 0 0,-1 0 0,1 0 1,0 0-1,-1 0 0,1 0 0,-1 0 1,1-1-1,0 1 0,-1 0 0,1-1 1,0 1-1,0-1 0,-1 0 1,1 1-1,0-1 0,0 0 0,0 0 1,0 0-1,0 0 0,-1 0 168,-24-20-2597</inkml:trace>
   <inkml:trace contextRef="#ctx0" brushRef="#br0" timeOffset="-16218.757">6695 1546 8960,'-5'2'445,"4"-1"-288,-1 0 1,0-1-1,0 1 0,1 0 0,-1 0 1,0 0-1,1 0 0,-1 0 0,1 0 0,-1 0 1,1 1-1,0-1 0,0 0 0,-1 1 1,1-1-1,0 1 0,0-1 0,0 1 0,0 0 1,1-1-1,-1 1 0,0 0 0,1 0 0,-1 0 1,1-1-1,0 3-157,19-1-875,132-42-335,-20 9 1164,1 5 1,1 6 0,1 6-1,120 5 46,-92 8-3,196-1-3706,-285-1 1187</inkml:trace>
   <inkml:trace contextRef="#ctx0" brushRef="#br0" timeOffset="-14123.299">8581 1138 2048,'13'-4'768,"-8"1"-576,2-17-928,-2 16-416</inkml:trace>
   <inkml:trace contextRef="#ctx0" brushRef="#br0" timeOffset="-13576.554">8651 1020 6400,'-15'-28'4573,"-24"-24"-3834,26 39-738,0 2 1,-1 0 0,0 1 0,-1 0 0,0 1 0,0 1 0,-1 0-1,0 1 1,-1 1 0,0 1 0,0 0 0,0 1 0,-14-1-2,18 3-1,0 0 0,0 1 0,0 1 0,0 0 0,1 1 0,-1 0 0,0 1 0,0 0 0,1 1 0,-1 1 0,1 0 0,0 1 0,0 0 0,1 0 0,-1 1 0,1 1 0,0 0 0,1 1 0,-3 2 1,10-7-6,-1 1 1,1 0 0,0-1-1,0 1 1,1 0-1,-1 1 1,1-1-1,0 0 1,0 1-1,0-1 1,1 1-1,-1-1 1,1 1-1,0 0 1,1 0-1,-1-1 1,1 1-1,0 0 1,0 0-1,0 0 1,1 0-1,0-1 1,0 1-1,0 0 1,0-1-1,1 1 1,0 0-1,0-1 1,0 0-1,0 0 1,1 1-1,-1-1 1,1-1-1,1 2 6,10 10 28,0-1-1,1-1 1,0 0 0,1 0-1,1-2 1,0 0-1,0-1 1,1-1-1,1 0 1,-1-1-1,1-2 1,3 1-28,179 54-171,-183-60 201,-1 0 1,1 0-1,0-2 0,0 0 0,0-2 0,-1 1 0,1-2 1,-1-1-1,0 0 0,0-1 0,0 0 0,-1-2 0,0 0 0,0 0 1,-1-2-1,-1 0 0,1-1 0,-1 0 0,-1-1 0,0 0 1,-1-2-1,0 1 0,-1-1 0,-1-1 0,0 0 0,5-11-30,-7 8 168,0-1-1,-1 0 0,-1 0 1,-1-1-1,-1 1 1,-1-1-1,0 0 1,-1 0-1,-2-1 0,0 1 1,-1 0-1,-1 0 1,0 0-1,-2 0 0,0 1 1,-2-1-1,0 1 1,-2-2-168,-2-5 89,-1 2 0,-1-1 0,-1 2 1,-1-1-1,-1 2 0,-2 0 0,0 1 1,-1 1-1,0 0 0,-2 2 0,-1 0 1,0 1-1,-1 1 0,0 1 0,-2 1 1,0 1-1,0 1 0,-1 1 0,-26-7-89,30 13-216,-1 1-1,-1 1 0,1 0 1,0 2-1,-1 1 0,1 1 1,0 0-1,-1 2 0,1 1 1,0 0-1,1 2 0,-3 1 217,-28 11-978,2 2 0,0 2 1,2 2-1,-18 13 978,9 0-1803,10-1-890</inkml:trace>
   <inkml:trace contextRef="#ctx0" brushRef="#br0" timeOffset="-12696.899">9187 445 9984,'8'7'4048,"3"2"-3025,2 3-1374,23 16 321,-29-24 111,0 1 0,0 1 0,0-1 1,-1 1-1,0 0 0,0 1 0,0 0 1,-1 0-1,0 0 0,0 0 1,2 5-82,3 19-3,0 0 1,-2 1 0,-2 0 0,-1 0 0,-1 0 0,-1 24 2,1-10-57,5 204 324,-9-247-217,1-1-19,-1 0 0,1-1 1,-1 1-1,1 0 0,-1 0 1,0 0-1,0-1 0,0 1 1,0 0-1,0 0 1,0 0-1,-1 0 0,1-1 1,0 1-1,-1 0 0,1 0 1,-1-1-1,0 1 0,0 0 1,0-1-1,0 1 0,0-1 1,0 1-1,0-1 1,0 1-1,0-1 0,-1 0 1,1 0-1,0 0 0,-1 1 1,1-1-1,-1-1 0,0 1 1,1 0-1,-1 0 0,-1 0-31,-15-29 1152,-10-110-1317,26 129 220,1 7-72,0 1 1,0-1 0,0 0 0,0 1 0,1-1 0,-1 0-1,1 0 1,-1 1 0,1-1 0,0 0 0,-1 0 0,1 0-1,0 1 1,0-1 0,0 0 0,1 0 0,-1 0 0,0 1-1,1-1 1,-1 0 0,1 0 0,-1 1 0,1-1 0,0 0-1,0 1 1,0-1 0,0 1 0,0-1 0,0 1-1,0-1 1,1 1 0,-1 0 0,0 0 0,1-1 0,-1 1-1,1 0 1,-1 0 0,1 0 16,172-15-208,-165 15 200,17 0-493,0-2 0,-1 0 0,1-2 0,-1-1 0,0-1 0,0-1 0,-1-1 0,13-7 501,-5-9-3362,-19 2-1798,-11 7 2328</inkml:trace>
-  <inkml:trace contextRef="#ctx0" brushRef="#br0" timeOffset="-12284.642">9762 484 9600,'0'0'3717,"6"5"-3109,-4-4-587,0 0 1,-1 0 0,1 0-1,0 0 1,0 0-1,-1 1 1,1-1-1,0 1 1,-1-1-1,0 1 1,1 0-1,-1-1 1,0 1-1,0 0 1,0 0 0,0 0-1,0 0 1,0 0-1,0 0 1,-1 0-1,1 0 1,-1 0-1,0 1 1,1-1-1,-1 0 1,0 1-22,13 81 619,23 157-769,8 281 326,-43-516-117,0 16-867,-12-26-2320,2-13 579,0-8-459</inkml:trace>
+  <inkml:trace contextRef="#ctx0" brushRef="#br0" timeOffset="-12284.643">9762 484 9600,'0'0'3717,"6"5"-3109,-4-4-587,0 0 1,-1 0 0,1 0-1,0 0 1,0 0-1,-1 1 1,1-1-1,0 1 1,-1-1-1,0 1 1,1 0-1,-1-1 1,0 1-1,0 0 1,0 0 0,0 0-1,0 0 1,0 0-1,0 0 1,-1 0-1,1 0 1,-1 0-1,0 1 1,1-1-1,-1 0 1,0 1-22,13 81 619,23 157-769,8 281 326,-43-516-117,0 16-867,-12-26-2320,2-13 579,0-8-459</inkml:trace>
   <inkml:trace contextRef="#ctx0" brushRef="#br0" timeOffset="-11605.919">9985 1119 5632,'0'0'85,"0"0"1,0 0-1,0 1 1,0-1-1,-1 0 1,1 1-1,0-1 1,0 0-1,0 1 0,0-1 1,0 0-1,0 0 1,0 1-1,0-1 1,0 0-1,0 1 1,0-1-1,0 0 1,1 1-1,-1-1 1,0 0-1,0 1 0,0-1 1,0 0-1,0 0 1,1 1-1,-1-1 1,0 0-1,0 0 1,0 1-1,1-1 1,-1 0-1,0 0 1,0 0-1,1 0 1,-1 1-1,0-1 0,0 0 1,1 0-1,-1 0 1,0 0-1,1 0 1,-1 0-1,0 0 1,1 0-1,-1 1 1,0-1-1,1 0 1,-1 0-1,0-1 0,0 1 1,1 0-1,-1 0 1,0 0-1,1 0 1,-1 0-1,0 0 1,1 0-1,-1 0 1,0-1-1,0 1 1,1 0-1,-1 0 0,0 0 1,0 0-1,1-1 1,-1 1-1,0 0-85,6 15 306,24 73 899,-27-75-1229,0 0 0,1 0-1,1 0 1,-1-1-1,2 0 1,0 0 0,4 6 24,-7-14-51,-1 0 0,1-1 0,-1 0 1,1 0-1,0 0 0,0 0 1,1 0-1,-1 0 0,0-1 0,1 0 1,0 1-1,-1-1 0,1-1 0,0 1 1,0 0-1,0-1 0,0 0 1,0 0-1,1 0 0,-1-1 0,0 1 1,0-1-1,1 0 0,-1 0 0,0 0 1,0-1-1,0 0 0,1 0 1,-1 0-1,0 0 0,0 0 0,0-1 1,0 0-1,-1 0 0,1 0 0,0 0 1,-1 0-1,1-1 0,-1 0 1,0 1-1,0-1 0,0 0 0,0-1 51,2-6 208,0 0 0,-1-1 0,0 1 0,0-1 0,-2 1 0,1-1 0,-1 0 0,-1 0 0,0 0 0,0-1 0,-1 1 0,-1 0 0,0 0 0,-1-2-208,1-28 955,1 20-955,0 16-25,0 15-19,0 2 31,1 0 1,0 1-1,1-1 1,0 0-1,1 0 1,0 0-1,1-1 1,0 1 0,1-1-1,0 0 1,1 0-1,4 7 13,-5-9-141,1-1 1,0 1-1,0-1 0,1 0 0,0 0 0,0-1 1,1 0-1,0 0 0,0-1 0,1 0 0,0 0 1,0-1-1,0 0 0,0-1 0,1 0 1,0 0-1,0-1 0,0-1 0,0 1 0,5-1 141,141-2-6405,-104-8 3520</inkml:trace>
   <inkml:trace contextRef="#ctx0" brushRef="#br0" timeOffset="-10845.097">8188 1816 6784,'-4'5'1130,"4"-5"-1112,0 0 0,1 0-1,-1 0 1,0 0 0,1 0 0,-1 0 0,0 0-1,1 0 1,-1 1 0,0-1 0,1 0 0,-1 0 0,0 0-1,1 0 1,-1 0 0,0 1 0,0-1 0,1 0-1,-1 0 1,0 1 0,0-1 0,1 0 0,-1 0-1,0 1 1,0-1 0,0 0 0,1 0 0,-1 1 0,0-1-1,0 0 1,0 1 0,0-1 0,0 0 0,0 1-1,0-1 1,0 0 0,0 1 0,0-1 0,0 0-1,0 1 1,0-1 0,0 0 0,0 1 0,0-1 0,0 0-1,0 1 1,0-1 0,0 0 0,-1 1 0,1-1-1,0 0 1,0 1 0,0-1 0,-1 0 0,1 0 0,0 1-1,0-1 1,0 0 0,-1 0 0,1 0 0,0 1-1,-1-1-17,105-20 1963,106 16-944,315-10-731,307-56-288,-777 64-3,142-18-214,0 9-1,174 10 218,-95 28-2725,-212-16 160</inkml:trace>
   <inkml:trace contextRef="#ctx0" brushRef="#br0" timeOffset="-7899.67">8906 2538 3712,'26'-12'2202,"-24"12"-2203,0 0 0,0-1 0,0 1 0,0 0 0,0-1 0,0 0 0,0 1 0,0-1 0,0 0 0,0 0 0,0 0 0,-1 0 0,1 0 0,0-1 0,-1 1 0,1 0 0,-1-1 0,1 1 0,-1-1 0,0 0 0,0 1 0,0-1-1,1 0 1,-2 0 0,1 0 0,0 0 0,0 1 0,-1-1 0,1 0 0,-1-1 0,1 1 0,-1 0 0,0 0 0,0 0 0,0 0 0,0 0 0,0 0 0,0 0 0,-1 0 0,1 0 0,-1 0 0,1 0 0,-1 0 0,0 0 0,0 0-1,0-1 2,-13-14 207,0 1 0,0 1 0,-2 0 0,1 1 0,-2 1 0,0 0-1,-1 1 1,0 1 0,0 0 0,-2 2 0,1 0 0,-1 1 0,0 2-1,-12-4-206,13 7 223,0 1-1,0 1 0,0 0 1,0 2-1,0 0 1,0 1-1,0 1 0,0 0 1,0 2-1,1 0 0,0 1 1,0 1-1,-14 8-222,27-13 18,0-1-17,-1 0-1,1 1 1,-1 0-1,1 0 0,0 1 1,0-1-1,0 1 1,0 0-1,1 0 1,-1 1-1,1-1 1,-1 1-1,1 0 1,1 0-1,-1 0 1,0 1-1,1-1 0,0 1 1,0 0-1,0 0 1,1 0-1,0 0 1,0 1-1,0-1 1,1 1-1,-1-1 1,1 1-1,1-1 1,-1 1-1,1 4 0,3-2 37,1 0 0,1 0 0,-1-1 0,1 0 0,0 0 0,1 0 0,0 0 0,0-1 0,0 0 0,1-1 1,0 1-1,0-1 0,0 0 0,1-1 0,-1 0 0,1 0 0,0-1 0,0 0 0,4 1-37,21 6 10,-1-2-1,2-1 1,-1-2 0,1-1 0,-1-2-1,1-1 1,0-2 0,0-1-1,-1-1 1,1-2 0,-1-2 0,0 0-1,0-3 1,-1 0 0,-1-3 0,0 0-1,17-11-9,-36 19 48,-1-1 0,1 1-1,-2-2 1,1 0-1,-1 0 1,0-1 0,0 0-1,-1 0 1,0-1-1,-1-1 1,0 1 0,0-2-1,-1 1 1,0-1 0,-1 0-1,0 0 1,-1 0-1,0-1 1,-1 0 0,0 0-1,-1 0 1,0 0-1,-1-1 1,-1 1 0,0-1-1,0 1 1,-1-1 0,-1-5-48,-2 6 49,0 0 0,-1 0 1,0 0-1,-1 1 0,0-1 1,-1 1-1,0 0 0,-1 1 1,0-1-1,-1 2 0,0-1 1,0 1-1,-1 0 0,0 0 1,-1 1-1,0 1 0,0-1 1,-1 2-1,-11-6-49,-4-2 28,-2 2-1,0 1 1,0 1-1,-1 1 1,0 2 0,0 1-1,-27-2-27,28 5-171,1 2 0,0 1 1,-1 1-1,1 2 0,0 0 0,0 2 0,0 1 0,1 1 171,-126 57-5379,138-56 2771</inkml:trace>
-  <inkml:trace contextRef="#ctx0" brushRef="#br0" timeOffset="-7236.865">9994 2073 5888,'10'-9'3123,"-25"-29"-2828,6 29-63,0 1 0,-1 0 0,0 0 0,-1 1 0,1 1 0,-1-1-1,-1 2 1,1-1 0,-1 2 0,0-1 0,0 2 0,0-1 0,0 2 0,-1 0-1,1 0 1,-1 1 0,0 1 0,1 0 0,-1 0 0,1 2 0,-6 0-232,-8 4-90,0 0 0,1 2 0,0 0 1,0 2-1,1 1 0,1 0 1,0 2-1,0 1 0,1 1 1,1 0-1,-14 15 90,26-24 7,1 0 1,1 1-1,-1 0 1,1 0-1,0 1 0,1 0 1,0 0-1,0 0 1,1 1-1,0 0 1,0 0-1,1 0 0,0 1 1,1-1-1,0 1 1,0 0-1,1 0 0,1 0 1,-1 0-1,2 0 1,-1 0-1,2 0 1,0 8-8,6-3-40,0 0 0,2 0 0,0 0 0,0-1 0,1-1 0,1 0 0,1 0 0,-1-1 0,2 0 0,0-1 0,0-1 0,1 0 0,0 0 0,1-2 0,0 0 0,0 0 0,1-2 0,6 3 40,8 3-345,1 0 1,0-2 0,0-1-1,1-2 1,0-1 0,1-1 0,-1-2-1,1-1 1,31-3 344,19-7-2629</inkml:trace>
-  <inkml:trace contextRef="#ctx0" brushRef="#br0" timeOffset="-6286.121">10180 2379 6912,'-1'-9'3434,"29"1"-3204,-26 9-145,1-1 0,-1 0 1,0 0-1,0 1 0,0 0 1,0-1-1,1 1 0,-1 0 1,0 0-1,0 0 0,-1 0 1,1 0-1,0 0 0,0 1 1,0-1-1,-1 1 0,1-1 1,-1 1-1,1-1 0,-1 1 1,0 0-1,1 0 0,-1 0 1,0 0-1,0 0 0,-1 0 1,1 0-1,0 0 0,-1 0 1,1 0-1,-1 1 0,1-1 1,-1 1-86,7 16 11,0 0 0,2 0 1,0-1-1,1 0 1,1-1-1,1 0 1,3 2-12,-12-14-38,1-1 1,0 0 0,0 0 0,0 0 0,1-1 0,-1 0-1,1 1 1,0-1 0,0-1 0,0 1 0,0-1 0,1 0 0,-1 0-1,0-1 1,1 1 0,0-1 0,-1 0 0,1-1 0,0 0-1,-1 1 1,1-2 0,0 1 0,-1-1 0,1 0 0,-1 0-1,1 0 1,-1-1 0,1 0 0,-1 0 0,0 0 0,1-1 37,-1-3 14,-1 1 1,1-1 0,-1 0-1,-1-1 1,1 1 0,-1-1-1,-1 1 1,1-1 0,-1 0-1,0 0 1,0 0 0,-1 0-1,0 0 1,0-1 0,-1 1-1,0 0 1,0 0 0,-1 0-1,0-1 1,-2-5-15,2-21 1173,5-33-431,37 146-246,34 40-544,-70-114-13,-1 0 0,1-1 1,0 1-1,0-1 0,0 0 1,1 0-1,0 0 0,-1-1 1,1 0-1,0 0 1,1-1-1,-1 1 0,0-1 1,1-1-1,-1 1 0,1-1 1,-1 0-1,5-1 61,8 1-902,-1-1-1,1-1 1,-1-1-1,0 0 1,0-1-1,5-2 903,6-4-3280,-9-2 267</inkml:trace>
+  <inkml:trace contextRef="#ctx0" brushRef="#br0" timeOffset="-7236.866">9994 2073 5888,'10'-9'3123,"-25"-29"-2828,6 29-63,0 1 0,-1 0 0,0 0 0,-1 1 0,1 1 0,-1-1-1,-1 2 1,1-1 0,-1 2 0,0-1 0,0 2 0,0-1 0,0 2 0,-1 0-1,1 0 1,-1 1 0,0 1 0,1 0 0,-1 0 0,1 2 0,-6 0-232,-8 4-90,0 0 0,1 2 0,0 0 1,0 2-1,1 1 0,1 0 1,0 2-1,0 1 0,1 1 1,1 0-1,-14 15 90,26-24 7,1 0 1,1 1-1,-1 0 1,1 0-1,0 1 0,1 0 1,0 0-1,0 0 1,1 1-1,0 0 1,0 0-1,1 0 0,0 1 1,1-1-1,0 1 1,0 0-1,1 0 0,1 0 1,-1 0-1,2 0 1,-1 0-1,2 0 1,0 8-8,6-3-40,0 0 0,2 0 0,0 0 0,0-1 0,1-1 0,1 0 0,1 0 0,-1-1 0,2 0 0,0-1 0,0-1 0,1 0 0,0 0 0,1-2 0,0 0 0,0 0 0,1-2 0,6 3 40,8 3-345,1 0 1,0-2 0,0-1-1,1-2 1,0-1 0,1-1 0,-1-2-1,1-1 1,31-3 344,19-7-2629</inkml:trace>
+  <inkml:trace contextRef="#ctx0" brushRef="#br0" timeOffset="-6286.122">10180 2379 6912,'-1'-9'3434,"29"1"-3204,-26 9-145,1-1 0,-1 0 1,0 0-1,0 1 0,0 0 1,0-1-1,1 1 0,-1 0 1,0 0-1,0 0 0,-1 0 1,1 0-1,0 0 0,0 1 1,0-1-1,-1 1 0,1-1 1,-1 1-1,1-1 0,-1 1 1,0 0-1,1 0 0,-1 0 1,0 0-1,0 0 0,-1 0 1,1 0-1,0 0 0,-1 0 1,1 0-1,-1 1 0,1-1 1,-1 1-86,7 16 11,0 0 0,2 0 1,0-1-1,1 0 1,1-1-1,1 0 1,3 2-12,-12-14-38,1-1 1,0 0 0,0 0 0,0 0 0,1-1 0,-1 0-1,1 1 1,0-1 0,0-1 0,0 1 0,0-1 0,1 0 0,-1 0-1,0-1 1,1 1 0,0-1 0,-1 0 0,1-1 0,0 0-1,-1 1 1,1-2 0,0 1 0,-1-1 0,1 0 0,-1 0-1,1 0 1,-1-1 0,1 0 0,-1 0 0,0 0 0,1-1 37,-1-3 14,-1 1 1,1-1 0,-1 0-1,-1-1 1,1 1 0,-1-1-1,-1 1 1,1-1 0,-1 0-1,0 0 1,0 0 0,-1 0-1,0 0 1,0-1 0,-1 1-1,0 0 1,0 0 0,-1 0-1,0-1 1,-2-5-15,2-21 1173,5-33-431,37 146-246,34 40-544,-70-114-13,-1 0 0,1-1 1,0 1-1,0-1 0,0 0 1,1 0-1,0 0 0,-1-1 1,1 0-1,0 0 1,1-1-1,-1 1 0,0-1 1,1-1-1,-1 1 0,1-1 1,-1 0-1,5-1 61,8 1-902,-1-1-1,1-1 1,-1-1-1,0 0 1,0-1-1,5-2 903,6-4-3280,-9-2 267</inkml:trace>
   <inkml:trace contextRef="#ctx0" brushRef="#br0" timeOffset="6692.528">6422 3956 6528,'0'1'123,"1"-1"1,0 1 0,-1-1-1,1 1 1,0-1 0,0 1-1,0-1 1,-1 0 0,1 1-1,0-1 1,0 0 0,0 0-1,0 0 1,0 0 0,0 1-1,0-1 1,0 0 0,-1 0-1,1-1 1,0 1 0,0 0-1,0 0 1,0 0-1,0-1 1,0 1 0,-1 0-1,1-1 1,0 1 0,0-1-1,0 1 1,-1-1 0,1 1-1,0-1 1,-1 1 0,1-1-1,0 0 1,-1 1 0,1-1-1,-1 0 1,1 0 0,-1 0-1,1 0-123,15-41 1335,-16 36-1291,-1 0-1,0-1 1,0 1 0,0 0 0,-1 0 0,0 0 0,0 0 0,-1 0 0,1 0 0,-1 0 0,-1 1 0,1-1 0,-1 1 0,0 0 0,0 0 0,0 0 0,-1 1 0,0 0 0,0 0 0,0 0-1,0 0 1,0 1 0,-1-1 0,0 2 0,-4-3-44,-6-2 114,-1 1-1,1 0 0,-1 1 1,0 1-1,0 1 0,0 1 1,-1 0-1,-16 0-113,26 1-36,1 1 0,-1-1 0,0 2 0,0-1 0,0 1 0,1 0 0,-1 0 0,0 1 1,1 0-1,-1 0 0,1 1 0,0 0 0,0 0 0,0 1 0,0 0 0,1 0 0,-1 1 0,1-1 0,-1 2 36,6-1-21,0 0 0,1 0 1,-1 0-1,1-1 0,0 1 0,1 0 0,-1 0 0,1 0 0,0-1 0,0 1 0,0 0 1,1-1-1,0 1 0,0-1 0,0 0 0,0 1 0,0-1 0,1 0 0,0 0 0,0 0 1,0-1-1,1 1 0,-1-1 0,2 2 21,12 11 1,1 0 0,0-1 0,1-1 0,0-1 0,1-1 0,1 0 0,0-2 0,0 0 0,1-1 0,0-2 0,0 0 0,1-1 0,0-1 0,0-1 0,1-2 0,15 1-1,-17-3 24,0 0 0,-1-2 1,1 0-1,0-1 0,-1-1 0,1-2 1,-1 0-1,0-1 0,-1-1 1,0 0-1,5-5-24,-13 7 58,1-1 1,-1-1 0,0 0-1,-1-1 1,0 0 0,-1 0-1,0-2 1,0 1 0,-1-1-1,0 0 1,-1-1 0,0 0-1,-1 0 1,0-1 0,-1 0-1,-1 0 1,4-12-59,-7 14 119,0 0 1,0 0-1,-1-1 1,-1 1-1,0 0 0,0 0 1,-1-1-1,-1 1 1,0 0-1,0 0 0,-1 0 1,0 1-1,-1-1 1,-1 1-1,1 0 0,-1 0 1,-1 0-1,-3-3-119,-9-13 304,-1 1 0,-2 1 0,0 1 0,-2 1 0,0 0 0,-2 2-304,-24-20 55,-2 3 1,-1 1-1,-1 4 1,-2 1-1,-25-8-55,37 21-723,0 2 1,-1 2-1,-1 2 1,-37-6 722,68 16-594,0 1 0,-1 0 1,1 1-1,0 0 0,0 1 0,0 0 1,-11 4 593,-51 27-6750,48-9 3475</inkml:trace>
   <inkml:trace contextRef="#ctx0" brushRef="#br0" timeOffset="7807.48">7367 3116 7168,'18'13'5966,"4"5"-4658,1-5 2057,8-2-2074,-28-9-1283,-1 1-1,0-1 1,1 1-1,-1-1 1,0 1 0,-1 0-1,1 0 1,0-1-1,-1 1 1,0 0 0,0 1-1,0-1 1,0 0-1,0 0 1,0 0 0,-1 1-1,0-1 1,1 0-1,-1 0 1,-1 2-8,2 1 40,62 444-168,-37-236 107,-18-122 341,-8-92-314,0 1 0,0-1 0,-1 1 0,1-1 0,0 1 0,-1-1 0,1 1-1,0-1 1,-1 1 0,1-1 0,-1 0 0,1 1 0,-1-1 0,1 0 0,0 1 0,-1-1 0,1 0 0,-1 0 0,1 1 0,-1-1 0,0 0 0,1 0 0,-1 0 0,1 0 0,-1 0 0,1 0 0,-1 0 0,1 0 0,-1 0 0,0 0 0,1 0 0,-1 0 0,1 0 0,-1 0 0,1 0 0,-1-1 0,1 1-1,-1 0 1,1 0 0,-1-1 0,1 1 0,-1 0 0,1-1 0,-1 1 0,1 0 0,0-1 0,-1 1 0,1-1 0,-1 1 0,1 0 0,0-1 0,0 1 0,-1-1-6,-24-24 158,-36-110-120,59 134-39,0-1 1,1 0 0,-1 0 0,1-1-1,-1 1 1,1 0 0,0 0 0,0-1-1,0 1 1,0-1 0,0 1 0,0-1-1,1 1 1,0-1 0,-1 1 0,1-1-1,0 0 1,0 1 0,0-1 0,0 1-1,1-1 1,-1 0 0,1 1 0,-1-1-1,1 1 1,0-1 0,0 1 0,0 0-1,1-1 1,-1 1 0,0 0 0,1 0-1,-1 0 1,1 0 0,0 0 0,0 0-1,0 0 1,0 1 0,0-1 0,0 1-1,0-1 1,1 1 0,161-12-223,-74 10 286,2-2-106,-23 2-654,0-3 1,-1-3-1,25-8 697,-9-3-4357,-82 12 639,2-3 652</inkml:trace>
   <inkml:trace contextRef="#ctx0" brushRef="#br0" timeOffset="8201.512">8210 3287 8320,'12'-5'6159,"17"10"-3503,-16 11 950,9 48-3105,-7-15-516,-3 0 1,-1 1-1,-3 1 1,-3 0-1,-1 0 1,-3 36 14,1-13 12,25 151 15,-23-183-666,-4-32-3612,1-43-1600,3 3 2182</inkml:trace>
   <inkml:trace contextRef="#ctx0" brushRef="#br0" timeOffset="8802.758">8710 3840 9984,'-6'8'3794,"7"-19"-2783,0 6-840,0 1 0,0-1 0,0 1 0,0-1 0,1 1 0,0 0-1,0 0 1,0-1 0,0 2 0,1-1 0,-1 0 0,1 0 0,0 1 0,0-1 0,0 1 0,1 0 0,-1 0 0,1 0 0,3-1-171,-6 4 44,1 0 0,0 1 0,-1-1 0,1 1 0,0-1 0,-1 1 0,1-1 0,-1 1 1,1 0-1,-1 0 0,1 0 0,-1 0 0,0 0 0,0 0 0,1 0 0,-1 1 0,0-1 0,0 0 0,0 1 0,0-1 1,0 1-1,-1-1 0,1 1 0,0-1 0,-1 1 0,1-1 0,-1 1 0,1 0 0,-1-1 0,0 1 0,0 0 0,0 0 1,0-1-1,0 1 0,0 0 0,0-1 0,0 1 0,-1 0 0,1 0-44,1 7 57,71 294 225,-70-295-273,1 0-1,-1-1 0,1 0 0,1 1 0,-1-1 1,1 0-1,0-1 0,1 1 0,-1-1 0,2 0 1,-1 0-1,0 0 0,7 4-8,-9-9 27,0-1-1,0 1 1,0-1 0,0 0-1,0 0 1,-1 0 0,1 0-1,0 0 1,0-1 0,0 0-1,0 1 1,0-1 0,-1 0-1,1 0 1,0-1 0,-1 1-1,1 0 1,-1-1 0,1 0-1,-1 1 1,0-1 0,1 0-1,-1 0 1,0-1 0,-1 1-1,1 0 1,0 0 0,0-1-1,-1 1 1,0-1 0,1 0-1,-1 1 1,0-1 0,0-1-27,19-34 33,-2 0 1,-2-2 0,-1 0 0,1-11-34,10-26-55,23-65-2324,-44 111 368,-33 58-4362,11-5 3243</inkml:trace>
-  <inkml:trace contextRef="#ctx0" brushRef="#br0" timeOffset="9384.557">6052 4559 8448,'-34'26'4629,"32"-25"-3968,3 1-603,0-1 0,0 1 0,0-1 0,1 0 0,-1 0 0,0 1 0,0-1 0,1 0 0,-1 0 0,1 0 0,-1 0 0,1 0-1,-1-1 1,1 1 0,-1 0 0,1-1 0,0 1 0,-1-1 0,1 0 0,0 1 0,-1-1 0,1 0 0,0 0 0,0 0 0,-1 0 0,1 0 0,0-1 0,0 1-1,-1 0 1,1-1 0,0 1 0,0-2-58,2 2 66,139-28 158,155-7-416,2 13 0,77 12 192,414 26 321,-282-1-2546,127-27 2225,-624 12-144,70-5-2771,-1-3 1,33-10 2914,-65 6-2629</inkml:trace>
+  <inkml:trace contextRef="#ctx0" brushRef="#br0" timeOffset="9384.556">6052 4559 8448,'-34'26'4629,"32"-25"-3968,3 1-603,0-1 0,0 1 0,0-1 0,1 0 0,-1 0 0,0 1 0,0-1 0,1 0 0,-1 0 0,1 0 0,-1 0 0,1 0-1,-1-1 1,1 1 0,-1 0 0,1-1 0,0 1 0,-1-1 0,1 0 0,0 1 0,-1-1 0,1 0 0,0 0 0,0 0 0,-1 0 0,1 0 0,0-1 0,0 1-1,-1 0 1,1-1 0,0 1 0,0-2-58,2 2 66,139-28 158,155-7-416,2 13 0,77 12 192,414 26 321,-282-1-2546,127-27 2225,-624 12-144,70-5-2771,-1-3 1,33-10 2914,-65 6-2629</inkml:trace>
   <inkml:trace contextRef="#ctx0" brushRef="#br0" timeOffset="11365.783">6695 5363 6656,'-15'-6'3536,"-9"-14"-3644,17 14 504,-121-104 494,120 102-910,0 0-1,0 1 0,-1 0 0,1 0 0,-2 1 1,1 0-1,-1 0 0,0 1 0,0 1 0,-7-3 21,16 7 2,0-1 0,0 1-1,0 0 1,0 0 0,1 0 0,-1 0-1,0 1 1,0-1 0,0 0-1,1 0 1,-1 0 0,0 1 0,0-1-1,1 0 1,-1 1 0,0-1-1,1 1 1,-1-1 0,0 1 0,1-1-1,-1 1 1,0-1 0,1 1-1,-1 0 1,1-1 0,-1 1 0,1 0-1,0-1 1,-1 1 0,1 0-1,0-1 1,-1 1 0,1 0 0,0 0-1,0 0 1,0-1 0,-1 1-1,1 0 1,0 0 0,0 0 0,0-1-1,1 1 1,-1 1-2,5 35-308,4-20 395,1 0 1,1 0-1,1-1 1,0-1-1,1 0 1,0 0 0,2-1-1,-1-1 1,2-1-1,0 0 1,0 0-1,1-2 1,0 0-1,1-1 1,0-1 0,0-1-1,1 0 1,0-2-1,0 0 1,1-1-1,-1 0 1,1-2-1,0-1 1,3 0-88,-12-1-28,1 0-1,-1 0 1,0-1-1,0-1 1,0 0 0,0-1-1,0 0 1,0 0-1,-1-1 1,0-1 0,1 1-1,-1-2 1,-1 0 0,1 0-1,-1 0 1,0-1-1,-1 0 1,0-1 0,0 0-1,0-1 1,-1 1-1,0-1 1,-1 0 0,0-1-1,-1 0 1,0 0 0,0 0-1,-1-1 1,0 1-1,-1-1 1,1-3 28,-2 2 90,-1 0 0,0-1 0,-1 1 0,0 0-1,-1-1 1,0 1 0,-1 0 0,-1 0 0,0 0 0,0 0 0,-1 0 0,0 1 0,-1 0 0,-1 0-1,0 0 1,0 0 0,-1 1 0,0 0 0,-1 1 0,-1-2-90,-11-10 43,0 1-1,-1 1 1,-1 1-1,-1 0 1,0 2-1,-1 1 1,-1 1 0,-5-1-43,-4-2 156,0 2 0,-1 1 0,-1 2 0,0 1 0,0 2 0,-1 2 0,0 1 1,0 2-1,-1 1 0,1 2 0,-25 3-156,17 2-253,-1 2-1,1 2 1,0 2 0,-22 9 253,-50 20-6224,93-27 3152</inkml:trace>
   <inkml:trace contextRef="#ctx0" brushRef="#br0" timeOffset="12188.61">7835 4765 4864,'-2'-2'282,"-1"0"0,1 0 0,-1 0 0,1 0 0,-1 1 0,0-1 0,0 1 0,0 0 0,0 0 0,0 0 0,0 0 0,0 0 0,0 1 0,0-1 0,0 1 0,0 0 0,-3 0-282,-22 1 1072,0 0 0,0 2 0,0 2 0,-20 5-1072,-52 14 1435,33-9-1016,0 3-1,-45 19-418,104-34-52,1-1 0,1 1 0,-1 0 0,0 0 0,1 1 0,-1 0 0,1 0 0,0 1 0,1 0 0,-1 0 0,1 0 0,0 0 0,0 1 0,0 0 0,1 0 0,0 0 0,0 1 0,1-1 0,0 1 0,0 0 0,0 0 0,1 0 0,0 0 0,0 1 0,1-1 0,0 0 0,0 1 0,1 0 52,2 2-38,1-1 0,0 1 0,0 0 0,1-1 0,0 1 0,1-1 0,0 0 0,0-1 0,1 1 0,0-1 0,1 0 0,0-1 0,0 1 0,0-1 0,1-1 0,3 3 38,143 84-405,-140-86 238,1 0 0,-1-1 1,1-1-1,0 0 0,1-1 1,-1-1-1,1 0 0,0-1 0,0-1 167,-7-1-594,0 0 0,0-1 0,0 0-1,-1 0 1,1-1 0,0 0 0,-1-1 0,0 0-1,0 0 1,1-1 0,-2 0 594,29-19-3312</inkml:trace>
   <inkml:trace contextRef="#ctx0" brushRef="#br0" timeOffset="12901.21">7737 5110 5504,'26'-19'3104,"-25"18"-2571,-1 1-42,0 0-6,0 23 1179,23 57 128,-9-37-1720,-13-38-72,-1 0-1,1-1 1,0 1 0,0 0 0,1-1 0,0 1 0,-1-1 0,2 0 0,-1 1 0,0-1-1,1 0 1,0 0 0,-1-1 0,2 1 0,-1 0 0,0-1 0,1 0 0,-1 0 0,1 0 0,0 0-1,0-1 1,0 1 0,1-1 0,4 0-103,1-1 0,0 0 0,-1-1-1,1 0 1,-1-1 0,1 0 0,0 0-1,-1-1 1,1 0 0,-1 0 0,0-1-1,0-1 1,0 1 0,0-2 0,-1 1-1,1-1 1,-1 0 0,0-1 0,-1 0-1,1 0 1,-1-1 0,0 0 0,-1 0-1,0 0 1,5-7 103,-7 5 340,1 0 1,-2-1-1,1 1 1,-1-1-1,0 1 1,-1-1-1,0 0 0,-1 0 1,0 0-1,0 0 1,-1 0-1,-1-2-340,-12 25 1355,10-5-1246,0-1 0,0 1 0,0 0 0,1 0 0,0 0 0,1 0-1,0 0 1,0 0 0,1 0 0,0 0 0,1 7-109,-1-14-9,0 7-47,0 0 0,1 0 0,0-1 0,0 1 0,1-1 0,0 1 1,0-1-1,1 0 0,0 1 0,0-1 0,1-1 0,0 1 0,0 0 0,1-1 0,-1 0 0,1 0 0,1 0 0,-1-1 0,4 3 56,-5-5-238,1 0 0,0 0-1,0 0 1,0-1 0,0 1-1,0-1 1,1 0 0,-1-1-1,1 1 1,-1-1 0,1 0-1,0-1 1,-1 1 0,1-1-1,0 0 1,-1-1 0,6 0 238,52-15-3846,-24 5 1036</inkml:trace>
@@ -1207,7 +1208,7 @@
   <inkml:trace contextRef="#ctx0" brushRef="#br0" timeOffset="23055.721">11354 4448 6400,'-30'-14'3753,"15"4"-3309,15 9-382,-1 0 0,1 1 0,0-1 0,-1 0 1,1 0-1,0 0 0,-1 1 0,1-1 0,0 0 0,0 0 0,0 0 0,0 0 0,0 0 0,0 1 0,0-1 1,0 0-1,0 0 0,0 0 0,0 0 0,0 0 0,1 1 0,-1-1 0,0 0 0,1 0 0,-1 0 1,1 1-1,-1-1 0,1 0 0,-1 0 0,1 1 0,-1-1 0,1 1 0,0-1 0,-1 0 0,1 1 1,0-1-1,-1 1 0,1-1 0,0 1 0,0 0 0,0-1 0,-1 1 0,2 0-62,4-6 178,7-8 50,-1-1 1,0 0-1,-1-1 1,-1 0-1,0-1 1,-1-1-229,37-79 576,-7 12-584,5 1 0,23-31 8,194-266-6555,-221 320 3654</inkml:trace>
   <inkml:trace contextRef="#ctx0" brushRef="#br0" timeOffset="23911.597">12054 4594 7936,'12'1'4281,"24"-18"-3602,4-10 638,-39 26-490,0 14-643,1-1 1,0 0-1,1 0 1,0 0-1,1 0 1,0 0-1,1-1 1,0 0-1,3 3-184,22 61-77,9 114-365,-20-91 447,-18-97 21,0 0 1,-1 0-1,1 0 0,0-1 1,0 1-1,0 0 0,0 0 0,0-1 1,0 1-1,0-1 0,0 1 1,0-1-1,0 1 0,0-1 0,0 0 1,1 1-1,-1-1 0,0 0 1,0 0-1,0 0 0,0 0 0,1 0 1,-1 0-1,0 0 0,0 0 1,0 0-1,0-1 0,0 1 0,1 0 1,-1-1-1,0 1 0,0-1 1,0 1-1,0-1 0,0 0 0,0 1 1,0-1-1,-1 0 0,1 0 1,0 0-1,0 0 0,0 1 0,-1-1 1,1 0-1,0 0 0,-1 0 1,1-1-1,-1 1 0,0 0 0,1 0 1,-1 0-1,0 0 0,1 0 1,-1 0-1,0-1 0,0 1-26,13-24 307,-2 0 1,0 0-1,-1-1 0,-2 0 0,4-21-307,7-21 91,19-56-70,41-127-3365,-79 251 3053,1 0 0,-1 0-1,0 0 1,0 1 0,1-1-1,-1 0 1,0 0 0,1 0 0,-1 0-1,0 0 1,1 0 0,-1 0-1,0 0 1,1 0 0,-1 0 0,0 0-1,1 0 1,-1 0 0,0 0-1,1 0 1,-1 0 291,-2 22-3029</inkml:trace>
   <inkml:trace contextRef="#ctx0" brushRef="#br0" timeOffset="24609.926">13364 3997 9344,'20'15'4817,"10"37"-4605,1 205 396,-6-68-544,-24-162-144,-27-50-2731,-32-64-4831,31 53 4954</inkml:trace>
-  <inkml:trace contextRef="#ctx0" brushRef="#br0" timeOffset="24818.899">12799 4282 9472,'-28'10'3061,"16"-4"-1670,19-4-1224,18-5-866,101-22-912,105-13 1366,-34 27-897,1 9 1,98 15 1141,-249-9-2629</inkml:trace>
+  <inkml:trace contextRef="#ctx0" brushRef="#br0" timeOffset="24818.898">12799 4282 9472,'-28'10'3061,"16"-4"-1670,19-4-1224,18-5-866,101-22-912,105-13 1366,-34 27-897,1 9 1,98 15 1141,-249-9-2629</inkml:trace>
   <inkml:trace contextRef="#ctx0" brushRef="#br0" timeOffset="25838.285">14260 4072 6784,'22'-6'3596,"-19"4"-3551,-1 1 1,1-1 0,-1 0-1,0 0 1,0 0-1,0-1 1,0 1-1,0 0 1,0-1 0,0 1-1,-1-1 1,0 0-1,1 0 1,-1 1-1,0-1 1,0-2-46,-1 1 93,-1 1 1,0 0-1,0 0 0,0 0 1,-1 0-1,1 0 0,-1 0 1,0 0-1,0 1 0,0-1 1,0 0-1,0 1 0,0 0 1,-1-1-1,1 1 0,-1 0 1,1 0-1,-3 0-93,-3-4-6,0 2 0,-1-1 0,0 1 0,0 1 1,0-1-1,0 2 0,-1-1 0,1 1 0,-1 1 0,1-1 0,-1 2 1,0-1-1,1 1 0,-1 1 0,0 0 0,1 0 0,-1 1 0,1 0 0,-1 1 1,-6 3 5,12-5-3,0 1 0,0 0 0,1 0 0,-1 0 0,1 0 0,-1 1 0,1-1 0,0 1 0,0 0 1,0 0-1,0 0 0,1 0 0,-1 0 0,1 1 0,0-1 0,0 1 0,0-1 0,1 1 0,-1 0 0,1 0 1,0 0-1,0 0 0,0 0 0,0 0 0,1 0 0,-1 0 0,1 0 0,0 1 0,1-1 0,-1 0 0,1 0 1,-1 0-1,2 3 3,1 0 17,-1 0 1,1 1-1,1-1 1,-1 0 0,1-1-1,1 1 1,-1-1-1,1 0 1,0 0 0,0 0-1,1-1 1,0 1-1,0-1 1,0-1 0,0 1-1,1-1 1,0 0-1,0-1 1,0 0 0,0 0-1,0 0 1,1-1-1,-1 0 1,1 0 0,0-1-1,-1 0 1,1 0-1,0-1 1,0 0 0,7-1-18,-8 1 35,0-1 0,0 1 0,0-1 0,0-1 0,0 1 0,0-1 0,0-1 0,-1 1 0,1-1 1,-1 0-1,1 0 0,-1-1 0,0 0 0,0 0 0,-1-1 0,1 1 0,-1-1 0,0 0 0,0-1 1,-1 1-1,1-1 0,-1 0 0,-1 0 0,1 0 0,-1 0 0,0-1 0,0 0 0,-1 1 0,0-1 0,0 0 1,0-5-36,-2-5 167,0-1 1,-2 1 0,0 0 0,-1 0 0,0 0-1,-1 0 1,-2 0 0,1 1 0,-2 0-1,0 0 1,-1 0 0,0 1 0,-4-3-168,0-6 4,-1 0 1,-2 1 0,0 1-1,-1 0 1,-1 1-1,-2 1 1,0 1-1,0 0 1,-2 2 0,0 0-1,-1 1 1,-1 1-1,0 2 1,-25-11-5,23 15-723,0 1-1,-1 2 1,0 1 0,-1 0 0,1 2 0,-1 2 0,1 0-1,-1 1 1,1 2 0,-14 3 723,-2 5-2645</inkml:trace>
   <inkml:trace contextRef="#ctx0" brushRef="#br0" timeOffset="26707.696">14439 3611 7168,'27'2'4593,"-1"0"-3677,-13 19 764,-7 54-1381,-7-10-87,4-1 0,2 0 1,4 0-1,1-1 1,4 0-1,3 1-212,9 15 432,-25-78-235,-10-22 38,4 5-219,1 1 0,0 0 0,1-1 0,1 0 0,1 0 0,0 1 0,1-1 0,1 0 0,0-4-16,2 16-18,-1 1 0,0-1 0,1 1 0,-1 0 0,1 0 0,0 0 0,0 0 0,0 1 0,1-1-1,-1 1 1,0 0 0,1 0 0,0 0 0,-1 0 0,1 1 0,0-1 0,0 1 0,0 0 0,0 0 0,0 0 0,0 1 0,0 0 0,0-1-1,1 1 1,-1 1 0,0-1 0,0 1 0,0-1 0,4 2 18,3-1 2,158-2-2685,-167 1 2515,-1 0-1,1 0 1,0 0 0,-1 0 0,1-1-1,-1 1 1,1 0 0,0-1 0,-1 1 0,1-1-1,-1 1 1,1-1 0,-1 0 0,1 0-1,-1 0 1,0 0 0,1 0 0,-1 0-1,0 0 1,0 0 0,0 0 0,0-1-1,0 1 1,0 0 0,0-1 0,0 1 0,-1 0-1,1-1 1,0 1 0,-1-1 0,1 0-1,-1 1 1,1-1 168,7-16-4602,-4 4 2495</inkml:trace>
   <inkml:trace contextRef="#ctx0" brushRef="#br0" timeOffset="27125.946">14979 3654 9216,'-7'1'6528,"7"6"-3874,13 17-2703,-6-11 942,0 0-754,-1 0 1,-1 1-1,0 0 1,-1 0-1,-1 1 1,0-1-1,0 4-139,2 88-90,-4-55 20,3-1-1,2 1 0,2 0 0,3 3 71,24 65 165,-35-106-967,0-13-968,2-4 646,20-44-9649,-14 32 7504</inkml:trace>
@@ -1216,9 +1217,9 @@
   <inkml:trace contextRef="#ctx0" brushRef="#br0" timeOffset="28736.822">14092 4483 128,'-4'4'0</inkml:trace>
   <inkml:trace contextRef="#ctx0" brushRef="#br0" timeOffset="29171.276">14070 4451 7552,'-15'4'2068,"-29"4"-552,53-20-1324,23 0 1850,-21 11-1945,-1 0-1,1 0 0,-1 1 1,1 0-1,-1 1 0,1 0 1,-1 1-1,0 0 0,1 0 1,-1 1-1,0 1 0,0-1 1,6 5-97,13 2 369,60 17 49,1-4 1,1-5-1,1-3 1,29-2-419,375 10-51,-362-20 86,-101-2-90,221 6-2716,192 32 2771,-291-15-3403,-102-16 278</inkml:trace>
   <inkml:trace contextRef="#ctx0" brushRef="#br0" timeOffset="30278.048">14640 5308 6528,'3'0'1854,"-1"-3"-78,-3-4-1876,1 6 36,1-3 139,-1 0-1,0 0 0,0 0 1,0 0-1,0 0 1,-1 0-1,0 0 0,0 0 1,0 0-1,0 0 1,0 0-1,-1 1 0,1-1 1,-1 0-1,0 1 0,-1 0 1,1-1-1,0 1 1,-2-1-75,-5-6 40,0 1 1,-1 1 0,0-1-1,-1 2 1,0-1 0,0 1-1,0 1 1,-1 0 0,0 1-1,0 0 1,0 1 0,-1 0-1,1 1 1,-1 0 0,0 1-1,0 1 1,0 0 0,0 1-1,0 0 1,0 0 0,0 2-1,0 0 1,0 0 0,0 1-1,1 1 1,-1 0 0,1 1-1,0 0 1,0 1 0,1 0-1,0 0 1,-3 4-41,10-8-21,1 0 1,0 0-1,0 0 1,0 1-1,0-1 1,0 1 0,0-1-1,1 1 1,-1 0-1,1 0 1,0 1-1,0-1 1,0 0-1,0 1 1,1-1-1,-1 1 1,1-1-1,0 1 1,0 0-1,0 0 1,1-1-1,-1 1 1,1 0-1,0 0 1,0 0-1,0 0 1,1-1-1,-1 1 1,1 0-1,0 0 1,0 0-1,0-1 1,1 1-1,-1-1 1,1 1-1,0-1 1,0 0-1,1 2 21,2 0 10,0 1 0,1-2 1,-1 1-1,1 0 0,0-1 0,1 0 0,-1-1 0,1 1 0,-1-1 0,1 0 0,0-1 0,0 0 0,0 0 0,1 0 0,-1-1 0,0 0 0,1-1 1,-1 1-1,0-2 0,1 1-10,11-1-7,1-1 0,-1-1 1,0 0-1,-1-1 0,1-2 1,-1 0-1,4-2 7,-13 5 42,0 0 1,-1-1-1,0 0 0,1 0 0,-1-1 1,-1 0-1,1-1 0,-1 1 0,0-1 1,0-1-1,-1 1 0,1-1 0,-2 0 1,1-1-1,-1 1 0,0-1 1,0 0-1,-1-1 0,0 1 0,-1-1 1,0 1-1,0-1 0,-1 0 0,0 0 1,-1-1-1,0 1 0,0-3-42,-3-4 121,-1 0 0,0 0-1,-1 0 1,-1 0 0,-1 0-1,0 1 1,-1 0 0,-1 0 0,0 1-1,-1 0 1,0 0 0,-1 1-1,-1 1 1,0-1 0,-1 2-1,0-1 1,0 2 0,-1 0 0,-9-5-121,0-1-165,0 0 1,-1 2 0,0 1 0,-1 1 0,-1 1 0,0 1 0,0 1 0,-5 0 164,-12-2-1233,-1 2-1,0 2 1,-1 2 0,-27 0 1233,8 5-2149,5 7-336</inkml:trace>
-  <inkml:trace contextRef="#ctx0" brushRef="#br0" timeOffset="30957.609">15015 5081 3456,'1'-1'226,"0"-1"1,0 1-1,0-1 1,0 1-1,0-1 1,-1 0-1,1 1 1,-1-1-1,1 0 0,-1 0 1,1 0-1,-1 1 1,0-1-1,0 0 1,0 0-1,0 0 1,0 0-1,0 1 1,-1-1-1,1 0 0,-1 0 1,1 0-1,-1 1 1,1-1-1,-1 0 1,0 0-227,-3-2 307,0-1 0,0 1 0,0 0 1,-1 1-1,0-1 0,1 1 0,-1 0 1,0 0-1,0 0 0,-1 1 0,1-1 1,-1 1-1,1 1 0,-5-2-307,-25-10 344,-32-17-824,57 27 520,0 0 1,0 1-1,-1 0 0,1 1 0,-1 0 1,1 0-1,-1 1 0,1 1 1,-1 0-1,1 0 0,0 1 0,-1 0 1,1 1-1,0 0 0,0 1 1,1 0-1,-1 0 0,1 1 1,0 0-1,0 1 0,0 0 0,1 0 1,0 1-1,0 0 0,1 1 1,0 0-1,-2 2-40,4-2-67,0 0 0,1 0 0,0 1 1,0-1-1,1 1 0,0 0 0,1 0 0,-1 1 0,2-1 1,-1 0-1,2 1 0,-1-1 0,1 1 0,0-1 0,1 0 1,0 1-1,1-1 0,0 0 0,0 0 0,1 0 0,0 0 1,1 0-1,0 0 0,0-1 0,1 0 0,0 0 0,0 0 1,1 0-1,0-1 0,0 0 0,1 0 0,0-1 67,5 4-188,1 0-1,0-2 0,0 1 1,1-2-1,-1 0 1,2 0-1,-1-1 0,1-1 1,11 2 188,85 4-5428,-63-15 2399</inkml:trace>
+  <inkml:trace contextRef="#ctx0" brushRef="#br0" timeOffset="30957.608">15015 5081 3456,'1'-1'226,"0"-1"1,0 1-1,0-1 1,0 1-1,0-1 1,-1 0-1,1 1 1,-1-1-1,1 0 0,-1 0 1,1 0-1,-1 1 1,0-1-1,0 0 1,0 0-1,0 0 1,0 0-1,0 1 1,-1-1-1,1 0 0,-1 0 1,1 0-1,-1 1 1,1-1-1,-1 0 1,0 0-227,-3-2 307,0-1 0,0 1 0,0 0 1,-1 1-1,0-1 0,1 1 0,-1 0 1,0 0-1,0 0 0,-1 1 0,1-1 1,-1 1-1,1 1 0,-5-2-307,-25-10 344,-32-17-824,57 27 520,0 0 1,0 1-1,-1 0 0,1 1 0,-1 0 1,1 0-1,-1 1 0,1 1 1,-1 0-1,1 0 0,0 1 0,-1 0 1,1 1-1,0 0 0,0 1 1,1 0-1,-1 0 0,1 1 1,0 0-1,0 1 0,0 0 0,1 0 1,0 1-1,0 0 0,1 1 1,0 0-1,-2 2-40,4-2-67,0 0 0,1 0 0,0 1 1,0-1-1,1 1 0,0 0 0,1 0 0,-1 1 0,2-1 1,-1 0-1,2 1 0,-1-1 0,1 1 0,0-1 0,1 0 1,0 1-1,1-1 0,0 0 0,0 0 0,1 0 0,0 0 1,1 0-1,0 0 0,0-1 0,1 0 0,0 0 0,0 0 1,1 0-1,0-1 0,0 0 0,1 0 0,0-1 67,5 4-188,1 0-1,0-2 0,0 1 1,1-2-1,-1 0 1,2 0-1,-1-1 0,1-1 1,11 2 188,85 4-5428,-63-15 2399</inkml:trace>
   <inkml:trace contextRef="#ctx0" brushRef="#br0" timeOffset="31557.625">15228 5236 9472,'5'17'4232,"17"-4"-2669,5 5-1817,10 73 979,50 27-629,-86-117-78,0 0-1,-1 0 1,1 0-1,0-1 1,-1 1-1,1 0 1,0-1-1,0 1 1,-1 0-1,1-1 1,0 1-1,0-1 1,0 1-1,0-1 1,0 1-1,0-1 1,0 0-1,0 0 1,0 1-1,0-1 1,0 0-1,0 0 1,0 0 0,0 0-1,0 0 1,0 0-1,0-1 1,0 1-1,0 0 1,0 0-1,0-1 1,0 1-1,0 0 1,0-1-1,0 1 1,0-1-1,-1 0 1,1 1-1,0-1 1,0 0-18,25-37 291,-20 27-376,12-20-289,-1-1 1,-2-1-1,-1-1 1,3-13 373,-14 35-495,0 0 1,-1 0 0,0 0 0,0 0 0,-2-1 0,1 1 0,-2 0 0,1-1 0,-2-4 494,-7-5-2208,-3 4-624</inkml:trace>
-  <inkml:trace contextRef="#ctx0" brushRef="#br0" timeOffset="41674.531">15581 505 4608,'17'0'4603,"29"3"-2444,106 28-1012,-95-23-658,0-3 0,1-2 0,4-2-489,68 2 597,-90 1 886,-36-3-1416,-1-1 0,1 1 0,-1-1 0,1 1 0,-1 0 0,1 1 0,-1-1 0,0 0 0,0 1 0,0 0 0,0 0 0,0 0 0,0 0 0,0 0 0,0 1 0,-1-1 0,1 1 0,-1-1 0,0 1 0,0 0 0,0 0 0,0 1-67,35 76 1303,-33-71-1275,38 175 845,-31-118-685,20 103-23,-49-10 577,14-9-502,43 124 96,-48-189 226,1-50-436,-32 269 55,-19-110 358,51-136-584,-14 43 410,12-72-309,0 1 0,3 0 0,0 1 0,2 0 0,1 0 0,1 0 0,2 0 0,1 1 1,2 5-57,-2-5 7,-27 139 3,31 38-180,-10-100 443,3-92-297,1 1 0,1 0-1,1 0 1,0 0 0,1-1 0,2 6 24,1 0 17,0 0 1,-2 0-1,-1 0 1,0 0-1,-2 1 1,0-1-1,-5 17-17,2 108-144,17 53 80,-4 76 262,28 155 52,-6-104 81,-27-264-349,-2-1 0,-3 1 1,-9 55 17,1 59 480,0-51-486,-9-15-111,4-104-22,3-1-42,9-7 48,2 0 10,0 0 54,-19 1-470,16 22 651,11-4-133,-7-18 53,-1-1 21,0 0-16,0 0 1,0 0 4,-18-1-10,-31-11 374,-94-11-118,-222 16-1248,173 3 160,148 14 368,43-9 346,1-1-26,1 2 70,-1 0-1,1 0 0,0 0 1,0 0-1,0-1 0,0 1 1,1 0-1,-1 0 0,0-1 1,1 1-1,-1 0 0,1-1 1,0 0-1,0 1 0,-1-1 0,1 0 1,0 0-1,0 0 0,0 0 1,0 0-1,0 0 0,0-1 1,0 1-1,0-1 0,1 1 43,23 12-85,14 14 101,-39-27 75,-11-8 5,-25-1-72,0 2-1,0 1 1,-1 1 0,-6 2-24,-11-2 12,-240-27-1794,253 28-410,62-16-3397,-5 9 2091</inkml:trace>
+  <inkml:trace contextRef="#ctx0" brushRef="#br0" timeOffset="41674.53">15581 505 4608,'17'0'4603,"29"3"-2444,106 28-1012,-95-23-658,0-3 0,1-2 0,4-2-489,68 2 597,-90 1 886,-36-3-1416,-1-1 0,1 1 0,-1-1 0,1 1 0,-1 0 0,1 1 0,-1-1 0,0 0 0,0 1 0,0 0 0,0 0 0,0 0 0,0 0 0,0 0 0,0 1 0,-1-1 0,1 1 0,-1-1 0,0 1 0,0 0 0,0 0 0,0 1-67,35 76 1303,-33-71-1275,38 175 845,-31-118-685,20 103-23,-49-10 577,14-9-502,43 124 96,-48-189 226,1-50-436,-32 269 55,-19-110 358,51-136-584,-14 43 410,12-72-309,0 1 0,3 0 0,0 1 0,2 0 0,1 0 0,1 0 0,2 0 0,1 1 1,2 5-57,-2-5 7,-27 139 3,31 38-180,-10-100 443,3-92-297,1 1 0,1 0-1,1 0 1,0 0 0,1-1 0,2 6 24,1 0 17,0 0 1,-2 0-1,-1 0 1,0 0-1,-2 1 1,0-1-1,-5 17-17,2 108-144,17 53 80,-4 76 262,28 155 52,-6-104 81,-27-264-349,-2-1 0,-3 1 1,-9 55 17,1 59 480,0-51-486,-9-15-111,4-104-22,3-1-42,9-7 48,2 0 10,0 0 54,-19 1-470,16 22 651,11-4-133,-7-18 53,-1-1 21,0 0-16,0 0 1,0 0 4,-18-1-10,-31-11 374,-94-11-118,-222 16-1248,173 3 160,148 14 368,43-9 346,1-1-26,1 2 70,-1 0-1,1 0 0,0 0 1,0 0-1,0-1 0,0 1 1,1 0-1,-1 0 0,0-1 1,1 1-1,-1 0 0,1-1 1,0 0-1,0 1 0,-1-1 0,1 0 1,0 0-1,0 0 0,0 0 1,0 0-1,0 0 0,0-1 1,0 1-1,0-1 0,1 1 43,23 12-85,14 14 101,-39-27 75,-11-8 5,-25-1-72,0 2-1,0 1 1,-1 1 0,-6 2-24,-11-2 12,-240-27-1794,253 28-410,62-16-3397,-5 9 2091</inkml:trace>
 </inkml:ink>
 </file>
 
@@ -1330,7 +1331,7 @@
     </inkml:brush>
   </inkml:definitions>
   <inkml:trace contextRef="#ctx0" brushRef="#br0">1025 650 5120,'-8'-8'4719,"-5"-4"-4153,5 7-464,0 0 0,0 0 1,0 1-1,0 0 0,-1 0 0,1 1 0,-1 0 0,0 0 0,0 1 1,0 0-1,-1 1 0,1 0 0,0 1 0,0-1 0,-1 2 1,1-1-1,-4 2-102,-8-2 231,2 2-131,1 1 0,0 1 1,0 0-1,0 2 0,0 0 0,1 0 0,0 2 0,1 0 1,-1 1-1,2 1 0,-1 0 0,1 1 0,1 1 1,-9 8-101,15-12-24,1 0 0,-1 1 1,2 0-1,-1 0 1,1 0-1,1 0 0,-1 1 1,2 0-1,-1 0 0,1 1 1,1-1-1,0 1 1,1 0-1,0 0 0,0 0 1,0 10 23,1 10-15,2 0 0,1 0-1,1 0 1,1 0 0,5 13 15,35 118 112,-42-153-109,1 0 0,1 0 0,-1 0 0,1-1 0,1 1 0,0-1 0,0 0 0,1-1 0,-1 1 0,2-1 0,-1 0 0,1-1 0,0 0 0,0 0 0,1 0 0,0-1 0,0 0 0,0 0 0,1-1 0,-1 0 0,1-1 0,0 0 0,0 0 0,0-1 0,8 1-3,-7-2 78,-1-1 0,1-1 0,-1 0-1,1 0 1,0-1 0,-1 0 0,0 0 0,0-1 0,1-1 0,-2 1-1,1-1 1,0-1 0,-1 0 0,0 0 0,1-2-78,-1 3 22,-1-1 1,0-1-1,0 1 0,0-1 1,-1 0-1,0-1 0,0 0 1,-1 0-1,0 0 0,0 0 1,0-1-1,-1 0 0,0 0 1,-1 0-1,0 0 0,0-1 1,-1 1-1,0-1 1,0 0-1,-1 1 0,0-7-22,-41-76 1264,40 59-1402,-4 60 116,3-12 11,1 0 0,1 0 0,1 0 1,0 0-1,1 0 0,0-1 0,2 0 0,0 1 0,0-1 0,1-1 0,1 1 0,1-1 0,0-1 1,0 1-1,2-1 0,-1-1 0,2 1 0,0-2 0,0 0 0,1 0 0,0-1 0,1 0 1,1 0 10,-11-8 6,0 0 0,0 0 1,0 0-1,1-1 1,-1 1-1,0-1 1,1 0-1,-1 0 1,1 0-1,-1 0 1,1-1-1,-1 1 0,1-1 1,0 0-1,-1 0 1,1 0-1,0-1 1,-1 1-1,1-1 1,-1 0-1,1 0 1,-1 0-1,1 0 0,-1-1 1,0 0-1,0 1 1,0-1-1,0 0 1,0 0-1,0-1 1,0 1-1,0-1 1,-1 1-1,1-1 0,-1 0 1,0 0-1,0 0 1,2-3-7,0-8 29,-1-1 0,0 1 0,-1-1 0,-1 1 0,0-1 0,-1 0 0,-1 0 0,0 1-1,0-1 1,-2 1 0,0-1 0,-2-4-29,0-7 293,-1-2 74,4 21-348,0-1-1,0 1 1,1-1 0,0 1 0,0-1-1,1 0 1,0 0 0,0 1 0,1-1-1,0 0-18,-1 8-2,1 1-1,-1-1 1,0 0-1,0 1 0,0-1 1,0 0-1,1 1 0,-1-1 1,0 0-1,0 0 0,1 1 1,-1-1-1,0 0 0,0 0 1,1 0-1,-1 0 0,0 1 1,1-1-1,-1 0 1,0 0-1,1 0 0,-1 0 1,0 0-1,1 0 0,-1 0 1,0 0-1,1 0 0,-1 0 1,0 0-1,1 0 0,-1 0 1,0 0-1,1 0 0,-1 0 1,0 0-1,1 0 1,-1 0-1,0 0 0,1-1 1,-1 1-1,0 0 0,0 0 1,1 0-1,-1 0 0,0-1 1,0 1-1,1 0 0,-1 0 1,0-1-1,0 1 1,0 0-1,1-1 0,-1 1 1,0 0-1,0-1 0,0 1 1,0 0-1,0-1 0,0 1 1,1 0-1,-1-1 3,11 32 1,-2 126 85,-9-149-117,0 0 0,0 1 0,0-1 1,1 0-1,0 1 0,1-1 0,-1 0 0,2 0 0,-1 1 0,1-2 1,0 1-1,1 0 0,0-1 0,0 1 0,0-1 0,1 0 1,0-1-1,1 1 0,-1-1 0,1 0 0,0 0 0,1-1 0,1 2 31,0-4-428,1 1-1,-1-1 0,0-1 0,1 1 0,-1-1 0,1-1 0,0 0 0,0 0 0,0-1 0,-1 0 0,1 0 0,0-1 0,0 0 0,3-2 429,16-4-3354</inkml:trace>
-  <inkml:trace contextRef="#ctx0" brushRef="#br0" timeOffset="10654.352">423 16 3584,'14'-14'1994,"-14"13"-1802,-4 0-78,-1 2-1,1-1 0,0 0 0,0 1 0,-1 0 0,1 0 0,0 0 0,0 0 0,0 1 0,0 0 0,0-1 0,1 1 0,-1 1 0,1-1 0,-3 3-113,-13 35 980,10-8-664,-89 87 1498,37-28-636,48-69-961,0 2 1,2 0-1,0 0 0,2 1 0,1 0 0,1 1 0,-3 18-217,-21 86 107,1-22 474,-2 59 171,24 37-741,7-56 16,19 30 298,-13 80 491,-3-214-757,1 1-1,3-1 1,2 0 0,8 24-59,1 20 0,73 213 613,-36-88-169,-28-93-136,87 217 305,-23-130-654,-16-46-62,23 48-2569,-87-191 694</inkml:trace>
+  <inkml:trace contextRef="#ctx0" brushRef="#br0" timeOffset="10654.351">423 16 3584,'14'-14'1994,"-14"13"-1802,-4 0-78,-1 2-1,1-1 0,0 0 0,0 1 0,-1 0 0,1 0 0,0 0 0,0 0 0,0 1 0,0 0 0,0-1 0,1 1 0,-1 1 0,1-1 0,-3 3-113,-13 35 980,10-8-664,-89 87 1498,37-28-636,48-69-961,0 2 1,2 0-1,0 0 0,2 1 0,1 0 0,1 1 0,-3 18-217,-21 86 107,1-22 474,-2 59 171,24 37-741,7-56 16,19 30 298,-13 80 491,-3-214-757,1 1-1,3-1 1,2 0 0,8 24-59,1 20 0,73 213 613,-36-88-169,-28-93-136,87 217 305,-23-130-654,-16-46-62,23 48-2569,-87-191 694</inkml:trace>
 </inkml:ink>
 </file>
 
@@ -1500,7 +1501,7 @@
     </inkml:brush>
   </inkml:definitions>
   <inkml:trace contextRef="#ctx0" brushRef="#br0">29 0 5376,'-28'25'7637,"44"-13"-5333,40 0-1824,-1-3 0,2-2 0,-1-3 0,1-2 0,2-3-480,49-1-998,-86 18-7903,-19-13 6363</inkml:trace>
-  <inkml:trace contextRef="#ctx0" brushRef="#br0" timeOffset="474.478">107 218 4224,'-19'-5'2725,"19"5"-1973,-6 11 3947,8-8-4565,-1-2 0,0 1 0,0 0 0,1 0 0,-1 0 0,1-1 0,-1 1 0,1 0 0,0-1 0,0 0 1,0 1-1,0-1 0,0 0 0,0 0 0,0 0 0,0 0 0,0 0 0,0-1 0,0 1 0,1-1 0,-1 1 1,0-1-1,0 0 0,1 0 0,-1 0 0,2 0-134,3 1 258,21 4 116,0-1 1,-1-2-1,1-1 1,1-1 0,-1-1-1,-1-1 1,1-2 0,24-6-375,24-5-1244,-26 19-5976,-41-2 3999</inkml:trace>
+  <inkml:trace contextRef="#ctx0" brushRef="#br0" timeOffset="474.477">107 218 4224,'-19'-5'2725,"19"5"-1973,-6 11 3947,8-8-4565,-1-2 0,0 1 0,0 0 0,1 0 0,-1 0 0,1-1 0,-1 1 0,1 0 0,0-1 0,0 0 1,0 1-1,0-1 0,0 0 0,0 0 0,0 0 0,0 0 0,0 0 0,0-1 0,0 1 0,1-1 0,-1 1 1,0-1-1,0 0 0,1 0 0,-1 0 0,2 0-134,3 1 258,21 4 116,0-1 1,-1-2-1,1-1 1,1-1 0,-1-1-1,-1-1 1,1-2 0,24-6-375,24-5-1244,-26 19-5976,-41-2 3999</inkml:trace>
 </inkml:ink>
 </file>
 
@@ -1529,7 +1530,7 @@
   </inkml:definitions>
   <inkml:trace contextRef="#ctx0" brushRef="#br0">347 23 3072,'81'-22'5520,"-35"22"-1035,-55 12-2661,-73 58 2245,-86 55-4069,150-111-14,0 1 0,0 0-1,1 1 1,1 0 0,1 2 0,0 0 0,2 1-1,0 0 1,1 1 0,0 0 0,2 1-1,1 0 1,0 0 0,2 1 0,-4 15 14,10-28-23,1-1 0,-1 0 0,1 0 1,1 1-1,0-1 0,0 0 0,0 0 1,1 0-1,0 0 0,1 0 0,0 0 0,0-1 1,1 1-1,0-1 0,0 0 0,0 0 0,1 0 1,1 0 22,5 7 6,1 0 1,1-1 0,0 0 0,1-1 0,0-1-1,0 0 1,12 6-7,-16-12-85,-1-1-1,1 0 0,0 0 1,0-1-1,0 0 1,0-1-1,0 0 0,1 0 1,-1-1-1,1-1 1,-1 0-1,1 0 0,-1-1 1,1 0-1,-1-1 1,0 0-1,0-1 0,0 0 1,0 0-1,3-3 86,45-13-5856,-43 16 2294</inkml:trace>
   <inkml:trace contextRef="#ctx0" brushRef="#br0" timeOffset="1436.71">688 1097 3840,'18'5'6365,"-4"-13"-5706,-8 1-335,0-1 1,-1 0-1,1-1 1,-1 1-1,-1-1 1,0 0-1,0 0 0,-1-1 1,0 1-1,-1-1 1,0 1-1,0-1 1,-1 0-1,0-2-324,-6-141 2892,3 132-2753,-23-172 250,10 160-416,14 53-261,29 422-2533,7-108 1397,-28-254 1995,-14-90 389,1-14-861,0 0 0,1 0 0,2 0 1,0-1-1,2 0 0,1 1 0,1-1 0,0 1 1,2-1-1,4-11-99,-7 33-31,0 0 1,0 1-1,1-1 0,-1 0 1,1 1-1,0-1 0,0 1 1,0-1-1,0 1 0,0 0 1,1-1-1,-1 1 1,1 0-1,-1 0 0,1 0 1,0 0-1,0 0 0,0 0 1,0 0-1,0 1 0,0-1 1,1 1-1,-1-1 1,0 1-1,1 0 0,-1 0 1,1 0-1,-1 0 0,1 1 1,0-1-1,-1 1 0,1-1 1,0 1-1,-1 0 1,1 0-1,0 0 0,-1 0 1,1 1-1,0-1 0,-1 1 1,1-1-1,-1 1 1,1 0 30,3 2-137,0-1 0,-1 1 0,1 0 0,-1 0 0,1 0 0,-1 1 0,0 0 0,-1 0 1,1 0-1,-1 0 0,0 1 0,0 0 0,0 0 0,1 3 137,-3-6 4,-1-1-1,0 1 1,0 0-1,0 0 1,0 0-1,0 1 1,0-1-1,-1 0 1,1 0-1,-1 0 1,0 1-1,1-1 1,-1 0-1,0 0 1,0 1-1,-1-1 1,1 0-1,0 0 1,-1 0-1,1 1 1,-1-1-1,0 0 1,1 0-1,-1 0 1,0 0-1,-1 0 1,1 0-1,0 0 1,0 0-1,-1-1 1,1 1-1,-1 0 1,0-1 0,1 1-1,-1-1 1,0 0-1,0 1 1,0-1-1,0 0 1,-1 0-4,-87 25 3189,89-25-3198,1 0 1,-1-1-1,1 1 0,0 0 1,0 0-1,-1 0 1,1 0-1,0 0 0,0-1 1,0 1-1,0 0 1,0 0-1,0 0 0,0 0 1,0 0-1,0 0 1,1 0-1,-1-1 1,0 1-1,0 0 0,1 0 1,-1 0-1,1-1 1,-1 1-1,0 0 0,1 0 1,0-1-1,-1 1 1,1 0-1,-1-1 0,1 1 1,0 0-1,0-1 1,-1 1-1,1-1 0,0 0 1,0 1-1,-1-1 1,1 1-1,0-1 9,3 3-19,159 134-34,-103-71-1088,-48-66-7942,-5-5 5398</inkml:trace>
-  <inkml:trace contextRef="#ctx0" brushRef="#br0" timeOffset="1920.124">1278 995 5760,'-1'3'7951,"-1"21"-7385,15 162 442,-4-46-1936,-8-134-505,4-7-6515,-1-4 4956</inkml:trace>
+  <inkml:trace contextRef="#ctx0" brushRef="#br0" timeOffset="1920.123">1278 995 5760,'-1'3'7951,"-1"21"-7385,15 162 442,-4-46-1936,-8-134-505,4-7-6515,-1-4 4956</inkml:trace>
   <inkml:trace contextRef="#ctx0" brushRef="#br0" timeOffset="2291.259">1184 1223 5376,'-1'-1'8605,"8"2"-8464,38 0 1088,70-8-1786,-93 2-2915,-12 5 86</inkml:trace>
   <inkml:trace contextRef="#ctx0" brushRef="#br0" timeOffset="2985.082">1579 1161 4480,'3'-13'6864,"26"-63"-3078,2-15-3039,-30 90-746,-1 1-1,1 0 1,-1 0 0,1 0-1,-1 0 1,1 0 0,-1 0-1,1 0 1,-1 0 0,1 0 0,-1 0-1,1 0 1,-1 0 0,1 0-1,-1 0 1,1 0 0,-1 1-1,1-1 1,-1 0 0,1 0 0,-1 1-1,1-1 1,-1 0 0,1 1-1,-1-1 1,0 0 0,1 1 0,-1-1-1,0 0 1,1 1 0,-1-1-1,0 1 1,0-1 0,1 1-1,-1-1 1,0 1 0,0-1 0,0 1-1,0-1 1,1 1 0,-1-1-1,0 1 1,0-1 0,0 1-1,0-1 1,0 1 0,0-1 0,0 1-1,-1-1 1,1 1 0,0-1-1,0 1 0,0 0-9,3 114 83,-22 271-2426,26-344-1829,-1-35 1296</inkml:trace>
 </inkml:ink>
@@ -1644,7 +1645,7 @@
   </inkml:definitions>
   <inkml:trace contextRef="#ctx0" brushRef="#br0">1 920 3968,'14'-1'7505,"19"-35"-4514,16-38-1653,-47 70-1255,1 0-1,-1 0 1,0 0-1,0-1 1,-1 1 0,1 0-1,-1-1 1,0 1-1,0-1 1,0 1-1,-1-1 1,1 0 0,-1 1-1,-1-1 1,1 0-1,0 1 1,-1-1-1,0 1 1,0-1 0,-1 1-1,1-1 1,-1 1-1,0 0 1,0 0-1,0 0 1,0 0 0,-1 0-1,0 0 1,-1-1-83,-68-64 1200,72 68-1307,13 1-336,12-1 492,0-2 0,0-1 0,-1-1 0,1-1 0,-1-1 0,12-5-49,24-8 64,-57 20-77,-1 1 1,1 0 0,-1 0 0,1 0-1,-1 0 1,1 0 0,-1 1 0,0-1-1,1 1 1,-1 0 0,0-1 0,0 1-1,0 0 1,-1 0 0,1 0 0,0 1-1,-1-1 1,1 0 0,-1 0-1,0 1 1,0-1 0,0 1 0,0 0-1,0-1 1,0 3 12,1-2-61,19 57-1488,-1 1 0,-4 1 0,-2 0 0,-3 1 0,-3 0 0,-3 1 0,-2 46 1549,-1-75-176,-1 192 366,-21-79 3818,20-145-3848,0 0 0,-1 0 0,1 0 0,-1 0 1,0 0-1,0 0 0,0 0 0,0-1 0,0 1 0,-1 0 1,1-1-1,-1 1 0,0-1 0,0 1 0,1-1 1,-2 0-1,1 0 0,0 0 0,0 0 0,-1 0 1,1 0-1,-1-1 0,1 1 0,-1-1 0,0 0 0,1 0 1,-1 0-1,-1 0-160,-9 0 580,0-1 1,0 0-1,0-1 1,0-1-1,0 0 1,0-1-1,0 0 1,0-1-581,6 2 188,-8 0-125,0-1 1,0-1 0,0 0-1,1-1 1,-1-1-1,1 0 1,1-1 0,-1 0-1,1-1 1,1-1-1,-1 0 1,1 0 0,1-1-1,-8-9-63,17 15-245,0 0-1,0 0 0,1 0 1,-1-1-1,1 1 0,0 0 1,0-1-1,0 1 1,1-1-1,-1 1 0,1-1 1,0 1-1,1-1 0,-1 1 1,1-1-1,0 1 0,0-1 1,0 1-1,1 0 1,-1-1-1,3-2 246,55-80-10431,-29 59 6485</inkml:trace>
   <inkml:trace contextRef="#ctx0" brushRef="#br0" timeOffset="687.226">481 279 5504,'6'2'8519,"1"-1"-8505,38-1 876,-15 0-4127,-24 0-101</inkml:trace>
-  <inkml:trace contextRef="#ctx0" brushRef="#br0" timeOffset="1204.183">810 170 5632,'1'-28'5481,"2"0"-3520,0-28-1041,9-1 403,0 74-715,-6 30-270,-2 0 0,-1 0 1,-3 0-1,-2 0 0,-5 19-338,0 40 21,5-75-179,0 29-1022,9-22-3013,3-30-2068,-1-12 2880</inkml:trace>
+  <inkml:trace contextRef="#ctx0" brushRef="#br0" timeOffset="1204.182">810 170 5632,'1'-28'5481,"2"0"-3520,0-28-1041,9-1 403,0 74-715,-6 30-270,-2 0 0,-1 0 1,-3 0-1,-2 0 0,-5 19-338,0 40 21,5-75-179,0 29-1022,9-22-3013,3-30-2068,-1-12 2880</inkml:trace>
 </inkml:ink>
 </file>
 
@@ -1841,8 +1842,8 @@
     </inkml:brush>
   </inkml:definitions>
   <inkml:trace contextRef="#ctx0" brushRef="#br0">464 64 3712,'2'-2'322,"1"1"-1,-1 0 1,1 0 0,-1 0 0,1 0 0,0 0-1,-1 1 1,1-1 0,0 1 0,0-1-1,-1 1 1,1 0 0,0 0 0,0 1-1,0-1 1,-1 0 0,1 1 0,0 0-322,16 0 896,-7 0-380,32-11 6146,-43 10-6596,-1-1 1,1 1-1,0-1 1,-1 1-1,1-1 0,-1 1 1,1-1-1,0 1 0,-1-1 1,1 1-1,-1-1 0,0 0 1,1 1-1,-1-1 0,1 0 1,-1 0-1,0 1 1,0-1-1,1 0 0,-1 0 1,0 1-1,0-1 0,0 0 1,0 0-1,0 1 0,0-1 1,0 0-1,0 0 0,0 0 1,0 1-1,0-1 1,-1 0-1,1 0 0,0 1 1,0-1-1,-1 0 0,1 0 1,-1 1-1,1-1 0,-1 0 1,1 1-1,-1-1 0,0 0-66,-2-1 43,0 0-1,-1 0 1,1 0-1,-1 0 1,1 1-1,-1-1 1,0 1-1,0 0 1,1 0-1,-1 1 1,0-1-1,0 1 1,0-1-1,0 1 1,0 1-1,-1-1-42,-8-1 110,-17 0 131,1 1 0,-1 2 0,1 0 0,-1 2 0,1 2-1,0 0 1,1 2 0,0 1 0,0 1 0,0 1 0,-23 15-241,40-19-3,0 1 1,0 0-1,1 1 0,0 1 0,0-1 0,1 2 0,0-1 1,1 1-1,0 0 0,1 1 0,1 0 0,-1 0 0,2 0 0,0 1 1,0 0-1,1 0 0,1 0 0,0 1 0,1-1 0,0 1 1,1-1-1,0 1 0,2 0 0,-1-1 0,2 1 0,0-1 0,0 1 1,1-1-1,1 0 0,1 2 3,-2-5-28,2 0 1,-1 0-1,2 0 0,-1 0 1,1-1-1,1 0 0,-1 0 1,2-1-1,-1 0 0,1 0 1,0-1-1,1 0 0,0 0 0,0-1 1,0 0-1,1 0 0,0-1 1,0-1-1,0 1 0,0-2 1,5 2 27,10 2-827,1-2 0,-1 0 1,1-2-1,0 0 0,0-2 1,0-1-1,0-1 1,15-3 825,20-4-4910</inkml:trace>
-  <inkml:trace contextRef="#ctx0" brushRef="#br0" timeOffset="870.551">733 431 5888,'11'-19'9386,"-28"24"-4181,14 2-5179,0-1 0,0 1 0,1 1 0,0-1 0,0 0 0,1 0-1,0 1 1,0-1 0,0 1 0,1-1 0,1 1 0,-1-1 0,1 1-26,-1 12 58,15 106-113,-14-120 34,1 1 0,0-1 0,0 0 0,1 1 0,0-1 0,0-1 0,0 1 1,1 0-1,0-1 0,0 1 0,0-1 0,1 0 0,0-1 0,0 1 0,0-1 0,0 0 0,4 2 21,-5-4-89,-1-1 0,1 1 0,0-1 0,0 0 0,0 0 0,1 0 0,-1 0 0,0-1 0,0 0-1,0 1 1,0-2 0,0 1 0,1 0 0,-1-1 0,0 0 0,0 0 0,0 0 0,0-1 0,0 1 0,0-1 0,-1 0-1,1 0 1,-1 0 0,1 0 0,2-3 89,2-1-168,0-1 0,-1 0 0,1 0 0,-1-1 1,-1 0-1,0 0 0,0-1 0,0 1 0,3-10 168,-3 6 144,-1-1 0,0 0 1,-1 0-1,0 0 0,-1-1 1,-1 1-1,0-1 0,-1 1 1,0-1-1,-1 0 0,-1 0 1,0 1-1,-1-1 0,0 0 1,-1 1-1,-4-13-144,1-2 1296,12 33-1141,16 93 362,-13-42-339,3-1 0,2 0-1,7 14-177,-19-63-70,0 0 0,0 0-1,1-1 1,0 1 0,0-1-1,0 1 1,0-1 0,1 0-1,0 0 1,0-1 0,0 1 0,1-1-1,-1 0 1,1 0 0,0 0-1,1-1 1,-1 0 0,0 0-1,1 0 1,0-1 0,-1 1-1,1-1 1,0-1 0,0 1-1,0-1 1,1 0 0,4 0 70,71-21-4517,-38-3 53</inkml:trace>
-  <inkml:trace contextRef="#ctx0" brushRef="#br0" timeOffset="1379.892">1549 685 6400,'-33'0'3925,"32"0"-2810,1 0-27,0 0-27,0 0-298,0 0-198,0 0-197,0 6 922,2 49 2657,7 28-2790,46 130-1242,-52-206-28,0 1-306,-2-3-3790,-1-15-1284</inkml:trace>
+  <inkml:trace contextRef="#ctx0" brushRef="#br0" timeOffset="870.55">733 431 5888,'11'-19'9386,"-28"24"-4181,14 2-5179,0-1 0,0 1 0,1 1 0,0-1 0,0 0 0,1 0-1,0 1 1,0-1 0,0 1 0,1-1 0,1 1 0,-1-1 0,1 1-26,-1 12 58,15 106-113,-14-120 34,1 1 0,0-1 0,0 0 0,1 1 0,0-1 0,0-1 0,0 1 1,1 0-1,0-1 0,0 1 0,0-1 0,1 0 0,0-1 0,0 1 0,0-1 0,0 0 0,4 2 21,-5-4-89,-1-1 0,1 1 0,0-1 0,0 0 0,0 0 0,1 0 0,-1 0 0,0-1 0,0 0-1,0 1 1,0-2 0,0 1 0,1 0 0,-1-1 0,0 0 0,0 0 0,0 0 0,0-1 0,0 1 0,0-1 0,-1 0-1,1 0 1,-1 0 0,1 0 0,2-3 89,2-1-168,0-1 0,-1 0 0,1 0 0,-1-1 1,-1 0-1,0 0 0,0-1 0,0 1 0,3-10 168,-3 6 144,-1-1 0,0 0 1,-1 0-1,0 0 0,-1-1 1,-1 1-1,0-1 0,-1 1 1,0-1-1,-1 0 0,-1 0 1,0 1-1,-1-1 0,0 0 1,-1 1-1,-4-13-144,1-2 1296,12 33-1141,16 93 362,-13-42-339,3-1 0,2 0-1,7 14-177,-19-63-70,0 0 0,0 0-1,1-1 1,0 1 0,0-1-1,0 1 1,0-1 0,1 0-1,0 0 1,0-1 0,0 1 0,1-1-1,-1 0 1,1 0 0,0 0-1,1-1 1,-1 0 0,0 0-1,1 0 1,0-1 0,-1 1-1,1-1 1,0-1 0,0 1-1,0-1 1,1 0 0,4 0 70,71-21-4517,-38-3 53</inkml:trace>
+  <inkml:trace contextRef="#ctx0" brushRef="#br0" timeOffset="1379.891">1549 685 6400,'-33'0'3925,"32"0"-2810,1 0-27,0 0-27,0 0-298,0 0-198,0 0-197,0 6 922,2 49 2657,7 28-2790,46 130-1242,-52-206-28,0 1-306,-2-3-3790,-1-15-1284</inkml:trace>
 </inkml:ink>
 </file>
 
@@ -2040,7 +2041,7 @@
     </inkml:brush>
   </inkml:definitions>
   <inkml:trace contextRef="#ctx0" brushRef="#br0">143 7 6400,'10'-5'4352,"-9"4"-2902,4 1 794,-6 1 3704,-7 3-5646,1 1 0,0-1-1,0 1 1,0 1 0,1-1 0,0 1-1,0 1 1,0-1 0,1 1 0,0 0 0,0 0-1,-4 7-301,0 7 14,0 1-1,1 0 0,1 0 1,1 0-1,1 1 0,-2 22-13,1 17-555,3 0-1,3-1 1,2 1 0,4-1-1,2 0 1,2 0-1,12 35 556,-18-78-905,0 0-1,2 0 1,0 0-1,0-1 1,2 0-1,0 0 0,1-1 1,1 0-1,0-1 1,2 2 905,31 24-3920</inkml:trace>
-  <inkml:trace contextRef="#ctx0" brushRef="#br0" timeOffset="550.821">657 329 7040,'5'-23'4517,"-4"11"3583,-1 20-5742,22 100-1824,49 242-289,-44-252-133,-27-98-148,1 0 1,-1 1-1,1-1 0,-1 0 1,1 0-1,-1 0 1,1 0-1,-1 0 0,1 0 1,-1 0-1,1 0 1,-1 0-1,1 0 0,-1 0 1,1 0-1,-1 0 0,0 0 1,1 0-1,-1 0 1,1-1-1,-1 1 0,1 0 1,-1 0-1,1 0 1,-1-1-1,0 1 0,1 0 1,-1-1-1,0 1 0,1 0 1,-1-1-1,0 1 1,1 0-1,-1-1 0,0 1 1,0-1-1,1 1 0,-1-1 1,0 1-1,0 0 1,0-1-1,0 1 0,0-1 1,1 1-1,-1-1 1,0 1-1,0-1 0,0 1 1,0-1-1,0 1 0,-1-1 1,1 1-1,0-1 1,0 1-1,0-1 0,0 1 36,-5-118-12127,5 90 8431</inkml:trace>
+  <inkml:trace contextRef="#ctx0" brushRef="#br0" timeOffset="550.82">657 329 7040,'5'-23'4517,"-4"11"3583,-1 20-5742,22 100-1824,49 242-289,-44-252-133,-27-98-148,1 0 1,-1 1-1,1-1 0,-1 0 1,1 0-1,-1 0 1,1 0-1,-1 0 0,1 0 1,-1 0-1,1 0 1,-1 0-1,1 0 0,-1 0 1,1 0-1,-1 0 0,0 0 1,1 0-1,-1 0 1,1-1-1,-1 1 0,1 0 1,-1 0-1,1 0 1,-1-1-1,0 1 0,1 0 1,-1-1-1,0 1 0,1 0 1,-1-1-1,0 1 1,1 0-1,-1-1 0,0 1 1,0-1-1,1 1 0,-1-1 1,0 1-1,0 0 1,0-1-1,0 1 0,0-1 1,1 1-1,-1-1 1,0 1-1,0-1 0,0 1 1,0-1-1,0 1 0,-1-1 1,1 1-1,0-1 1,0 1-1,0-1 0,0 1 36,-5-118-12127,5 90 8431</inkml:trace>
   <inkml:trace contextRef="#ctx0" brushRef="#br0" timeOffset="975.05">1108 531 6272,'39'-5'8618,"55"11"-3306,175-3-4144,-131-7-2779,-89-6-3407,-33 6-3366,-9 4 4555</inkml:trace>
   <inkml:trace contextRef="#ctx0" brushRef="#br0" timeOffset="2418.297">2432 287 5888,'0'0'1978,"0"-2"-1055,0-6 202,0 6 203,0-17 3670,0 18-4917,0 0 0,0 0 0,0-1 0,-1 1 0,1 0 0,0 0 0,-1 0 0,1 0 0,0 0 1,-1 0-1,1 0 0,-1 0 0,0 0 0,1 0 0,-1 0 0,0 0 0,0 0 0,1 0 1,-1 0-1,0 1 0,0-1 0,0 0 0,0 1 0,0-1 0,0 1 0,0-1 0,0 1 0,0-1 1,0 1-1,0 0 0,-1-1 0,1 1 0,-1 0-81,-2-2 129,-6 0-28,0 0 0,-1 1 0,1 0 0,-1 1 0,1 0 0,-1 1 0,1 0 0,-1 0 0,1 1 1,0 1-1,0 0 0,0 0 0,0 1 0,0 0 0,1 0 0,0 1 0,0 1 0,0-1 0,0 2 0,1-1 0,-4 5-101,7-6-7,0 0-1,1 1 1,-1 0-1,1 0 1,0 0 0,1 0-1,0 1 1,0-1-1,0 1 1,0 0-1,1 0 1,1 0-1,-1 0 1,1 0-1,0 1 1,0-1-1,1 0 1,0 0-1,1 1 1,-1-1 0,1 0-1,1 0 1,-1 1-1,1-1 1,1-1-1,-1 1 1,1 0-1,0 0 1,1-1-1,-1 0 1,1 0-1,1 0 1,-1 0-1,1 0 1,2 1 7,-5-4-2,0-1 0,1 1-1,-1-1 1,0 0 0,1 0 0,-1 0 0,1 0 0,0 0-1,-1-1 1,1 1 0,0-1 0,0 0 0,0 1-1,0-2 1,0 1 0,0 0 0,1 0 0,-1-1 0,0 0-1,0 0 1,0 0 0,1 0 0,-1 0 0,0 0-1,0-1 1,0 0 0,1 1 0,-1-1 0,0-1 0,0 1-1,0 0 1,-1-1 0,1 1 0,0-1 0,0 0-1,-1 0 1,1 0 0,-1 0 0,0 0 0,0-1 0,0 1-1,0-1 1,0 1 0,2-4 2,-4 6 18,0 0 0,0-1 0,1 1 1,-1 0-1,0-1 0,1 1 0,-1 0 0,0-1 0,0 1 1,0 0-1,0-1 0,1 1 0,-1 0 0,0-1 0,0 1 0,0-1 1,0 1-1,0 0 0,0-1 0,0 1 0,0-1 0,0 1 0,0-1 1,0 1-1,0 0 0,0-1 0,0 1 0,-1 0 0,1-1 0,0 1 1,0-1-1,0 1 0,0 0 0,-1-1 0,1 1 0,0 0 1,0-1-1,-1 1 0,1 0 0,0 0 0,-1-1 0,1 1 0,0 0 1,-1 0-1,1-1 0,0 1 0,-1 0 0,1 0 0,-1 0 0,1 0 1,0 0-1,-1 0 0,1 0 0,-1 0 0,1 0 0,0 0 0,-1 0 1,1 0-1,-1 0 0,1 0 0,0 0 0,-1 0 0,1 0 1,-1 0-1,1 0 0,0 0 0,-1 1 0,1-1 0,0 0 0,-1 0-18,-25 15 1045,-44 62 875,58-38-2246,33-24 540,-20-15-182,-1 0 32,0 0 32,0 0 37,-6 30 608,-16 53-570,22-79-169,0 4-21,-1 0 0,1 1 0,0-1 1,1 0-1,0 0 0,0 0 0,1 0 0,0 0 1,0 0-1,1 0 0,0-1 0,0 1 0,1-1 1,3 5 18,-3-9-3,0-1-1,1 0 1,-1 0 0,1 0 0,-1-1 0,1 1 0,-1-1 0,1 0 0,0-1 0,-1 1 0,1-1 0,0 0 0,0 0 0,0 0 0,-1-1 0,1 1 0,1-2 3,3 2-2,6-2-66,0 0 1,0 0-1,-1-2 0,1 0 0,-1-1 0,1 0 1,4-3 67,-9 4-18,-8 3 31,-1 1 0,0 0 0,0-1 0,1 1 0,-1 0 0,0-1 0,0 0 0,1 1 0,-1-1 0,0 0 0,0 1 1,0-1-1,0 0 0,0 0 0,0 0 0,0 0 0,0 0 0,0 0 0,-1 0 0,1 0 0,0-1 0,-1 1 0,1 0 0,-1 0 0,1-1 0,-1 1 0,1 0 0,-1-1 0,0 1 0,0 0 0,0-1 1,0 1-14,0 0 53,0 1 32,0 0 27,0 0 80,0 11 368,-15 79 533,3 89-886,7 1 0,8 0-1,11 35-206,-9-141-12,17 161-617,-17-212-539,-5-23 1075,0 0-1,0 0 0,0-1 1,0 1-1,0 0 0,1 0 1,-1 0-1,0-1 1,0 1-1,0 0 0,0 0 1,0 0-1,0-1 0,1 1 1,-1 0-1,0 0 1,0 0-1,0 0 0,1-1 1,-1 1-1,0 0 1,0 0-1,0 0 0,1 0 1,-1 0-1,0 0 0,0 0 1,1 0-1,-1 0 1,0 0-1,0 0 0,0 0 1,1 0-1,-1 0 0,0 0 1,0 0-1,1 0 1,-1 0-1,0 0 0,0 0 1,1 0-1,-1 0 0,0 0 1,0 0-1,0 0 1,1 0-1,-1 1 0,0-1 1,0 0-1,0 0 0,1 0 1,-1 0-1,0 1 1,0-1-1,0 0 0,0 0 1,0 0-1,1 1 0,-1-1 1,0 0-1,0 0 1,0 0-1,0 1 0,0-1 94,0-1-264,6-9-5863</inkml:trace>
   <inkml:trace contextRef="#ctx0" brushRef="#br0" timeOffset="3303.94">3027 589 6784,'-6'0'-846,"-4"0"7994,8 0 1251,10 0-7021,74-4-1042,306 4-2026,-387 0 1550,-1 0 0,0 0 0,0 0 0,1 0 0,-1 0 0,0 0 0,1 0 0,-1 0 0,0 0 0,1 0 0,-1 0 1,0 0-1,0 0 0,1 0 0,-1 0 0,0 0 0,1-1 0,-1 1 0,0 0 0,0 0 0,1 0 0,-1 0 0,0-1 0,0 1 0,0 0 1,1 0-1,-1-1 0,0 1 0,0 0 0,0 0 0,0-1 0,0 1 0,1 0 0,-1-1 0,0 1 0,0 0 0,0 0 0,0-1 1,0 1-1,0 0 0,0-1 0,0 1 0,0 0 0,0-1 0,0 1 0,0 0 0,0 0 0,0-1 0,-1 1 0,1 0 0,0-1 0,0 1 1,0 0-1,0 0 0,0-1 0,-1 1 0,1 0 0,0 0 0,0-1 140,-5-7-4485</inkml:trace>
@@ -2049,7 +2050,7 @@
   <inkml:trace contextRef="#ctx0" brushRef="#br0" timeOffset="29593.085">0 2388 6400,'0'-12'2058,"0"9"-1071,0 3 416,0 0 389,0 0-70,0 0-116,0 0-273,0 0-224,0 0-448,0 0 22,0 0 42,0 10 966,7 65-48,22 49-1323,46 96 32,-37-136 48,-34-92-3523,-8-17-597,-7-14-4445,5 19 4176</inkml:trace>
   <inkml:trace contextRef="#ctx0" brushRef="#br0" timeOffset="29894">386 2651 5632,'3'0'9968,"4"0"-4872,39 0-4011,152-9-1453,-107-5-4448,-67 13 91</inkml:trace>
   <inkml:trace contextRef="#ctx0" brushRef="#br0" timeOffset="31351.766">1289 2338 5120,'4'-2'1016,"-4"2"-925,0 0 0,1 0 0,-1 0 0,0 0 0,1 0-1,-1 0 1,0 0 0,1-1 0,-1 1 0,0 0 0,0 0 0,1 0-1,-1 0 1,0 0 0,0 0 0,1-1 0,-1 1 0,0 0 0,0 0 0,1 0-1,-1-1 1,0 1 0,0 0 0,0 0 0,0-1 0,1 1 0,-1 0-1,0 0 1,0-1 0,0 1 0,0 0 0,0-1 0,0 1 0,0 0 0,0 0-1,0-1 1,0 1 0,0 0 0,0-1 0,0 1 0,0 0 0,0-1-1,0 1 1,0 0 0,0 0 0,0-1 0,0 1 0,0 0 0,-1-1 0,1 1-1,0 0 1,0 0 0,0 0 0,0-1 0,-1 1 0,1 0 0,0 0-1,0-1 1,-1 1 0,1 0 0,0 0 0,0 0 0,-1 0 0,1 0-91,-1-23 3962,-20 22-2341,-4 1-1210,9-1-247,-1 1 0,1 0 0,0 1 0,-1 1 0,1 1 0,0 0 0,0 1 0,-11 4-164,16-3 24,-1 0 1,1 0-1,-1 1 0,1 1 0,1-1 1,0 2-1,0 0 0,0 0 0,1 0 1,0 1-1,-2 4-24,9-11-9,1 0 0,0 0 0,-1 1 0,1-1 0,0 0 0,0 1 0,1-1 1,-1 0-1,1 1 0,-1-1 0,1 1 0,-1 0 0,1-1 0,0 1 0,0-1 0,1 1 1,-1-1-1,0 1 0,1-1 0,0 1 0,-1-1 0,1 0 0,0 1 0,0-1 0,0 0 1,1 1-1,-1-1 0,1 0 0,-1 0 0,1 0 0,-1 0 0,1-1 0,0 1 0,0 0 1,0-1-1,0 1 0,0-1 0,0 0 0,1 1 9,91 44-101,-77-40 123,7 3 82,0-1 0,1-1 0,0-1-1,0-1 1,0-1 0,18-1-104,-136 3 1440,-16 23-453,85-21-700,20-7-268,-1 0 0,1-1-1,-1 2 1,1-1 0,0 0 0,-1 1 0,1 0-1,0 0 1,0 0 0,0 1 0,1-1 0,-1 1 0,1 0-1,-1 0 1,1 0 0,0 0 0,0 1 0,0-1-1,1 1 1,-1 0 0,1 0 0,0 0 0,-2 4-19,5-5-13,-1 0 0,1 0 1,1 0-1,-1 0 0,0 0 1,1 0-1,-1 0 1,1 0-1,0-1 0,0 1 1,0-1-1,0 1 0,1-1 1,-1 0-1,1 0 0,-1 0 1,1 0-1,0 0 0,-1-1 1,1 1-1,0-1 1,0 0-1,0 0 0,0 0 1,1 0-1,-1 0 0,0-1 13,23 8 25,1-2-1,0-1 1,1-1-1,-1-1 1,0-1 0,1-2-1,0 0 1,-1-2-1,0-2 1,12-2-25,17-3 2560,-57 30-1670,-39 110-591,-40 119-544,-25 236 133,85-388-437,15-73-2479,3-13-4408,6-43 2140,-3-11 880</inkml:trace>
-  <inkml:trace contextRef="#ctx0" brushRef="#br0" timeOffset="33227.175">3142 1991 6400,'-4'-20'2058,"5"12"-1130,3-6-105,1-18 5229,-10-16 566,6 61-5610,23 49-1045,80 129 96,-15-11-33,-12 45-42,-64-179-122,-2 0-1,-2 1 0,-2 0 1,-2 2 138,-5-23-698,0 0 1,-1-1-1,-2 0 1,-1 1-1,0-1 1,-2 0-1,-1-1 1,-8 19 697,13-37-164,-37 120-5297</inkml:trace>
+  <inkml:trace contextRef="#ctx0" brushRef="#br0" timeOffset="33227.174">3142 1991 6400,'-4'-20'2058,"5"12"-1130,3-6-105,1-18 5229,-10-16 566,6 61-5610,23 49-1045,80 129 96,-15-11-33,-12 45-42,-64-179-122,-2 0-1,-2 1 0,-2 0 1,-2 2 138,-5-23-698,0 0 1,-1-1-1,-2 0 1,-1 1-1,0-1 1,-2 0-1,-1-1 1,-8 19 697,13-37-164,-37 120-5297</inkml:trace>
 </inkml:ink>
 </file>
 
@@ -2079,7 +2080,7 @@
   <inkml:trace contextRef="#ctx0" brushRef="#br0">393 236 6912,'5'-11'2032,"0"-3"117,-4 1 2448,-1 12-3200,0 1-143,0 0-449,0 0 75,-5 41 2096,3-3-2860,2 0 0,1 0 0,2 0 0,6 28-116,-6-38-82,-2-15 81,1 0 0,0 0-1,0 0 1,1 0-1,1 0 1,0-1-1,1 1 1,0-1-1,1 0 1,1 0 1,-7-12-81,0 0 0,-1-1 0,1 1 1,0 0-1,0-1 0,0 1 0,-1 0 0,1-1 1,0 1-1,0-1 0,0 1 0,0 0 0,0-1 0,0 1 1,0-1-1,0 1 0,0 0 0,0-1 0,0 1 0,0-1 1,0 1-1,0 0 0,0-1 0,0 1 0,0-1 0,0 1 1,1 0-1,-1-1 0,0 1 0,0 0 0,1-1 1,-1 1-1,0 0 0,0-1 0,1 1 0,-1 0 0,0 0 1,1-1-1,-1 1 0,0 0 0,1 0 0,-1 0 0,0-1 1,1 1-1,-1 0 0,0 0 0,1 0 0,-1 0 1,1 0-1,-1 0 0,0 0 0,1 0 0,-1 0 0,1 0 1,-1 0-1,0 0 0,1 0 0,-1 0 81,-59-101-13082,39 75 9626</inkml:trace>
   <inkml:trace contextRef="#ctx0" brushRef="#br0" timeOffset="263.823">200 359 8320,'-9'11'3168,"9"-8"-2464,3-3 576,-3 0 64,6 6-288,5-2-1,0 1-159,6 5-96,5 1-416,6-2-160,5 0-96,6 2-64,10-1-64,6-1-608,6-9-256,-1-6-1823,12-3-801,0-9-640</inkml:trace>
   <inkml:trace contextRef="#ctx0" brushRef="#br0" timeOffset="983.984">1799 104 6656,'5'-13'4378,"-5"12"-3034,0 1-117,0-25 3690,1 23-4849,-1-1 1,-1 1-1,1-1 0,0 0 1,-1 1-1,1-1 1,-1 1-1,1 0 0,-1-1 1,0 1-1,0-1 0,-1 1 1,1 0-1,0 0 0,-1 0 1,1 0-1,-1 0 0,1 0 1,-1 0-1,0 0 0,0 1 1,0-1-1,0 1 0,0-1 1,-1 1-1,1 0 0,-2-1-68,-84-5 1275,68 9-1144,-1 1-1,1 0 1,0 2 0,0 0-1,0 2 1,1 0 0,0 1-1,0 1 1,1 0 0,-12 10-131,17-12-11,1 1 0,0 1 1,1 0-1,0 1 0,1 0 1,-1 1-1,2 0 0,0 0 1,0 1-1,1 0 0,1 1 1,0 0-1,0 0 0,1 0 1,1 1-1,0 0 0,1 0 1,1 0-1,0 0 0,1 1 1,0-1-1,1 1 0,1 0 1,1-1-1,0 1 0,0-1 1,2 6 10,2-6-13,1 1 0,0-1 0,1-1 0,0 1 0,1-1 0,0 0 0,4 3 13,-2-4-422,1-1-1,0 0 1,1 0-1,0-1 1,0-1 0,1 0-1,0-1 1,0 0 0,3 0 422,-6-4-929,-1 0 1,1-1 0,-1 0 0,1 0 0,0-1 0,0-1 0,0 1 0,9-1 928,15-1-3856</inkml:trace>
-  <inkml:trace contextRef="#ctx0" brushRef="#br0" timeOffset="1506.152">1777 516 6912,'-17'-20'7440,"1"26"2006,15 6-7302,1-6-2871,3 14 767,1-1 0,0 1 0,1-1 0,1 0 0,1-1 0,8 14-40,-9-18-156,0-1 0,1 0 0,1 0-1,0 0 1,0-1 0,2-1 0,-1 1 0,1-2 0,7 6 156,-13-12-172,1 0 1,-1-1 0,1 0 0,0 0 0,0 0-1,0-1 1,0 1 0,1-1 0,-1 0 0,1-1 0,-1 1-1,1-1 1,-1 0 0,1-1 0,0 1 0,-1-1-1,1 0 1,0-1 0,0 1 0,-1-1 0,1 0 0,-1-1-1,1 1 1,-1-1 0,6-2 171,-5 1-31,0 0 0,0 0-1,0-1 1,-1 0 0,1 0-1,-1 0 1,0 0 0,0-1 0,0 0-1,-1 0 1,0 0 0,0-1 0,0 1-1,0-1 1,-1 0 0,0 0-1,0-1 1,-1 1 0,0 0 0,0-1-1,0 1 1,0-8 31,-3 1 485,0-1 1,-1 0-1,-1 1 0,0-1 1,-1 1-1,0 0 0,-1 0 1,-4-8-486,9 21 19,0 1 1,0-1-1,0 0 1,1 0-1,-1 0 1,0 0-1,0 0 1,0 0-1,0 0 1,1 0-1,-1 0 1,0 0-1,0 0 1,0 0-1,1 0 1,-1 0-1,0 0 1,0 0-1,0 0 1,0 0-1,1-1 1,-1 1-1,0 0 1,0 0-1,0 0 1,0 0-1,1 0 1,-1 0-1,0 0 1,0-1-1,0 1 1,0 0-1,0 0 1,0 0-1,0 0 1,1 0-1,-1-1 1,0 1-20,14 16 453,60 118-15,-60-116-800,0-1 0,1 0 0,1-1 0,0 0 0,1-2 0,17 12 362,-22-18-998,1-1-1,0 0 0,0-1 0,0 0 1,1-1-1,0 0 0,6 0 999,36 2-4506,-6-2 202</inkml:trace>
+  <inkml:trace contextRef="#ctx0" brushRef="#br0" timeOffset="1506.151">1777 516 6912,'-17'-20'7440,"1"26"2006,15 6-7302,1-6-2871,3 14 767,1-1 0,0 1 0,1-1 0,1 0 0,1-1 0,8 14-40,-9-18-156,0-1 0,1 0 0,1 0-1,0 0 1,0-1 0,2-1 0,-1 1 0,1-2 0,7 6 156,-13-12-172,1 0 1,-1-1 0,1 0 0,0 0 0,0 0-1,0-1 1,0 1 0,1-1 0,-1 0 0,1-1 0,-1 1-1,1-1 1,-1 0 0,1-1 0,0 1 0,-1-1-1,1 0 1,0-1 0,0 1 0,-1-1 0,1 0 0,-1-1-1,1 1 1,-1-1 0,6-2 171,-5 1-31,0 0 0,0 0-1,0-1 1,-1 0 0,1 0-1,-1 0 1,0 0 0,0-1 0,0 0-1,-1 0 1,0 0 0,0-1 0,0 1-1,0-1 1,-1 0 0,0 0-1,0-1 1,-1 1 0,0 0 0,0-1-1,0 1 1,0-8 31,-3 1 485,0-1 1,-1 0-1,-1 1 0,0-1 1,-1 1-1,0 0 0,-1 0 1,-4-8-486,9 21 19,0 1 1,0-1-1,0 0 1,1 0-1,-1 0 1,0 0-1,0 0 1,0 0-1,0 0 1,1 0-1,-1 0 1,0 0-1,0 0 1,0 0-1,1 0 1,-1 0-1,0 0 1,0 0-1,0 0 1,0 0-1,1-1 1,-1 1-1,0 0 1,0 0-1,0 0 1,0 0-1,1 0 1,-1 0-1,0 0 1,0-1-1,0 1 1,0 0-1,0 0 1,0 0-1,0 0 1,1 0-1,-1-1 1,0 1-20,14 16 453,60 118-15,-60-116-800,0-1 0,1 0 0,1-1 0,0 0 0,1-2 0,17 12 362,-22-18-998,1-1-1,0 0 0,0-1 0,0 0 1,1-1-1,0 0 0,6 0 999,36 2-4506,-6-2 202</inkml:trace>
   <inkml:trace contextRef="#ctx0" brushRef="#br0" timeOffset="2433.397">2620 756 7296,'22'-12'8923,"11"5"-7212,13 6-1558,-30-1-71,-1 2 1,1-1 0,0 2-1,-1 0 1,1 1-1,-1 0 1,1 1 0,-1 1-1,0 1 1,0 0-1,6 3-82,-20-7 52,1-1 0,-1 1 0,0 0 0,0-1 0,1 1-1,-1 0 1,0-1 0,0 1 0,0 0 0,0 0 0,0 0-1,0 0 1,0 0 0,0 0 0,0 1 0,-1-1-1,1 0 1,0 0 0,-1 0 0,1 1 0,-1-1 0,1 0-1,-1 1 1,1-1 0,-1 1 0,0-1 0,0 0 0,0 1-1,0-1 1,0 1 0,0-1 0,0 0 0,0 1 0,-1-1-1,1 0 1,-1 1 0,1-1 0,-1 0 0,0 2-52,-6 9 163,-1-1 0,0 0 1,-1 0-1,0-1 1,-1 0-1,0-1 0,-1 0 1,0 0-1,0-1 1,-1-1-1,-11 6-163,16-9 76,0 1-1,0-2 1,-1 1 0,0-1 0,1 0-1,-1-1 1,0 0 0,0 0 0,-1-1-1,-2 0-75,11 0-4,0-1-1,1 0 0,-1 0 0,1 0 1,-1 0-1,1 0 0,-1 1 1,0-1-1,1 0 0,-1 0 1,1 0-1,-1 0 0,1 0 0,-1-1 1,1 1-1,-1 0 0,1 0 1,-1 0-1,0 0 0,1 0 0,-1-1 1,1 1-1,-1 0 0,0 0 1,1-1-1,-1 1 0,0 0 1,1 0-1,-1-1 0,0 1 0,1 0 1,-1-1-1,0 1 0,0-1 1,1 1-1,-1 0 0,0-1 0,0 1 1,0-1-1,1 1 0,-1-1 1,0 1-1,0 0 0,0-1 1,0 1-1,0-1 0,0 1 0,0-1 1,0 1-1,0-1 0,0 1 1,0-1-1,-1 1 0,1 0 1,0-1-1,0 1 0,0-1 0,0 1 1,-1 0-1,1-1 0,0 1 1,-1-1-1,1 1 0,0 0 0,0-1 1,-1 1-1,1 0 0,-1-1 5,15 2-13,-1-1 0,0 2 0,1 0 0,-1 0 0,0 1 0,0 1 0,-1 0 0,1 1 0,-1 0 0,0 1 0,0 1 0,-1-1 0,1 2 0,-2 0 0,1 0 0,6 7 13,5 0 8,-1 1-1,-1 1 0,-1 1 1,0 0-1,-1 2 0,-1 0 1,-1 1-1,3 7-7,-17-27 4,-1 0 0,0 1 1,-1-1-1,1 1 0,0-1 0,0 1 1,-1-1-1,1 1 0,-1 0 0,1-1 0,-1 1 1,0 0-1,1 0 0,-1-1 0,0 1 1,0 0-1,0 0 0,-1-1 0,1 1 1,0 0-1,-1-1 0,1 1 0,-1 0 0,1-1 1,-1 1-1,0-1 0,1 1 0,-1-1 1,-1 2-5,-4 4 15,-1 1 0,0-1 0,0 0 0,-1-1 0,0 0 0,0 0 0,0 0 1,-1-1-1,1-1 0,-1 1 0,-1-1 0,1-1 0,0 0 0,-1 0 0,0-1 1,0 0-1,-5 0-15,9 0 9,-221 41-110,108-23-1784,-4-5-4288,55-11 957</inkml:trace>
   <inkml:trace contextRef="#ctx0" brushRef="#br0" timeOffset="4101.452">3314 520 3840,'-16'-25'3509,"16"2"-1701,6 10-1326,-1 0 0,2 0 0,-1 1 0,2 0 0,0 0 0,0 1 0,1 0 0,0 0-482,0 0 236,1 0 0,0 1 0,0 0 0,1 0 0,0 1-1,1 1 1,0 0 0,0 0 0,0 1 0,1 1 0,0 0 0,1 1 0,-1 1 0,1 0 0,0 0 0,0 1-1,2 1-235,-11 2 57,-1 1 0,1 0 0,-1 0 0,1 0 0,-1 0-1,0 1 1,1-1 0,-1 1 0,0 0 0,0 1-1,0-1 1,0 1 0,-1-1 0,1 1 0,-1 0 0,1 1-1,-1-1 1,0 0 0,0 1 0,-1 0 0,1 0-1,-1 0-56,44 92 494,-1 61-190,-34-99 64,-9-91-242,1 1-1,1-1 0,2 1 0,1 0 0,2 0 0,0 1 0,3 0 0,0 1 1,2 1-1,1 0 0,2 0 0,0 2 0,4-2-125,-15 21 201,0 0 0,1 0 1,0 1-1,0 0 0,1 0 0,-1 1 0,2 0 1,-1 0-1,3-1-201,-8 6 25,0-1 0,1 0 0,-1 1 0,1 0 0,0-1 0,-1 1 0,1 1 0,0-1 0,-1 1 0,1-1 0,0 1 0,0 0 1,0 0-1,0 1 0,-1-1 0,1 1 0,0 0 0,-1 0 0,1 0 0,0 0 0,-1 1 0,1-1 0,-1 1 0,0 0 0,3 2-25,1 2 99,1 2-1,-1-1 0,0 1 1,0 0-1,-1 1 0,0-1 1,-1 1-1,0 0 1,2 6-99,-1-4 95,-1 0 0,-1 0 0,0 1 0,-1 0 0,0 0 0,0 0 0,-1 0 0,-1 0 0,0 1 0,-1-1 0,0 2-95,-4 97 245,-5 0 1,-4 0-1,-15 49-245,-29 107-1467,-11-2 1,-16 10 1466,79-259-241,-27 72-1446,0-36-2428,20-39-919</inkml:trace>
   <inkml:trace contextRef="#ctx0" brushRef="#br0" timeOffset="29734.952">521 1907 6656,'49'-35'6101,"-11"2"-3392,-37 31-2611,0 0 0,0 1 0,0-1 0,-1 0 0,1 0 0,0 0 0,-1 0 1,0 1-1,1-1 0,-1 0 0,0 0 0,0 0 0,0 0 0,0 0 0,0 0 0,0 0 0,-1 0 0,1 0 0,-1 0 0,1 1 0,-1-1 0,0 0 0,0 0 0,0 1 0,0-1 0,0 0 0,0 1 0,0-1 0,0 1 0,-1-1 0,1 1 0,0 0 1,-1-1-1,1 1 0,-1 0 0,0 0 0,1 0 0,-1 0 0,0 1 0,0-1 0,0 0 0,1 1 0,-1-1 0,0 1 0,0 0 0,0-1 0,-1 1-98,-10-3 211,0 0 0,0 1 0,-1 1 0,1 0 0,0 0 0,0 2 0,-1-1 0,1 2 0,-6 1-211,-8 2 102,1 2 0,-1 0 1,2 2-1,-1 1 1,1 1-1,1 1 0,0 1 1,1 1-1,0 1 1,-8 9-103,16-13-38,0 2 1,1-1 0,0 2-1,1 0 1,0 1 0,1 0-1,-8 15 38,15-21-16,0 0 0,0-1 0,1 1 0,1 1 0,-1-1 0,1 0 0,1 1 0,0 0 0,0 0 0,1-1 0,0 1 0,1 0 0,0 0 0,2 7 16,-1-6-33,1 0 0,0 0 0,1-1 0,1 1-1,-1-1 1,2 0 0,-1 0 0,1 0 0,4 4 33,-2-2-86,1-1-1,0 1 1,1-2 0,0 1 0,1-1 0,0 0 0,11 7 86,-11-8-279,1-1 0,0-1-1,1 0 1,-1-1 0,1 0 0,0 0-1,1-1 1,-1-1 0,1 0 0,0-1-1,0-1 1,0 0 0,0 0 0,10-1 279,53-2-2965,-6 0-1563</inkml:trace>
@@ -2113,10 +2114,10 @@
     </inkml:brush>
   </inkml:definitions>
   <inkml:trace contextRef="#ctx0" brushRef="#br0">3163 325 6400,'12'-10'1250,"-12"10"-986,1 0-1,0-1 1,-1 1-1,1-1 0,0 1 1,-1-1-1,1 1 1,0-1-1,-1 0 1,1 1-1,-1-1 0,0 0 1,1 0-1,-1 1 1,1-1-1,-1 0 1,0 0-1,0 1 0,1-1 1,-1 0-1,0 0 1,0 0-1,0 0 0,0 1 1,0-1-1,0 0 1,0 0-1,0 0 1,0 0-1,0 1 0,-1-1 1,1 0-1,0 0 1,0 0-1,-1 1 1,1-1-1,-1 0 0,1 1 1,-1-1-1,1 0 1,-1 1-1,0-2-263,-38-31 2576,21 27-2394,1 2 1,-1 0-1,0 1 0,0 0 0,-1 2 1,1 0-1,0 1 0,0 1 0,0 1 1,-1 0-1,1 2 0,1 0 1,-1 0-1,1 2 0,0 0 0,0 1 1,-3 3-183,9-7 8,0 1 1,0 0 0,1 1 0,0 0 0,-1 1 0,2 0 0,-1 0 0,1 1 0,0 0-1,1 1 1,-1 0 0,1 0 0,1 1 0,0 0 0,0 0 0,1 0 0,0 1 0,0 0-1,1 1 1,1-1 0,-3 10-9,3 1-38,2-1 0,0 1-1,1 0 1,1 0 0,1 0-1,1 0 1,1 0-1,1 0 1,0 0 0,2-1-1,0 0 1,2 0 0,0-1-1,1 0 1,1 0 0,0-1-1,2 0 1,0-1 0,1-1-1,0 0 1,11 9 38,-14-13-353,1-1 0,1 0 0,0 0 0,0-1 0,1-1 1,0 0-1,1-1 0,0 0 0,0-1 0,1 0 0,0-1 353,1-1-1395,-1-1 1,1 0-1,0-1 0,0-1 0,0 0 1,14-1 1394,-1-1-3968</inkml:trace>
-  <inkml:trace contextRef="#ctx0" brushRef="#br0" timeOffset="629.368">3168 790 5888,'21'-11'6016,"-20"11"-4672,-1 0-96,6 6 3519,0 53-1583,11 14-3104,-15-65-203,1 0 0,-1-1 0,1 1 0,1-1 0,0 0 0,0 0 0,0 0 0,1 0 0,-1-1 0,2 0 0,-1 0 0,1 0 0,0-1 0,0 0 0,0 0 0,1 0 0,0-1 0,0 0 0,0 0 0,0-1 0,0 0 0,1 0 0,0-1 0,-1 1 0,1-2 0,0 1 0,0-1 0,0-1 0,0 1 0,0-1 0,7-1 123,-9-1-79,-1 1 0,1-1 0,0 0 0,0-1 0,-1 1-1,0-1 1,1 0 0,-1-1 0,0 1 0,0-1 0,-1 0 0,1 0 0,-1 0 0,0-1-1,0 0 1,0 0 0,-1 0 0,2-3 79,1-6 339,-1-1-1,0 0 0,-1 0 1,-1 0-1,-1 0 1,0 0-1,0-1 1,-2 1-1,0 0 1,-1-1-1,0 1 1,-1 0-1,-2-6-338,-6 1 811,10 19-689,0 4-26,4 8-103,5 29-60,2 0-1,2-2 1,2 0 0,1 0 0,2-1 0,9 12 67,-22-42-345,0 0 0,1-1 1,0 1-1,1-1 1,-1 0-1,1 0 0,0-1 1,1 0-1,-1 0 0,1-1 1,0 0-1,0 0 1,0-1-1,1 0 0,-1-1 1,1 0-1,0 0 0,-1 0 1,1-1-1,0-1 1,2 1 344,66-5-6806,-44-2 3468</inkml:trace>
-  <inkml:trace contextRef="#ctx0" brushRef="#br0" timeOffset="1332.614">4029 1128 6656,'-3'-1'366,"3"1"-173,-1 0-1,0 0 1,0 0-1,0 0 1,1 0-1,-1-1 1,0 1-1,0 0 1,1 0-1,-1-1 1,0 1-1,1 0 1,-1-1-1,0 1 1,1 0-1,-1-1 1,0 1-1,1-1 1,-1 1-1,1-1 1,-1 0-1,1 1 1,-1-1 0,1 0-1,0 1 1,-1-1-1,1 0 1,0 1-1,-1-1 1,1 0-1,0 1 1,0-1-1,0 0 1,0 0-1,-1 1 1,1-1-1,0 0 1,0 0-1,0 0 1,1 1-1,-1-1 1,0 0-1,0 0 1,0 1-193,113-54 2032,-107 51-1919,-1 1-1,1 0 1,0 0 0,0 0 0,1 1-1,-1 0 1,0 0 0,0 1 0,1-1-1,-1 1 1,0 1 0,0-1 0,1 1-1,-1 0 1,0 1 0,0-1 0,0 1-1,0 1 1,0-1 0,-1 1 0,1 0-113,-4 0 67,0 0 1,0 0 0,0 0-1,-1 0 1,1 0-1,-1 1 1,0-1 0,0 0-1,0 1 1,-1-1-1,1 1 1,-1-1 0,0 1-1,0-1 1,0 1 0,0-1-1,0 1 1,-1-1-1,0 1 1,0-1 0,0 1-1,0-1 1,0 0-1,-1 1 1,1-1 0,-1 0-1,0 0 1,0 0-1,0 0 1,0-1 0,-2 3-68,-17 27 96,-1-1 1,-2-1-1,-1-2 1,-1 0 0,-1-1-1,-2-2 1,0-1-1,-2-1 1,-2 0-97,31-22 4,-32 27-23,33-27 18,1-1-1,-1 1 1,0 0 0,1-1 0,-1 1-1,1 0 1,-1-1 0,1 1-1,-1 0 1,1 0 0,-1-1 0,1 1-1,0 0 1,0 0 0,-1 0 0,1 0-1,0 0 1,0-1 0,0 1-1,0 0 1,0 0 0,0 0 0,0 0-1,0 0 1,0 0 0,1-1 0,-1 1-1,0 0 1,0 0 0,1 0 0,-1 0-1,1-1 1,-1 1 0,1 0-1,-1 0 1,1-1 0,-1 1 0,1 0-1,-1-1 1,1 1 0,0-1 0,0 1-1,-1-1 1,1 1 0,0-1 0,0 1-1,0-1 2,15 7-15,0-2 0,1 0 0,-1-1 0,1 0-1,0-1 1,0-1 0,0-1 0,2-1 15,11 3-23,63 7-286,-1 1-1495,0-6-3362,-58-5 622</inkml:trace>
+  <inkml:trace contextRef="#ctx0" brushRef="#br0" timeOffset="629.367">3168 790 5888,'21'-11'6016,"-20"11"-4672,-1 0-96,6 6 3519,0 53-1583,11 14-3104,-15-65-203,1 0 0,-1-1 0,1 1 0,1-1 0,0 0 0,0 0 0,0 0 0,1 0 0,-1-1 0,2 0 0,-1 0 0,1 0 0,0-1 0,0 0 0,0 0 0,1 0 0,0-1 0,0 0 0,0 0 0,0-1 0,0 0 0,1 0 0,0-1 0,-1 1 0,1-2 0,0 1 0,0-1 0,0-1 0,0 1 0,0-1 0,7-1 123,-9-1-79,-1 1 0,1-1 0,0 0 0,0-1 0,-1 1-1,0-1 1,1 0 0,-1-1 0,0 1 0,0-1 0,-1 0 0,1 0 0,-1 0 0,0-1-1,0 0 1,0 0 0,-1 0 0,2-3 79,1-6 339,-1-1-1,0 0 0,-1 0 1,-1 0-1,-1 0 1,0 0-1,0-1 1,-2 1-1,0 0 1,-1-1-1,0 1 1,-1 0-1,-2-6-338,-6 1 811,10 19-689,0 4-26,4 8-103,5 29-60,2 0-1,2-2 1,2 0 0,1 0 0,2-1 0,9 12 67,-22-42-345,0 0 0,1-1 1,0 1-1,1-1 1,-1 0-1,1 0 0,0-1 1,1 0-1,-1 0 0,1-1 1,0 0-1,0 0 1,0-1-1,1 0 0,-1-1 1,1 0-1,0 0 0,-1 0 1,1-1-1,0-1 1,2 1 344,66-5-6806,-44-2 3468</inkml:trace>
+  <inkml:trace contextRef="#ctx0" brushRef="#br0" timeOffset="1332.613">4029 1128 6656,'-3'-1'366,"3"1"-173,-1 0-1,0 0 1,0 0-1,0 0 1,1 0-1,-1-1 1,0 1-1,0 0 1,1 0-1,-1-1 1,0 1-1,1 0 1,-1-1-1,0 1 1,1 0-1,-1-1 1,0 1-1,1-1 1,-1 1-1,1-1 1,-1 0-1,1 1 1,-1-1 0,1 0-1,0 1 1,-1-1-1,1 0 1,0 1-1,-1-1 1,1 0-1,0 1 1,0-1-1,0 0 1,0 0-1,-1 1 1,1-1-1,0 0 1,0 0-1,0 0 1,1 1-1,-1-1 1,0 0-1,0 0 1,0 1-193,113-54 2032,-107 51-1919,-1 1-1,1 0 1,0 0 0,0 0 0,1 1-1,-1 0 1,0 0 0,0 1 0,1-1-1,-1 1 1,0 1 0,0-1 0,1 1-1,-1 0 1,0 1 0,0-1 0,0 1-1,0 1 1,0-1 0,-1 1 0,1 0-113,-4 0 67,0 0 1,0 0 0,0 0-1,-1 0 1,1 0-1,-1 1 1,0-1 0,0 0-1,0 1 1,-1-1-1,1 1 1,-1-1 0,0 1-1,0-1 1,0 1 0,0-1-1,0 1 1,-1-1-1,0 1 1,0-1 0,0 1-1,0-1 1,0 0-1,-1 1 1,1-1 0,-1 0-1,0 0 1,0 0-1,0 0 1,0-1 0,-2 3-68,-17 27 96,-1-1 1,-2-1-1,-1-2 1,-1 0 0,-1-1-1,-2-2 1,0-1-1,-2-1 1,-2 0-97,31-22 4,-32 27-23,33-27 18,1-1-1,-1 1 1,0 0 0,1-1 0,-1 1-1,1 0 1,-1-1 0,1 1-1,-1 0 1,1 0 0,-1-1 0,1 1-1,0 0 1,0 0 0,-1 0 0,1 0-1,0 0 1,0-1 0,0 1-1,0 0 1,0 0 0,0 0 0,0 0-1,0 0 1,0 0 0,1-1 0,-1 1-1,0 0 1,0 0 0,1 0 0,-1 0-1,1-1 1,-1 1 0,1 0-1,-1 0 1,1-1 0,-1 1 0,1 0-1,-1-1 1,1 1 0,0-1 0,0 1-1,-1-1 1,1 1 0,0-1 0,0 1-1,0-1 2,15 7-15,0-2 0,1 0 0,-1-1 0,1 0-1,0-1 1,0-1 0,0-1 0,2-1 15,11 3-23,63 7-286,-1 1-1495,0-6-3362,-58-5 622</inkml:trace>
   <inkml:trace contextRef="#ctx0" brushRef="#br0" timeOffset="2786.62">4845 432 3712,'-3'-2'586,"12"-11"4518,43-21-704,-73 14-1691,14 15-2469,0 0 0,0 1-1,-1 0 1,1 0 0,-1 1-1,0 0 1,0 1-1,0-1 1,-1 2 0,1-1-1,0 1 1,-1 0-1,1 1 1,-3 0-240,-1 0 127,0 1 0,-1 1 0,1 0-1,0 1 1,0 0 0,0 1 0,0 0 0,1 0 0,0 2 0,0-1-1,0 2 1,0-1 0,1 1 0,-8 8-127,15-12-6,0 0-1,1 0 1,0 0-1,-1 1 1,1-1 0,1 1-1,-1-1 1,0 1-1,1 0 1,0-1 0,0 1-1,0 0 1,0 0-1,0 0 1,1 0 0,0 0-1,0 0 1,0 0-1,0 0 1,1-1 0,-1 1-1,1 0 1,0 0-1,0 0 1,1 0 0,-1-1-1,1 1 1,0-1-1,0 1 1,0-1 0,0 1-1,0-1 1,1 0-1,0 0 1,2 2 6,0 2-6,0 0 1,0 0-1,1 0 1,0-1-1,0 0 1,1 0-1,-1-1 1,1 0-1,0 0 0,1 0 1,-1-1-1,1 0 1,0-1-1,0 1 1,0-2-1,0 1 0,1-1 1,-1 0-1,1-1 1,-1 0-1,1 0 1,0-1-1,0 0 6,6 0-100,0 0 0,-1-1 1,1-1-1,-1-1 0,0 0 0,1 0 0,9-5 100,-23 8 8,-1 0 1,1 0-1,-1 1 0,1-1 0,0 0 0,-1 0 0,1 0 0,0-1 0,-1 1 0,1 0 0,0 0 0,-1 0 0,1 0 0,0-1 1,-1 1-1,1 0 0,-1 0 0,1-1 0,-1 1 0,1 0 0,-1-1 0,1 1 0,-1-1 0,1 1 0,-1-1 0,1 1 1,-1-1-1,0 1 0,1-1 0,-1 1 0,0-1 0,1 0 0,-1 1 0,0-1 0,0 1 0,0-1 0,1 0 0,-1 1 0,0-1 1,0 0-1,0 1 0,0-1 0,0 0 0,0 1 0,0-1 0,0 0 0,-1 1 0,1-1 0,0 1 0,0-1 0,-1 0 1,1 1-1,0-1 0,0 1 0,-1-1 0,1 1 0,-1-1 0,1 0 0,-1 1 0,1 0 0,0-1 0,-1 1 0,0-1 0,1 1 1,-1 0-1,1-1-8,-17 0 189,0 1 0,0 0 0,0 1 0,0 1 0,0 1 0,1 0 1,-1 1-1,1 1 0,0 0 0,0 1 0,0 1 0,1 1 0,-5 3-189,13-7 5,1 1-1,-1-1 0,1 1 1,1 0-1,-1 1 0,1 0 1,0-1-1,0 2 1,0-1-1,1 0 0,0 1 1,0 0-1,-1 4-4,4-8-17,-1 0 0,1 1 0,0-1-1,0 0 1,0 1 0,1-1 0,-1 1 0,1-1 0,0 1 0,0-1-1,0 0 1,0 1 0,1-1 0,-1 1 0,1-1 0,0 1 0,0-1-1,0 0 1,0 0 0,1 0 0,-1 1 0,1-1 0,0-1 0,0 1-1,0 0 1,0 0 0,0-1 0,1 1 0,-1-1 0,1 0 0,1 1 17,8 4-56,0 0 1,1-1 0,-1-1 0,1 0 0,1-1-1,-1-1 1,1 0 0,-1 0 0,1-1-1,0-1 1,0 0 0,-1-1 0,1-1 0,0 0-1,0-1 1,-1 0 0,12-4 55,-18 4 106,1 0-1,-1 0 1,1-1-1,-1 0 1,0 0 0,0 0-1,-1-1 1,1-1-1,-1 1 1,0-1 0,0 0-1,0 0 1,-1 0-1,1-1 1,-1 0-106,7 52 2128,0 46-1742,-4 2 0,-4-1 1,-5 39-387,0-47 62,-15 379-339,15-450 136,-9 100-1285,-7-41-2543,6-45-1993</inkml:trace>
-  <inkml:trace contextRef="#ctx0" brushRef="#br0" timeOffset="-2552.334">0 657 3456,'1'-2'794,"8"-10"-438,-2 7 6568,-6-16-4518,1 9-2099,1 1 0,0 0 1,1-1-1,0 1 0,1 0 1,1 1-1,-1 0 0,1-1 0,1 2 1,0-1-1,0 1 0,1 0 1,0 0-1,1 1 0,0 1 1,1-1-308,-7 6 22,0 0-1,0 1 1,0-1 0,1 1 0,-1 0-1,1 0 1,-1 0 0,1 0 0,-1 1-1,1 0 1,-1-1 0,1 1 0,-1 0-1,1 1 1,0-1 0,-1 1 0,1-1-1,-1 1 1,0 0 0,1 1 0,-1-1-1,0 0 1,1 1 0,-1 0 0,0 0-1,0 0 1,0 0 0,-1 0 0,1 0-1,1 3-21,6 4 79,-1 1-1,0 1 0,-1 0 0,0 0 0,-1 0 1,0 1-1,1 5-78,-2-6 61,-1 0 0,0 1 0,-1 0 0,-1 0 0,0 0 0,0 0 0,-1 0 0,-1 1 0,0-1 0,-1 1 0,0-1 1,-1 0-1,0 1 0,-1-1 0,0 0 0,-1 1 0,0-1 0,-1-1 0,-1 1 0,-5 10-61,-1 2 251,6-34-150,12-27-135,2 1 0,1 1 1,2-1-1,2 2 0,1 0 0,1 0 1,2 2-1,2 0 0,7-8 34,-21 33 13,-1 0 0,1 0 0,0 1-1,1 0 1,-1 0 0,1 1 0,0 0 0,1 0 0,-1 0 0,1 1 0,0 0-1,0 1 1,0 0 0,0 0 0,1 1 0,-1 0 0,8-1-13,-13 3 24,0 1 0,0-1 1,0 1-1,0 0 0,0-1 1,0 1-1,0 1 1,0-1-1,-1 0 0,1 1 1,0-1-1,-1 1 0,0 0 1,1 0-1,-1 0 0,0 0 1,0 0-1,0 1 0,0-1 1,0 0-1,0 1 1,-1 0-1,1-1 0,-1 1 1,1 2-25,22 79 585,-17-24-361,-3 1 0,-2 0 0,-3 0 0,-3 0 0,-3 0 0,-6 21-224,-16 88 68,-8-1 0,-8-1 0,-6-3 0,-31 56-68,38-138-944,43-82 806,0 0-1,0 0 1,0 0-1,0 0 1,0 0-1,-1-1 1,1 1-1,0 0 1,0-1 0,-1 1-1,1-1 1,0 1-1,-1-1 1,1 0-1,0 0 1,-1 1-1,1-1 1,-1 0-1,1 0 1,0 0-1,-1 0 1,1-1-1,-1 1 1,1 0-1,0-1 1,-1 1-1,1 0 1,0-1-1,-1 0 1,1 1-1,0-1 1,0 0 0,0 0-1,0 1 1,-1-1-1,1 0 1,0 0-1,1 0 1,-1 0-1,0-1 1,0 1-1,0 0 1,1 0-1,-1 0 1,0-1-1,1 1 1,-1 0-1,1-1 1,0 1-1,-1 0 1,1-1-1,0 1 1,0-1-1,0 1 1,0 0 0,0-1-1,0 1 1,0-2 138,-6-30-3552,0-5-528</inkml:trace>
+  <inkml:trace contextRef="#ctx0" brushRef="#br0" timeOffset="-2552.335">0 657 3456,'1'-2'794,"8"-10"-438,-2 7 6568,-6-16-4518,1 9-2099,1 1 0,0 0 1,1-1-1,0 1 0,1 0 1,1 1-1,-1 0 0,1-1 0,1 2 1,0-1-1,0 1 0,1 0 1,0 0-1,1 1 0,0 1 1,1-1-308,-7 6 22,0 0-1,0 1 1,0-1 0,1 1 0,-1 0-1,1 0 1,-1 0 0,1 0 0,-1 1-1,1 0 1,-1-1 0,1 1 0,-1 0-1,1 1 1,0-1 0,-1 1 0,1-1-1,-1 1 1,0 0 0,1 1 0,-1-1-1,0 0 1,1 1 0,-1 0 0,0 0-1,0 0 1,0 0 0,-1 0 0,1 0-1,1 3-21,6 4 79,-1 1-1,0 1 0,-1 0 0,0 0 0,-1 0 1,0 1-1,1 5-78,-2-6 61,-1 0 0,0 1 0,-1 0 0,-1 0 0,0 0 0,0 0 0,-1 0 0,-1 1 0,0-1 0,-1 1 0,0-1 1,-1 0-1,0 1 0,-1-1 0,0 0 0,-1 1 0,0-1 0,-1-1 0,-1 1 0,-5 10-61,-1 2 251,6-34-150,12-27-135,2 1 0,1 1 1,2-1-1,2 2 0,1 0 0,1 0 1,2 2-1,2 0 0,7-8 34,-21 33 13,-1 0 0,1 0 0,0 1-1,1 0 1,-1 0 0,1 1 0,0 0 0,1 0 0,-1 0 0,1 1 0,0 0-1,0 1 1,0 0 0,0 0 0,1 1 0,-1 0 0,8-1-13,-13 3 24,0 1 0,0-1 1,0 1-1,0 0 0,0-1 1,0 1-1,0 1 1,0-1-1,-1 0 0,1 1 1,0-1-1,-1 1 0,0 0 1,1 0-1,-1 0 0,0 0 1,0 0-1,0 1 0,0-1 1,0 0-1,0 1 1,-1 0-1,1-1 0,-1 1 1,1 2-25,22 79 585,-17-24-361,-3 1 0,-2 0 0,-3 0 0,-3 0 0,-3 0 0,-6 21-224,-16 88 68,-8-1 0,-8-1 0,-6-3 0,-31 56-68,38-138-944,43-82 806,0 0-1,0 0 1,0 0-1,0 0 1,0 0-1,-1-1 1,1 1-1,0 0 1,0-1 0,-1 1-1,1-1 1,0 1-1,-1-1 1,1 0-1,0 0 1,-1 1-1,1-1 1,-1 0-1,1 0 1,0 0-1,-1 0 1,1-1-1,-1 1 1,1 0-1,0-1 1,-1 1-1,1 0 1,0-1-1,-1 0 1,1 1-1,0-1 1,0 0 0,0 0-1,0 1 1,-1-1-1,1 0 1,0 0-1,1 0 1,-1 0-1,0-1 1,0 1-1,0 0 1,1 0-1,-1 0 1,0-1-1,1 1 1,-1 0-1,1-1 1,0 1-1,-1 0 1,1-1-1,0 1 1,0-1-1,0 1 1,0 0 0,0-1-1,0 1 1,0-2 138,-6-30-3552,0-5-528</inkml:trace>
   <inkml:trace contextRef="#ctx0" brushRef="#br0" timeOffset="-2030.919">865 39 5888,'4'-3'994,"-3"2"-677,1 0 0,0-1 0,-1 1 1,1 0-1,0-1 0,-1 1 0,0-1 1,1 1-1,-1-1 0,0 0 0,0 0 0,0 1 1,0-1-1,0 0 0,0 0 0,-1 0 1,1 0-1,0 0 0,-1 0 0,0 0-317,12 13 5019,75 127-2251,-11-11-2214,20 90-186,-70-141-442,-4 0-1,4 35 75,-2 38-464,-19-100-572,-1 1 0,-2-1 0,-3 1 0,-3 18 1036,-1-23-2569,-2 0 0,-2-1-1,-2 1 1,-11 26 2569,-17 41-4277</inkml:trace>
   <inkml:trace contextRef="#ctx0" brushRef="#br0" timeOffset="-909.329">1796 367 5888,'13'-13'2390,"-5"3"5401,4 16-490,-1 257-6138,-9-245-1170,1 20 28,1 1 1,3-1 0,0 0 0,9 21-22,11 34-107,-28-93-18,0 1-1,0-1 1,0 0-1,1 0 1,-1 0-1,0 0 1,0 0 0,0 0-1,0 0 1,0 0-1,0 0 1,0 0 0,0 0-1,0-1 1,1 1-1,-1 0 1,0-1 0,0 1-1,0 0 1,0-1-1,1 1 1,-1-1 0,0 1-1,1-1 1,-1 0-1,0 1 1,1-1-1,-1 0 1,0 1 0,1-1-1,-1 0 1,1 0-1,0 0 1,-1 1 0,1-1-1,0 0 1,-1 0-1,1 0 1,0 0 0,0 0-1,0 0 126,-5-5-698,-39-42-5275,22 23 1856</inkml:trace>
   <inkml:trace contextRef="#ctx0" brushRef="#br0" timeOffset="-625.033">1614 653 6784,'-71'19'8394,"27"-10"-2901,51 2-4565,66-7-554,363-4-1048,-248 0-7212,-165 0 3785</inkml:trace>
@@ -2740,13 +2741,13 @@
   <inkml:trace contextRef="#ctx0" brushRef="#br0" timeOffset="44545.956">27615 3860 4992,'0'-11'2810,"0"10"-2244,0 1 68,0 0 70,0 0 54,9-1 1092,18-10-200,31-4-4692,-1 7-3384,-43 7 3882</inkml:trace>
   <inkml:trace contextRef="#ctx0" brushRef="#br0" timeOffset="45331.989">27798 4026 5888,'45'-34'7477,"-6"-39"-5786,-38 70-1687,0 1 0,1-1 0,-1 0 0,0 1 0,-1-1 0,1 0 0,0 0 0,-1 0 0,0 0 0,1 0 0,-1 0 0,0 0 0,-1 0 0,1 0 0,0 0 0,-1 0 0,0 1 0,0-1 0,0 0 0,0 0 0,0 0 0,0 1 0,-1-1 0,1 1 0,-1-1 0,0 1 0,0 0 0,1-1 0,-2 1 0,1 0 0,0 0 0,0 0 0,-1 1 0,1-1 0,-1 0 0,-1 0-4,3 2-29,0-1 1,1 1-1,-1 0 1,1 0-1,-1-1 0,0 1 1,1 0-1,-1 0 1,0 0-1,1 0 1,-1 0-1,0 0 1,1 0-1,-1 0 1,0 0-1,1 0 1,-1 0-1,0 1 1,1-1-1,-1 0 1,0 0-1,1 1 1,-1-1-1,1 0 1,-1 1-1,0-1 1,1 0-1,-1 1 1,1-1-1,-1 1 1,1-1-1,0 1 1,-1-1-1,1 1 1,-1-1-1,1 1 1,0 0-1,0-1 1,-1 1-1,1 0 1,0-1-1,0 1 1,0-1-1,-1 1 1,1 0-1,0 0 1,0-1-1,0 1 1,0 0 28,0 42-361,1-30 263,-1-5 91,1 0 0,0 0 1,0 0-1,0 0 0,1 0 1,0 0-1,1 0 0,0-1 1,0 0-1,1 1 0,-1-1 1,2 0-1,-1 0 0,1-1 1,0 0-1,5 6 7,-7-10 95,0 0 1,0 0-1,1-1 1,-1 1-1,0-1 1,1 1-1,-1-1 0,1 0 1,-1 0-1,1-1 1,0 1-1,-1-1 1,1 0-1,0 0 0,0 0 1,-1 0-1,1-1 1,0 1-1,-1-1 1,1 0-1,-1 0 1,1 0-1,-1-1 0,1 1 1,-1-1-1,0 0 1,0 0-1,0 0 1,0 0-1,0 0 0,0-1 1,-1 1-1,1-1 1,-1 0-1,1 0 1,-1 0-1,0 0 0,1-2-95,54-100 32,-52 95-180,1 0-1,0 0 0,0 1 1,1-1-1,0 1 0,1 1 0,0 0 1,0 0-1,3-1 149,-11 8-34,0 1 1,1-1-1,-1 0 1,1 1-1,-1-1 1,1 1-1,-1-1 0,1 1 1,-1-1-1,1 1 1,0-1-1,-1 1 1,1 0-1,-1-1 1,1 1-1,0 0 1,0 0-1,-1-1 0,1 1 1,0 0-1,-1 0 1,1 0-1,0 0 1,0 0-1,-1 0 1,1 0-1,0 0 1,-1 0-1,1 0 0,0 0 1,0 0-1,-1 1 1,1-1-1,0 0 1,-1 1-1,1-1 1,0 0-1,-1 1 0,1-1 1,-1 1-1,1-1 1,-1 1-1,1-1 1,-1 1-1,1-1 1,-1 1-1,1-1 1,-1 1-1,0 0 0,1-1 1,-1 1-1,0 0 1,1-1-1,-1 1 1,0 0-1,0-1 1,0 1-1,0 0 1,0 0-1,0-1 0,0 1 1,0 0 33,1 16-66,1 1-1,1-1 1,1 0-1,0 0 1,1 0 0,0-1-1,2 0 1,0 0 0,3 5 66,28 20-1355,-4-38-2336,-20-7 1233</inkml:trace>
   <inkml:trace contextRef="#ctx0" brushRef="#br0" timeOffset="45921.048">28341 3800 5248,'0'0'1754,"0"18"1505,22 95-2694,5-2 1419,-27-100-1298,0-14 644,-27-139 94,27 139-1434,-1 1 0,1-1 0,0 1-1,0-1 1,0 1 0,0 0 0,0-1 0,0 1 0,1-1-1,-1 1 1,1 0 0,0-1 0,0 1 0,-1 0-1,2-1 1,-1 1 0,0 0 0,0 0 0,1 0 0,-1 0-1,1 0 1,-1 0 0,1 1 0,0-1 0,0 1-1,0-1 1,0 1 0,0-1 0,0 1 0,0 0 0,0 0-1,0 0 1,2 0 10,3 2-72,-1 0-1,1 0 0,0 1 1,-1 0-1,1 0 0,-1 1 1,1 0-1,-1 0 0,0 0 1,0 1-1,-1 0 0,1 0 1,-1 1-1,0-1 0,0 1 1,0 0-1,-1 0 0,0 1 1,0-1-1,0 1 0,0 0 1,-1 0-1,0 1 0,0 1 73,26 50-2317,-21-16-2304,-8-31 2189</inkml:trace>
-  <inkml:trace contextRef="#ctx0" brushRef="#br0" timeOffset="46786.197">28765 3855 5120,'-6'-2'4865,"-9"5"-4315,14-3-403,-2 1-114,-1 0-1,1 1 0,0-1 0,0 1 0,0 0 0,0 0 1,0 0-1,0 0 0,0 0 0,1 1 0,-1-1 1,1 1-1,0 0 0,-1 0 0,1 0 0,1 0 1,-1 0-1,0 0 0,1 0 0,-1 0 0,1 1 1,0-1-1,0 1 0,1-1 0,-1 1 0,1-1 0,-1 1 1,1 2-33,0 0 71,1 0 0,0 0 1,0 0-1,0-1 0,0 1 1,1 0-1,0 0 0,1-1 1,-1 1-1,1-1 0,0 1 1,0-1-1,0 0 0,1-1 1,0 1-1,2 2-71,-5-7 48,0 1 1,0 0-1,0 0 0,0 0 1,0-1-1,0 1 0,0-1 0,0 1 1,0-1-1,0 1 0,0-1 1,0 0-1,1 1 0,-1-1 1,0 0-1,0 0 0,0 0 1,1 0-1,-1 0 0,0 0 1,0 0-1,1 0 0,-1-1 1,0 1-1,0 0 0,0-1 1,0 1-1,0-1 0,1 1 1,-1-1-1,0 1 0,0-1 0,0 0 1,0 0-1,-1 1 0,1-1 1,0 0-1,0 0 0,0 0 1,-1 0-1,1 0 0,0 0-48,21-50 579,-44-79-1048,50 210-529,-26-72 980,0-2 18,-1-1 0,1 0 0,-1 0-1,1 0 1,1 0 0,-1 0 0,1 0 0,0-1-1,0 0 1,0 1 0,0-1 0,1 0-1,0 0 1,0-1 0,1 2 0,-2-5 24,-1 0-1,1 0 1,-1 0 0,0 0-1,1-1 1,-1 1 0,1-1 0,-1 0-1,1 1 1,-1-1 0,0 0-1,0 0 1,1-1 0,-1 1-1,0 0 1,0-1 0,0 1 0,0-1-1,0 0 1,-1 1 0,1-1-1,0 0 1,-1 0 0,0 0-1,1 0 1,-1-1 0,1 0-24,6-10 6,0 0 0,-1 0 0,-1 0-1,0-1 1,-1 0 0,0 0 0,-1-1 0,0 1 0,-2-1 0,1 0 0,-2 1 0,0-3-6,-11-176 598,9 189-579,-16-138 253,17 141-272,0-3-79,0-1-1,-1 0 0,1 1 0,-1-1 1,0 0-1,0 1 0,0-1 1,-1 1-1,0 0 0,0 0 0,0-1 1,0 1-1,0 0 0,-1 1 1,0-1-1,0 0 0,-2-2 80,3 6-26,1 1 0,0-1 0,0 0 0,-1 0 1,1 1-1,0-1 0,0 1 0,0-1 0,0 1 0,0 0 0,0-1 0,0 1 0,0 0 0,0 0 0,0 0 0,0 0 0,0 0 0,1-1 0,-1 2 0,0-1 1,1 0-1,-1 0 0,0 0 0,1 0 0,-1 0 0,1 0 0,0 1 0,-1-1 0,1 0 26,-1 1-37,0 4 8,-1-1 1,1 1-1,0-1 0,0 1 1,1 0-1,-1-1 0,1 1 0,0 0 1,1-1-1,0 1 0,0-1 1,0 2 28,2 13-51,-2 9 20,2-1 0,1 1-1,2-1 1,0 0 0,2 0-1,1-1 1,2 0 0,2 3 31,-3-11-51,2 0 0,0 0 0,1-1 0,1-1 0,0 0 0,1-1 0,1-1 0,1 0 0,0-1 1,1-1-1,13 8 51,-12-12-760,0 0 1,1-1-1,0 0 1,0-2-1,15 3 760,5-2-2538</inkml:trace>
-  <inkml:trace contextRef="#ctx0" brushRef="#br0" timeOffset="48658.561">26242 5552 5888,'-4'-34'3301,"3"32"-2720,1 2-223,-9 8 63,5 13-37,27 49 304,-6 52-1003,14 81-346,-23-163 1616,-30-157 799,-62-186-799,62 252-427,22 50-498,0 0 0,0 0 0,0 0 0,0 0-1,1 0 1,-1 0 0,0 0 0,1 0 0,-1 0 0,0 1 0,1-1 0,-1 0 0,1 0 0,-1 0 0,1 0 0,0 0-1,-1 1 1,1-1 0,0 0 0,0 1 0,0-1 0,-1 0 0,1 1 0,0-1 0,0 1 0,0 0 0,0-1 0,0 1-1,0 0 1,0-1 0,0 1 0,0 0-30,1-1 94,62-20 1175,-36 9-1092,-1-1 0,-1-2-1,0 0 1,-1-2 0,-1-1 0,5-5-177,66-50-885,-24 47-4598,-32 25 1259,-21 1 1622</inkml:trace>
+  <inkml:trace contextRef="#ctx0" brushRef="#br0" timeOffset="46786.196">28765 3855 5120,'-6'-2'4865,"-9"5"-4315,14-3-403,-2 1-114,-1 0-1,1 1 0,0-1 0,0 1 0,0 0 0,0 0 1,0 0-1,0 0 0,0 0 0,1 1 0,-1-1 1,1 1-1,0 0 0,-1 0 0,1 0 0,1 0 1,-1 0-1,0 0 0,1 0 0,-1 0 0,1 1 1,0-1-1,0 1 0,1-1 0,-1 1 0,1-1 0,-1 1 1,1 2-33,0 0 71,1 0 0,0 0 1,0 0-1,0-1 0,0 1 1,1 0-1,0 0 0,1-1 1,-1 1-1,1-1 0,0 1 1,0-1-1,0 0 0,1-1 1,0 1-1,2 2-71,-5-7 48,0 1 1,0 0-1,0 0 0,0 0 1,0-1-1,0 1 0,0-1 0,0 1 1,0-1-1,0 1 0,0-1 1,0 0-1,1 1 0,-1-1 1,0 0-1,0 0 0,0 0 1,1 0-1,-1 0 0,0 0 1,0 0-1,1 0 0,-1-1 1,0 1-1,0 0 0,0-1 1,0 1-1,0-1 0,1 1 1,-1-1-1,0 1 0,0-1 0,0 0 1,0 0-1,-1 1 0,1-1 1,0 0-1,0 0 0,0 0 1,-1 0-1,1 0 0,0 0-48,21-50 579,-44-79-1048,50 210-529,-26-72 980,0-2 18,-1-1 0,1 0 0,-1 0-1,1 0 1,1 0 0,-1 0 0,1 0 0,0-1-1,0 0 1,0 1 0,0-1 0,1 0-1,0 0 1,0-1 0,1 2 0,-2-5 24,-1 0-1,1 0 1,-1 0 0,0 0-1,1-1 1,-1 1 0,1-1 0,-1 0-1,1 1 1,-1-1 0,0 0-1,0 0 1,1-1 0,-1 1-1,0 0 1,0-1 0,0 1 0,0-1-1,0 0 1,-1 1 0,1-1-1,0 0 1,-1 0 0,0 0-1,1 0 1,-1-1 0,1 0-24,6-10 6,0 0 0,-1 0 0,-1 0-1,0-1 1,-1 0 0,0 0 0,-1-1 0,0 1 0,-2-1 0,1 0 0,-2 1 0,0-3-6,-11-176 598,9 189-579,-16-138 253,17 141-272,0-3-79,0-1-1,-1 0 0,1 1 0,-1-1 1,0 0-1,0 1 0,0-1 1,-1 1-1,0 0 0,0 0 0,0-1 1,0 1-1,0 0 0,-1 1 1,0-1-1,0 0 0,-2-2 80,3 6-26,1 1 0,0-1 0,0 0 0,-1 0 1,1 1-1,0-1 0,0 1 0,0-1 0,0 1 0,0 0 0,0-1 0,0 1 0,0 0 0,0 0 0,0 0 0,0 0 0,0 0 0,1-1 0,-1 2 0,0-1 1,1 0-1,-1 0 0,0 0 0,1 0 0,-1 0 0,1 0 0,0 1 0,-1-1 0,1 0 26,-1 1-37,0 4 8,-1-1 1,1 1-1,0-1 0,0 1 1,1 0-1,-1-1 0,1 1 0,0 0 1,1-1-1,0 1 0,0-1 1,0 2 28,2 13-51,-2 9 20,2-1 0,1 1-1,2-1 1,0 0 0,2 0-1,1-1 1,2 0 0,2 3 31,-3-11-51,2 0 0,0 0 0,1-1 0,1-1 0,0 0 0,1-1 0,1-1 0,1 0 0,0-1 1,1-1-1,13 8 51,-12-12-760,0 0 1,1-1-1,0 0 1,0-2-1,15 3 760,5-2-2538</inkml:trace>
+  <inkml:trace contextRef="#ctx0" brushRef="#br0" timeOffset="48658.56">26242 5552 5888,'-4'-34'3301,"3"32"-2720,1 2-223,-9 8 63,5 13-37,27 49 304,-6 52-1003,14 81-346,-23-163 1616,-30-157 799,-62-186-799,62 252-427,22 50-498,0 0 0,0 0 0,0 0 0,0 0-1,1 0 1,-1 0 0,0 0 0,1 0 0,-1 0 0,0 1 0,1-1 0,-1 0 0,1 0 0,-1 0 0,1 0 0,0 0-1,-1 1 1,1-1 0,0 0 0,0 1 0,0-1 0,-1 0 0,1 1 0,0-1 0,0 1 0,0 0 0,0-1 0,0 1-1,0 0 1,0-1 0,0 1 0,0 0-30,1-1 94,62-20 1175,-36 9-1092,-1-1 0,-1-2-1,0 0 1,-1-2 0,-1-1 0,5-5-177,66-50-885,-24 47-4598,-32 25 1259,-21 1 1622</inkml:trace>
   <inkml:trace contextRef="#ctx0" brushRef="#br0" timeOffset="49031.364">27013 5473 8320,'0'-5'3072,"0"5"-2400,0-3 320,0 3 32,-5 0-640,5 0-192,0 0-224,0 0-64,-4 0 64,-1 0-416,1 0-128,4 0-608,0 0-192,0 0-1984</inkml:trace>
   <inkml:trace contextRef="#ctx0" brushRef="#br0" timeOffset="49280.983">27013 5644 8320,'4'7'3072,"-4"-7"-2400,0 0 320,0 0-64,0 0-480,0 0-160,0 0-192,0 0-96,0 0 32,0 0-32,0 0 0,0 0-224,0 0 0,0 0-1024,0 5-448,0-2-1888</inkml:trace>
-  <inkml:trace contextRef="#ctx0" brushRef="#br0" timeOffset="51738.233">27642 5497 4736,'-18'-45'4069,"4"10"-1093,5 16-1648,9 19-1141,-1 2-91,-2 97-118,3 234 92,-1-328-22,1-1 0,-1 1 1,1 0-1,0-1 0,1 1 0,-1 0 1,1-1-1,0 1 0,0-1 1,1 1-1,-1-1 0,1 1 1,0-1-1,0 0 0,1 0 0,-1 0 1,1 0-1,0 0 0,0-1 1,0 1-1,0-1 0,0 0 1,1 0-1,0 0 0,0 0 0,0 0 1,0-1-1,0 0 0,0 0 1,0 0-1,1 0 0,-1-1 1,1 0-1,-1 0 0,3 0-48,110-1 693,-46-2-3818,-61-2-853,-5 3 1146</inkml:trace>
-  <inkml:trace contextRef="#ctx0" brushRef="#br0" timeOffset="52069.997">27673 5770 6656,'7'-2'8897,"5"-4"-6677,1-1-2180,52-10 109,16-2-4895,-67 11 676,-11 7 1164</inkml:trace>
-  <inkml:trace contextRef="#ctx0" brushRef="#br0" timeOffset="52355.023">27646 5497 5248,'6'-6'9729,"25"-8"-7768,49 5-6915,-60 9 2932,-1 0-996</inkml:trace>
+  <inkml:trace contextRef="#ctx0" brushRef="#br0" timeOffset="51738.232">27642 5497 4736,'-18'-45'4069,"4"10"-1093,5 16-1648,9 19-1141,-1 2-91,-2 97-118,3 234 92,-1-328-22,1-1 0,-1 1 1,1 0-1,0-1 0,1 1 0,-1 0 1,1-1-1,0 1 0,0-1 1,1 1-1,-1-1 0,1 1 1,0-1-1,0 0 0,1 0 0,-1 0 1,1 0-1,0 0 0,0-1 1,0 1-1,0-1 0,0 0 1,1 0-1,0 0 0,0 0 0,0 0 1,0-1-1,0 0 0,0 0 1,0 0-1,1 0 0,-1-1 1,1 0-1,-1 0 0,3 0-48,110-1 693,-46-2-3818,-61-2-853,-5 3 1146</inkml:trace>
+  <inkml:trace contextRef="#ctx0" brushRef="#br0" timeOffset="52069.996">27673 5770 6656,'7'-2'8897,"5"-4"-6677,1-1-2180,52-10 109,16-2-4895,-67 11 676,-11 7 1164</inkml:trace>
+  <inkml:trace contextRef="#ctx0" brushRef="#br0" timeOffset="52355.022">27646 5497 5248,'6'-6'9729,"25"-8"-7768,49 5-6915,-60 9 2932,-1 0-996</inkml:trace>
   <inkml:trace contextRef="#ctx0" brushRef="#br0" timeOffset="53255.895">28132 5765 5120,'-2'-1'173,"0"0"1,0 0-1,0 0 0,-1 0 0,1 0 1,0 0-1,-1 1 0,1-1 1,0 1-1,-1 0 0,1-1 1,-1 1-1,1 0 0,0 1 1,-1-1-1,1 0 0,-1 1 1,1-1-1,0 1 0,-1 0 1,1-1-1,0 1 0,0 0 1,0 1-1,-1-1 0,1 0 1,0 1-1,0 0-173,-2 4 21,1 0 0,0 0-1,0 1 1,1-1 0,0 1 0,0 0 0,1 0-1,0-1 1,0 1 0,0 4-21,1-3-3,-1 0 0,2 0 0,-1 0 1,1 1-1,1-1 0,-1 0 0,2 0 0,-1 0 0,1-1 1,0 1-1,1 1 3,-3-6 92,0-1 1,1 1 0,-1 0 0,1-1-1,-1 1 1,1-1 0,0 1-1,0-1 1,0 0 0,0 0-1,1 0 1,-1 0 0,1 0 0,-1-1-1,1 1 1,-1-1 0,1 1-1,0-1 1,0 0 0,0 0 0,0 0-1,0-1 1,-1 1 0,1-1-1,0 1 1,1-1 0,-1 0-1,0 0 1,0 0 0,0-1 0,2 0-93,-2 0 45,1 1 0,-1-2 0,0 1 1,0 0-1,0-1 0,0 1 0,0-1 1,0 0-1,0 0 0,0 0 0,-1 0 1,1 0-1,-1-1 0,0 1 0,1-1 0,-1 0 1,0-1-46,0 1-162,0-1 1,-1 1 0,1-1-1,-1 0 1,0 1-1,0-1 1,0 0 0,-1 0-1,1 1 1,-1-1-1,0 0 1,0 0 0,-1 0-1,1 0 1,-1 1-1,0-2 162,-45-169-5605,28-6 5946,9 61 4379,0 40-2538,31 109-1137,-7-1-989,-1 1 1,-2 0-1,-1 1 1,-1 1-1,-1-1 1,-2 1-1,-1 7-56,26 92-326,43 127-4079,-62-235 1226,-8-18 1089</inkml:trace>
   <inkml:trace contextRef="#ctx0" brushRef="#br0" timeOffset="54272.983">28476 5789 5632,'-2'0'200,"1"0"1,-1-1-1,1 1 1,-1 0-1,0 0 1,1 0-1,-1 0 1,1 0-1,-1 1 1,0-1-1,1 0 1,-1 1-1,1-1 1,-1 1-1,1-1 0,-1 1 1,1 0-1,0 0 1,-1 0-1,1-1 1,0 1-1,-1 0 1,0 1-201,-1 2 71,0-1 1,0 0-1,1 1 1,-1-1 0,1 1-1,-1 0 1,1 0-1,0 0 1,1 0-1,-1 0 1,1 0-1,0 0 1,-1 3-72,2 6-15,0 1 0,1-1 0,0 0 0,1 0 0,1 0 0,0 0 0,1 0 1,0 0-1,1-1 0,3 6 15,-8-15 101,0-1 1,1 0-1,-1 1 0,1-1 1,0 0-1,0 0 1,-1 1-1,1-1 1,1 0-1,-1 0 1,0 0-1,0 0 0,1 0 1,-1 0-1,1-1 1,0 1-1,0 0 1,-1-1-1,1 0 1,0 1-1,0-1 0,0 0 1,0 0-1,1 0 1,-1 0-1,0 0 1,0 0-1,1-1 1,-1 1-1,0-1 0,1 1 1,-1-1-1,0 0 1,1 0-1,-1 0 1,0-1-1,1 1 1,-1 0-1,0-1 1,1 1-1,-1-1 0,0 0 1,0 0-1,1 0 1,-1 0-1,0 0-101,1-3 88,-1 0 0,1 0 0,-1-1-1,0 1 1,-1 0 0,1-1 0,-1 1-1,0-1 1,0 1 0,0-1 0,0 1-1,-1-1 1,0 0 0,0 1 0,0-1 0,-1 0-1,1 1 1,-1-1 0,0 0 0,0 1-1,-1 0 1,1-1 0,-3-3-88,0-8 360,-12-31 407,-7-43-734,23 90-44,0 1 0,0-1 0,0 0 0,1 1 1,-1-1-1,0 0 0,0 0 0,0 1 0,0-1 0,0 0 1,0 1-1,0-1 0,1 0 0,-1 1 0,0-1 0,0 0 0,0 0 1,1 0-1,-1 1 0,0-1 0,0 0 0,1 0 0,-1 0 1,0 1-1,1-1 0,-1 0 0,0 0 0,0 0 0,1 0 1,-1 0-1,0 0 0,1 0 0,-1 1 0,0-1 0,1 0 0,-1 0 1,0 0-1,1 0 0,-1-1 0,0 1 0,1 0 0,-1 0 1,0 0-1,1 0 0,-1 0 0,0 0 0,0 0 0,1 0 1,-1-1-1,0 1 0,0 0 0,1 0 0,-1 0 0,0-1 0,0 1 1,1 0-1,-1 0 0,0-1 0,0 1 0,0 0 0,1-1 11,63 88-3290,-3 3-1,34 73 3291,-79-136 390,-2 0 0,-1 1 1,-1 1-1,-2 0 0,-1 0 0,-1 1 0,3 26-390,-10-54 73,-1 0 0,1 0-1,-1 0 1,0 0 0,1 0 0,-1 0 0,0 0 0,0 0 0,-1 0-1,1 0 1,0 0 0,-1 0 0,1 0 0,-1 0 0,1 0-1,-1 0 1,0 0 0,0 0 0,0-1 0,0 1 0,0 0 0,-1-1-1,1 1 1,0-1 0,-1 1 0,1-1 0,-1 1 0,1-1-1,-1 0 1,0 0 0,0 0 0,1 0 0,-1 0 0,0 0 0,0-1-1,0 1 1,0 0 0,0-1 0,0 0 0,0 1 0,0-1-1,0 0 1,0 0 0,-2 0-73,-9-3 48,1 0 0,0-1-1,0 0 1,1-1 0,-1 0 0,1-1-1,0 0 1,0-1 0,1 0 0,0-1-1,0 0 1,1 0 0,0-1 0,0 0-1,1-1 1,0 0 0,1 0 0,0-1-1,1 1 1,0-2 0,-2-5-48,6 10-19,0 0 0,0 0 0,0 0 0,1-1 0,0 1 0,1 0 0,0-1 1,0 1-1,0-1 0,1 1 0,0 0 0,1 0 0,-1-1 0,1 1 0,1 0 0,0-2 19,56-103-87,39-29 247,-31 27-144,-65 113-30,-1 0 0,0-1-1,-1 1 1,1-1-1,0 1 1,0-1 0,-1 1-1,1-1 1,0 1-1,-1-1 1,0 0-1,1 1 1,-1-1 0,0 0-1,0 0 1,0 1-1,0-1 1,0 0 0,0 1-1,-1-1 1,1 0-1,-1 1 1,1-1 0,-1 0-1,1 1 1,-1-1-1,0 1 1,0-1 0,0 1-1,0 0 1,0-1-1,0 1 1,0 0-1,0-1 1,-1 1 0,1 0-1,0 0 1,-1 0-1,1 0 1,-1 0 0,1 1-1,-1-1 1,1 0-1,-1 1 1,1-1 0,-1 1-1,0-1 15,-1 2 6,0-1 0,-1 1 1,1 0-1,0-1 0,0 1 0,0 0 0,0 1 0,0-1 0,1 1 1,-1-1-1,0 1 0,1 0 0,-1 0 0,1 0 0,-1 0 0,1 0 1,0 1-1,0-1 0,0 1 0,0-1 0,1 1 0,-1 0 0,1 0 1,-1 0-1,1 0 0,0 0 0,0 0 0,0 0 0,1 0 0,-1 0 0,1 0 1,0 1-1,-1 1-6,2 5 7,0-1 1,0 1-1,1 0 1,0-1-1,1 0 1,0 1-1,0-1 1,1 0-1,0 0 0,1-1 1,0 0-1,0 1 1,1-1-1,0-1 1,0 1-1,1-1 1,0 0-1,0-1 1,1 0-1,4 4-7,60 25-318,3-25-3454,-39-10-404</inkml:trace>
   <inkml:trace contextRef="#ctx0" brushRef="#br0" timeOffset="61676.814">25278 3237 4480,'-5'78'2138,"1"-4"-1802,0-32-85,-5 75 352,0 190 325,14 75-480,3 90-368,-17 43-48,-4-26 986,-1-60-143,-3-71-678,4-36 571,13-305-658,9 86 784,-8-99-882,0 0 0,0 0 0,0-1 1,1 1-1,0 0 0,0-1 0,0 1 1,0-1-1,1 0 0,-1 0 0,1 0 1,0 0-1,-1 0 0,1 0 1,1-1-1,-1 1 0,0-1 0,1 0 1,-1 0-1,1 0 0,0-1 0,-1 1 1,3 0-13,249 38-128,-60 6-198,53 15 454,38 8-58,35 1-38,34-4-171,21-10 416,51-13 102,84 8 32,394 36-219,-783-80-154,0-5 1,0-5 0,0-6-1,104-22-38,-186 24 108,0-1 0,-1-2-1,0-1 1,-1-3 0,8-4-108,-42 16-10,-1 0 0,1 0 0,0 0 0,-1-1 0,1 1 0,-1-1 0,0 0 0,0 0 0,0 0 0,0-1 0,0 1 0,-1-1 0,1 1 0,-1-1 0,0 0 0,0 0 0,-1 1 0,1-2-1,-1 1 1,0 0 0,0 0 0,0 0 0,0 0 0,-1-1 0,0 1 0,0 0 0,0-1 0,0 1 0,-1 0 0,0 0 0,1-1 0,-2 1 0,1-1 10,-38-234 166,11-367 202,-2-1180 272,41 1344-671,-2-248 40,-30 397 135,-10 129-208,31 160 74,-1 0 1,1 0-1,-1 0 0,0 0 1,-1 0-1,1 0 0,-1 1 0,1-1 1,-1 0-1,0 1 0,-1-1 1,1 1-1,0 0 0,-1 0 0,0 0 1,0 0-1,0 0 0,0 0 1,0 1-1,-1 0 0,1 0 0,-1 0 1,1 0-1,-1 0 0,0 0 1,0 1-1,1 0 0,-2 0-10,-88-31 75,-196-43 629,176 32-548,-154-52-24,82 53 243,-149-13-375,107 20 302,53 15-217,-1 7 1,-1 8-1,0 8 0,1 7 1,-116 24-86,3-6 234,-276-10-234,434-12-19,0 5-1,0 6 1,-54 17 19,-18-2-6,30-21 65,-20-6-86,190-5 16,1 0 0,-1 0 0,0 1 0,0-1 0,0 0 0,1 1-1,-1-1 1,0 1 0,1 0 0,-1-1 0,1 1 0,-1 0-1,1 0 1,-1 0 0,1 0 0,-1 1 0,1-1 0,0 0 0,0 0-1,-1 1 1,1-1 0,0 1 0,0-1 0,1 1 0,-1-1 0,0 1-1,0 0 1,1-1 0,-1 1 0,1 0 0,-1 0 0,1-1-1,0 2 12,4 69-1232,-4 16 1216,0 33-1051,0-2-3631,0-86 1392</inkml:trace>
@@ -2835,7 +2836,7 @@
           <a:p>
             <a:fld id="{23C66214-DB21-4647-B5DA-0D17CA592867}" type="datetimeFigureOut">
               <a:rPr lang="nl-NL" smtClean="0"/>
-              <a:t>26-3-2019</a:t>
+              <a:t>8-4-2019</a:t>
             </a:fld>
             <a:endParaRPr lang="nl-NL"/>
           </a:p>
@@ -7877,6 +7878,207 @@
           <a:chExt cx="0" cy="0"/>
         </a:xfrm>
       </p:grpSpPr>
+      <p:sp>
+        <p:nvSpPr>
+          <p:cNvPr id="2" name="Content Placeholder 1">
+            <a:extLst>
+              <a:ext uri="{FF2B5EF4-FFF2-40B4-BE49-F238E27FC236}">
+                <a16:creationId xmlns:a16="http://schemas.microsoft.com/office/drawing/2014/main" id="{7B81B8CC-1256-4F0C-A0D5-4977E0859234}"/>
+              </a:ext>
+            </a:extLst>
+          </p:cNvPr>
+          <p:cNvSpPr>
+            <a:spLocks noGrp="1"/>
+          </p:cNvSpPr>
+          <p:nvPr>
+            <p:ph idx="1"/>
+          </p:nvPr>
+        </p:nvSpPr>
+        <p:spPr>
+          <a:xfrm>
+            <a:off x="849050" y="1789250"/>
+            <a:ext cx="5012000" cy="3665400"/>
+          </a:xfrm>
+        </p:spPr>
+        <p:txBody>
+          <a:bodyPr/>
+          <a:lstStyle/>
+          <a:p>
+            <a:r>
+              <a:rPr lang="fr-BE" dirty="0"/>
+              <a:t>Initial plots </a:t>
+            </a:r>
+            <a:r>
+              <a:rPr lang="fr-BE" dirty="0" err="1"/>
+              <a:t>give</a:t>
+            </a:r>
+            <a:r>
+              <a:rPr lang="fr-BE" dirty="0"/>
+              <a:t> </a:t>
+            </a:r>
+            <a:r>
+              <a:rPr lang="fr-BE" dirty="0" err="1"/>
+              <a:t>expected</a:t>
+            </a:r>
+            <a:r>
+              <a:rPr lang="fr-BE" dirty="0"/>
+              <a:t> </a:t>
+            </a:r>
+            <a:r>
+              <a:rPr lang="fr-BE" dirty="0" err="1"/>
+              <a:t>result</a:t>
+            </a:r>
+            <a:endParaRPr lang="en-BE" dirty="0"/>
+          </a:p>
+        </p:txBody>
+      </p:sp>
+      <p:sp>
+        <p:nvSpPr>
+          <p:cNvPr id="3" name="Slide Number Placeholder 2">
+            <a:extLst>
+              <a:ext uri="{FF2B5EF4-FFF2-40B4-BE49-F238E27FC236}">
+                <a16:creationId xmlns:a16="http://schemas.microsoft.com/office/drawing/2014/main" id="{82F27C9C-9EC3-4A17-998C-417A9BA401D7}"/>
+              </a:ext>
+            </a:extLst>
+          </p:cNvPr>
+          <p:cNvSpPr>
+            <a:spLocks noGrp="1"/>
+          </p:cNvSpPr>
+          <p:nvPr>
+            <p:ph type="sldNum" sz="quarter" idx="12"/>
+          </p:nvPr>
+        </p:nvSpPr>
+        <p:spPr/>
+        <p:txBody>
+          <a:bodyPr/>
+          <a:lstStyle/>
+          <a:p>
+            <a:fld id="{0A297500-7527-634B-90F4-69D0994C32B4}" type="slidenum">
+              <a:rPr lang="nl-NL" smtClean="0"/>
+              <a:t>11</a:t>
+            </a:fld>
+            <a:endParaRPr lang="nl-NL"/>
+          </a:p>
+        </p:txBody>
+      </p:sp>
+      <p:sp>
+        <p:nvSpPr>
+          <p:cNvPr id="4" name="Title 3">
+            <a:extLst>
+              <a:ext uri="{FF2B5EF4-FFF2-40B4-BE49-F238E27FC236}">
+                <a16:creationId xmlns:a16="http://schemas.microsoft.com/office/drawing/2014/main" id="{BBAF61CF-2235-4323-A2EC-0BD0F6163120}"/>
+              </a:ext>
+            </a:extLst>
+          </p:cNvPr>
+          <p:cNvSpPr>
+            <a:spLocks noGrp="1"/>
+          </p:cNvSpPr>
+          <p:nvPr>
+            <p:ph type="title"/>
+          </p:nvPr>
+        </p:nvSpPr>
+        <p:spPr>
+          <a:xfrm>
+            <a:off x="576000" y="227157"/>
+            <a:ext cx="11041200" cy="1152000"/>
+          </a:xfrm>
+        </p:spPr>
+        <p:txBody>
+          <a:bodyPr/>
+          <a:lstStyle/>
+          <a:p>
+            <a:r>
+              <a:rPr lang="nl-BE" dirty="0"/>
+              <a:t>3. </a:t>
+            </a:r>
+            <a:r>
+              <a:rPr lang="nl-BE" dirty="0" err="1"/>
+              <a:t>Demonstration</a:t>
+            </a:r>
+            <a:r>
+              <a:rPr lang="nl-BE" dirty="0"/>
+              <a:t> of </a:t>
+            </a:r>
+            <a:r>
+              <a:rPr lang="nl-BE" dirty="0" err="1"/>
+              <a:t>Result</a:t>
+            </a:r>
+            <a:r>
+              <a:rPr lang="nl-BE" dirty="0"/>
+              <a:t> </a:t>
+            </a:r>
+            <a:r>
+              <a:rPr lang="nl-BE" dirty="0" err="1"/>
+              <a:t>for</a:t>
+            </a:r>
+            <a:r>
+              <a:rPr lang="nl-BE" dirty="0"/>
+              <a:t> Linear System</a:t>
+            </a:r>
+            <a:endParaRPr lang="en-BE" dirty="0"/>
+          </a:p>
+        </p:txBody>
+      </p:sp>
+      <p:pic>
+        <p:nvPicPr>
+          <p:cNvPr id="6" name="Picture 5" descr="A close up of a map&#10;&#10;Description generated with high confidence">
+            <a:extLst>
+              <a:ext uri="{FF2B5EF4-FFF2-40B4-BE49-F238E27FC236}">
+                <a16:creationId xmlns:a16="http://schemas.microsoft.com/office/drawing/2014/main" id="{DE23BF57-0EA6-45DE-9987-C9458A2D2686}"/>
+              </a:ext>
+            </a:extLst>
+          </p:cNvPr>
+          <p:cNvPicPr>
+            <a:picLocks noChangeAspect="1"/>
+          </p:cNvPicPr>
+          <p:nvPr/>
+        </p:nvPicPr>
+        <p:blipFill>
+          <a:blip r:embed="rId2"/>
+          <a:stretch>
+            <a:fillRect/>
+          </a:stretch>
+        </p:blipFill>
+        <p:spPr>
+          <a:xfrm>
+            <a:off x="6392766" y="1182171"/>
+            <a:ext cx="4599945" cy="4888429"/>
+          </a:xfrm>
+          <a:prstGeom prst="rect">
+            <a:avLst/>
+          </a:prstGeom>
+        </p:spPr>
+      </p:pic>
+    </p:spTree>
+    <p:extLst>
+      <p:ext uri="{BB962C8B-B14F-4D97-AF65-F5344CB8AC3E}">
+        <p14:creationId xmlns:p14="http://schemas.microsoft.com/office/powerpoint/2010/main" val="3159155727"/>
+      </p:ext>
+    </p:extLst>
+  </p:cSld>
+  <p:clrMapOvr>
+    <a:masterClrMapping/>
+  </p:clrMapOvr>
+</p:sld>
+</file>
+
+<file path=ppt/slides/slide12.xml><?xml version="1.0" encoding="utf-8"?>
+<p:sld xmlns:a="http://schemas.openxmlformats.org/drawingml/2006/main" xmlns:r="http://schemas.openxmlformats.org/officeDocument/2006/relationships" xmlns:p="http://schemas.openxmlformats.org/presentationml/2006/main">
+  <p:cSld>
+    <p:spTree>
+      <p:nvGrpSpPr>
+        <p:cNvPr id="1" name=""/>
+        <p:cNvGrpSpPr/>
+        <p:nvPr/>
+      </p:nvGrpSpPr>
+      <p:grpSpPr>
+        <a:xfrm>
+          <a:off x="0" y="0"/>
+          <a:ext cx="0" cy="0"/>
+          <a:chOff x="0" y="0"/>
+          <a:chExt cx="0" cy="0"/>
+        </a:xfrm>
+      </p:grpSpPr>
       <p:pic>
         <p:nvPicPr>
           <p:cNvPr id="5" name="Content Placeholder 4">
@@ -7932,7 +8134,7 @@
           <a:p>
             <a:fld id="{0A297500-7527-634B-90F4-69D0994C32B4}" type="slidenum">
               <a:rPr lang="nl-NL" smtClean="0"/>
-              <a:t>11</a:t>
+              <a:t>12</a:t>
             </a:fld>
             <a:endParaRPr lang="nl-NL"/>
           </a:p>
@@ -7967,8 +8169,8 @@
           </a:p>
         </p:txBody>
       </p:sp>
-      <mc:AlternateContent xmlns:mc="http://schemas.openxmlformats.org/markup-compatibility/2006">
-        <mc:Choice xmlns:p14="http://schemas.microsoft.com/office/powerpoint/2010/main" Requires="p14">
+      <mc:AlternateContent xmlns:mc="http://schemas.openxmlformats.org/markup-compatibility/2006" xmlns:p14="http://schemas.microsoft.com/office/powerpoint/2010/main">
+        <mc:Choice Requires="p14">
           <p:contentPart p14:bwMode="auto" r:id="rId3">
             <p14:nvContentPartPr>
               <p14:cNvPr id="13" name="Ink 12">
@@ -7987,7 +8189,7 @@
             </p14:xfrm>
           </p:contentPart>
         </mc:Choice>
-        <mc:Fallback>
+        <mc:Fallback xmlns="">
           <p:pic>
             <p:nvPicPr>
               <p:cNvPr id="13" name="Ink 12">
@@ -8018,8 +8220,8 @@
           </p:pic>
         </mc:Fallback>
       </mc:AlternateContent>
-      <mc:AlternateContent xmlns:mc="http://schemas.openxmlformats.org/markup-compatibility/2006">
-        <mc:Choice xmlns:p14="http://schemas.microsoft.com/office/powerpoint/2010/main" Requires="p14">
+      <mc:AlternateContent xmlns:mc="http://schemas.openxmlformats.org/markup-compatibility/2006" xmlns:p14="http://schemas.microsoft.com/office/powerpoint/2010/main">
+        <mc:Choice Requires="p14">
           <p:contentPart p14:bwMode="auto" r:id="rId5">
             <p14:nvContentPartPr>
               <p14:cNvPr id="14" name="Ink 13">
@@ -8038,7 +8240,7 @@
             </p14:xfrm>
           </p:contentPart>
         </mc:Choice>
-        <mc:Fallback>
+        <mc:Fallback xmlns="">
           <p:pic>
             <p:nvPicPr>
               <p:cNvPr id="14" name="Ink 13">
@@ -8423,8 +8625,8 @@
           </a:prstGeom>
         </p:spPr>
       </p:pic>
-      <mc:AlternateContent xmlns:mc="http://schemas.openxmlformats.org/markup-compatibility/2006">
-        <mc:Choice xmlns:p14="http://schemas.microsoft.com/office/powerpoint/2010/main" Requires="p14">
+      <mc:AlternateContent xmlns:mc="http://schemas.openxmlformats.org/markup-compatibility/2006" xmlns:p14="http://schemas.microsoft.com/office/powerpoint/2010/main">
+        <mc:Choice Requires="p14">
           <p:contentPart p14:bwMode="auto" r:id="rId8">
             <p14:nvContentPartPr>
               <p14:cNvPr id="26" name="Ink 25">
@@ -8443,7 +8645,7 @@
             </p14:xfrm>
           </p:contentPart>
         </mc:Choice>
-        <mc:Fallback>
+        <mc:Fallback xmlns="">
           <p:pic>
             <p:nvPicPr>
               <p:cNvPr id="26" name="Ink 25">
@@ -8504,8 +8706,8 @@
           </a:prstGeom>
         </p:spPr>
       </p:pic>
-      <mc:AlternateContent xmlns:mc="http://schemas.openxmlformats.org/markup-compatibility/2006">
-        <mc:Choice xmlns:p14="http://schemas.microsoft.com/office/powerpoint/2010/main" Requires="p14">
+      <mc:AlternateContent xmlns:mc="http://schemas.openxmlformats.org/markup-compatibility/2006" xmlns:p14="http://schemas.microsoft.com/office/powerpoint/2010/main">
+        <mc:Choice Requires="p14">
           <p:contentPart p14:bwMode="auto" r:id="rId11">
             <p14:nvContentPartPr>
               <p14:cNvPr id="32" name="Ink 31">
@@ -8524,7 +8726,7 @@
             </p14:xfrm>
           </p:contentPart>
         </mc:Choice>
-        <mc:Fallback>
+        <mc:Fallback xmlns="">
           <p:pic>
             <p:nvPicPr>
               <p:cNvPr id="32" name="Ink 31">
@@ -8555,8 +8757,8 @@
           </p:pic>
         </mc:Fallback>
       </mc:AlternateContent>
-      <mc:AlternateContent xmlns:mc="http://schemas.openxmlformats.org/markup-compatibility/2006">
-        <mc:Choice xmlns:p14="http://schemas.microsoft.com/office/powerpoint/2010/main" Requires="p14">
+      <mc:AlternateContent xmlns:mc="http://schemas.openxmlformats.org/markup-compatibility/2006" xmlns:p14="http://schemas.microsoft.com/office/powerpoint/2010/main">
+        <mc:Choice Requires="p14">
           <p:contentPart p14:bwMode="auto" r:id="rId13">
             <p14:nvContentPartPr>
               <p14:cNvPr id="33" name="Ink 32">
@@ -8575,7 +8777,7 @@
             </p14:xfrm>
           </p:contentPart>
         </mc:Choice>
-        <mc:Fallback>
+        <mc:Fallback xmlns="">
           <p:pic>
             <p:nvPicPr>
               <p:cNvPr id="33" name="Ink 32">
@@ -8606,8 +8808,8 @@
           </p:pic>
         </mc:Fallback>
       </mc:AlternateContent>
-      <mc:AlternateContent xmlns:mc="http://schemas.openxmlformats.org/markup-compatibility/2006">
-        <mc:Choice xmlns:p14="http://schemas.microsoft.com/office/powerpoint/2010/main" Requires="p14">
+      <mc:AlternateContent xmlns:mc="http://schemas.openxmlformats.org/markup-compatibility/2006" xmlns:p14="http://schemas.microsoft.com/office/powerpoint/2010/main">
+        <mc:Choice Requires="p14">
           <p:contentPart p14:bwMode="auto" r:id="rId15">
             <p14:nvContentPartPr>
               <p14:cNvPr id="34" name="Ink 33">
@@ -8626,7 +8828,7 @@
             </p14:xfrm>
           </p:contentPart>
         </mc:Choice>
-        <mc:Fallback>
+        <mc:Fallback xmlns="">
           <p:pic>
             <p:nvPicPr>
               <p:cNvPr id="34" name="Ink 33">
@@ -8657,8 +8859,8 @@
           </p:pic>
         </mc:Fallback>
       </mc:AlternateContent>
-      <mc:AlternateContent xmlns:mc="http://schemas.openxmlformats.org/markup-compatibility/2006">
-        <mc:Choice xmlns:p14="http://schemas.microsoft.com/office/powerpoint/2010/main" Requires="p14">
+      <mc:AlternateContent xmlns:mc="http://schemas.openxmlformats.org/markup-compatibility/2006" xmlns:p14="http://schemas.microsoft.com/office/powerpoint/2010/main">
+        <mc:Choice Requires="p14">
           <p:contentPart p14:bwMode="auto" r:id="rId17">
             <p14:nvContentPartPr>
               <p14:cNvPr id="37" name="Ink 36">
@@ -8677,7 +8879,7 @@
             </p14:xfrm>
           </p:contentPart>
         </mc:Choice>
-        <mc:Fallback>
+        <mc:Fallback xmlns="">
           <p:pic>
             <p:nvPicPr>
               <p:cNvPr id="37" name="Ink 36">
@@ -8708,8 +8910,8 @@
           </p:pic>
         </mc:Fallback>
       </mc:AlternateContent>
-      <mc:AlternateContent xmlns:mc="http://schemas.openxmlformats.org/markup-compatibility/2006">
-        <mc:Choice xmlns:p14="http://schemas.microsoft.com/office/powerpoint/2010/main" Requires="p14">
+      <mc:AlternateContent xmlns:mc="http://schemas.openxmlformats.org/markup-compatibility/2006" xmlns:p14="http://schemas.microsoft.com/office/powerpoint/2010/main">
+        <mc:Choice Requires="p14">
           <p:contentPart p14:bwMode="auto" r:id="rId19">
             <p14:nvContentPartPr>
               <p14:cNvPr id="41" name="Ink 40">
@@ -8728,7 +8930,7 @@
             </p14:xfrm>
           </p:contentPart>
         </mc:Choice>
-        <mc:Fallback>
+        <mc:Fallback xmlns="">
           <p:pic>
             <p:nvPicPr>
               <p:cNvPr id="41" name="Ink 40">
@@ -8759,8 +8961,8 @@
           </p:pic>
         </mc:Fallback>
       </mc:AlternateContent>
-      <mc:AlternateContent xmlns:mc="http://schemas.openxmlformats.org/markup-compatibility/2006">
-        <mc:Choice xmlns:p14="http://schemas.microsoft.com/office/powerpoint/2010/main" Requires="p14">
+      <mc:AlternateContent xmlns:mc="http://schemas.openxmlformats.org/markup-compatibility/2006" xmlns:p14="http://schemas.microsoft.com/office/powerpoint/2010/main">
+        <mc:Choice Requires="p14">
           <p:contentPart p14:bwMode="auto" r:id="rId21">
             <p14:nvContentPartPr>
               <p14:cNvPr id="42" name="Ink 41">
@@ -8779,7 +8981,7 @@
             </p14:xfrm>
           </p:contentPart>
         </mc:Choice>
-        <mc:Fallback>
+        <mc:Fallback xmlns="">
           <p:pic>
             <p:nvPicPr>
               <p:cNvPr id="42" name="Ink 41">
@@ -8810,8 +9012,8 @@
           </p:pic>
         </mc:Fallback>
       </mc:AlternateContent>
-      <mc:AlternateContent xmlns:mc="http://schemas.openxmlformats.org/markup-compatibility/2006">
-        <mc:Choice xmlns:p14="http://schemas.microsoft.com/office/powerpoint/2010/main" Requires="p14">
+      <mc:AlternateContent xmlns:mc="http://schemas.openxmlformats.org/markup-compatibility/2006" xmlns:p14="http://schemas.microsoft.com/office/powerpoint/2010/main">
+        <mc:Choice Requires="p14">
           <p:contentPart p14:bwMode="auto" r:id="rId23">
             <p14:nvContentPartPr>
               <p14:cNvPr id="48" name="Ink 47">
@@ -8830,7 +9032,7 @@
             </p14:xfrm>
           </p:contentPart>
         </mc:Choice>
-        <mc:Fallback>
+        <mc:Fallback xmlns="">
           <p:pic>
             <p:nvPicPr>
               <p:cNvPr id="48" name="Ink 47">
@@ -8861,8 +9063,8 @@
           </p:pic>
         </mc:Fallback>
       </mc:AlternateContent>
-      <mc:AlternateContent xmlns:mc="http://schemas.openxmlformats.org/markup-compatibility/2006">
-        <mc:Choice xmlns:p14="http://schemas.microsoft.com/office/powerpoint/2010/main" Requires="p14">
+      <mc:AlternateContent xmlns:mc="http://schemas.openxmlformats.org/markup-compatibility/2006" xmlns:p14="http://schemas.microsoft.com/office/powerpoint/2010/main">
+        <mc:Choice Requires="p14">
           <p:contentPart p14:bwMode="auto" r:id="rId25">
             <p14:nvContentPartPr>
               <p14:cNvPr id="55" name="Ink 54">
@@ -8881,7 +9083,7 @@
             </p14:xfrm>
           </p:contentPart>
         </mc:Choice>
-        <mc:Fallback>
+        <mc:Fallback xmlns="">
           <p:pic>
             <p:nvPicPr>
               <p:cNvPr id="55" name="Ink 54">
@@ -8912,8 +9114,8 @@
           </p:pic>
         </mc:Fallback>
       </mc:AlternateContent>
-      <mc:AlternateContent xmlns:mc="http://schemas.openxmlformats.org/markup-compatibility/2006">
-        <mc:Choice xmlns:p14="http://schemas.microsoft.com/office/powerpoint/2010/main" Requires="p14">
+      <mc:AlternateContent xmlns:mc="http://schemas.openxmlformats.org/markup-compatibility/2006" xmlns:p14="http://schemas.microsoft.com/office/powerpoint/2010/main">
+        <mc:Choice Requires="p14">
           <p:contentPart p14:bwMode="auto" r:id="rId27">
             <p14:nvContentPartPr>
               <p14:cNvPr id="74" name="Ink 73">
@@ -8932,7 +9134,7 @@
             </p14:xfrm>
           </p:contentPart>
         </mc:Choice>
-        <mc:Fallback>
+        <mc:Fallback xmlns="">
           <p:pic>
             <p:nvPicPr>
               <p:cNvPr id="74" name="Ink 73">
@@ -8963,8 +9165,8 @@
           </p:pic>
         </mc:Fallback>
       </mc:AlternateContent>
-      <mc:AlternateContent xmlns:mc="http://schemas.openxmlformats.org/markup-compatibility/2006">
-        <mc:Choice xmlns:p14="http://schemas.microsoft.com/office/powerpoint/2010/main" Requires="p14">
+      <mc:AlternateContent xmlns:mc="http://schemas.openxmlformats.org/markup-compatibility/2006" xmlns:p14="http://schemas.microsoft.com/office/powerpoint/2010/main">
+        <mc:Choice Requires="p14">
           <p:contentPart p14:bwMode="auto" r:id="rId29">
             <p14:nvContentPartPr>
               <p14:cNvPr id="77" name="Ink 76">
@@ -8983,7 +9185,7 @@
             </p14:xfrm>
           </p:contentPart>
         </mc:Choice>
-        <mc:Fallback>
+        <mc:Fallback xmlns="">
           <p:pic>
             <p:nvPicPr>
               <p:cNvPr id="77" name="Ink 76">
@@ -9014,8 +9216,8 @@
           </p:pic>
         </mc:Fallback>
       </mc:AlternateContent>
-      <mc:AlternateContent xmlns:mc="http://schemas.openxmlformats.org/markup-compatibility/2006">
-        <mc:Choice xmlns:p14="http://schemas.microsoft.com/office/powerpoint/2010/main" Requires="p14">
+      <mc:AlternateContent xmlns:mc="http://schemas.openxmlformats.org/markup-compatibility/2006" xmlns:p14="http://schemas.microsoft.com/office/powerpoint/2010/main">
+        <mc:Choice Requires="p14">
           <p:contentPart p14:bwMode="auto" r:id="rId31">
             <p14:nvContentPartPr>
               <p14:cNvPr id="80" name="Ink 79">
@@ -9034,7 +9236,7 @@
             </p14:xfrm>
           </p:contentPart>
         </mc:Choice>
-        <mc:Fallback>
+        <mc:Fallback xmlns="">
           <p:pic>
             <p:nvPicPr>
               <p:cNvPr id="80" name="Ink 79">
@@ -9065,8 +9267,8 @@
           </p:pic>
         </mc:Fallback>
       </mc:AlternateContent>
-      <mc:AlternateContent xmlns:mc="http://schemas.openxmlformats.org/markup-compatibility/2006">
-        <mc:Choice xmlns:p14="http://schemas.microsoft.com/office/powerpoint/2010/main" Requires="p14">
+      <mc:AlternateContent xmlns:mc="http://schemas.openxmlformats.org/markup-compatibility/2006" xmlns:p14="http://schemas.microsoft.com/office/powerpoint/2010/main">
+        <mc:Choice Requires="p14">
           <p:contentPart p14:bwMode="auto" r:id="rId33">
             <p14:nvContentPartPr>
               <p14:cNvPr id="81" name="Ink 80">
@@ -9085,7 +9287,7 @@
             </p14:xfrm>
           </p:contentPart>
         </mc:Choice>
-        <mc:Fallback>
+        <mc:Fallback xmlns="">
           <p:pic>
             <p:nvPicPr>
               <p:cNvPr id="81" name="Ink 80">
@@ -9116,8 +9318,8 @@
           </p:pic>
         </mc:Fallback>
       </mc:AlternateContent>
-      <mc:AlternateContent xmlns:mc="http://schemas.openxmlformats.org/markup-compatibility/2006">
-        <mc:Choice xmlns:p14="http://schemas.microsoft.com/office/powerpoint/2010/main" Requires="p14">
+      <mc:AlternateContent xmlns:mc="http://schemas.openxmlformats.org/markup-compatibility/2006" xmlns:p14="http://schemas.microsoft.com/office/powerpoint/2010/main">
+        <mc:Choice Requires="p14">
           <p:contentPart p14:bwMode="auto" r:id="rId35">
             <p14:nvContentPartPr>
               <p14:cNvPr id="89" name="Ink 88">
@@ -9136,7 +9338,7 @@
             </p14:xfrm>
           </p:contentPart>
         </mc:Choice>
-        <mc:Fallback>
+        <mc:Fallback xmlns="">
           <p:pic>
             <p:nvPicPr>
               <p:cNvPr id="89" name="Ink 88">
@@ -9167,8 +9369,8 @@
           </p:pic>
         </mc:Fallback>
       </mc:AlternateContent>
-      <mc:AlternateContent xmlns:mc="http://schemas.openxmlformats.org/markup-compatibility/2006">
-        <mc:Choice xmlns:p14="http://schemas.microsoft.com/office/powerpoint/2010/main" Requires="p14">
+      <mc:AlternateContent xmlns:mc="http://schemas.openxmlformats.org/markup-compatibility/2006" xmlns:p14="http://schemas.microsoft.com/office/powerpoint/2010/main">
+        <mc:Choice Requires="p14">
           <p:contentPart p14:bwMode="auto" r:id="rId37">
             <p14:nvContentPartPr>
               <p14:cNvPr id="91" name="Ink 90">
@@ -9187,7 +9389,7 @@
             </p14:xfrm>
           </p:contentPart>
         </mc:Choice>
-        <mc:Fallback>
+        <mc:Fallback xmlns="">
           <p:pic>
             <p:nvPicPr>
               <p:cNvPr id="91" name="Ink 90">
@@ -9231,7 +9433,7 @@
 </p:sld>
 </file>
 
-<file path=ppt/slides/slide12.xml><?xml version="1.0" encoding="utf-8"?>
+<file path=ppt/slides/slide13.xml><?xml version="1.0" encoding="utf-8"?>
 <p:sld xmlns:a="http://schemas.openxmlformats.org/drawingml/2006/main" xmlns:r="http://schemas.openxmlformats.org/officeDocument/2006/relationships" xmlns:p="http://schemas.openxmlformats.org/presentationml/2006/main">
   <p:cSld>
     <p:spTree>
@@ -9475,7 +9677,7 @@
           <a:p>
             <a:fld id="{0A297500-7527-634B-90F4-69D0994C32B4}" type="slidenum">
               <a:rPr lang="nl-NL" smtClean="0"/>
-              <a:t>12</a:t>
+              <a:t>13</a:t>
             </a:fld>
             <a:endParaRPr lang="nl-NL"/>
           </a:p>
@@ -9553,7 +9755,7 @@
 </p:sld>
 </file>
 
-<file path=ppt/slides/slide13.xml><?xml version="1.0" encoding="utf-8"?>
+<file path=ppt/slides/slide14.xml><?xml version="1.0" encoding="utf-8"?>
 <p:sld xmlns:a="http://schemas.openxmlformats.org/drawingml/2006/main" xmlns:r="http://schemas.openxmlformats.org/officeDocument/2006/relationships" xmlns:p="http://schemas.openxmlformats.org/presentationml/2006/main">
   <p:cSld>
     <p:spTree>
@@ -9622,7 +9824,7 @@
           <a:p>
             <a:fld id="{0A297500-7527-634B-90F4-69D0994C32B4}" type="slidenum">
               <a:rPr lang="nl-NL" smtClean="0"/>
-              <a:t>13</a:t>
+              <a:t>14</a:t>
             </a:fld>
             <a:endParaRPr lang="nl-NL"/>
           </a:p>
@@ -9651,11 +9853,7 @@
           <a:p>
             <a:r>
               <a:rPr lang="en-US" dirty="0"/>
-              <a:t>3. Construction of Linear System: </a:t>
-            </a:r>
-            <a:r>
-              <a:rPr lang="en-US" dirty="0" err="1"/>
-              <a:t>Linearisation</a:t>
+              <a:t>3. Construction of Linear System: Linearization</a:t>
             </a:r>
             <a:endParaRPr lang="en-BE" dirty="0"/>
           </a:p>
@@ -9832,7 +10030,7 @@
 </p:sld>
 </file>
 
-<file path=ppt/slides/slide14.xml><?xml version="1.0" encoding="utf-8"?>
+<file path=ppt/slides/slide15.xml><?xml version="1.0" encoding="utf-8"?>
 <p:sld xmlns:a="http://schemas.openxmlformats.org/drawingml/2006/main" xmlns:r="http://schemas.openxmlformats.org/officeDocument/2006/relationships" xmlns:p="http://schemas.openxmlformats.org/presentationml/2006/main">
   <p:cSld>
     <p:spTree>
@@ -9849,113 +10047,41 @@
           <a:chExt cx="0" cy="0"/>
         </a:xfrm>
       </p:grpSpPr>
-      <p:sp>
-        <p:nvSpPr>
-          <p:cNvPr id="2" name="Content Placeholder 1">
+      <p:pic>
+        <p:nvPicPr>
+          <p:cNvPr id="6" name="Content Placeholder 5" descr="A close up of a map&#10;&#10;Description generated with high confidence">
             <a:extLst>
               <a:ext uri="{FF2B5EF4-FFF2-40B4-BE49-F238E27FC236}">
-                <a16:creationId xmlns:a16="http://schemas.microsoft.com/office/drawing/2014/main" id="{7B81B8CC-1256-4F0C-A0D5-4977E0859234}"/>
+                <a16:creationId xmlns:a16="http://schemas.microsoft.com/office/drawing/2014/main" id="{A0EAF409-E026-4B1E-8D3F-5BD4D91680C4}"/>
               </a:ext>
             </a:extLst>
           </p:cNvPr>
-          <p:cNvSpPr>
-            <a:spLocks noGrp="1"/>
-          </p:cNvSpPr>
+          <p:cNvPicPr>
+            <a:picLocks noGrp="1" noChangeAspect="1"/>
+          </p:cNvPicPr>
           <p:nvPr>
             <p:ph idx="1"/>
           </p:nvPr>
-        </p:nvSpPr>
-        <p:spPr/>
-        <p:txBody>
-          <a:bodyPr/>
-          <a:lstStyle/>
-          <a:p>
-            <a:r>
-              <a:rPr lang="fr-BE" dirty="0" err="1"/>
-              <a:t>We</a:t>
-            </a:r>
-            <a:r>
-              <a:rPr lang="fr-BE" dirty="0"/>
-              <a:t> </a:t>
-            </a:r>
-            <a:r>
-              <a:rPr lang="fr-BE" dirty="0" err="1"/>
-              <a:t>got</a:t>
-            </a:r>
-            <a:r>
-              <a:rPr lang="fr-BE" dirty="0"/>
-              <a:t> the initial concentration but the values are far </a:t>
-            </a:r>
-            <a:r>
-              <a:rPr lang="fr-BE" dirty="0" err="1"/>
-              <a:t>from</a:t>
-            </a:r>
-            <a:r>
-              <a:rPr lang="fr-BE" dirty="0"/>
-              <a:t> </a:t>
-            </a:r>
-            <a:r>
-              <a:rPr lang="fr-BE" dirty="0" err="1"/>
-              <a:t>what</a:t>
-            </a:r>
-            <a:r>
-              <a:rPr lang="fr-BE" dirty="0"/>
-              <a:t> </a:t>
-            </a:r>
-            <a:r>
-              <a:rPr lang="fr-BE" dirty="0" err="1"/>
-              <a:t>is</a:t>
-            </a:r>
-            <a:r>
-              <a:rPr lang="fr-BE" dirty="0"/>
-              <a:t> to </a:t>
-            </a:r>
-            <a:r>
-              <a:rPr lang="fr-BE" dirty="0" err="1"/>
-              <a:t>be</a:t>
-            </a:r>
-            <a:r>
-              <a:rPr lang="fr-BE" dirty="0"/>
-              <a:t> </a:t>
-            </a:r>
-            <a:r>
-              <a:rPr lang="fr-BE" dirty="0" err="1"/>
-              <a:t>expected</a:t>
-            </a:r>
-            <a:r>
-              <a:rPr lang="fr-BE" dirty="0"/>
-              <a:t> in the </a:t>
-            </a:r>
-            <a:r>
-              <a:rPr lang="fr-BE" dirty="0" err="1"/>
-              <a:t>pear</a:t>
-            </a:r>
-            <a:r>
-              <a:rPr lang="fr-BE" dirty="0"/>
-              <a:t> </a:t>
-            </a:r>
-            <a:r>
-              <a:rPr lang="fr-BE" dirty="0" err="1"/>
-              <a:t>given</a:t>
-            </a:r>
-            <a:r>
-              <a:rPr lang="fr-BE" dirty="0"/>
-              <a:t> the </a:t>
-            </a:r>
-            <a:r>
-              <a:rPr lang="fr-BE" dirty="0" err="1"/>
-              <a:t>environment</a:t>
-            </a:r>
-            <a:endParaRPr lang="en-BE" dirty="0"/>
-          </a:p>
-        </p:txBody>
-      </p:sp>
+        </p:nvPicPr>
+        <p:blipFill>
+          <a:blip r:embed="rId2"/>
+          <a:stretch>
+            <a:fillRect/>
+          </a:stretch>
+        </p:blipFill>
+        <p:spPr>
+          <a:xfrm>
+            <a:off x="5835225" y="1271495"/>
+            <a:ext cx="6182604" cy="4938505"/>
+          </a:xfrm>
+        </p:spPr>
+      </p:pic>
       <p:sp>
         <p:nvSpPr>
           <p:cNvPr id="3" name="Slide Number Placeholder 2">
             <a:extLst>
               <a:ext uri="{FF2B5EF4-FFF2-40B4-BE49-F238E27FC236}">
-                <a16:creationId xmlns:a16="http://schemas.microsoft.com/office/drawing/2014/main" id="{82F27C9C-9EC3-4A17-998C-417A9BA401D7}"/>
+                <a16:creationId xmlns:a16="http://schemas.microsoft.com/office/drawing/2014/main" id="{FC49E6C1-0667-4154-94D7-45DA3DAC425E}"/>
               </a:ext>
             </a:extLst>
           </p:cNvPr>
@@ -9973,7 +10099,7 @@
           <a:p>
             <a:fld id="{0A297500-7527-634B-90F4-69D0994C32B4}" type="slidenum">
               <a:rPr lang="nl-NL" smtClean="0"/>
-              <a:t>14</a:t>
+              <a:t>15</a:t>
             </a:fld>
             <a:endParaRPr lang="nl-NL"/>
           </a:p>
@@ -9984,7 +10110,7 @@
           <p:cNvPr id="4" name="Title 3">
             <a:extLst>
               <a:ext uri="{FF2B5EF4-FFF2-40B4-BE49-F238E27FC236}">
-                <a16:creationId xmlns:a16="http://schemas.microsoft.com/office/drawing/2014/main" id="{BBAF61CF-2235-4323-A2EC-0BD0F6163120}"/>
+                <a16:creationId xmlns:a16="http://schemas.microsoft.com/office/drawing/2014/main" id="{69176473-2871-41FA-9EDA-2F722CD30E86}"/>
               </a:ext>
             </a:extLst>
           </p:cNvPr>
@@ -10001,101 +10127,81 @@
           <a:lstStyle/>
           <a:p>
             <a:r>
-              <a:rPr lang="nl-BE" dirty="0"/>
-              <a:t>4. </a:t>
-            </a:r>
-            <a:r>
-              <a:rPr lang="nl-BE" dirty="0" err="1"/>
-              <a:t>Demonstration</a:t>
-            </a:r>
-            <a:r>
-              <a:rPr lang="nl-BE" dirty="0"/>
-              <a:t> of </a:t>
-            </a:r>
-            <a:r>
-              <a:rPr lang="nl-BE" dirty="0" err="1"/>
-              <a:t>Result</a:t>
-            </a:r>
-            <a:r>
-              <a:rPr lang="nl-BE" dirty="0"/>
-              <a:t> </a:t>
-            </a:r>
-            <a:r>
-              <a:rPr lang="nl-BE" dirty="0" err="1"/>
-              <a:t>for</a:t>
-            </a:r>
-            <a:r>
-              <a:rPr lang="nl-BE" dirty="0"/>
-              <a:t> Linear System</a:t>
+              <a:rPr lang="en-US" dirty="0"/>
+              <a:t>4. Results for initial values after </a:t>
+            </a:r>
+            <a:r>
+              <a:rPr lang="en-US" dirty="0" err="1"/>
+              <a:t>linearisation</a:t>
             </a:r>
             <a:endParaRPr lang="en-BE" dirty="0"/>
           </a:p>
         </p:txBody>
       </p:sp>
-      <p:pic>
-        <p:nvPicPr>
-          <p:cNvPr id="16" name="Picture 15">
+      <p:sp>
+        <p:nvSpPr>
+          <p:cNvPr id="7" name="TextBox 6">
             <a:extLst>
               <a:ext uri="{FF2B5EF4-FFF2-40B4-BE49-F238E27FC236}">
-                <a16:creationId xmlns:a16="http://schemas.microsoft.com/office/drawing/2014/main" id="{A39D9548-A5FA-4A94-914C-439B6C1A870D}"/>
+                <a16:creationId xmlns:a16="http://schemas.microsoft.com/office/drawing/2014/main" id="{FB8584B4-D479-44D3-9414-8AC59A9ADE38}"/>
               </a:ext>
             </a:extLst>
           </p:cNvPr>
-          <p:cNvPicPr>
-            <a:picLocks noChangeAspect="1"/>
-          </p:cNvPicPr>
+          <p:cNvSpPr txBox="1"/>
           <p:nvPr/>
-        </p:nvPicPr>
-        <p:blipFill>
-          <a:blip r:embed="rId2"/>
-          <a:stretch>
-            <a:fillRect/>
-          </a:stretch>
-        </p:blipFill>
+        </p:nvSpPr>
         <p:spPr>
           <a:xfrm>
-            <a:off x="5771580" y="2415233"/>
-            <a:ext cx="2725967" cy="3794767"/>
+            <a:off x="319314" y="1553029"/>
+            <a:ext cx="5297715" cy="646331"/>
           </a:xfrm>
           <a:prstGeom prst="rect">
             <a:avLst/>
           </a:prstGeom>
+          <a:noFill/>
         </p:spPr>
-      </p:pic>
-      <p:pic>
-        <p:nvPicPr>
-          <p:cNvPr id="18" name="Picture 17">
-            <a:extLst>
-              <a:ext uri="{FF2B5EF4-FFF2-40B4-BE49-F238E27FC236}">
-                <a16:creationId xmlns:a16="http://schemas.microsoft.com/office/drawing/2014/main" id="{7A9E62F6-8B51-45D4-B6A8-326E94494DAE}"/>
-              </a:ext>
-            </a:extLst>
-          </p:cNvPr>
-          <p:cNvPicPr>
-            <a:picLocks noChangeAspect="1"/>
-          </p:cNvPicPr>
-          <p:nvPr/>
-        </p:nvPicPr>
-        <p:blipFill>
-          <a:blip r:embed="rId3"/>
-          <a:stretch>
-            <a:fillRect/>
-          </a:stretch>
-        </p:blipFill>
-        <p:spPr>
-          <a:xfrm>
-            <a:off x="8994953" y="2415233"/>
-            <a:ext cx="2508250" cy="3794767"/>
-          </a:xfrm>
-          <a:prstGeom prst="rect">
-            <a:avLst/>
-          </a:prstGeom>
-        </p:spPr>
-      </p:pic>
+        <p:txBody>
+          <a:bodyPr wrap="square" rtlCol="0">
+            <a:spAutoFit/>
+          </a:bodyPr>
+          <a:lstStyle/>
+          <a:p>
+            <a:pPr marL="285750" indent="-285750">
+              <a:buFont typeface="Arial" panose="020B0604020202020204" pitchFamily="34" charset="0"/>
+              <a:buChar char="•"/>
+            </a:pPr>
+            <a:r>
+              <a:rPr lang="nl-BE" dirty="0"/>
+              <a:t>Using Fortran or Matlab we get </a:t>
+            </a:r>
+            <a:r>
+              <a:rPr lang="nl-BE" dirty="0" err="1"/>
+              <a:t>the</a:t>
+            </a:r>
+            <a:r>
+              <a:rPr lang="nl-BE" dirty="0"/>
+              <a:t> </a:t>
+            </a:r>
+            <a:r>
+              <a:rPr lang="nl-BE" dirty="0" err="1"/>
+              <a:t>same</a:t>
+            </a:r>
+            <a:r>
+              <a:rPr lang="nl-BE" dirty="0"/>
+              <a:t> </a:t>
+            </a:r>
+            <a:r>
+              <a:rPr lang="nl-BE" dirty="0" err="1"/>
+              <a:t>results</a:t>
+            </a:r>
+            <a:endParaRPr lang="en-BE" dirty="0"/>
+          </a:p>
+        </p:txBody>
+      </p:sp>
     </p:spTree>
     <p:extLst>
       <p:ext uri="{BB962C8B-B14F-4D97-AF65-F5344CB8AC3E}">
-        <p14:creationId xmlns:p14="http://schemas.microsoft.com/office/powerpoint/2010/main" val="3159155727"/>
+        <p14:creationId xmlns:p14="http://schemas.microsoft.com/office/powerpoint/2010/main" val="2020344404"/>
       </p:ext>
     </p:extLst>
   </p:cSld>
@@ -10105,7 +10211,7 @@
 </p:sld>
 </file>
 
-<file path=ppt/slides/slide15.xml><?xml version="1.0" encoding="utf-8"?>
+<file path=ppt/slides/slide16.xml><?xml version="1.0" encoding="utf-8"?>
 <p:sld xmlns:a="http://schemas.openxmlformats.org/drawingml/2006/main" xmlns:r="http://schemas.openxmlformats.org/officeDocument/2006/relationships" xmlns:p="http://schemas.openxmlformats.org/presentationml/2006/main">
   <p:cSld>
     <p:spTree>
@@ -10218,7 +10324,7 @@
           <a:p>
             <a:fld id="{0A297500-7527-634B-90F4-69D0994C32B4}" type="slidenum">
               <a:rPr lang="nl-NL" smtClean="0"/>
-              <a:t>15</a:t>
+              <a:t>16</a:t>
             </a:fld>
             <a:endParaRPr lang="nl-NL"/>
           </a:p>
@@ -10269,8 +10375,8 @@
           </a:p>
         </p:txBody>
       </p:sp>
-      <mc:AlternateContent xmlns:mc="http://schemas.openxmlformats.org/markup-compatibility/2006">
-        <mc:Choice xmlns:p14="http://schemas.microsoft.com/office/powerpoint/2010/main" Requires="p14">
+      <mc:AlternateContent xmlns:mc="http://schemas.openxmlformats.org/markup-compatibility/2006" xmlns:p14="http://schemas.microsoft.com/office/powerpoint/2010/main">
+        <mc:Choice Requires="p14">
           <p:contentPart p14:bwMode="auto" r:id="rId2">
             <p14:nvContentPartPr>
               <p14:cNvPr id="79" name="Ink 78">
@@ -10289,7 +10395,7 @@
             </p14:xfrm>
           </p:contentPart>
         </mc:Choice>
-        <mc:Fallback>
+        <mc:Fallback xmlns="">
           <p:pic>
             <p:nvPicPr>
               <p:cNvPr id="79" name="Ink 78">
@@ -10320,8 +10426,8 @@
           </p:pic>
         </mc:Fallback>
       </mc:AlternateContent>
-      <mc:AlternateContent xmlns:mc="http://schemas.openxmlformats.org/markup-compatibility/2006">
-        <mc:Choice xmlns:p14="http://schemas.microsoft.com/office/powerpoint/2010/main" Requires="p14">
+      <mc:AlternateContent xmlns:mc="http://schemas.openxmlformats.org/markup-compatibility/2006" xmlns:p14="http://schemas.microsoft.com/office/powerpoint/2010/main">
+        <mc:Choice Requires="p14">
           <p:contentPart p14:bwMode="auto" r:id="rId4">
             <p14:nvContentPartPr>
               <p14:cNvPr id="86" name="Ink 85">
@@ -10340,7 +10446,7 @@
             </p14:xfrm>
           </p:contentPart>
         </mc:Choice>
-        <mc:Fallback>
+        <mc:Fallback xmlns="">
           <p:pic>
             <p:nvPicPr>
               <p:cNvPr id="86" name="Ink 85">
@@ -10371,8 +10477,8 @@
           </p:pic>
         </mc:Fallback>
       </mc:AlternateContent>
-      <mc:AlternateContent xmlns:mc="http://schemas.openxmlformats.org/markup-compatibility/2006">
-        <mc:Choice xmlns:p14="http://schemas.microsoft.com/office/powerpoint/2010/main" Requires="p14">
+      <mc:AlternateContent xmlns:mc="http://schemas.openxmlformats.org/markup-compatibility/2006" xmlns:p14="http://schemas.microsoft.com/office/powerpoint/2010/main">
+        <mc:Choice Requires="p14">
           <p:contentPart p14:bwMode="auto" r:id="rId6">
             <p14:nvContentPartPr>
               <p14:cNvPr id="91" name="Ink 90">
@@ -10391,7 +10497,7 @@
             </p14:xfrm>
           </p:contentPart>
         </mc:Choice>
-        <mc:Fallback>
+        <mc:Fallback xmlns="">
           <p:pic>
             <p:nvPicPr>
               <p:cNvPr id="91" name="Ink 90">
@@ -10422,8 +10528,8 @@
           </p:pic>
         </mc:Fallback>
       </mc:AlternateContent>
-      <mc:AlternateContent xmlns:mc="http://schemas.openxmlformats.org/markup-compatibility/2006">
-        <mc:Choice xmlns:p14="http://schemas.microsoft.com/office/powerpoint/2010/main" Requires="p14">
+      <mc:AlternateContent xmlns:mc="http://schemas.openxmlformats.org/markup-compatibility/2006" xmlns:p14="http://schemas.microsoft.com/office/powerpoint/2010/main">
+        <mc:Choice Requires="p14">
           <p:contentPart p14:bwMode="auto" r:id="rId8">
             <p14:nvContentPartPr>
               <p14:cNvPr id="92" name="Ink 91">
@@ -10442,7 +10548,7 @@
             </p14:xfrm>
           </p:contentPart>
         </mc:Choice>
-        <mc:Fallback>
+        <mc:Fallback xmlns="">
           <p:pic>
             <p:nvPicPr>
               <p:cNvPr id="92" name="Ink 91">
@@ -10503,8 +10609,8 @@
           </a:prstGeom>
         </p:spPr>
       </p:pic>
-      <mc:AlternateContent xmlns:mc="http://schemas.openxmlformats.org/markup-compatibility/2006">
-        <mc:Choice xmlns:p14="http://schemas.microsoft.com/office/powerpoint/2010/main" Requires="p14">
+      <mc:AlternateContent xmlns:mc="http://schemas.openxmlformats.org/markup-compatibility/2006" xmlns:p14="http://schemas.microsoft.com/office/powerpoint/2010/main">
+        <mc:Choice Requires="p14">
           <p:contentPart p14:bwMode="auto" r:id="rId11">
             <p14:nvContentPartPr>
               <p14:cNvPr id="102" name="Ink 101">
@@ -10523,7 +10629,7 @@
             </p14:xfrm>
           </p:contentPart>
         </mc:Choice>
-        <mc:Fallback>
+        <mc:Fallback xmlns="">
           <p:pic>
             <p:nvPicPr>
               <p:cNvPr id="102" name="Ink 101">
@@ -10554,8 +10660,8 @@
           </p:pic>
         </mc:Fallback>
       </mc:AlternateContent>
-      <mc:AlternateContent xmlns:mc="http://schemas.openxmlformats.org/markup-compatibility/2006">
-        <mc:Choice xmlns:p14="http://schemas.microsoft.com/office/powerpoint/2010/main" Requires="p14">
+      <mc:AlternateContent xmlns:mc="http://schemas.openxmlformats.org/markup-compatibility/2006" xmlns:p14="http://schemas.microsoft.com/office/powerpoint/2010/main">
+        <mc:Choice Requires="p14">
           <p:contentPart p14:bwMode="auto" r:id="rId13">
             <p14:nvContentPartPr>
               <p14:cNvPr id="103" name="Ink 102">
@@ -10574,7 +10680,7 @@
             </p14:xfrm>
           </p:contentPart>
         </mc:Choice>
-        <mc:Fallback>
+        <mc:Fallback xmlns="">
           <p:pic>
             <p:nvPicPr>
               <p:cNvPr id="103" name="Ink 102">
@@ -10605,8 +10711,8 @@
           </p:pic>
         </mc:Fallback>
       </mc:AlternateContent>
-      <mc:AlternateContent xmlns:mc="http://schemas.openxmlformats.org/markup-compatibility/2006">
-        <mc:Choice xmlns:p14="http://schemas.microsoft.com/office/powerpoint/2010/main" Requires="p14">
+      <mc:AlternateContent xmlns:mc="http://schemas.openxmlformats.org/markup-compatibility/2006" xmlns:p14="http://schemas.microsoft.com/office/powerpoint/2010/main">
+        <mc:Choice Requires="p14">
           <p:contentPart p14:bwMode="auto" r:id="rId15">
             <p14:nvContentPartPr>
               <p14:cNvPr id="110" name="Ink 109">
@@ -10625,7 +10731,7 @@
             </p14:xfrm>
           </p:contentPart>
         </mc:Choice>
-        <mc:Fallback>
+        <mc:Fallback xmlns="">
           <p:pic>
             <p:nvPicPr>
               <p:cNvPr id="110" name="Ink 109">
@@ -10656,8 +10762,8 @@
           </p:pic>
         </mc:Fallback>
       </mc:AlternateContent>
-      <mc:AlternateContent xmlns:mc="http://schemas.openxmlformats.org/markup-compatibility/2006">
-        <mc:Choice xmlns:p14="http://schemas.microsoft.com/office/powerpoint/2010/main" Requires="p14">
+      <mc:AlternateContent xmlns:mc="http://schemas.openxmlformats.org/markup-compatibility/2006" xmlns:p14="http://schemas.microsoft.com/office/powerpoint/2010/main">
+        <mc:Choice Requires="p14">
           <p:contentPart p14:bwMode="auto" r:id="rId17">
             <p14:nvContentPartPr>
               <p14:cNvPr id="114" name="Ink 113">
@@ -10676,7 +10782,7 @@
             </p14:xfrm>
           </p:contentPart>
         </mc:Choice>
-        <mc:Fallback>
+        <mc:Fallback xmlns="">
           <p:pic>
             <p:nvPicPr>
               <p:cNvPr id="114" name="Ink 113">
@@ -10707,8 +10813,8 @@
           </p:pic>
         </mc:Fallback>
       </mc:AlternateContent>
-      <mc:AlternateContent xmlns:mc="http://schemas.openxmlformats.org/markup-compatibility/2006">
-        <mc:Choice xmlns:p14="http://schemas.microsoft.com/office/powerpoint/2010/main" Requires="p14">
+      <mc:AlternateContent xmlns:mc="http://schemas.openxmlformats.org/markup-compatibility/2006" xmlns:p14="http://schemas.microsoft.com/office/powerpoint/2010/main">
+        <mc:Choice Requires="p14">
           <p:contentPart p14:bwMode="auto" r:id="rId19">
             <p14:nvContentPartPr>
               <p14:cNvPr id="115" name="Ink 114">
@@ -10727,7 +10833,7 @@
             </p14:xfrm>
           </p:contentPart>
         </mc:Choice>
-        <mc:Fallback>
+        <mc:Fallback xmlns="">
           <p:pic>
             <p:nvPicPr>
               <p:cNvPr id="115" name="Ink 114">
@@ -10758,8 +10864,8 @@
           </p:pic>
         </mc:Fallback>
       </mc:AlternateContent>
-      <mc:AlternateContent xmlns:mc="http://schemas.openxmlformats.org/markup-compatibility/2006">
-        <mc:Choice xmlns:p14="http://schemas.microsoft.com/office/powerpoint/2010/main" Requires="p14">
+      <mc:AlternateContent xmlns:mc="http://schemas.openxmlformats.org/markup-compatibility/2006" xmlns:p14="http://schemas.microsoft.com/office/powerpoint/2010/main">
+        <mc:Choice Requires="p14">
           <p:contentPart p14:bwMode="auto" r:id="rId21">
             <p14:nvContentPartPr>
               <p14:cNvPr id="123" name="Ink 122">
@@ -10778,7 +10884,7 @@
             </p14:xfrm>
           </p:contentPart>
         </mc:Choice>
-        <mc:Fallback>
+        <mc:Fallback xmlns="">
           <p:pic>
             <p:nvPicPr>
               <p:cNvPr id="123" name="Ink 122">
@@ -10809,8 +10915,8 @@
           </p:pic>
         </mc:Fallback>
       </mc:AlternateContent>
-      <mc:AlternateContent xmlns:mc="http://schemas.openxmlformats.org/markup-compatibility/2006">
-        <mc:Choice xmlns:p14="http://schemas.microsoft.com/office/powerpoint/2010/main" Requires="p14">
+      <mc:AlternateContent xmlns:mc="http://schemas.openxmlformats.org/markup-compatibility/2006" xmlns:p14="http://schemas.microsoft.com/office/powerpoint/2010/main">
+        <mc:Choice Requires="p14">
           <p:contentPart p14:bwMode="auto" r:id="rId23">
             <p14:nvContentPartPr>
               <p14:cNvPr id="124" name="Ink 123">
@@ -10829,7 +10935,7 @@
             </p14:xfrm>
           </p:contentPart>
         </mc:Choice>
-        <mc:Fallback>
+        <mc:Fallback xmlns="">
           <p:pic>
             <p:nvPicPr>
               <p:cNvPr id="124" name="Ink 123">
@@ -10860,8 +10966,8 @@
           </p:pic>
         </mc:Fallback>
       </mc:AlternateContent>
-      <mc:AlternateContent xmlns:mc="http://schemas.openxmlformats.org/markup-compatibility/2006">
-        <mc:Choice xmlns:p14="http://schemas.microsoft.com/office/powerpoint/2010/main" Requires="p14">
+      <mc:AlternateContent xmlns:mc="http://schemas.openxmlformats.org/markup-compatibility/2006" xmlns:p14="http://schemas.microsoft.com/office/powerpoint/2010/main">
+        <mc:Choice Requires="p14">
           <p:contentPart p14:bwMode="auto" r:id="rId25">
             <p14:nvContentPartPr>
               <p14:cNvPr id="127" name="Ink 126">
@@ -10880,7 +10986,7 @@
             </p14:xfrm>
           </p:contentPart>
         </mc:Choice>
-        <mc:Fallback>
+        <mc:Fallback xmlns="">
           <p:pic>
             <p:nvPicPr>
               <p:cNvPr id="127" name="Ink 126">
@@ -10911,8 +11017,8 @@
           </p:pic>
         </mc:Fallback>
       </mc:AlternateContent>
-      <mc:AlternateContent xmlns:mc="http://schemas.openxmlformats.org/markup-compatibility/2006">
-        <mc:Choice xmlns:p14="http://schemas.microsoft.com/office/powerpoint/2010/main" Requires="p14">
+      <mc:AlternateContent xmlns:mc="http://schemas.openxmlformats.org/markup-compatibility/2006" xmlns:p14="http://schemas.microsoft.com/office/powerpoint/2010/main">
+        <mc:Choice Requires="p14">
           <p:contentPart p14:bwMode="auto" r:id="rId27">
             <p14:nvContentPartPr>
               <p14:cNvPr id="128" name="Ink 127">
@@ -10931,7 +11037,7 @@
             </p14:xfrm>
           </p:contentPart>
         </mc:Choice>
-        <mc:Fallback>
+        <mc:Fallback xmlns="">
           <p:pic>
             <p:nvPicPr>
               <p:cNvPr id="128" name="Ink 127">
@@ -10962,8 +11068,8 @@
           </p:pic>
         </mc:Fallback>
       </mc:AlternateContent>
-      <mc:AlternateContent xmlns:mc="http://schemas.openxmlformats.org/markup-compatibility/2006">
-        <mc:Choice xmlns:p14="http://schemas.microsoft.com/office/powerpoint/2010/main" Requires="p14">
+      <mc:AlternateContent xmlns:mc="http://schemas.openxmlformats.org/markup-compatibility/2006" xmlns:p14="http://schemas.microsoft.com/office/powerpoint/2010/main">
+        <mc:Choice Requires="p14">
           <p:contentPart p14:bwMode="auto" r:id="rId29">
             <p14:nvContentPartPr>
               <p14:cNvPr id="137" name="Ink 136">
@@ -10982,7 +11088,7 @@
             </p14:xfrm>
           </p:contentPart>
         </mc:Choice>
-        <mc:Fallback>
+        <mc:Fallback xmlns="">
           <p:pic>
             <p:nvPicPr>
               <p:cNvPr id="137" name="Ink 136">
@@ -11013,8 +11119,8 @@
           </p:pic>
         </mc:Fallback>
       </mc:AlternateContent>
-      <mc:AlternateContent xmlns:mc="http://schemas.openxmlformats.org/markup-compatibility/2006">
-        <mc:Choice xmlns:p14="http://schemas.microsoft.com/office/powerpoint/2010/main" Requires="p14">
+      <mc:AlternateContent xmlns:mc="http://schemas.openxmlformats.org/markup-compatibility/2006" xmlns:p14="http://schemas.microsoft.com/office/powerpoint/2010/main">
+        <mc:Choice Requires="p14">
           <p:contentPart p14:bwMode="auto" r:id="rId31">
             <p14:nvContentPartPr>
               <p14:cNvPr id="143" name="Ink 142">
@@ -11033,7 +11139,7 @@
             </p14:xfrm>
           </p:contentPart>
         </mc:Choice>
-        <mc:Fallback>
+        <mc:Fallback xmlns="">
           <p:pic>
             <p:nvPicPr>
               <p:cNvPr id="143" name="Ink 142">
@@ -11064,8 +11170,8 @@
           </p:pic>
         </mc:Fallback>
       </mc:AlternateContent>
-      <mc:AlternateContent xmlns:mc="http://schemas.openxmlformats.org/markup-compatibility/2006">
-        <mc:Choice xmlns:p14="http://schemas.microsoft.com/office/powerpoint/2010/main" Requires="p14">
+      <mc:AlternateContent xmlns:mc="http://schemas.openxmlformats.org/markup-compatibility/2006" xmlns:p14="http://schemas.microsoft.com/office/powerpoint/2010/main">
+        <mc:Choice Requires="p14">
           <p:contentPart p14:bwMode="auto" r:id="rId33">
             <p14:nvContentPartPr>
               <p14:cNvPr id="144" name="Ink 143">
@@ -11084,7 +11190,7 @@
             </p14:xfrm>
           </p:contentPart>
         </mc:Choice>
-        <mc:Fallback>
+        <mc:Fallback xmlns="">
           <p:pic>
             <p:nvPicPr>
               <p:cNvPr id="144" name="Ink 143">
@@ -11115,8 +11221,8 @@
           </p:pic>
         </mc:Fallback>
       </mc:AlternateContent>
-      <mc:AlternateContent xmlns:mc="http://schemas.openxmlformats.org/markup-compatibility/2006">
-        <mc:Choice xmlns:p14="http://schemas.microsoft.com/office/powerpoint/2010/main" Requires="p14">
+      <mc:AlternateContent xmlns:mc="http://schemas.openxmlformats.org/markup-compatibility/2006" xmlns:p14="http://schemas.microsoft.com/office/powerpoint/2010/main">
+        <mc:Choice Requires="p14">
           <p:contentPart p14:bwMode="auto" r:id="rId35">
             <p14:nvContentPartPr>
               <p14:cNvPr id="150" name="Ink 149">
@@ -11135,7 +11241,7 @@
             </p14:xfrm>
           </p:contentPart>
         </mc:Choice>
-        <mc:Fallback>
+        <mc:Fallback xmlns="">
           <p:pic>
             <p:nvPicPr>
               <p:cNvPr id="150" name="Ink 149">
@@ -11166,8 +11272,8 @@
           </p:pic>
         </mc:Fallback>
       </mc:AlternateContent>
-      <mc:AlternateContent xmlns:mc="http://schemas.openxmlformats.org/markup-compatibility/2006">
-        <mc:Choice xmlns:p14="http://schemas.microsoft.com/office/powerpoint/2010/main" Requires="p14">
+      <mc:AlternateContent xmlns:mc="http://schemas.openxmlformats.org/markup-compatibility/2006" xmlns:p14="http://schemas.microsoft.com/office/powerpoint/2010/main">
+        <mc:Choice Requires="p14">
           <p:contentPart p14:bwMode="auto" r:id="rId37">
             <p14:nvContentPartPr>
               <p14:cNvPr id="153" name="Ink 152">
@@ -11186,7 +11292,7 @@
             </p14:xfrm>
           </p:contentPart>
         </mc:Choice>
-        <mc:Fallback>
+        <mc:Fallback xmlns="">
           <p:pic>
             <p:nvPicPr>
               <p:cNvPr id="153" name="Ink 152">
@@ -11230,7 +11336,7 @@
 </p:sld>
 </file>
 
-<file path=ppt/slides/slide16.xml><?xml version="1.0" encoding="utf-8"?>
+<file path=ppt/slides/slide17.xml><?xml version="1.0" encoding="utf-8"?>
 <p:sld xmlns:a="http://schemas.openxmlformats.org/drawingml/2006/main" xmlns:r="http://schemas.openxmlformats.org/officeDocument/2006/relationships" xmlns:p="http://schemas.openxmlformats.org/presentationml/2006/main">
   <p:cSld>
     <p:spTree>
@@ -11406,7 +11512,7 @@
           <a:p>
             <a:fld id="{0A297500-7527-634B-90F4-69D0994C32B4}" type="slidenum">
               <a:rPr lang="nl-NL" smtClean="0"/>
-              <a:t>16</a:t>
+              <a:t>17</a:t>
             </a:fld>
             <a:endParaRPr lang="nl-NL"/>
           </a:p>
@@ -11522,8 +11628,8 @@
           </a:prstGeom>
         </p:spPr>
       </p:pic>
-      <mc:AlternateContent xmlns:mc="http://schemas.openxmlformats.org/markup-compatibility/2006">
-        <mc:Choice xmlns:p14="http://schemas.microsoft.com/office/powerpoint/2010/main" Requires="p14">
+      <mc:AlternateContent xmlns:mc="http://schemas.openxmlformats.org/markup-compatibility/2006" xmlns:p14="http://schemas.microsoft.com/office/powerpoint/2010/main">
+        <mc:Choice Requires="p14">
           <p:contentPart p14:bwMode="auto" r:id="rId4">
             <p14:nvContentPartPr>
               <p14:cNvPr id="48" name="Ink 47">
@@ -11542,7 +11648,7 @@
             </p14:xfrm>
           </p:contentPart>
         </mc:Choice>
-        <mc:Fallback>
+        <mc:Fallback xmlns="">
           <p:pic>
             <p:nvPicPr>
               <p:cNvPr id="48" name="Ink 47">
@@ -11573,8 +11679,8 @@
           </p:pic>
         </mc:Fallback>
       </mc:AlternateContent>
-      <mc:AlternateContent xmlns:mc="http://schemas.openxmlformats.org/markup-compatibility/2006">
-        <mc:Choice xmlns:p14="http://schemas.microsoft.com/office/powerpoint/2010/main" Requires="p14">
+      <mc:AlternateContent xmlns:mc="http://schemas.openxmlformats.org/markup-compatibility/2006" xmlns:p14="http://schemas.microsoft.com/office/powerpoint/2010/main">
+        <mc:Choice Requires="p14">
           <p:contentPart p14:bwMode="auto" r:id="rId6">
             <p14:nvContentPartPr>
               <p14:cNvPr id="49" name="Ink 48">
@@ -11593,7 +11699,7 @@
             </p14:xfrm>
           </p:contentPart>
         </mc:Choice>
-        <mc:Fallback>
+        <mc:Fallback xmlns="">
           <p:pic>
             <p:nvPicPr>
               <p:cNvPr id="49" name="Ink 48">
@@ -11624,8 +11730,8 @@
           </p:pic>
         </mc:Fallback>
       </mc:AlternateContent>
-      <mc:AlternateContent xmlns:mc="http://schemas.openxmlformats.org/markup-compatibility/2006">
-        <mc:Choice xmlns:p14="http://schemas.microsoft.com/office/powerpoint/2010/main" Requires="p14">
+      <mc:AlternateContent xmlns:mc="http://schemas.openxmlformats.org/markup-compatibility/2006" xmlns:p14="http://schemas.microsoft.com/office/powerpoint/2010/main">
+        <mc:Choice Requires="p14">
           <p:contentPart p14:bwMode="auto" r:id="rId8">
             <p14:nvContentPartPr>
               <p14:cNvPr id="53" name="Ink 52">
@@ -11644,7 +11750,7 @@
             </p14:xfrm>
           </p:contentPart>
         </mc:Choice>
-        <mc:Fallback>
+        <mc:Fallback xmlns="">
           <p:pic>
             <p:nvPicPr>
               <p:cNvPr id="53" name="Ink 52">
@@ -11675,8 +11781,8 @@
           </p:pic>
         </mc:Fallback>
       </mc:AlternateContent>
-      <mc:AlternateContent xmlns:mc="http://schemas.openxmlformats.org/markup-compatibility/2006">
-        <mc:Choice xmlns:p14="http://schemas.microsoft.com/office/powerpoint/2010/main" Requires="p14">
+      <mc:AlternateContent xmlns:mc="http://schemas.openxmlformats.org/markup-compatibility/2006" xmlns:p14="http://schemas.microsoft.com/office/powerpoint/2010/main">
+        <mc:Choice Requires="p14">
           <p:contentPart p14:bwMode="auto" r:id="rId10">
             <p14:nvContentPartPr>
               <p14:cNvPr id="82" name="Ink 81">
@@ -11695,7 +11801,7 @@
             </p14:xfrm>
           </p:contentPart>
         </mc:Choice>
-        <mc:Fallback>
+        <mc:Fallback xmlns="">
           <p:pic>
             <p:nvPicPr>
               <p:cNvPr id="82" name="Ink 81">
@@ -11726,8 +11832,8 @@
           </p:pic>
         </mc:Fallback>
       </mc:AlternateContent>
-      <mc:AlternateContent xmlns:mc="http://schemas.openxmlformats.org/markup-compatibility/2006">
-        <mc:Choice xmlns:p14="http://schemas.microsoft.com/office/powerpoint/2010/main" Requires="p14">
+      <mc:AlternateContent xmlns:mc="http://schemas.openxmlformats.org/markup-compatibility/2006" xmlns:p14="http://schemas.microsoft.com/office/powerpoint/2010/main">
+        <mc:Choice Requires="p14">
           <p:contentPart p14:bwMode="auto" r:id="rId12">
             <p14:nvContentPartPr>
               <p14:cNvPr id="87" name="Ink 86">
@@ -11746,7 +11852,7 @@
             </p14:xfrm>
           </p:contentPart>
         </mc:Choice>
-        <mc:Fallback>
+        <mc:Fallback xmlns="">
           <p:pic>
             <p:nvPicPr>
               <p:cNvPr id="87" name="Ink 86">
@@ -11777,8 +11883,8 @@
           </p:pic>
         </mc:Fallback>
       </mc:AlternateContent>
-      <mc:AlternateContent xmlns:mc="http://schemas.openxmlformats.org/markup-compatibility/2006">
-        <mc:Choice xmlns:p14="http://schemas.microsoft.com/office/powerpoint/2010/main" Requires="p14">
+      <mc:AlternateContent xmlns:mc="http://schemas.openxmlformats.org/markup-compatibility/2006" xmlns:p14="http://schemas.microsoft.com/office/powerpoint/2010/main">
+        <mc:Choice Requires="p14">
           <p:contentPart p14:bwMode="auto" r:id="rId14">
             <p14:nvContentPartPr>
               <p14:cNvPr id="88" name="Ink 87">
@@ -11797,7 +11903,7 @@
             </p14:xfrm>
           </p:contentPart>
         </mc:Choice>
-        <mc:Fallback>
+        <mc:Fallback xmlns="">
           <p:pic>
             <p:nvPicPr>
               <p:cNvPr id="88" name="Ink 87">
@@ -11828,8 +11934,8 @@
           </p:pic>
         </mc:Fallback>
       </mc:AlternateContent>
-      <mc:AlternateContent xmlns:mc="http://schemas.openxmlformats.org/markup-compatibility/2006">
-        <mc:Choice xmlns:p14="http://schemas.microsoft.com/office/powerpoint/2010/main" Requires="p14">
+      <mc:AlternateContent xmlns:mc="http://schemas.openxmlformats.org/markup-compatibility/2006" xmlns:p14="http://schemas.microsoft.com/office/powerpoint/2010/main">
+        <mc:Choice Requires="p14">
           <p:contentPart p14:bwMode="auto" r:id="rId16">
             <p14:nvContentPartPr>
               <p14:cNvPr id="92" name="Ink 91">
@@ -11848,7 +11954,7 @@
             </p14:xfrm>
           </p:contentPart>
         </mc:Choice>
-        <mc:Fallback>
+        <mc:Fallback xmlns="">
           <p:pic>
             <p:nvPicPr>
               <p:cNvPr id="92" name="Ink 91">
@@ -11879,8 +11985,8 @@
           </p:pic>
         </mc:Fallback>
       </mc:AlternateContent>
-      <mc:AlternateContent xmlns:mc="http://schemas.openxmlformats.org/markup-compatibility/2006">
-        <mc:Choice xmlns:p14="http://schemas.microsoft.com/office/powerpoint/2010/main" Requires="p14">
+      <mc:AlternateContent xmlns:mc="http://schemas.openxmlformats.org/markup-compatibility/2006" xmlns:p14="http://schemas.microsoft.com/office/powerpoint/2010/main">
+        <mc:Choice Requires="p14">
           <p:contentPart p14:bwMode="auto" r:id="rId18">
             <p14:nvContentPartPr>
               <p14:cNvPr id="99" name="Ink 98">
@@ -11899,7 +12005,7 @@
             </p14:xfrm>
           </p:contentPart>
         </mc:Choice>
-        <mc:Fallback>
+        <mc:Fallback xmlns="">
           <p:pic>
             <p:nvPicPr>
               <p:cNvPr id="99" name="Ink 98">
@@ -11930,8 +12036,8 @@
           </p:pic>
         </mc:Fallback>
       </mc:AlternateContent>
-      <mc:AlternateContent xmlns:mc="http://schemas.openxmlformats.org/markup-compatibility/2006">
-        <mc:Choice xmlns:p14="http://schemas.microsoft.com/office/powerpoint/2010/main" Requires="p14">
+      <mc:AlternateContent xmlns:mc="http://schemas.openxmlformats.org/markup-compatibility/2006" xmlns:p14="http://schemas.microsoft.com/office/powerpoint/2010/main">
+        <mc:Choice Requires="p14">
           <p:contentPart p14:bwMode="auto" r:id="rId20">
             <p14:nvContentPartPr>
               <p14:cNvPr id="101" name="Ink 100">
@@ -11950,7 +12056,7 @@
             </p14:xfrm>
           </p:contentPart>
         </mc:Choice>
-        <mc:Fallback>
+        <mc:Fallback xmlns="">
           <p:pic>
             <p:nvPicPr>
               <p:cNvPr id="101" name="Ink 100">
@@ -11981,8 +12087,8 @@
           </p:pic>
         </mc:Fallback>
       </mc:AlternateContent>
-      <mc:AlternateContent xmlns:mc="http://schemas.openxmlformats.org/markup-compatibility/2006">
-        <mc:Choice xmlns:p14="http://schemas.microsoft.com/office/powerpoint/2010/main" Requires="p14">
+      <mc:AlternateContent xmlns:mc="http://schemas.openxmlformats.org/markup-compatibility/2006" xmlns:p14="http://schemas.microsoft.com/office/powerpoint/2010/main">
+        <mc:Choice Requires="p14">
           <p:contentPart p14:bwMode="auto" r:id="rId22">
             <p14:nvContentPartPr>
               <p14:cNvPr id="115" name="Ink 114">
@@ -12001,7 +12107,7 @@
             </p14:xfrm>
           </p:contentPart>
         </mc:Choice>
-        <mc:Fallback>
+        <mc:Fallback xmlns="">
           <p:pic>
             <p:nvPicPr>
               <p:cNvPr id="115" name="Ink 114">
@@ -12032,8 +12138,8 @@
           </p:pic>
         </mc:Fallback>
       </mc:AlternateContent>
-      <mc:AlternateContent xmlns:mc="http://schemas.openxmlformats.org/markup-compatibility/2006">
-        <mc:Choice xmlns:p14="http://schemas.microsoft.com/office/powerpoint/2010/main" Requires="p14">
+      <mc:AlternateContent xmlns:mc="http://schemas.openxmlformats.org/markup-compatibility/2006" xmlns:p14="http://schemas.microsoft.com/office/powerpoint/2010/main">
+        <mc:Choice Requires="p14">
           <p:contentPart p14:bwMode="auto" r:id="rId24">
             <p14:nvContentPartPr>
               <p14:cNvPr id="116" name="Ink 115">
@@ -12052,7 +12158,7 @@
             </p14:xfrm>
           </p:contentPart>
         </mc:Choice>
-        <mc:Fallback>
+        <mc:Fallback xmlns="">
           <p:pic>
             <p:nvPicPr>
               <p:cNvPr id="116" name="Ink 115">
@@ -12083,8 +12189,8 @@
           </p:pic>
         </mc:Fallback>
       </mc:AlternateContent>
-      <mc:AlternateContent xmlns:mc="http://schemas.openxmlformats.org/markup-compatibility/2006">
-        <mc:Choice xmlns:p14="http://schemas.microsoft.com/office/powerpoint/2010/main" Requires="p14">
+      <mc:AlternateContent xmlns:mc="http://schemas.openxmlformats.org/markup-compatibility/2006" xmlns:p14="http://schemas.microsoft.com/office/powerpoint/2010/main">
+        <mc:Choice Requires="p14">
           <p:contentPart p14:bwMode="auto" r:id="rId26">
             <p14:nvContentPartPr>
               <p14:cNvPr id="117" name="Ink 116">
@@ -12103,7 +12209,7 @@
             </p14:xfrm>
           </p:contentPart>
         </mc:Choice>
-        <mc:Fallback>
+        <mc:Fallback xmlns="">
           <p:pic>
             <p:nvPicPr>
               <p:cNvPr id="117" name="Ink 116">
@@ -12134,8 +12240,8 @@
           </p:pic>
         </mc:Fallback>
       </mc:AlternateContent>
-      <mc:AlternateContent xmlns:mc="http://schemas.openxmlformats.org/markup-compatibility/2006">
-        <mc:Choice xmlns:p14="http://schemas.microsoft.com/office/powerpoint/2010/main" Requires="p14">
+      <mc:AlternateContent xmlns:mc="http://schemas.openxmlformats.org/markup-compatibility/2006" xmlns:p14="http://schemas.microsoft.com/office/powerpoint/2010/main">
+        <mc:Choice Requires="p14">
           <p:contentPart p14:bwMode="auto" r:id="rId28">
             <p14:nvContentPartPr>
               <p14:cNvPr id="118" name="Ink 117">
@@ -12154,7 +12260,7 @@
             </p14:xfrm>
           </p:contentPart>
         </mc:Choice>
-        <mc:Fallback>
+        <mc:Fallback xmlns="">
           <p:pic>
             <p:nvPicPr>
               <p:cNvPr id="118" name="Ink 117">
@@ -12185,8 +12291,8 @@
           </p:pic>
         </mc:Fallback>
       </mc:AlternateContent>
-      <mc:AlternateContent xmlns:mc="http://schemas.openxmlformats.org/markup-compatibility/2006">
-        <mc:Choice xmlns:p14="http://schemas.microsoft.com/office/powerpoint/2010/main" Requires="p14">
+      <mc:AlternateContent xmlns:mc="http://schemas.openxmlformats.org/markup-compatibility/2006" xmlns:p14="http://schemas.microsoft.com/office/powerpoint/2010/main">
+        <mc:Choice Requires="p14">
           <p:contentPart p14:bwMode="auto" r:id="rId30">
             <p14:nvContentPartPr>
               <p14:cNvPr id="119" name="Ink 118">
@@ -12205,7 +12311,7 @@
             </p14:xfrm>
           </p:contentPart>
         </mc:Choice>
-        <mc:Fallback>
+        <mc:Fallback xmlns="">
           <p:pic>
             <p:nvPicPr>
               <p:cNvPr id="119" name="Ink 118">
@@ -12236,8 +12342,8 @@
           </p:pic>
         </mc:Fallback>
       </mc:AlternateContent>
-      <mc:AlternateContent xmlns:mc="http://schemas.openxmlformats.org/markup-compatibility/2006">
-        <mc:Choice xmlns:p14="http://schemas.microsoft.com/office/powerpoint/2010/main" Requires="p14">
+      <mc:AlternateContent xmlns:mc="http://schemas.openxmlformats.org/markup-compatibility/2006" xmlns:p14="http://schemas.microsoft.com/office/powerpoint/2010/main">
+        <mc:Choice Requires="p14">
           <p:contentPart p14:bwMode="auto" r:id="rId32">
             <p14:nvContentPartPr>
               <p14:cNvPr id="120" name="Ink 119">
@@ -12256,7 +12362,7 @@
             </p14:xfrm>
           </p:contentPart>
         </mc:Choice>
-        <mc:Fallback>
+        <mc:Fallback xmlns="">
           <p:pic>
             <p:nvPicPr>
               <p:cNvPr id="120" name="Ink 119">
@@ -12287,8 +12393,8 @@
           </p:pic>
         </mc:Fallback>
       </mc:AlternateContent>
-      <mc:AlternateContent xmlns:mc="http://schemas.openxmlformats.org/markup-compatibility/2006">
-        <mc:Choice xmlns:p14="http://schemas.microsoft.com/office/powerpoint/2010/main" Requires="p14">
+      <mc:AlternateContent xmlns:mc="http://schemas.openxmlformats.org/markup-compatibility/2006" xmlns:p14="http://schemas.microsoft.com/office/powerpoint/2010/main">
+        <mc:Choice Requires="p14">
           <p:contentPart p14:bwMode="auto" r:id="rId34">
             <p14:nvContentPartPr>
               <p14:cNvPr id="121" name="Ink 120">
@@ -12307,7 +12413,7 @@
             </p14:xfrm>
           </p:contentPart>
         </mc:Choice>
-        <mc:Fallback>
+        <mc:Fallback xmlns="">
           <p:pic>
             <p:nvPicPr>
               <p:cNvPr id="121" name="Ink 120">
@@ -12338,8 +12444,8 @@
           </p:pic>
         </mc:Fallback>
       </mc:AlternateContent>
-      <mc:AlternateContent xmlns:mc="http://schemas.openxmlformats.org/markup-compatibility/2006">
-        <mc:Choice xmlns:p14="http://schemas.microsoft.com/office/powerpoint/2010/main" Requires="p14">
+      <mc:AlternateContent xmlns:mc="http://schemas.openxmlformats.org/markup-compatibility/2006" xmlns:p14="http://schemas.microsoft.com/office/powerpoint/2010/main">
+        <mc:Choice Requires="p14">
           <p:contentPart p14:bwMode="auto" r:id="rId36">
             <p14:nvContentPartPr>
               <p14:cNvPr id="122" name="Ink 121">
@@ -12358,7 +12464,7 @@
             </p14:xfrm>
           </p:contentPart>
         </mc:Choice>
-        <mc:Fallback>
+        <mc:Fallback xmlns="">
           <p:pic>
             <p:nvPicPr>
               <p:cNvPr id="122" name="Ink 121">
@@ -12389,8 +12495,8 @@
           </p:pic>
         </mc:Fallback>
       </mc:AlternateContent>
-      <mc:AlternateContent xmlns:mc="http://schemas.openxmlformats.org/markup-compatibility/2006">
-        <mc:Choice xmlns:p14="http://schemas.microsoft.com/office/powerpoint/2010/main" Requires="p14">
+      <mc:AlternateContent xmlns:mc="http://schemas.openxmlformats.org/markup-compatibility/2006" xmlns:p14="http://schemas.microsoft.com/office/powerpoint/2010/main">
+        <mc:Choice Requires="p14">
           <p:contentPart p14:bwMode="auto" r:id="rId38">
             <p14:nvContentPartPr>
               <p14:cNvPr id="123" name="Ink 122">
@@ -12409,7 +12515,7 @@
             </p14:xfrm>
           </p:contentPart>
         </mc:Choice>
-        <mc:Fallback>
+        <mc:Fallback xmlns="">
           <p:pic>
             <p:nvPicPr>
               <p:cNvPr id="123" name="Ink 122">
@@ -12440,8 +12546,8 @@
           </p:pic>
         </mc:Fallback>
       </mc:AlternateContent>
-      <mc:AlternateContent xmlns:mc="http://schemas.openxmlformats.org/markup-compatibility/2006">
-        <mc:Choice xmlns:p14="http://schemas.microsoft.com/office/powerpoint/2010/main" Requires="p14">
+      <mc:AlternateContent xmlns:mc="http://schemas.openxmlformats.org/markup-compatibility/2006" xmlns:p14="http://schemas.microsoft.com/office/powerpoint/2010/main">
+        <mc:Choice Requires="p14">
           <p:contentPart p14:bwMode="auto" r:id="rId40">
             <p14:nvContentPartPr>
               <p14:cNvPr id="124" name="Ink 123">
@@ -12460,7 +12566,7 @@
             </p14:xfrm>
           </p:contentPart>
         </mc:Choice>
-        <mc:Fallback>
+        <mc:Fallback xmlns="">
           <p:pic>
             <p:nvPicPr>
               <p:cNvPr id="124" name="Ink 123">
@@ -12491,8 +12597,8 @@
           </p:pic>
         </mc:Fallback>
       </mc:AlternateContent>
-      <mc:AlternateContent xmlns:mc="http://schemas.openxmlformats.org/markup-compatibility/2006">
-        <mc:Choice xmlns:p14="http://schemas.microsoft.com/office/powerpoint/2010/main" Requires="p14">
+      <mc:AlternateContent xmlns:mc="http://schemas.openxmlformats.org/markup-compatibility/2006" xmlns:p14="http://schemas.microsoft.com/office/powerpoint/2010/main">
+        <mc:Choice Requires="p14">
           <p:contentPart p14:bwMode="auto" r:id="rId42">
             <p14:nvContentPartPr>
               <p14:cNvPr id="125" name="Ink 124">
@@ -12511,7 +12617,7 @@
             </p14:xfrm>
           </p:contentPart>
         </mc:Choice>
-        <mc:Fallback>
+        <mc:Fallback xmlns="">
           <p:pic>
             <p:nvPicPr>
               <p:cNvPr id="125" name="Ink 124">
@@ -12542,8 +12648,8 @@
           </p:pic>
         </mc:Fallback>
       </mc:AlternateContent>
-      <mc:AlternateContent xmlns:mc="http://schemas.openxmlformats.org/markup-compatibility/2006">
-        <mc:Choice xmlns:p14="http://schemas.microsoft.com/office/powerpoint/2010/main" Requires="p14">
+      <mc:AlternateContent xmlns:mc="http://schemas.openxmlformats.org/markup-compatibility/2006" xmlns:p14="http://schemas.microsoft.com/office/powerpoint/2010/main">
+        <mc:Choice Requires="p14">
           <p:contentPart p14:bwMode="auto" r:id="rId44">
             <p14:nvContentPartPr>
               <p14:cNvPr id="126" name="Ink 125">
@@ -12562,7 +12668,7 @@
             </p14:xfrm>
           </p:contentPart>
         </mc:Choice>
-        <mc:Fallback>
+        <mc:Fallback xmlns="">
           <p:pic>
             <p:nvPicPr>
               <p:cNvPr id="126" name="Ink 125">
@@ -12593,8 +12699,8 @@
           </p:pic>
         </mc:Fallback>
       </mc:AlternateContent>
-      <mc:AlternateContent xmlns:mc="http://schemas.openxmlformats.org/markup-compatibility/2006">
-        <mc:Choice xmlns:p14="http://schemas.microsoft.com/office/powerpoint/2010/main" Requires="p14">
+      <mc:AlternateContent xmlns:mc="http://schemas.openxmlformats.org/markup-compatibility/2006" xmlns:p14="http://schemas.microsoft.com/office/powerpoint/2010/main">
+        <mc:Choice Requires="p14">
           <p:contentPart p14:bwMode="auto" r:id="rId46">
             <p14:nvContentPartPr>
               <p14:cNvPr id="127" name="Ink 126">
@@ -12613,7 +12719,7 @@
             </p14:xfrm>
           </p:contentPart>
         </mc:Choice>
-        <mc:Fallback>
+        <mc:Fallback xmlns="">
           <p:pic>
             <p:nvPicPr>
               <p:cNvPr id="127" name="Ink 126">
@@ -12644,8 +12750,8 @@
           </p:pic>
         </mc:Fallback>
       </mc:AlternateContent>
-      <mc:AlternateContent xmlns:mc="http://schemas.openxmlformats.org/markup-compatibility/2006">
-        <mc:Choice xmlns:p14="http://schemas.microsoft.com/office/powerpoint/2010/main" Requires="p14">
+      <mc:AlternateContent xmlns:mc="http://schemas.openxmlformats.org/markup-compatibility/2006" xmlns:p14="http://schemas.microsoft.com/office/powerpoint/2010/main">
+        <mc:Choice Requires="p14">
           <p:contentPart p14:bwMode="auto" r:id="rId48">
             <p14:nvContentPartPr>
               <p14:cNvPr id="128" name="Ink 127">
@@ -12664,7 +12770,7 @@
             </p14:xfrm>
           </p:contentPart>
         </mc:Choice>
-        <mc:Fallback>
+        <mc:Fallback xmlns="">
           <p:pic>
             <p:nvPicPr>
               <p:cNvPr id="128" name="Ink 127">
@@ -12695,8 +12801,8 @@
           </p:pic>
         </mc:Fallback>
       </mc:AlternateContent>
-      <mc:AlternateContent xmlns:mc="http://schemas.openxmlformats.org/markup-compatibility/2006">
-        <mc:Choice xmlns:p14="http://schemas.microsoft.com/office/powerpoint/2010/main" Requires="p14">
+      <mc:AlternateContent xmlns:mc="http://schemas.openxmlformats.org/markup-compatibility/2006" xmlns:p14="http://schemas.microsoft.com/office/powerpoint/2010/main">
+        <mc:Choice Requires="p14">
           <p:contentPart p14:bwMode="auto" r:id="rId50">
             <p14:nvContentPartPr>
               <p14:cNvPr id="129" name="Ink 128">
@@ -12715,7 +12821,7 @@
             </p14:xfrm>
           </p:contentPart>
         </mc:Choice>
-        <mc:Fallback>
+        <mc:Fallback xmlns="">
           <p:pic>
             <p:nvPicPr>
               <p:cNvPr id="129" name="Ink 128">
@@ -12746,8 +12852,8 @@
           </p:pic>
         </mc:Fallback>
       </mc:AlternateContent>
-      <mc:AlternateContent xmlns:mc="http://schemas.openxmlformats.org/markup-compatibility/2006">
-        <mc:Choice xmlns:p14="http://schemas.microsoft.com/office/powerpoint/2010/main" Requires="p14">
+      <mc:AlternateContent xmlns:mc="http://schemas.openxmlformats.org/markup-compatibility/2006" xmlns:p14="http://schemas.microsoft.com/office/powerpoint/2010/main">
+        <mc:Choice Requires="p14">
           <p:contentPart p14:bwMode="auto" r:id="rId52">
             <p14:nvContentPartPr>
               <p14:cNvPr id="130" name="Ink 129">
@@ -12766,7 +12872,7 @@
             </p14:xfrm>
           </p:contentPart>
         </mc:Choice>
-        <mc:Fallback>
+        <mc:Fallback xmlns="">
           <p:pic>
             <p:nvPicPr>
               <p:cNvPr id="130" name="Ink 129">
@@ -12797,8 +12903,8 @@
           </p:pic>
         </mc:Fallback>
       </mc:AlternateContent>
-      <mc:AlternateContent xmlns:mc="http://schemas.openxmlformats.org/markup-compatibility/2006">
-        <mc:Choice xmlns:p14="http://schemas.microsoft.com/office/powerpoint/2010/main" Requires="p14">
+      <mc:AlternateContent xmlns:mc="http://schemas.openxmlformats.org/markup-compatibility/2006" xmlns:p14="http://schemas.microsoft.com/office/powerpoint/2010/main">
+        <mc:Choice Requires="p14">
           <p:contentPart p14:bwMode="auto" r:id="rId54">
             <p14:nvContentPartPr>
               <p14:cNvPr id="131" name="Ink 130">
@@ -12817,7 +12923,7 @@
             </p14:xfrm>
           </p:contentPart>
         </mc:Choice>
-        <mc:Fallback>
+        <mc:Fallback xmlns="">
           <p:pic>
             <p:nvPicPr>
               <p:cNvPr id="131" name="Ink 130">
@@ -12848,8 +12954,8 @@
           </p:pic>
         </mc:Fallback>
       </mc:AlternateContent>
-      <mc:AlternateContent xmlns:mc="http://schemas.openxmlformats.org/markup-compatibility/2006">
-        <mc:Choice xmlns:p14="http://schemas.microsoft.com/office/powerpoint/2010/main" Requires="p14">
+      <mc:AlternateContent xmlns:mc="http://schemas.openxmlformats.org/markup-compatibility/2006" xmlns:p14="http://schemas.microsoft.com/office/powerpoint/2010/main">
+        <mc:Choice Requires="p14">
           <p:contentPart p14:bwMode="auto" r:id="rId56">
             <p14:nvContentPartPr>
               <p14:cNvPr id="132" name="Ink 131">
@@ -12868,7 +12974,7 @@
             </p14:xfrm>
           </p:contentPart>
         </mc:Choice>
-        <mc:Fallback>
+        <mc:Fallback xmlns="">
           <p:pic>
             <p:nvPicPr>
               <p:cNvPr id="132" name="Ink 131">
@@ -12899,8 +13005,8 @@
           </p:pic>
         </mc:Fallback>
       </mc:AlternateContent>
-      <mc:AlternateContent xmlns:mc="http://schemas.openxmlformats.org/markup-compatibility/2006">
-        <mc:Choice xmlns:p14="http://schemas.microsoft.com/office/powerpoint/2010/main" Requires="p14">
+      <mc:AlternateContent xmlns:mc="http://schemas.openxmlformats.org/markup-compatibility/2006" xmlns:p14="http://schemas.microsoft.com/office/powerpoint/2010/main">
+        <mc:Choice Requires="p14">
           <p:contentPart p14:bwMode="auto" r:id="rId58">
             <p14:nvContentPartPr>
               <p14:cNvPr id="133" name="Ink 132">
@@ -12919,7 +13025,7 @@
             </p14:xfrm>
           </p:contentPart>
         </mc:Choice>
-        <mc:Fallback>
+        <mc:Fallback xmlns="">
           <p:pic>
             <p:nvPicPr>
               <p:cNvPr id="133" name="Ink 132">
@@ -13023,7 +13129,7 @@
 </p:sld>
 </file>
 
-<file path=ppt/slides/slide17.xml><?xml version="1.0" encoding="utf-8"?>
+<file path=ppt/slides/slide18.xml><?xml version="1.0" encoding="utf-8"?>
 <p:sld xmlns:a="http://schemas.openxmlformats.org/drawingml/2006/main" xmlns:r="http://schemas.openxmlformats.org/officeDocument/2006/relationships" xmlns:p="http://schemas.openxmlformats.org/presentationml/2006/main">
   <p:cSld>
     <p:spTree>
@@ -13163,7 +13269,7 @@
           <a:p>
             <a:fld id="{0A297500-7527-634B-90F4-69D0994C32B4}" type="slidenum">
               <a:rPr lang="nl-NL" smtClean="0"/>
-              <a:t>17</a:t>
+              <a:t>18</a:t>
             </a:fld>
             <a:endParaRPr lang="nl-NL"/>
           </a:p>
@@ -13222,126 +13328,6 @@
           </a:p>
         </p:txBody>
       </p:sp>
-      <p:pic>
-        <p:nvPicPr>
-          <p:cNvPr id="6" name="Picture 5">
-            <a:extLst>
-              <a:ext uri="{FF2B5EF4-FFF2-40B4-BE49-F238E27FC236}">
-                <a16:creationId xmlns:a16="http://schemas.microsoft.com/office/drawing/2014/main" id="{3C298C5A-793D-479B-BC5B-E0DF0938452F}"/>
-              </a:ext>
-            </a:extLst>
-          </p:cNvPr>
-          <p:cNvPicPr>
-            <a:picLocks noChangeAspect="1"/>
-          </p:cNvPicPr>
-          <p:nvPr/>
-        </p:nvPicPr>
-        <p:blipFill>
-          <a:blip r:embed="rId2"/>
-          <a:stretch>
-            <a:fillRect/>
-          </a:stretch>
-        </p:blipFill>
-        <p:spPr>
-          <a:xfrm>
-            <a:off x="6018189" y="3092451"/>
-            <a:ext cx="3218025" cy="3841750"/>
-          </a:xfrm>
-          <a:prstGeom prst="rect">
-            <a:avLst/>
-          </a:prstGeom>
-        </p:spPr>
-      </p:pic>
-      <p:pic>
-        <p:nvPicPr>
-          <p:cNvPr id="8" name="Picture 7">
-            <a:extLst>
-              <a:ext uri="{FF2B5EF4-FFF2-40B4-BE49-F238E27FC236}">
-                <a16:creationId xmlns:a16="http://schemas.microsoft.com/office/drawing/2014/main" id="{3EF31D3B-C4BF-406F-A08E-23F30BA565BC}"/>
-              </a:ext>
-            </a:extLst>
-          </p:cNvPr>
-          <p:cNvPicPr>
-            <a:picLocks noChangeAspect="1"/>
-          </p:cNvPicPr>
-          <p:nvPr/>
-        </p:nvPicPr>
-        <p:blipFill>
-          <a:blip r:embed="rId3"/>
-          <a:stretch>
-            <a:fillRect/>
-          </a:stretch>
-        </p:blipFill>
-        <p:spPr>
-          <a:xfrm>
-            <a:off x="9109451" y="3215975"/>
-            <a:ext cx="3082549" cy="3718226"/>
-          </a:xfrm>
-          <a:prstGeom prst="rect">
-            <a:avLst/>
-          </a:prstGeom>
-        </p:spPr>
-      </p:pic>
-      <p:pic>
-        <p:nvPicPr>
-          <p:cNvPr id="10" name="Picture 9">
-            <a:extLst>
-              <a:ext uri="{FF2B5EF4-FFF2-40B4-BE49-F238E27FC236}">
-                <a16:creationId xmlns:a16="http://schemas.microsoft.com/office/drawing/2014/main" id="{2AD0D4DE-F892-4557-8D94-66BE91EEF8FE}"/>
-              </a:ext>
-            </a:extLst>
-          </p:cNvPr>
-          <p:cNvPicPr>
-            <a:picLocks noChangeAspect="1"/>
-          </p:cNvPicPr>
-          <p:nvPr/>
-        </p:nvPicPr>
-        <p:blipFill>
-          <a:blip r:embed="rId4"/>
-          <a:stretch>
-            <a:fillRect/>
-          </a:stretch>
-        </p:blipFill>
-        <p:spPr>
-          <a:xfrm>
-            <a:off x="5894829" y="3182191"/>
-            <a:ext cx="3337983" cy="3752009"/>
-          </a:xfrm>
-          <a:prstGeom prst="rect">
-            <a:avLst/>
-          </a:prstGeom>
-        </p:spPr>
-      </p:pic>
-      <p:pic>
-        <p:nvPicPr>
-          <p:cNvPr id="12" name="Picture 11">
-            <a:extLst>
-              <a:ext uri="{FF2B5EF4-FFF2-40B4-BE49-F238E27FC236}">
-                <a16:creationId xmlns:a16="http://schemas.microsoft.com/office/drawing/2014/main" id="{3694AFF2-559A-447B-8B37-FA4D2452A568}"/>
-              </a:ext>
-            </a:extLst>
-          </p:cNvPr>
-          <p:cNvPicPr>
-            <a:picLocks noChangeAspect="1"/>
-          </p:cNvPicPr>
-          <p:nvPr/>
-        </p:nvPicPr>
-        <p:blipFill>
-          <a:blip r:embed="rId5"/>
-          <a:stretch>
-            <a:fillRect/>
-          </a:stretch>
-        </p:blipFill>
-        <p:spPr>
-          <a:xfrm>
-            <a:off x="9325925" y="3294477"/>
-            <a:ext cx="2649600" cy="3527436"/>
-          </a:xfrm>
-          <a:prstGeom prst="rect">
-            <a:avLst/>
-          </a:prstGeom>
-        </p:spPr>
-      </p:pic>
     </p:spTree>
     <p:extLst>
       <p:ext uri="{BB962C8B-B14F-4D97-AF65-F5344CB8AC3E}">
@@ -13355,7 +13341,7 @@
 </p:sld>
 </file>
 
-<file path=ppt/slides/slide18.xml><?xml version="1.0" encoding="utf-8"?>
+<file path=ppt/slides/slide19.xml><?xml version="1.0" encoding="utf-8"?>
 <p:sld xmlns:a="http://schemas.openxmlformats.org/drawingml/2006/main" xmlns:r="http://schemas.openxmlformats.org/officeDocument/2006/relationships" xmlns:p="http://schemas.openxmlformats.org/presentationml/2006/main">
   <p:cSld>
     <p:spTree>
@@ -13613,7 +13599,7 @@
           <a:p>
             <a:fld id="{0A297500-7527-634B-90F4-69D0994C32B4}" type="slidenum">
               <a:rPr lang="nl-NL" smtClean="0"/>
-              <a:t>18</a:t>
+              <a:t>19</a:t>
             </a:fld>
             <a:endParaRPr lang="nl-NL"/>
           </a:p>
@@ -15039,8 +15025,8 @@
           </a:prstGeom>
         </p:spPr>
       </p:pic>
-      <mc:AlternateContent xmlns:mc="http://schemas.openxmlformats.org/markup-compatibility/2006">
-        <mc:Choice xmlns:p14="http://schemas.microsoft.com/office/powerpoint/2010/main" Requires="p14">
+      <mc:AlternateContent xmlns:mc="http://schemas.openxmlformats.org/markup-compatibility/2006" xmlns:p14="http://schemas.microsoft.com/office/powerpoint/2010/main">
+        <mc:Choice Requires="p14">
           <p:contentPart p14:bwMode="auto" r:id="rId4">
             <p14:nvContentPartPr>
               <p14:cNvPr id="21" name="Ink 20">
@@ -15059,7 +15045,7 @@
             </p14:xfrm>
           </p:contentPart>
         </mc:Choice>
-        <mc:Fallback>
+        <mc:Fallback xmlns="">
           <p:pic>
             <p:nvPicPr>
               <p:cNvPr id="21" name="Ink 20">
@@ -15704,8 +15690,8 @@
           </a:p>
         </p:txBody>
       </p:sp>
-      <mc:AlternateContent xmlns:mc="http://schemas.openxmlformats.org/markup-compatibility/2006">
-        <mc:Choice xmlns:p14="http://schemas.microsoft.com/office/powerpoint/2010/main" Requires="p14">
+      <mc:AlternateContent xmlns:mc="http://schemas.openxmlformats.org/markup-compatibility/2006" xmlns:p14="http://schemas.microsoft.com/office/powerpoint/2010/main">
+        <mc:Choice Requires="p14">
           <p:contentPart p14:bwMode="auto" r:id="rId3">
             <p14:nvContentPartPr>
               <p14:cNvPr id="18" name="Ink 17">
@@ -15724,7 +15710,7 @@
             </p14:xfrm>
           </p:contentPart>
         </mc:Choice>
-        <mc:Fallback>
+        <mc:Fallback xmlns="">
           <p:pic>
             <p:nvPicPr>
               <p:cNvPr id="18" name="Ink 17">
@@ -15755,8 +15741,8 @@
           </p:pic>
         </mc:Fallback>
       </mc:AlternateContent>
-      <mc:AlternateContent xmlns:mc="http://schemas.openxmlformats.org/markup-compatibility/2006">
-        <mc:Choice xmlns:p14="http://schemas.microsoft.com/office/powerpoint/2010/main" Requires="p14">
+      <mc:AlternateContent xmlns:mc="http://schemas.openxmlformats.org/markup-compatibility/2006" xmlns:p14="http://schemas.microsoft.com/office/powerpoint/2010/main">
+        <mc:Choice Requires="p14">
           <p:contentPart p14:bwMode="auto" r:id="rId5">
             <p14:nvContentPartPr>
               <p14:cNvPr id="21" name="Ink 20">
@@ -15775,7 +15761,7 @@
             </p14:xfrm>
           </p:contentPart>
         </mc:Choice>
-        <mc:Fallback>
+        <mc:Fallback xmlns="">
           <p:pic>
             <p:nvPicPr>
               <p:cNvPr id="21" name="Ink 20">
@@ -15806,8 +15792,8 @@
           </p:pic>
         </mc:Fallback>
       </mc:AlternateContent>
-      <mc:AlternateContent xmlns:mc="http://schemas.openxmlformats.org/markup-compatibility/2006">
-        <mc:Choice xmlns:p14="http://schemas.microsoft.com/office/powerpoint/2010/main" Requires="p14">
+      <mc:AlternateContent xmlns:mc="http://schemas.openxmlformats.org/markup-compatibility/2006" xmlns:p14="http://schemas.microsoft.com/office/powerpoint/2010/main">
+        <mc:Choice Requires="p14">
           <p:contentPart p14:bwMode="auto" r:id="rId7">
             <p14:nvContentPartPr>
               <p14:cNvPr id="22" name="Ink 21">
@@ -15826,7 +15812,7 @@
             </p14:xfrm>
           </p:contentPart>
         </mc:Choice>
-        <mc:Fallback>
+        <mc:Fallback xmlns="">
           <p:pic>
             <p:nvPicPr>
               <p:cNvPr id="22" name="Ink 21">
@@ -15857,8 +15843,8 @@
           </p:pic>
         </mc:Fallback>
       </mc:AlternateContent>
-      <mc:AlternateContent xmlns:mc="http://schemas.openxmlformats.org/markup-compatibility/2006">
-        <mc:Choice xmlns:p14="http://schemas.microsoft.com/office/powerpoint/2010/main" Requires="p14">
+      <mc:AlternateContent xmlns:mc="http://schemas.openxmlformats.org/markup-compatibility/2006" xmlns:p14="http://schemas.microsoft.com/office/powerpoint/2010/main">
+        <mc:Choice Requires="p14">
           <p:contentPart p14:bwMode="auto" r:id="rId9">
             <p14:nvContentPartPr>
               <p14:cNvPr id="34" name="Ink 33">
@@ -15877,7 +15863,7 @@
             </p14:xfrm>
           </p:contentPart>
         </mc:Choice>
-        <mc:Fallback>
+        <mc:Fallback xmlns="">
           <p:pic>
             <p:nvPicPr>
               <p:cNvPr id="34" name="Ink 33">
@@ -15908,8 +15894,8 @@
           </p:pic>
         </mc:Fallback>
       </mc:AlternateContent>
-      <mc:AlternateContent xmlns:mc="http://schemas.openxmlformats.org/markup-compatibility/2006">
-        <mc:Choice xmlns:p14="http://schemas.microsoft.com/office/powerpoint/2010/main" Requires="p14">
+      <mc:AlternateContent xmlns:mc="http://schemas.openxmlformats.org/markup-compatibility/2006" xmlns:p14="http://schemas.microsoft.com/office/powerpoint/2010/main">
+        <mc:Choice Requires="p14">
           <p:contentPart p14:bwMode="auto" r:id="rId11">
             <p14:nvContentPartPr>
               <p14:cNvPr id="35" name="Ink 34">
@@ -15928,7 +15914,7 @@
             </p14:xfrm>
           </p:contentPart>
         </mc:Choice>
-        <mc:Fallback>
+        <mc:Fallback xmlns="">
           <p:pic>
             <p:nvPicPr>
               <p:cNvPr id="35" name="Ink 34">
@@ -15959,8 +15945,8 @@
           </p:pic>
         </mc:Fallback>
       </mc:AlternateContent>
-      <mc:AlternateContent xmlns:mc="http://schemas.openxmlformats.org/markup-compatibility/2006">
-        <mc:Choice xmlns:p14="http://schemas.microsoft.com/office/powerpoint/2010/main" Requires="p14">
+      <mc:AlternateContent xmlns:mc="http://schemas.openxmlformats.org/markup-compatibility/2006" xmlns:p14="http://schemas.microsoft.com/office/powerpoint/2010/main">
+        <mc:Choice Requires="p14">
           <p:contentPart p14:bwMode="auto" r:id="rId13">
             <p14:nvContentPartPr>
               <p14:cNvPr id="36" name="Ink 35">
@@ -15979,7 +15965,7 @@
             </p14:xfrm>
           </p:contentPart>
         </mc:Choice>
-        <mc:Fallback>
+        <mc:Fallback xmlns="">
           <p:pic>
             <p:nvPicPr>
               <p:cNvPr id="36" name="Ink 35">
@@ -16010,8 +15996,8 @@
           </p:pic>
         </mc:Fallback>
       </mc:AlternateContent>
-      <mc:AlternateContent xmlns:mc="http://schemas.openxmlformats.org/markup-compatibility/2006">
-        <mc:Choice xmlns:p14="http://schemas.microsoft.com/office/powerpoint/2010/main" Requires="p14">
+      <mc:AlternateContent xmlns:mc="http://schemas.openxmlformats.org/markup-compatibility/2006" xmlns:p14="http://schemas.microsoft.com/office/powerpoint/2010/main">
+        <mc:Choice Requires="p14">
           <p:contentPart p14:bwMode="auto" r:id="rId15">
             <p14:nvContentPartPr>
               <p14:cNvPr id="37" name="Ink 36">
@@ -16030,7 +16016,7 @@
             </p14:xfrm>
           </p:contentPart>
         </mc:Choice>
-        <mc:Fallback>
+        <mc:Fallback xmlns="">
           <p:pic>
             <p:nvPicPr>
               <p:cNvPr id="37" name="Ink 36">
@@ -16285,8 +16271,8 @@
           </a:prstGeom>
         </p:spPr>
       </p:pic>
-      <mc:AlternateContent xmlns:mc="http://schemas.openxmlformats.org/markup-compatibility/2006">
-        <mc:Choice xmlns:p14="http://schemas.microsoft.com/office/powerpoint/2010/main" Requires="p14">
+      <mc:AlternateContent xmlns:mc="http://schemas.openxmlformats.org/markup-compatibility/2006" xmlns:p14="http://schemas.microsoft.com/office/powerpoint/2010/main">
+        <mc:Choice Requires="p14">
           <p:contentPart p14:bwMode="auto" r:id="rId5">
             <p14:nvContentPartPr>
               <p14:cNvPr id="63" name="Ink 62">
@@ -16305,7 +16291,7 @@
             </p14:xfrm>
           </p:contentPart>
         </mc:Choice>
-        <mc:Fallback>
+        <mc:Fallback xmlns="">
           <p:pic>
             <p:nvPicPr>
               <p:cNvPr id="63" name="Ink 62">
@@ -16630,7 +16616,14 @@
             </a:br>
             <a:r>
               <a:rPr lang="nl-BE" dirty="0"/>
-              <a:t>	with    </a:t>
+              <a:t>	with</a:t>
+            </a:r>
+            <a:br>
+              <a:rPr lang="nl-BE" dirty="0"/>
+            </a:br>
+            <a:r>
+              <a:rPr lang="nl-BE" dirty="0"/>
+              <a:t>    </a:t>
             </a:r>
           </a:p>
           <a:p>
@@ -16668,36 +16661,6 @@
               <a:rPr lang="nl-BE" dirty="0"/>
               <a:t>	with: </a:t>
             </a:r>
-          </a:p>
-          <a:p>
-            <a:r>
-              <a:rPr lang="nl-BE" dirty="0" err="1"/>
-              <a:t>Gaussian</a:t>
-            </a:r>
-            <a:r>
-              <a:rPr lang="nl-BE" dirty="0"/>
-              <a:t> </a:t>
-            </a:r>
-            <a:r>
-              <a:rPr lang="nl-BE" dirty="0" err="1"/>
-              <a:t>quadrature</a:t>
-            </a:r>
-            <a:r>
-              <a:rPr lang="nl-BE" dirty="0"/>
-              <a:t> of </a:t>
-            </a:r>
-            <a:r>
-              <a:rPr lang="nl-BE" dirty="0" err="1"/>
-              <a:t>degree</a:t>
-            </a:r>
-            <a:r>
-              <a:rPr lang="nl-BE" dirty="0"/>
-              <a:t> 1</a:t>
-            </a:r>
-            <a:br>
-              <a:rPr lang="nl-BE" dirty="0"/>
-            </a:br>
-            <a:endParaRPr lang="nl-BE" dirty="0"/>
           </a:p>
         </p:txBody>
       </p:sp>
@@ -16888,7 +16851,7 @@
         </p:blipFill>
         <p:spPr>
           <a:xfrm>
-            <a:off x="2380377" y="3825923"/>
+            <a:off x="2381446" y="4284115"/>
             <a:ext cx="3735292" cy="859676"/>
           </a:xfrm>
           <a:prstGeom prst="rect">
@@ -16956,39 +16919,9 @@
           </a:prstGeom>
         </p:spPr>
       </p:pic>
-      <p:pic>
-        <p:nvPicPr>
-          <p:cNvPr id="60" name="Picture 59">
-            <a:extLst>
-              <a:ext uri="{FF2B5EF4-FFF2-40B4-BE49-F238E27FC236}">
-                <a16:creationId xmlns:a16="http://schemas.microsoft.com/office/drawing/2014/main" id="{5398C1D9-6FAF-4D9E-B216-74EB40788669}"/>
-              </a:ext>
-            </a:extLst>
-          </p:cNvPr>
-          <p:cNvPicPr>
-            <a:picLocks noChangeAspect="1"/>
-          </p:cNvPicPr>
-          <p:nvPr/>
-        </p:nvPicPr>
-        <p:blipFill>
-          <a:blip r:embed="rId7"/>
-          <a:stretch>
-            <a:fillRect/>
-          </a:stretch>
-        </p:blipFill>
-        <p:spPr>
-          <a:xfrm>
-            <a:off x="1429391" y="5127184"/>
-            <a:ext cx="3081620" cy="597674"/>
-          </a:xfrm>
-          <a:prstGeom prst="rect">
-            <a:avLst/>
-          </a:prstGeom>
-        </p:spPr>
-      </p:pic>
-      <mc:AlternateContent xmlns:mc="http://schemas.openxmlformats.org/markup-compatibility/2006">
-        <mc:Choice xmlns:p14="http://schemas.microsoft.com/office/powerpoint/2010/main" Requires="p14">
-          <p:contentPart p14:bwMode="auto" r:id="rId8">
+      <mc:AlternateContent xmlns:mc="http://schemas.openxmlformats.org/markup-compatibility/2006" xmlns:p14="http://schemas.microsoft.com/office/powerpoint/2010/main">
+        <mc:Choice Requires="p14">
+          <p:contentPart p14:bwMode="auto" r:id="rId7">
             <p14:nvContentPartPr>
               <p14:cNvPr id="61" name="Ink 60">
                 <a:extLst>
@@ -17006,7 +16939,7 @@
             </p14:xfrm>
           </p:contentPart>
         </mc:Choice>
-        <mc:Fallback>
+        <mc:Fallback xmlns="">
           <p:pic>
             <p:nvPicPr>
               <p:cNvPr id="61" name="Ink 60">
@@ -17037,8 +16970,8 @@
           </p:pic>
         </mc:Fallback>
       </mc:AlternateContent>
-      <mc:AlternateContent xmlns:mc="http://schemas.openxmlformats.org/markup-compatibility/2006">
-        <mc:Choice xmlns:p14="http://schemas.microsoft.com/office/powerpoint/2010/main" Requires="p14">
+      <mc:AlternateContent xmlns:mc="http://schemas.openxmlformats.org/markup-compatibility/2006" xmlns:p14="http://schemas.microsoft.com/office/powerpoint/2010/main">
+        <mc:Choice Requires="p14">
           <p:contentPart p14:bwMode="auto" r:id="rId10">
             <p14:nvContentPartPr>
               <p14:cNvPr id="62" name="Ink 61">
@@ -17057,7 +16990,7 @@
             </p14:xfrm>
           </p:contentPart>
         </mc:Choice>
-        <mc:Fallback>
+        <mc:Fallback xmlns="">
           <p:pic>
             <p:nvPicPr>
               <p:cNvPr id="62" name="Ink 61">
@@ -17088,8 +17021,8 @@
           </p:pic>
         </mc:Fallback>
       </mc:AlternateContent>
-      <mc:AlternateContent xmlns:mc="http://schemas.openxmlformats.org/markup-compatibility/2006">
-        <mc:Choice xmlns:p14="http://schemas.microsoft.com/office/powerpoint/2010/main" Requires="p14">
+      <mc:AlternateContent xmlns:mc="http://schemas.openxmlformats.org/markup-compatibility/2006" xmlns:p14="http://schemas.microsoft.com/office/powerpoint/2010/main">
+        <mc:Choice Requires="p14">
           <p:contentPart p14:bwMode="auto" r:id="rId12">
             <p14:nvContentPartPr>
               <p14:cNvPr id="63" name="Ink 62">
@@ -17108,7 +17041,7 @@
             </p14:xfrm>
           </p:contentPart>
         </mc:Choice>
-        <mc:Fallback>
+        <mc:Fallback xmlns="">
           <p:pic>
             <p:nvPicPr>
               <p:cNvPr id="63" name="Ink 62">
@@ -17139,8 +17072,8 @@
           </p:pic>
         </mc:Fallback>
       </mc:AlternateContent>
-      <mc:AlternateContent xmlns:mc="http://schemas.openxmlformats.org/markup-compatibility/2006">
-        <mc:Choice xmlns:p14="http://schemas.microsoft.com/office/powerpoint/2010/main" Requires="p14">
+      <mc:AlternateContent xmlns:mc="http://schemas.openxmlformats.org/markup-compatibility/2006" xmlns:p14="http://schemas.microsoft.com/office/powerpoint/2010/main">
+        <mc:Choice Requires="p14">
           <p:contentPart p14:bwMode="auto" r:id="rId14">
             <p14:nvContentPartPr>
               <p14:cNvPr id="64" name="Ink 63">
@@ -17159,7 +17092,7 @@
             </p14:xfrm>
           </p:contentPart>
         </mc:Choice>
-        <mc:Fallback>
+        <mc:Fallback xmlns="">
           <p:pic>
             <p:nvPicPr>
               <p:cNvPr id="64" name="Ink 63">
@@ -17190,8 +17123,8 @@
           </p:pic>
         </mc:Fallback>
       </mc:AlternateContent>
-      <mc:AlternateContent xmlns:mc="http://schemas.openxmlformats.org/markup-compatibility/2006">
-        <mc:Choice xmlns:p14="http://schemas.microsoft.com/office/powerpoint/2010/main" Requires="p14">
+      <mc:AlternateContent xmlns:mc="http://schemas.openxmlformats.org/markup-compatibility/2006" xmlns:p14="http://schemas.microsoft.com/office/powerpoint/2010/main">
+        <mc:Choice Requires="p14">
           <p:contentPart p14:bwMode="auto" r:id="rId16">
             <p14:nvContentPartPr>
               <p14:cNvPr id="65" name="Ink 64">
@@ -17210,7 +17143,7 @@
             </p14:xfrm>
           </p:contentPart>
         </mc:Choice>
-        <mc:Fallback>
+        <mc:Fallback xmlns="">
           <p:pic>
             <p:nvPicPr>
               <p:cNvPr id="65" name="Ink 64">
@@ -17241,8 +17174,8 @@
           </p:pic>
         </mc:Fallback>
       </mc:AlternateContent>
-      <mc:AlternateContent xmlns:mc="http://schemas.openxmlformats.org/markup-compatibility/2006">
-        <mc:Choice xmlns:p14="http://schemas.microsoft.com/office/powerpoint/2010/main" Requires="p14">
+      <mc:AlternateContent xmlns:mc="http://schemas.openxmlformats.org/markup-compatibility/2006" xmlns:p14="http://schemas.microsoft.com/office/powerpoint/2010/main">
+        <mc:Choice Requires="p14">
           <p:contentPart p14:bwMode="auto" r:id="rId18">
             <p14:nvContentPartPr>
               <p14:cNvPr id="66" name="Ink 65">
@@ -17261,7 +17194,7 @@
             </p14:xfrm>
           </p:contentPart>
         </mc:Choice>
-        <mc:Fallback>
+        <mc:Fallback xmlns="">
           <p:pic>
             <p:nvPicPr>
               <p:cNvPr id="66" name="Ink 65">
@@ -17292,8 +17225,8 @@
           </p:pic>
         </mc:Fallback>
       </mc:AlternateContent>
-      <mc:AlternateContent xmlns:mc="http://schemas.openxmlformats.org/markup-compatibility/2006">
-        <mc:Choice xmlns:p14="http://schemas.microsoft.com/office/powerpoint/2010/main" Requires="p14">
+      <mc:AlternateContent xmlns:mc="http://schemas.openxmlformats.org/markup-compatibility/2006" xmlns:p14="http://schemas.microsoft.com/office/powerpoint/2010/main">
+        <mc:Choice Requires="p14">
           <p:contentPart p14:bwMode="auto" r:id="rId20">
             <p14:nvContentPartPr>
               <p14:cNvPr id="67" name="Ink 66">
@@ -17312,7 +17245,7 @@
             </p14:xfrm>
           </p:contentPart>
         </mc:Choice>
-        <mc:Fallback>
+        <mc:Fallback xmlns="">
           <p:pic>
             <p:nvPicPr>
               <p:cNvPr id="67" name="Ink 66">
@@ -17343,8 +17276,8 @@
           </p:pic>
         </mc:Fallback>
       </mc:AlternateContent>
-      <mc:AlternateContent xmlns:mc="http://schemas.openxmlformats.org/markup-compatibility/2006">
-        <mc:Choice xmlns:p14="http://schemas.microsoft.com/office/powerpoint/2010/main" Requires="p14">
+      <mc:AlternateContent xmlns:mc="http://schemas.openxmlformats.org/markup-compatibility/2006" xmlns:p14="http://schemas.microsoft.com/office/powerpoint/2010/main">
+        <mc:Choice Requires="p14">
           <p:contentPart p14:bwMode="auto" r:id="rId22">
             <p14:nvContentPartPr>
               <p14:cNvPr id="68" name="Ink 67">
@@ -17363,7 +17296,7 @@
             </p14:xfrm>
           </p:contentPart>
         </mc:Choice>
-        <mc:Fallback>
+        <mc:Fallback xmlns="">
           <p:pic>
             <p:nvPicPr>
               <p:cNvPr id="68" name="Ink 67">
@@ -17394,8 +17327,8 @@
           </p:pic>
         </mc:Fallback>
       </mc:AlternateContent>
-      <mc:AlternateContent xmlns:mc="http://schemas.openxmlformats.org/markup-compatibility/2006">
-        <mc:Choice xmlns:p14="http://schemas.microsoft.com/office/powerpoint/2010/main" Requires="p14">
+      <mc:AlternateContent xmlns:mc="http://schemas.openxmlformats.org/markup-compatibility/2006" xmlns:p14="http://schemas.microsoft.com/office/powerpoint/2010/main">
+        <mc:Choice Requires="p14">
           <p:contentPart p14:bwMode="auto" r:id="rId24">
             <p14:nvContentPartPr>
               <p14:cNvPr id="69" name="Ink 68">
@@ -17414,7 +17347,7 @@
             </p14:xfrm>
           </p:contentPart>
         </mc:Choice>
-        <mc:Fallback>
+        <mc:Fallback xmlns="">
           <p:pic>
             <p:nvPicPr>
               <p:cNvPr id="69" name="Ink 68">
@@ -17587,8 +17520,8 @@
           </a:prstGeom>
         </p:spPr>
       </p:pic>
-      <mc:AlternateContent xmlns:mc="http://schemas.openxmlformats.org/markup-compatibility/2006">
-        <mc:Choice xmlns:p14="http://schemas.microsoft.com/office/powerpoint/2010/main" Requires="p14">
+      <mc:AlternateContent xmlns:mc="http://schemas.openxmlformats.org/markup-compatibility/2006" xmlns:p14="http://schemas.microsoft.com/office/powerpoint/2010/main">
+        <mc:Choice Requires="p14">
           <p:contentPart p14:bwMode="auto" r:id="rId29">
             <p14:nvContentPartPr>
               <p14:cNvPr id="82" name="Ink 81">
@@ -17607,7 +17540,7 @@
             </p14:xfrm>
           </p:contentPart>
         </mc:Choice>
-        <mc:Fallback>
+        <mc:Fallback xmlns="">
           <p:pic>
             <p:nvPicPr>
               <p:cNvPr id="82" name="Ink 81">

</xml_diff>

<commit_message>
Finished version to be handed in
</commit_message>
<xml_diff>
--- a/PearProjectPresentation.pptx
+++ b/PearProjectPresentation.pptx
@@ -6,10 +6,10 @@
     <p:sldMasterId id="2147483694" r:id="rId2"/>
   </p:sldMasterIdLst>
   <p:notesMasterIdLst>
-    <p:notesMasterId r:id="rId22"/>
+    <p:notesMasterId r:id="rId23"/>
   </p:notesMasterIdLst>
   <p:handoutMasterIdLst>
-    <p:handoutMasterId r:id="rId23"/>
+    <p:handoutMasterId r:id="rId24"/>
   </p:handoutMasterIdLst>
   <p:sldIdLst>
     <p:sldId id="261" r:id="rId3"/>
@@ -30,7 +30,8 @@
     <p:sldId id="299" r:id="rId18"/>
     <p:sldId id="306" r:id="rId19"/>
     <p:sldId id="300" r:id="rId20"/>
-    <p:sldId id="270" r:id="rId21"/>
+    <p:sldId id="308" r:id="rId21"/>
+    <p:sldId id="270" r:id="rId22"/>
   </p:sldIdLst>
   <p:sldSz cx="12192000" cy="6858000"/>
   <p:notesSz cx="6858000" cy="9144000"/>
@@ -222,7 +223,7 @@
           <a:p>
             <a:fld id="{8F591CCF-F6FD-734B-854A-5BC033593B1E}" type="datetimeFigureOut">
               <a:rPr lang="nl-NL" smtClean="0"/>
-              <a:t>8-4-2019</a:t>
+              <a:t>9-4-2019</a:t>
             </a:fld>
             <a:endParaRPr lang="nl-NL"/>
           </a:p>
@@ -600,7 +601,7 @@
     </inkml:brush>
   </inkml:definitions>
   <inkml:trace contextRef="#ctx0" brushRef="#br0">10 141 4736,'-9'-4'6901,"11"-6"-6485,0 4-311,1-1 0,0 1 0,0 0 0,0 0-1,0 0 1,1 0 0,0 1 0,1-1 0,-1 1 0,1 0 0,0 1 0,0-1-1,0 1 1,1 0 0,0 0 0,-1 0 0,1 1 0,1 0 0,-1 0 0,0 1 0,3-1-105,5-2-70,-9 2 76,0 1 1,0-1 0,0 1 0,0 0-1,0 1 1,0-1 0,1 1 0,-1 0-1,0 0 1,1 1 0,-1-1 0,0 1-1,1 1 1,-1-1 0,1 1 0,-1 0-1,0 0 1,1 0 0,-1 1 0,0 0-1,0 0 1,0 0 0,1 1-7,-5 0 8,0 1 0,0-1-1,0 0 1,0 1 0,-1-1 0,1 1 0,-1-1-1,0 1 1,0-1 0,0 1 0,-1-1 0,1 1-1,-1-1 1,0 0 0,0 1 0,0-1 0,0 0 0,-1 0-1,1 1 1,-1-1 0,0 0 0,0-1 0,0 1-1,0 0 1,0-1 0,-1 1 0,1-1 0,-1 1 0,-1 0-8,-10 17 72,4-4-56,1 1 0,1 1 0,1-1 0,0 2 0,1-1 0,1 0 0,1 1 0,0 0 0,2 0 0,0 1 0,1-1 0,1 0 0,2 10-16,-2-25 18,0 0 1,1 0 0,-1 0-1,1 0 1,0 0 0,0 0-1,1 0 1,-1 0 0,1 0-1,0-1 1,-1 1 0,2-1-1,-1 1 1,0-1 0,1 0-1,0 0 1,-1 0 0,1 0-1,1 0 1,-1-1 0,0 1-1,0-1 1,1 0 0,0 0-1,-1 0 1,1-1 0,0 1-1,0-1 1,0 0 0,1 0-19,14 2-77,1 0 0,1-2 0,-1 0 0,0-1 1,19-3 76,-9-4-3340,-3-3-3299,-16 5 3546</inkml:trace>
-  <inkml:trace contextRef="#ctx0" brushRef="#br0" timeOffset="1063.141">520 160 3712,'4'10'6716,"7"-6"-3344,35-8-3021,-32 2 159,56-2-126,-62 3-34,0 0-1604,-9 1-5261,-1 0 3913</inkml:trace>
+  <inkml:trace contextRef="#ctx0" brushRef="#br0" timeOffset="1063.14">520 160 3712,'4'10'6716,"7"-6"-3344,35-8-3021,-32 2 159,56-2-126,-62 3-34,0 0-1604,-9 1-5261,-1 0 3913</inkml:trace>
   <inkml:trace contextRef="#ctx0" brushRef="#br0" timeOffset="1779.815">553 259 4352,'0'3'4284,"2"6"-1507,108 1 956,-53-2-2714,-47-5-2278,-1 0-3631,-8-3 3098</inkml:trace>
 </inkml:ink>
 </file>
@@ -967,7 +968,7 @@
   </inkml:definitions>
   <inkml:trace contextRef="#ctx0" brushRef="#br0">203 221 4864,'38'-31'7466,"-55"46"-3807,-90 43-1830,97-51-1845,0 1-1,1 0 1,0 0 0,0 1-1,1 0 1,0 0 0,1 1-1,0 0 1,0 1 0,1-1-1,1 1 1,0 1 0,0-1-1,1 1 1,0-1 0,1 1 16,3-5-14,-1 0 1,1 0-1,1 0 1,-1-1-1,1 1 1,1 0-1,-1-1 1,1 1-1,0-1 1,0 1-1,1-1 0,0 0 1,0 0-1,0 0 1,1 0-1,0-1 1,0 0-1,1 1 1,-1-1-1,1-1 1,0 1-1,0-1 1,1 0-1,-1 0 1,6 3 13,65 17-2531,-19-34-3773,-43 2 3808</inkml:trace>
   <inkml:trace contextRef="#ctx0" brushRef="#br0" timeOffset="565.764">448 10 4736,'0'-10'8731,"0"24"-6948,2 11-1796,14 67-1656,-15-89 692,-3-2-7086,1-3 5359</inkml:trace>
-  <inkml:trace contextRef="#ctx0" brushRef="#br0" timeOffset="960.916">382 116 5888,'19'-6'8084,"9"-18"-6156,-8 7-1679,14-3 23,-3 2-573,-12 4-2849,-18 11-1292,-1 2 1610</inkml:trace>
+  <inkml:trace contextRef="#ctx0" brushRef="#br0" timeOffset="960.915">382 116 5888,'19'-6'8084,"9"-18"-6156,-8 7-1679,14-3 23,-3 2-573,-12 4-2849,-18 11-1292,-1 2 1610</inkml:trace>
   <inkml:trace contextRef="#ctx0" brushRef="#br0" timeOffset="1364.878">398 23 6400,'-24'-15'4997,"24"15"-4165,0 0-240,38 26 0,-22-19-582,-1 1 0,0 1 0,0 0 0,-1 1-1,0 0 1,-1 2 0,3 2-10,2-2-574,-8-7-1683,-1 2-4725,-6-4 4657</inkml:trace>
   <inkml:trace contextRef="#ctx0" brushRef="#br0" timeOffset="2684.375">380 632 5248,'-9'17'7872,"1"82"-6694,9-84-1192,0 1-1,0-1 0,1 0 1,1 0-1,1 0 0,0 0 1,1 0-1,4 6 15,-9-20 15,1 0 0,-1 0 0,0 0 1,1 0-1,0 0 0,-1 0 0,1 0 0,0 0 1,-1 0-1,1 0 0,0 0 0,0 0 0,0-1 0,0 1 1,-1 0-1,1-1 0,0 1 0,0 0 0,1-1 0,-1 1 1,0-1-1,0 0 0,0 1 0,0-1 0,0 0 1,0 0-1,1 0 0,-1 0 0,0 0 0,0 0 0,0 0 1,0 0-1,0 0 0,1 0 0,-1-1 0,0 1 1,0 0-1,0-1 0,0 1 0,0-1 0,0 1 0,0-1 1,0 0-16,37-37 2008,-7-58-806,-25 69-3677,2 1-3420,-7 22 3325,1 1-22</inkml:trace>
 </inkml:ink>
@@ -1025,7 +1026,7 @@
     </inkml:brush>
   </inkml:definitions>
   <inkml:trace contextRef="#ctx0" brushRef="#br0">264 123 3456,'-5'3'8078,"-9"5"-4725,0 1-2299,-8 2 391,15-9-1422,0 1-1,0-1 1,0 1-1,1 1 1,-1-1-1,1 1 1,0 1-1,0-1 1,0 1-1,1 0 1,0 0-1,0 0 1,0 1-1,0 0 1,1 0-1,0 0 1,0 0-1,1 1 0,0-1 1,0 1-1,0 0 1,1 0-1,0 2-22,3-5-60,0 1 0,1-1 0,-1 1-1,1-1 1,0 0 0,1 0 0,-1 0-1,1 0 1,-1 0 0,1 0 0,1-1 0,-1 0-1,0 1 1,1-1 0,-1 0 0,1-1-1,0 1 1,0-1 0,0 1 0,1-1-1,-1 0 1,0-1 0,1 1 0,-1-1-1,1 0 1,-1 0 0,3 0 60,73-4-528,-80 3 581,0 0-5,0 0 48,-22 7 1397,11-3-1402,3-3-90,-1 0-1,1 1 0,-1 0 1,1 1-1,0 0 0,0 0 0,0 1 1,0 0-1,1 0 0,-1 1 0,1 0 1,0 0-1,1 1 0,-1 0 1,1 0-1,0 0 0,0 1 0,-4 7 0,10-10-9,0-1 0,0 1-1,0-1 1,0 1-1,0 0 1,1-1-1,0 1 1,0-1 0,0 1-1,0-1 1,0 0-1,1 1 1,-1-1-1,1 0 1,0 0-1,0 0 1,0 0 0,0 0-1,1 0 1,-1-1-1,1 1 1,-1-1-1,1 0 1,0 0 0,0 0-1,3 2 10,15 10-31,-12-8 34,1 0 1,-1 1-1,0 0 0,0 1 0,-1 0 0,0 0 1,0 1-1,0 1-3,53 88 661,-61-96-539,0-1-1,1 1 1,-1 0 0,0 0-1,0-1 1,0 1-1,0 0 1,0 0 0,0 0-1,-1-1 1,1 1-1,-1 0 1,1 0 0,-1-1-1,1 1 1,-1 0 0,0-1-1,0 1 1,0-1-1,0 1 1,0-1 0,0 1-1,-1-1 1,1 0-1,0 0 1,-1 0 0,1 1-1,0-1 1,-1 0-1,0-1 1,1 1 0,-1 0-122,-59 19 695,-55-17-2774,78-10-2480,3-6-4200,19 4 4471</inkml:trace>
-  <inkml:trace contextRef="#ctx0" brushRef="#br0" timeOffset="1033.669">242 124 384,'-3'10'10386,"-21"3"-8154,17-13-1942,-1-1 1,1-1-1,-1 1 0,1-1 0,0 0 0,0-1 0,0 0 0,0 0 0,0 0 1,1-1-1,-1 0 0,1 0 0,0-1 0,0 1 0,1-1 0,-1-1 0,-1-1-290,-22-30-2199,9-3-5072,17 29 4183</inkml:trace>
+  <inkml:trace contextRef="#ctx0" brushRef="#br0" timeOffset="1033.668">242 124 384,'-3'10'10386,"-21"3"-8154,17-13-1942,-1-1 1,1-1-1,-1 1 0,1-1 0,0 0 0,0-1 0,0 0 0,0 0 0,0 0 1,1-1-1,-1 0 0,1 0 0,0-1 0,0 1 0,1-1 0,-1-1 0,-1-1-290,-22-30-2199,9-3-5072,17 29 4183</inkml:trace>
 </inkml:ink>
 </file>
 
@@ -1110,7 +1111,7 @@
   <inkml:trace contextRef="#ctx0" brushRef="#br0">65 129 4480,'-5'1'6059,"-17"36"-4502,14-13-971,0-1 1,2 1 0,1 0-1,1 1 1,1 0 0,1-1-1,1 15-586,1-32-23,1 0 0,0 0 0,0 0 0,0 0 0,1 0 0,0 0 0,1 0 0,0 0 0,0-1 0,0 0 0,1 1 0,-1-1 0,2 0 0,-1-1 0,3 4 23,-3-5-446,0 0 1,0 0-1,1 0 1,-1-1 0,1 0-1,0 0 1,0 0-1,0 0 1,0-1 0,0 0-1,0 0 1,5 1 445,5 0-3088</inkml:trace>
   <inkml:trace contextRef="#ctx0" brushRef="#br0" timeOffset="2319.974">628 443 3712,'12'30'4032,"-8"-21"-3105,-1 0 0,0 1 0,0 0 0,-1-1 0,0 1 0,-1 0 0,0 0 1,-1 9-928,0-15 245,0 0 1,0-1-1,0 1 1,-1 0 0,0 0-1,0-1 1,0 1-1,0-1 1,0 1 0,-1-1-1,1 0 1,-1 1-1,0-1 1,0 0 0,0 0-1,-1 0 1,1 0-1,-1-1 1,1 1 0,-1 0-1,0-1 1,0 0-1,0 0 1,0 0 0,-1 0-246,-45 15-355,31-17-3573,3-6-4589,11 3 5008</inkml:trace>
   <inkml:trace contextRef="#ctx0" brushRef="#br0" timeOffset="4002.709">1155 1 5376,'3'3'6753,"6"10"-5048,-1-3-1529,4 5-49,-1 1-1,-1 0 0,-1 0 0,0 1 1,-2 0-1,1 1 0,1 8-126,11 24 658,-16-42-477,-1 1 0,1-1 1,-1 1-1,-1 0 0,1 0 0,-2 0 1,1 0-1,-1 0 0,-1 0 1,1 1-1,-2-1 0,1 0 1,-1 0-1,-1 0 0,1 0 1,-1 0-1,-1 0 0,0 0 1,0-1-1,-1 1 0,-4 6-181,-44 54-2169,11-29-5997,28-29 4614</inkml:trace>
-  <inkml:trace contextRef="#ctx0" brushRef="#br0" timeOffset="46642.296">221 9 4096,'-1'2'172,"0"-1"-1,0 1 1,0 0 0,0-1 0,0 1 0,0 0-1,1 0 1,-1 0 0,1-1 0,-1 1 0,1 0-1,0 0 1,0 0 0,0 0 0,0 0-1,0 0 1,0-1 0,0 1 0,1 0 0,-1 0-1,1 0 1,-1 0 0,1-1 0,0 1-1,0 0 1,0-1 0,0 1 0,0 0 0,0-1-1,0 1 1,0-1 0,1 0 0,-1 1 0,0-1-1,1 0 1,-1 0 0,1 0 0,0 1-172,6 3 154,-1 1 0,2-1 0,-1 0 0,0-1 0,1 0 0,0 0 0,0-1 0,0 0 0,0 0 0,0-1 0,1-1 0,-1 1 0,1-2 0,-1 1 0,1-1 0,3-1-154,-13 1 272,0 0-59,-20 10 731,9-5-959,1 0 0,-1 1 0,1 0 0,0 1 0,0 0 0,1 0 0,0 1 0,1 0 0,-1 1 1,-3 5 14,11-12-13,0-1 0,0 1 0,0 0 0,0 0 1,1-1-1,-1 1 0,1 0 0,-1 0 0,1 0 0,-1 0 1,1 0-1,0 0 0,0 0 0,0 0 0,0-1 1,0 1-1,1 0 0,-1 0 0,0 0 0,1 0 1,-1 0-1,1 0 0,0-1 0,0 1 0,0 0 0,0-1 1,0 1-1,0 0 0,0-1 0,0 1 0,1-1 1,-1 0-1,1 1 0,-1-1 0,1 0 13,1 2 3,1 0 0,0 0-1,0-1 1,0 0 0,0 1-1,0-1 1,0-1 0,1 1-1,-1-1 1,0 1 0,1-1 0,0-1-1,-1 1 1,2-1-3,1 0-43,-7 1 55,0-1-1,0 0 1,-1 0-1,1 0 1,0 0-1,0 1 1,0-1-1,0 0 1,0 0 0,0 1-1,0-1 1,0 0-1,0 0 1,-1 1-1,1-1 1,0 0-1,0 0 1,0 1-1,0-1 1,0 0-1,0 0 1,1 0-1,-1 1 1,0-1-1,0 0 1,0 0-1,0 1 1,0-1 0,0 0-1,0 0 1,0 1-12,-23 11 219,19-12-220,0 1 1,0 0-1,1 1 1,-1-1-1,0 1 1,1 0-1,-1-1 1,1 2-1,-1-1 0,1 0 1,0 1-1,0-1 1,0 1-1,0 0 1,0 0-1,1 0 1,-1 0-1,1 1 1,0-1-1,0 1 1,0-1-1,1 1 0,-1 0 1,1 0-1,0 0 1,0-1-1,0 1 1,0 0-1,1 0 1,-1 0-1,1 2 1,2-3-12,-1 0-1,1-1 1,-1 0 0,1 1-1,0-1 1,0 0-1,0 0 1,0 0 0,0 0-1,0 0 1,1 0-1,-1-1 1,1 1 0,-1-1-1,1 1 1,0-1-1,2 1 13,19 12 174,4 7-172,-21-16 60,0-1 0,0 1 0,0 1 0,-1-1 1,1 1-1,-2 0 0,1 1 0,-1-1 1,1 1-1,-2 0 0,1 0 0,-1 1 1,3 6-63,-7-11 157,1-1 1,-1 1 0,0 0 0,0-1 0,0 1-1,0 0 1,0 0 0,-1-1 0,1 1 0,-1-1-1,0 1 1,0 0 0,0-1 0,0 1 0,0-1 0,0 0-1,-1 1 1,1-1 0,-1 0 0,1 0 0,-1 0-1,0 0 1,0 0 0,0 0 0,0 0 0,0-1-1,0 1 1,-1-1 0,1 0 0,-1 1 0,1-1-1,-1 0 1,0 0-158,-45 16-2145,4-10-5285,30-6 3494</inkml:trace>
+  <inkml:trace contextRef="#ctx0" brushRef="#br0" timeOffset="46642.295">221 9 4096,'-1'2'172,"0"-1"-1,0 1 1,0 0 0,0-1 0,0 1 0,0 0-1,1 0 1,-1 0 0,1-1 0,-1 1 0,1 0-1,0 0 1,0 0 0,0 0 0,0 0-1,0 0 1,0-1 0,0 1 0,1 0 0,-1 0-1,1 0 1,-1 0 0,1-1 0,0 1-1,0 0 1,0-1 0,0 1 0,0 0 0,0-1-1,0 1 1,0-1 0,1 0 0,-1 1 0,0-1-1,1 0 1,-1 0 0,1 0 0,0 1-172,6 3 154,-1 1 0,2-1 0,-1 0 0,0-1 0,1 0 0,0 0 0,0-1 0,0 0 0,0 0 0,0-1 0,1-1 0,-1 1 0,1-2 0,-1 1 0,1-1 0,3-1-154,-13 1 272,0 0-59,-20 10 731,9-5-959,1 0 0,-1 1 0,1 0 0,0 1 0,0 0 0,1 0 0,0 1 0,1 0 0,-1 1 1,-3 5 14,11-12-13,0-1 0,0 1 0,0 0 0,0 0 1,1-1-1,-1 1 0,1 0 0,-1 0 0,1 0 0,-1 0 1,1 0-1,0 0 0,0 0 0,0 0 0,0-1 1,0 1-1,1 0 0,-1 0 0,0 0 0,1 0 1,-1 0-1,1 0 0,0-1 0,0 1 0,0 0 0,0-1 1,0 1-1,0 0 0,0-1 0,0 1 0,1-1 1,-1 0-1,1 1 0,-1-1 0,1 0 13,1 2 3,1 0 0,0 0-1,0-1 1,0 0 0,0 1-1,0-1 1,0-1 0,1 1-1,-1-1 1,0 1 0,1-1 0,0-1-1,-1 1 1,2-1-3,1 0-43,-7 1 55,0-1-1,0 0 1,-1 0-1,1 0 1,0 0-1,0 1 1,0-1-1,0 0 1,0 0 0,0 1-1,0-1 1,0 0-1,0 0 1,-1 1-1,1-1 1,0 0-1,0 0 1,0 1-1,0-1 1,0 0-1,0 0 1,1 0-1,-1 1 1,0-1-1,0 0 1,0 0-1,0 1 1,0-1 0,0 0-1,0 0 1,0 1-12,-23 11 219,19-12-220,0 1 1,0 0-1,1 1 1,-1-1-1,0 1 1,1 0-1,-1-1 1,1 2-1,-1-1 0,1 0 1,0 1-1,0-1 1,0 1-1,0 0 1,0 0-1,1 0 1,-1 0-1,1 1 1,0-1-1,0 1 1,0-1-1,1 1 0,-1 0 1,1 0-1,0 0 1,0-1-1,0 1 1,0 0-1,1 0 1,-1 0-1,1 2 1,2-3-12,-1 0-1,1-1 1,-1 0 0,1 1-1,0-1 1,0 0-1,0 0 1,0 0 0,0 0-1,0 0 1,1 0-1,-1-1 1,1 1 0,-1-1-1,1 1 1,0-1-1,2 1 13,19 12 174,4 7-172,-21-16 60,0-1 0,0 1 0,0 1 0,-1-1 1,1 1-1,-2 0 0,1 1 0,-1-1 1,1 1-1,-2 0 0,1 0 0,-1 1 1,3 6-63,-7-11 157,1-1 1,-1 1 0,0 0 0,0-1 0,0 1-1,0 0 1,0 0 0,-1-1 0,1 1 0,-1-1-1,0 1 1,0 0 0,0-1 0,0 1 0,0-1 0,0 0-1,-1 1 1,1-1 0,-1 0 0,1 0 0,-1 0-1,0 0 1,0 0 0,0 0 0,0 0 0,0-1-1,0 1 1,-1-1 0,1 0 0,-1 1 0,1-1-1,-1 0 1,0 0-158,-45 16-2145,4-10-5285,30-6 3494</inkml:trace>
   <inkml:trace contextRef="#ctx0" brushRef="#br0" timeOffset="49902.607">806 208 6144,'0'4'5527,"2"7"-5300,39 116 979,-41-127-1113,1 0 0,-1 0 0,0-1 1,0 1-1,1 0 0,-1 0 0,0 0 1,1 0-1,-1 0 0,0 0 1,0 0-1,1 0 0,-1 0 0,0 0 1,0 1-1,1-1 0,-1 0 0,0 0 1,0 0-1,1 0 0,-1 0 0,0 0 1,0 1-1,1-1 0,-1 0 1,0 0-1,0 0 0,0 1 0,1-1 1,-1 0-1,0 0 0,0 0-93,-2-29 1026,0 24-1027,0-1 1,1 0-1,0 0 0,0 1 1,0-1-1,1 0 0,0 0 1,0 0-1,0 0 0,1 0 0,0 0 1,0 1-1,0-1 0,1 0 1,0 1-1,0-1 0,0 1 1,1-1-1,0 1 0,0 0 1,0 0-1,1 0 0,2-2 1,-4 7-3,1 1 0,-1-1 0,0 1-1,0 0 1,0 0 0,1 0 0,-1 0 0,0 0 0,-1 1-1,1-1 1,0 1 0,0-1 0,0 1 0,-1-1-1,1 1 1,-1 0 0,1 0 0,-1 0 0,0 0 0,0 0-1,0 0 1,0 0 0,0 0 0,0 1 0,0 1 3,-1-3 4,14 36-112,-1 1-1,-2 0 0,-2 1 1,-2 0-1,-1 0 0,-2 1 0,-2-1 1,-2 1-1,-1 9 109,3 41-691,0-20-3485,-2-53 774</inkml:trace>
 </inkml:ink>
 </file>
@@ -1170,7 +1171,7 @@
     </inkml:brush>
   </inkml:definitions>
   <inkml:trace contextRef="#ctx0" brushRef="#br0">12258 2070 7552,'2'-1'2448,"87"-39"-3478,-33 25 1265,0 2 0,1 3 0,1 2-1,-1 3 1,1 2 0,22 3-235,-64 0 58,689 13 238,-141 1 389,722-69-1389,-1224 50-373,-15-2-1520</inkml:trace>
-  <inkml:trace contextRef="#ctx0" brushRef="#br0" timeOffset="929.844">13138 2787 5120,'6'-3'466,"0"0"-1,-1 0 1,1-1 0,-1 0 0,0 0-1,0 0 1,0 0 0,0-1 0,-1 0-1,0 0 1,0 0 0,1-2-466,-3 4-10,-1 0-1,1 0 1,-1 1-1,0-1 1,0 0-1,0 0 1,0-1-1,0 1 1,-1 0-1,1 0 1,-1 0-1,0 0 1,0-1-1,0 1 1,-1 0 0,1 0-1,-1 0 1,1 0-1,-1 0 1,0-1-1,0 1 1,0 1-1,-1-1 1,1 0-1,-1 0 1,0 0-1,-1-2 11,-2 0 45,1 0 0,0 1-1,-1-1 1,0 1 0,0 0-1,0 0 1,-1 0-1,1 1 1,-1 0 0,0 0-1,0 0 1,0 1 0,0 0-1,0 0 1,-1 0 0,1 1-1,-1 0 1,1 0 0,-1 1-1,1 0 1,-1 0-1,1 0 1,-1 1 0,1 0-1,-1 0 1,1 1 0,-1 0-45,-1 0-15,0 1 0,-1 0 0,1 0 0,1 1 1,-1 0-1,0 0 0,1 1 0,0 0 0,0 0 0,0 1 1,1 0-1,0 0 0,-2 3 15,6-7 26,-1 1 0,1 1-1,-1-1 1,1 0 0,0 0 0,0 1 0,1-1-1,-1 1 1,1 0 0,0 0 0,0-1 0,0 1-1,0 0 1,0 0 0,1 0 0,0 0 0,0 0-1,0 0 1,0 0 0,1-1 0,-1 1 0,1 0-1,0 0 1,0 0 0,1-1 0,-1 1 0,1 0-1,0-1 1,-1 1 0,2 0-26,2 3 38,1-1 0,0 1 1,0-1-1,0-1 0,1 1 1,-1-1-1,1 0 0,1 0 0,-1-1 1,1 0-1,-1 0 0,1-1 0,0 0 1,0-1-1,1 1 0,-1-2 0,0 1 1,1-1-1,3 0-38,6 0 3,0 0 0,0-2 0,0 0 0,0-1 1,0-1-1,0 0 0,-1-1 0,14-6-3,-22 7 19,0-2 1,1 1-1,-2-2 1,1 1-1,-1-1 1,1 0-1,-2-1 1,1 1-1,-1-2 1,0 1-1,0-1 1,-1 0-1,0 0 1,-1-1-1,0 0 0,0 0 1,0 0-1,-2 0 1,1-1-1,-1 0 1,0 0-1,-1 0 1,1-6-20,-1 0 104,0 0 0,-1 0 0,0 0 0,-1 0 0,-1 0 0,-1 0 0,0 1 0,-1-1 0,-1 1 0,0-1 0,-1 1 0,-1 0 0,0 0 0,-8-12-104,4 13-91,0 2 1,-1-1-1,0 1 0,-1 1 1,0 0-1,-1 1 0,-1 0 1,1 1-1,-1 0 0,-1 1 1,1 1-1,-2 0 0,1 1 1,0 1-1,-1 0 0,0 1 1,0 1-1,-1 1 0,1 0 1,0 1-1,-1 0 0,1 2 1,-1 0-1,1 1 0,0 0 1,-1 1-1,1 1 0,-4 2 91,-183 65-6058,172-55 3087,12 0 918</inkml:trace>
+  <inkml:trace contextRef="#ctx0" brushRef="#br0" timeOffset="929.843">13138 2787 5120,'6'-3'466,"0"0"-1,-1 0 1,1-1 0,-1 0 0,0 0-1,0 0 1,0 0 0,0-1 0,-1 0-1,0 0 1,0 0 0,1-2-466,-3 4-10,-1 0-1,1 0 1,-1 1-1,0-1 1,0 0-1,0 0 1,0-1-1,0 1 1,-1 0-1,1 0 1,-1 0-1,0 0 1,0-1-1,0 1 1,-1 0 0,1 0-1,-1 0 1,1 0-1,-1 0 1,0-1-1,0 1 1,0 1-1,-1-1 1,1 0-1,-1 0 1,0 0-1,-1-2 11,-2 0 45,1 0 0,0 1-1,-1-1 1,0 1 0,0 0-1,0 0 1,-1 0-1,1 1 1,-1 0 0,0 0-1,0 0 1,0 1 0,0 0-1,0 0 1,-1 0 0,1 1-1,-1 0 1,1 0 0,-1 1-1,1 0 1,-1 0-1,1 0 1,-1 1 0,1 0-1,-1 0 1,1 1 0,-1 0-45,-1 0-15,0 1 0,-1 0 0,1 0 0,1 1 1,-1 0-1,0 0 0,1 1 0,0 0 0,0 0 0,0 1 1,1 0-1,0 0 0,-2 3 15,6-7 26,-1 1 0,1 1-1,-1-1 1,1 0 0,0 0 0,0 1 0,1-1-1,-1 1 1,1 0 0,0 0 0,0-1 0,0 1-1,0 0 1,0 0 0,1 0 0,0 0 0,0 0-1,0 0 1,0 0 0,1-1 0,-1 1 0,1 0-1,0 0 1,0 0 0,1-1 0,-1 1 0,1 0-1,0-1 1,-1 1 0,2 0-26,2 3 38,1-1 0,0 1 1,0-1-1,0-1 0,1 1 1,-1-1-1,1 0 0,1 0 0,-1-1 1,1 0-1,-1 0 0,1-1 0,0 0 1,0-1-1,1 1 0,-1-2 0,0 1 1,1-1-1,3 0-38,6 0 3,0 0 0,0-2 0,0 0 0,0-1 1,0-1-1,0 0 0,-1-1 0,14-6-3,-22 7 19,0-2 1,1 1-1,-2-2 1,1 1-1,-1-1 1,1 0-1,-2-1 1,1 1-1,-1-2 1,0 1-1,0-1 1,-1 0-1,0 0 1,-1-1-1,0 0 0,0 0 1,0 0-1,-2 0 1,1-1-1,-1 0 1,0 0-1,-1 0 1,1-6-20,-1 0 104,0 0 0,-1 0 0,0 0 0,-1 0 0,-1 0 0,-1 0 0,0 1 0,-1-1 0,-1 1 0,0-1 0,-1 1 0,-1 0 0,0 0 0,-8-12-104,4 13-91,0 2 1,-1-1-1,0 1 0,-1 1 1,0 0-1,-1 1 0,-1 0 1,1 1-1,-1 0 0,-1 1 1,1 1-1,-2 0 0,1 1 1,0 1-1,-1 0 0,0 1 1,0 1-1,-1 1 0,1 0 1,0 1-1,-1 0 0,1 2 1,-1 0-1,1 1 0,0 0 1,-1 1-1,1 1 0,-4 2 91,-183 65-6058,172-55 3087,12 0 918</inkml:trace>
   <inkml:trace contextRef="#ctx0" brushRef="#br0" timeOffset="1621.851">13948 2447 5632,'3'0'1535,"6"-11"-1045,-8 9-361,0 0-36,-1 0 0,1 0 0,0 0 0,-1 0 0,0-1 0,1 1 0,-1 0 0,0 0-1,0-1 1,0 1 0,-1 0 0,1 0 0,0-1 0,-1 1 0,1 0 0,-1 0 0,0 0-1,0 0 1,0-1 0,0 1 0,0 1 0,0-1 0,-1 0 0,1 0 0,-1 0 0,1 1 0,-1-1-1,1 1 1,-1-1 0,0 1 0,0-1 0,0 1 0,-1 0-93,-2-2 200,0 1 1,-1 0-1,1 1 1,-1-1 0,1 1-1,-1 0 1,0 0-1,1 1 1,-1 0-1,0 0 1,1 0-1,-6 1-200,-10 4 232,-1 0-1,1 1 1,0 1-1,0 1 1,1 1-1,0 1 0,0 1 1,1 0-1,1 2 1,-1 1-232,12-10 4,1 0-1,0 0 1,0 1 0,0 0-1,1 0 1,0 0 0,0 1-1,0 0 1,1 0 0,-1 0-1,1 0 1,1 1 0,-1 0 0,1-1-1,0 1 1,1 0 0,0 1-1,0-1 1,0 0 0,1 1-1,0-1 1,1 1 0,0-1-1,0 1 1,0-1 0,1 1 0,0-1-1,0 1 1,1-1 0,0 0-1,0 0 1,1 0 0,0 0-1,0 0 1,1 0 0,0-1-1,0 0 1,0 0 0,1 1-4,3-1-78,0 0 0,0 0 0,1-1 0,0 0 0,0 0 0,0-1 0,0 0 0,1-1 0,-1 0 0,1 0 0,0-1-1,0 0 1,0-1 0,0 0 0,2-1 78,154-13-2285,-132 7 1072,0-1-1,-1-2 1,0-2 0,6-3 1213,10-9-2448</inkml:trace>
   <inkml:trace contextRef="#ctx0" brushRef="#br0" timeOffset="2369.939">14190 2652 6400,'24'-3'3745,"22"2"-2232,-41 3-1328,0 1-1,0-1 1,0 1-1,0 0 1,0 0-1,-1 0 1,0 1-1,0-1 1,0 1-1,0 0 1,0 0-1,-1 1 1,1-1-1,-1 1 0,0-1 1,-1 1-1,1 0 1,-1 0-1,0 1 1,0-1-1,-1 0 1,1 4-185,52 172 453,-37-121 182,-15-60-629,-1 0-1,1 0 1,-1 0 0,0 0 0,1 0-1,-1 0 1,0-1 0,1 1 0,-1 0 0,0-1-1,1 1 1,-1-1 0,0 1 0,1-1-1,-1 0 1,0 1 0,0-1 0,0 0 0,0 0-1,0 0 1,0 0 0,0 0 0,0 0-1,0 0 1,0 0 0,-1 0 0,1-1-1,0 1 1,-1 0 0,1 0 0,-1-1 0,1 1-1,-1 0 1,0-1 0,1 1 0,-1-1-6,4-5 0,93-183-86,-87 170-4,1-2-588,-1 1-1,-1-2 1,-1 1-1,-1-1 1,0-3 678,-7 25-1,1-10-1755,-11 3-4983,-3 11 3742</inkml:trace>
   <inkml:trace contextRef="#ctx0" brushRef="#br0" timeOffset="-2779.657">13484 1225 1152,'36'9'464,"-36"-30"4960,-2 17-5185,0 0 0,0 0 1,0 0-1,-1 0 0,0 1 0,1-1 1,-2 1-1,1-1 0,0 1 0,-1 0 1,1 0-1,-1 0 0,0 1 0,0 0 1,0-1-1,0 1 0,0 0 1,0 1-1,-1-1 0,1 1 0,-1 0 1,0 0-240,-178-46 688,165 43-718,-1 1 1,1 1 0,-1 0-1,1 1 1,-1 2 0,0 0-1,1 0 1,-16 5 29,30-5-28,0 1 0,0 0 0,0 0 0,1 0 0,-1 1 0,0-1-1,1 1 1,0 0 0,-1 0 0,1 0 0,0 1 0,1-1 0,-1 1 0,0-1 0,1 1 0,0 0 0,0 0 0,0 0 0,1 0 0,-1 0-1,1 0 1,0 1 0,0-1 0,0 0 0,1 1 0,-1-1 0,1 1 0,0-1 0,1 0 0,-1 1 0,1-1 0,0 1 0,0-1 0,0 0 0,0 0-1,1 0 1,0 1 0,1 2 28,3 6 20,0-1 1,1 0-1,0 0 0,0-1 0,2 0 0,-1 0 1,1 0-1,1-1 0,0-1 0,0 0 0,1 0 0,0-1 1,0 0-1,1-1 0,0 0 0,1-1 0,-1-1 0,1 0 1,0 0-1,0-1 0,1-1 0,-1 0 0,5-1-20,-9-1 28,1-1-1,0 0 1,0-1-1,0 0 1,0 0-1,-1-1 1,1 0-1,-1-1 1,1 0-1,-1-1 1,0 0-1,0 0 0,0-1 1,-1 0-1,0 0 1,0-1-1,0 0 1,-1-1-1,1 0 1,-2 0-1,5-5-27,1-4 70,0 0 0,-1-1 0,-1 0-1,0-1 1,-2 0 0,0-1 0,-1 0-1,0 0 1,-2 0 0,0-3-70,0 1 172,-1 1-1,-2-1 1,0 0 0,-1 0 0,-1 0-1,-1 0 1,-1 0 0,-1 1-1,0-1 1,-2 1 0,0-1 0,-2 1-1,0 1 1,-1-1 0,-1 1 0,0 1-1,-2 0 1,0 0 0,-1 1-1,-8-9-171,-1 6-67,0 1-1,-1 1 0,-1 0 0,-1 2 0,-1 1 1,0 0-1,-1 2 0,0 1 0,-1 2 0,-2-1 68,-3 1-564,0 1-1,0 2 1,-1 1-1,0 2 1,0 1-1,0 1 1,0 2-1,-22 3 565,-51 16-3333,64-4 757</inkml:trace>
@@ -1180,27 +1181,27 @@
   <inkml:trace contextRef="#ctx0" brushRef="#br0" timeOffset="-24298.919">3114 1527 6528,'16'9'3268,"16"-6"-3079,-26-3 28,154-12-57,171-16-316,-191 12-5095,-98 9 2408</inkml:trace>
   <inkml:trace contextRef="#ctx0" brushRef="#br0" timeOffset="-24016.866">3149 1963 9856,'-18'23'3680,"18"-19"-2848,13 4-384,-8-4-320,8-4-480,5 0-96,9-4-320,10 1-96,6-6 480,11-3-288,14 1-32,11-1 320,11 0 192,8 0-224,-5 0-32,1 0-1184,-5 5-1504,1 2 576</inkml:trace>
   <inkml:trace contextRef="#ctx0" brushRef="#br0" timeOffset="-20350.955">5343 8 5376,'-18'0'2432,"18"0"-2171,0 0-202,-9 0-651,-53 12 1514,-49-7 1233,-15-13-1627,60 0-464,-1 2 0,-67 4-64,126 2 94,1 1 0,-1 0 0,1 1 0,-1-1 0,1 2 0,0-1 0,0 1 0,0 0 1,0 0-1,0 1 0,1 0 0,-1 0 0,1 1 0,0-1 0,1 1 0,-1 1 0,1-1 0,0 1 0,0 0 0,0 0 0,1 0 0,-2 5-94,0 56 734,6-47-625,-27 607 750,9-402-886,-16 49 27,-32 38 1233,41-215-656,5 0 1,3 2-1,-2 85-577,10 216 272,3-351-135,2 1 0,3 0 0,1-1 0,3 1 0,2-1-1,2 2-136,4 2-14,2 4 21,-3 0-1,-3 0 1,0 43-7,-11 44 129,4 98 222,3-203-329,4 15 31,-4 1 0,-1 0 1,-3 0-1,-3-1 0,-2 2-53,-4 0-11,-16 151 294,35 133 5,-21-108-131,3-131-128,0-18-130,-9-16 96,-30 52 211,39-100-263,8-18 41,0 0 0,0 1 0,0-1 0,1 0 1,-1 1-1,0-1 0,1 0 0,-1 1 0,1-1 0,0 1 0,0-1 0,-1 1 0,1-1 1,0 1-1,0-1 0,0 1 0,0-1 0,1 1 0,-1-1 0,0 0 0,1 1 0,-1-1 1,1 1-1,-1-1 0,1 0 0,-1 1 0,1-1 0,0 0 0,0 1 0,0-1 0,0 0 0,0 0 1,0 0-1,0 0 0,0 0 0,0 0 0,0 0 0,1 0 0,-1-1 0,0 1 0,1 0 1,-1-1-1,0 1 0,1-1 0,-1 0 0,1 1 0,-1-1 0,1 0 0,-1 0 0,1 0 16,137 22-442,2-3-57,0-6 0,52-6 499,-141-7-536,152-3-2534,-65-10-6827,-92 5 6921</inkml:trace>
-  <inkml:trace contextRef="#ctx0" brushRef="#br0" timeOffset="-19177.243">5139 659 7424,'-6'4'3305,"6"-4"-3280,5 4 879,22 11 1987,-5 10-1819,-12 3-1005,0 2 0,-2-1 0,-2 1 1,0 0-1,-2 1 0,0 12-67,2 17 130,61 495 30,-42-208 0,-24-322-101,-1 1-1,-2-1 1,0 0 0,-1 1-1,-2-2 1,-1 1 0,-2 5-59,-9 2-584,16-31 525,1-1 0,0 1 0,-1-1 0,1 1 0,-1-1 0,1 1 0,-1-1 1,1 1-1,-1-1 0,1 1 0,-1-1 0,1 0 0,-1 1 0,0-1 0,1 0 0,-1 0 0,0 1 0,1-1 0,-1 0 0,0 0 0,1 0 0,-1 0 0,0 0 0,1 0 0,-1 0 0,0 0 1,1 0-1,-1 0 0,0 0 0,1-1 0,-1 1 0,0 0 0,1 0 0,-1-1 0,1 1 0,-1 0 0,0-1 0,1 1 0,-1 0 0,1-1 0,-1 1 0,1-1 0,-1 1 0,1-1 0,0 1 1,-1-1-1,1 1 0,-1-2 59,-31-63-7867,15 37 4598</inkml:trace>
-  <inkml:trace contextRef="#ctx0" brushRef="#br0" timeOffset="-18680.968">5191 1725 5248,'19'4'4965,"-14"-5"-4847,0 1 0,0 0 0,0 0 0,-1 0 0,1 0 0,0 1 0,0 0 0,0 0 0,-1 1 0,1-1 0,0 1 0,-1 0 0,1 0 0,-1 0 0,0 1-118,15 6 411,203 92 1269,-79-27-973,4-6 0,66 17-707,-206-84 16,-1 1 1,0 0 0,1 0 0,-1 1 0,0 0 0,-1 0 0,1 0 0,0 1 0,-1 0 0,0 0 0,0 0 0,0 1 0,0-1 0,-1 1 0,1 0 0,-1 1 0,1 1-17,-6-6-85,1 0 1,-1-1-1,1 1 1,-1-1 0,0 1-1,1-1 1,-1 1-1,0-1 1,0 1 0,1-1-1,-1 1 1,0-1-1,0 0 1,1 1 0,-1-1-1,0 0 1,0 0-1,0 0 1,0 0 0,1 0-1,-1 1 1,0-2-1,0 1 1,0 0 0,0 0-1,0 0 1,1 0-1,-1 0 1,0-1 0,0 1-1,0 0 1,1-1-1,-1 1 1,0-1 0,0 1-1,1-1 1,-1 1-1,0-1 1,1 1 0,-1-1 84,-61-54-8976,35 24 6768</inkml:trace>
+  <inkml:trace contextRef="#ctx0" brushRef="#br0" timeOffset="-19177.244">5139 659 7424,'-6'4'3305,"6"-4"-3280,5 4 879,22 11 1987,-5 10-1819,-12 3-1005,0 2 0,-2-1 0,-2 1 1,0 0-1,-2 1 0,0 12-67,2 17 130,61 495 30,-42-208 0,-24-322-101,-1 1-1,-2-1 1,0 0 0,-1 1-1,-2-2 1,-1 1 0,-2 5-59,-9 2-584,16-31 525,1-1 0,0 1 0,-1-1 0,1 1 0,-1-1 0,1 1 0,-1-1 1,1 1-1,-1-1 0,1 1 0,-1-1 0,1 0 0,-1 1 0,0-1 0,1 0 0,-1 0 0,0 1 0,1-1 0,-1 0 0,0 0 0,1 0 0,-1 0 0,0 0 0,1 0 0,-1 0 0,0 0 1,1 0-1,-1 0 0,0 0 0,1-1 0,-1 1 0,0 0 0,1 0 0,-1-1 0,1 1 0,-1 0 0,0-1 0,1 1 0,-1 0 0,1-1 0,-1 1 0,1-1 0,-1 1 0,1-1 0,0 1 1,-1-1-1,1 1 0,-1-2 59,-31-63-7867,15 37 4598</inkml:trace>
+  <inkml:trace contextRef="#ctx0" brushRef="#br0" timeOffset="-18680.969">5191 1725 5248,'19'4'4965,"-14"-5"-4847,0 1 0,0 0 0,0 0 0,-1 0 0,1 0 0,0 1 0,0 0 0,0 0 0,-1 1 0,1-1 0,0 1 0,-1 0 0,1 0 0,-1 0 0,0 1-118,15 6 411,203 92 1269,-79-27-973,4-6 0,66 17-707,-206-84 16,-1 1 1,0 0 0,1 0 0,-1 1 0,0 0 0,-1 0 0,1 0 0,0 1 0,-1 0 0,0 0 0,0 0 0,0 1 0,0-1 0,-1 1 0,1 0 0,-1 1 0,1 1-17,-6-6-85,1 0 1,-1-1-1,1 1 1,-1-1 0,0 1-1,1-1 1,-1 1-1,0-1 1,0 1 0,1-1-1,-1 1 1,0-1-1,0 0 1,1 1 0,-1-1-1,0 0 1,0 0-1,0 0 1,0 0 0,1 0-1,-1 1 1,0-2-1,0 1 1,0 0 0,0 0-1,0 0 1,1 0-1,-1 0 1,0-1 0,0 1-1,0 0 1,1-1-1,-1 1 1,0-1 0,0 1-1,1-1 1,-1 1-1,0-1 1,1 1 0,-1-1 84,-61-54-8976,35 24 6768</inkml:trace>
   <inkml:trace contextRef="#ctx0" brushRef="#br0" timeOffset="-18350.709">5268 1809 5760,'48'-17'3328,"-42"11"-3177,-1 0 1,0 0 0,0 0-1,0-1 1,-1 0-1,0 0 1,0 0-1,0 0 1,-1-1 0,0 1-1,-1-1 1,1-1-152,12-31 645,23-34-212,3 1 1,4 2 0,4-1-434,130-216-4208,-134 208 1547</inkml:trace>
-  <inkml:trace contextRef="#ctx0" brushRef="#br0" timeOffset="-17808.994">6096 1609 5504,'4'0'2112,"-4"9"-1664,5-6 96,-5 6 0</inkml:trace>
+  <inkml:trace contextRef="#ctx0" brushRef="#br0" timeOffset="-17808.995">6096 1609 5504,'4'0'2112,"-4"9"-1664,5-6 96,-5 6 0</inkml:trace>
   <inkml:trace contextRef="#ctx0" brushRef="#br0" timeOffset="-17290.338">6109 1653 9888,'63'159'1984,"-13"-24"-1968,-45-119-18,1 0 1,1 0-1,0 0 1,1-1-1,1-1 0,0 1 1,1-1-1,1-1 1,0 0-1,1 0 1,0-1-1,1-1 1,0 0-1,6 3 2,-17-12-16,0-1 0,1 0 0,-1 1 0,1-1 0,0 0 0,-1 0 0,1-1 0,0 1 0,-1-1 0,1 1 0,0-1 0,0 0 0,0 0 0,-1 0 0,1 0 0,0 0 0,0-1 0,-1 0 0,1 1 0,0-1 0,0 0 0,-1 0 0,1 0 0,-1-1 0,1 1 0,-1 0 0,0-1 0,1 0 0,-1 1 0,0-1 0,0 0 0,0 0 0,0-1 0,-1 1 0,1 0 0,-1 0 0,1-1 0,-1 1 0,0-1 0,1-2 16,4-13-4,-1-1 0,-1 0 0,-1 0 0,0 0-1,-2 0 1,0-12 4,4-41 1279,0-103 1777,-3 185-3051,0 0 0,1-1 1,0 1-1,1-1 1,0 1-1,1-1 0,0-1 1,3 6-6,18 36-86,-19-31-24,0 0 0,2-1 0,0 0 0,0 0 1,2-1-1,0-1 0,1 0 0,1 0 0,0-1 0,1-1 0,1 0 1,0-1-1,1-1 0,0 0 0,1-1 0,0-1 0,1 0 0,0-1 0,0-1 1,11 2 109,-22-9-309,0 1 0,1-1 0,-1-1 0,1 0 0,-1 0 1,1 0-1,-1-1 0,1 0 0,-1 0 0,0-1 0,6-2 309,41-18-2986</inkml:trace>
   <inkml:trace contextRef="#ctx0" brushRef="#br0" timeOffset="-16531.14">7484 1068 8576,'10'14'4522,"19"46"-3658,7 187-357,31 52-390,-65-289-153,0-6-71,-1 0 1,0 0-1,0 0 0,0 0 0,0 1 1,-1-1-1,0 0 0,1 0 0,-2 0 1,1 0-1,0 1 0,-1-1 0,0 0 1,0 0-1,-1 3 107,1-6-168,0-1 0,0 1 1,-1 0-1,1-1 0,0 1 1,-1-1-1,1 0 0,0 1 0,-1-1 1,1 0-1,0 0 0,-1 0 0,1 0 1,0 0-1,-1 0 0,1 0 0,-1 0 1,1-1-1,0 1 0,-1 0 0,1-1 1,0 1-1,0-1 0,-1 0 1,1 1-1,0-1 0,0 0 0,0 0 1,0 0-1,0 0 0,-1 0 168,-24-20-2597</inkml:trace>
   <inkml:trace contextRef="#ctx0" brushRef="#br0" timeOffset="-16218.757">6695 1546 8960,'-5'2'445,"4"-1"-288,-1 0 1,0-1-1,0 1 0,1 0 0,-1 0 1,0 0-1,1 0 0,-1 0 0,1 0 0,-1 0 1,1 1-1,0-1 0,0 0 0,-1 1 1,1-1-1,0 1 0,0-1 0,0 1 0,0 0 1,1-1-1,-1 1 0,0 0 0,1 0 0,-1 0 1,1-1-1,0 3-157,19-1-875,132-42-335,-20 9 1164,1 5 1,1 6 0,1 6-1,120 5 46,-92 8-3,196-1-3706,-285-1 1187</inkml:trace>
   <inkml:trace contextRef="#ctx0" brushRef="#br0" timeOffset="-14123.299">8581 1138 2048,'13'-4'768,"-8"1"-576,2-17-928,-2 16-416</inkml:trace>
   <inkml:trace contextRef="#ctx0" brushRef="#br0" timeOffset="-13576.554">8651 1020 6400,'-15'-28'4573,"-24"-24"-3834,26 39-738,0 2 1,-1 0 0,0 1 0,-1 0 0,0 1 0,0 1 0,-1 0-1,0 1 1,-1 1 0,0 1 0,0 0 0,0 1 0,-14-1-2,18 3-1,0 0 0,0 1 0,0 1 0,0 0 0,1 1 0,-1 0 0,0 1 0,0 0 0,1 1 0,-1 1 0,1 0 0,0 1 0,0 0 0,1 0 0,-1 1 0,1 1 0,0 0 0,1 1 0,-3 2 1,10-7-6,-1 1 1,1 0 0,0-1-1,0 1 1,1 0-1,-1 1 1,1-1-1,0 0 1,0 1-1,0-1 1,1 1-1,-1-1 1,1 1-1,0 0 1,1 0-1,-1-1 1,1 1-1,0 0 1,0 0-1,0 0 1,1 0-1,0-1 1,0 1-1,0 0 1,0-1-1,1 1 1,0 0-1,0-1 1,0 0-1,0 0 1,1 1-1,-1-1 1,1-1-1,1 2 6,10 10 28,0-1-1,1-1 1,0 0 0,1 0-1,1-2 1,0 0-1,0-1 1,1-1-1,1 0 1,-1-1-1,1-2 1,3 1-28,179 54-171,-183-60 201,-1 0 1,1 0-1,0-2 0,0 0 0,0-2 0,-1 1 0,1-2 1,-1-1-1,0 0 0,0-1 0,0 0 0,-1-2 0,0 0 0,0 0 1,-1-2-1,-1 0 0,1-1 0,-1 0 0,-1-1 0,0 0 1,-1-2-1,0 1 0,-1-1 0,-1-1 0,0 0 0,5-11-30,-7 8 168,0-1-1,-1 0 0,-1 0 1,-1-1-1,-1 1 1,-1-1-1,0 0 1,-1 0-1,-2-1 0,0 1 1,-1 0-1,-1 0 1,0 0-1,-2 0 0,0 1 1,-2-1-1,0 1 1,-2-2-168,-2-5 89,-1 2 0,-1-1 0,-1 2 1,-1-1-1,-1 2 0,-2 0 0,0 1 1,-1 1-1,0 0 0,-2 2 0,-1 0 1,0 1-1,-1 1 0,0 1 0,-2 1 1,0 1-1,0 1 0,-1 1 0,-26-7-89,30 13-216,-1 1-1,-1 1 0,1 0 1,0 2-1,-1 1 0,1 1 1,0 0-1,-1 2 0,1 1 1,0 0-1,1 2 0,-3 1 217,-28 11-978,2 2 0,0 2 1,2 2-1,-18 13 978,9 0-1803,10-1-890</inkml:trace>
   <inkml:trace contextRef="#ctx0" brushRef="#br0" timeOffset="-12696.899">9187 445 9984,'8'7'4048,"3"2"-3025,2 3-1374,23 16 321,-29-24 111,0 1 0,0 1 0,0-1 1,-1 1-1,0 0 0,0 1 0,0 0 1,-1 0-1,0 0 0,0 0 1,2 5-82,3 19-3,0 0 1,-2 1 0,-2 0 0,-1 0 0,-1 0 0,-1 24 2,1-10-57,5 204 324,-9-247-217,1-1-19,-1 0 0,1-1 1,-1 1-1,1 0 0,-1 0 1,0 0-1,0-1 0,0 1 1,0 0-1,0 0 1,0 0-1,-1 0 0,1-1 1,0 1-1,-1 0 0,1 0 1,-1-1-1,0 1 0,0 0 1,0-1-1,0 1 0,0-1 1,0 1-1,0-1 1,0 1-1,0-1 0,-1 0 1,1 0-1,0 0 0,-1 1 1,1-1-1,-1-1 0,0 1 1,1 0-1,-1 0 0,-1 0-31,-15-29 1152,-10-110-1317,26 129 220,1 7-72,0 1 1,0-1 0,0 0 0,0 1 0,1-1 0,-1 0-1,1 0 1,-1 1 0,1-1 0,0 0 0,-1 0 0,1 0-1,0 1 1,0-1 0,0 0 0,1 0 0,-1 0 0,0 1-1,1-1 1,-1 0 0,1 0 0,-1 1 0,1-1 0,0 0-1,0 1 1,0-1 0,0 1 0,0-1 0,0 1-1,0-1 1,1 1 0,-1 0 0,0 0 0,1-1 0,-1 1-1,1 0 1,-1 0 0,1 0 16,172-15-208,-165 15 200,17 0-493,0-2 0,-1 0 0,1-2 0,-1-1 0,0-1 0,0-1 0,-1-1 0,13-7 501,-5-9-3362,-19 2-1798,-11 7 2328</inkml:trace>
-  <inkml:trace contextRef="#ctx0" brushRef="#br0" timeOffset="-12284.643">9762 484 9600,'0'0'3717,"6"5"-3109,-4-4-587,0 0 1,-1 0 0,1 0-1,0 0 1,0 0-1,-1 1 1,1-1-1,0 1 1,-1-1-1,0 1 1,1 0-1,-1-1 1,0 1-1,0 0 1,0 0 0,0 0-1,0 0 1,0 0-1,0 0 1,-1 0-1,1 0 1,-1 0-1,0 1 1,1-1-1,-1 0 1,0 1-22,13 81 619,23 157-769,8 281 326,-43-516-117,0 16-867,-12-26-2320,2-13 579,0-8-459</inkml:trace>
+  <inkml:trace contextRef="#ctx0" brushRef="#br0" timeOffset="-12284.644">9762 484 9600,'0'0'3717,"6"5"-3109,-4-4-587,0 0 1,-1 0 0,1 0-1,0 0 1,0 0-1,-1 1 1,1-1-1,0 1 1,-1-1-1,0 1 1,1 0-1,-1-1 1,0 1-1,0 0 1,0 0 0,0 0-1,0 0 1,0 0-1,0 0 1,-1 0-1,1 0 1,-1 0-1,0 1 1,1-1-1,-1 0 1,0 1-22,13 81 619,23 157-769,8 281 326,-43-516-117,0 16-867,-12-26-2320,2-13 579,0-8-459</inkml:trace>
   <inkml:trace contextRef="#ctx0" brushRef="#br0" timeOffset="-11605.919">9985 1119 5632,'0'0'85,"0"0"1,0 0-1,0 1 1,0-1-1,-1 0 1,1 1-1,0-1 1,0 0-1,0 1 0,0-1 1,0 0-1,0 0 1,0 1-1,0-1 1,0 0-1,0 1 1,0-1-1,0 0 1,1 1-1,-1-1 1,0 0-1,0 1 0,0-1 1,0 0-1,0 0 1,1 1-1,-1-1 1,0 0-1,0 0 1,0 1-1,1-1 1,-1 0-1,0 0 1,0 0-1,1 0 1,-1 1-1,0-1 0,0 0 1,1 0-1,-1 0 1,0 0-1,1 0 1,-1 0-1,0 0 1,1 0-1,-1 1 1,0-1-1,1 0 1,-1 0-1,0-1 0,0 1 1,1 0-1,-1 0 1,0 0-1,1 0 1,-1 0-1,0 0 1,1 0-1,-1 0 1,0-1-1,0 1 1,1 0-1,-1 0 0,0 0 1,0 0-1,1-1 1,-1 1-1,0 0-85,6 15 306,24 73 899,-27-75-1229,0 0 0,1 0-1,1 0 1,-1-1-1,2 0 1,0 0 0,4 6 24,-7-14-51,-1 0 0,1-1 0,-1 0 1,1 0-1,0 0 0,0 0 1,1 0-1,-1 0 0,0-1 0,1 0 1,0 1-1,-1-1 0,1-1 0,0 1 1,0 0-1,0-1 0,0 0 1,0 0-1,1 0 0,-1-1 0,0 1 1,0-1-1,1 0 0,-1 0 0,0 0 1,0-1-1,0 0 0,1 0 1,-1 0-1,0 0 0,0 0 0,0-1 1,0 0-1,-1 0 0,1 0 0,0 0 1,-1 0-1,1-1 0,-1 0 1,0 1-1,0-1 0,0 0 0,0-1 51,2-6 208,0 0 0,-1-1 0,0 1 0,0-1 0,-2 1 0,1-1 0,-1 0 0,-1 0 0,0 0 0,0-1 0,-1 1 0,-1 0 0,0 0 0,-1-2-208,1-28 955,1 20-955,0 16-25,0 15-19,0 2 31,1 0 1,0 1-1,1-1 1,0 0-1,1 0 1,0 0-1,1-1 1,0 1 0,1-1-1,0 0 1,1 0-1,4 7 13,-5-9-141,1-1 1,0 1-1,0-1 0,1 0 0,0 0 0,0-1 1,1 0-1,0 0 0,0-1 0,1 0 0,0 0 1,0-1-1,0 0 0,0-1 0,1 0 1,0 0-1,0-1 0,0-1 0,0 1 0,5-1 141,141-2-6405,-104-8 3520</inkml:trace>
   <inkml:trace contextRef="#ctx0" brushRef="#br0" timeOffset="-10845.097">8188 1816 6784,'-4'5'1130,"4"-5"-1112,0 0 0,1 0-1,-1 0 1,0 0 0,1 0 0,-1 0 0,0 0-1,1 0 1,-1 1 0,0-1 0,1 0 0,-1 0 0,0 0-1,1 0 1,-1 0 0,0 1 0,0-1 0,1 0-1,-1 0 1,0 1 0,0-1 0,1 0 0,-1 0-1,0 1 1,0-1 0,0 0 0,1 0 0,-1 1 0,0-1-1,0 0 1,0 1 0,0-1 0,0 0 0,0 1-1,0-1 1,0 0 0,0 1 0,0-1 0,0 0-1,0 1 1,0-1 0,0 0 0,0 1 0,0-1 0,0 0-1,0 1 1,0-1 0,0 0 0,-1 1 0,1-1-1,0 0 1,0 1 0,0-1 0,-1 0 0,1 0 0,0 1-1,0-1 1,0 0 0,-1 0 0,1 0 0,0 1-1,-1-1-17,105-20 1963,106 16-944,315-10-731,307-56-288,-777 64-3,142-18-214,0 9-1,174 10 218,-95 28-2725,-212-16 160</inkml:trace>
   <inkml:trace contextRef="#ctx0" brushRef="#br0" timeOffset="-7899.67">8906 2538 3712,'26'-12'2202,"-24"12"-2203,0 0 0,0-1 0,0 1 0,0 0 0,0-1 0,0 0 0,0 1 0,0-1 0,0 0 0,0 0 0,0 0 0,-1 0 0,1 0 0,0-1 0,-1 1 0,1 0 0,-1-1 0,1 1 0,-1-1 0,0 0 0,0 1 0,0-1-1,1 0 1,-2 0 0,1 0 0,0 0 0,0 1 0,-1-1 0,1 0 0,-1-1 0,1 1 0,-1 0 0,0 0 0,0 0 0,0 0 0,0 0 0,0 0 0,0 0 0,-1 0 0,1 0 0,-1 0 0,1 0 0,-1 0 0,0 0 0,0 0-1,0-1 2,-13-14 207,0 1 0,0 1 0,-2 0 0,1 1 0,-2 1 0,0 0-1,-1 1 1,0 1 0,0 0 0,-2 2 0,1 0 0,-1 1 0,0 2-1,-12-4-206,13 7 223,0 1-1,0 1 0,0 0 1,0 2-1,0 0 1,0 1-1,0 1 0,0 0 1,0 2-1,1 0 0,0 1 1,0 1-1,-14 8-222,27-13 18,0-1-17,-1 0-1,1 1 1,-1 0-1,1 0 0,0 1 1,0-1-1,0 1 1,0 0-1,1 0 1,-1 1-1,1-1 1,-1 1-1,1 0 1,1 0-1,-1 0 1,0 1-1,1-1 0,0 1 1,0 0-1,0 0 1,1 0-1,0 0 1,0 1-1,0-1 1,1 1-1,-1-1 1,1 1-1,1-1 1,-1 1-1,1 4 0,3-2 37,1 0 0,1 0 0,-1-1 0,1 0 0,0 0 0,1 0 0,0 0 0,0-1 0,0 0 0,1-1 1,0 1-1,0-1 0,0 0 0,1-1 0,-1 0 0,1 0 0,0-1 0,0 0 0,4 1-37,21 6 10,-1-2-1,2-1 1,-1-2 0,1-1 0,-1-2-1,1-1 1,0-2 0,0-1-1,-1-1 1,1-2 0,-1-2 0,0 0-1,0-3 1,-1 0 0,-1-3 0,0 0-1,17-11-9,-36 19 48,-1-1 0,1 1-1,-2-2 1,1 0-1,-1 0 1,0-1 0,0 0-1,-1 0 1,0-1-1,-1-1 1,0 1 0,0-2-1,-1 1 1,0-1 0,-1 0-1,0 0 1,-1 0-1,0-1 1,-1 0 0,0 0-1,-1 0 1,0 0-1,-1-1 1,-1 1 0,0-1-1,0 1 1,-1-1 0,-1-5-48,-2 6 49,0 0 0,-1 0 1,0 0-1,-1 1 0,0-1 1,-1 1-1,0 0 0,-1 1 1,0-1-1,-1 2 0,0-1 1,0 1-1,-1 0 0,0 0 1,-1 1-1,0 1 0,0-1 1,-1 2-1,-11-6-49,-4-2 28,-2 2-1,0 1 1,0 1-1,-1 1 1,0 2 0,0 1-1,-27-2-27,28 5-171,1 2 0,0 1 1,-1 1-1,1 2 0,0 0 0,0 2 0,0 1 0,1 1 171,-126 57-5379,138-56 2771</inkml:trace>
-  <inkml:trace contextRef="#ctx0" brushRef="#br0" timeOffset="-7236.866">9994 2073 5888,'10'-9'3123,"-25"-29"-2828,6 29-63,0 1 0,-1 0 0,0 0 0,-1 1 0,1 1 0,-1-1-1,-1 2 1,1-1 0,-1 2 0,0-1 0,0 2 0,0-1 0,0 2 0,-1 0-1,1 0 1,-1 1 0,0 1 0,1 0 0,-1 0 0,1 2 0,-6 0-232,-8 4-90,0 0 0,1 2 0,0 0 1,0 2-1,1 1 0,1 0 1,0 2-1,0 1 0,1 1 1,1 0-1,-14 15 90,26-24 7,1 0 1,1 1-1,-1 0 1,1 0-1,0 1 0,1 0 1,0 0-1,0 0 1,1 1-1,0 0 1,0 0-1,1 0 0,0 1 1,1-1-1,0 1 1,0 0-1,1 0 0,1 0 1,-1 0-1,2 0 1,-1 0-1,2 0 1,0 8-8,6-3-40,0 0 0,2 0 0,0 0 0,0-1 0,1-1 0,1 0 0,1 0 0,-1-1 0,2 0 0,0-1 0,0-1 0,1 0 0,0 0 0,1-2 0,0 0 0,0 0 0,1-2 0,6 3 40,8 3-345,1 0 1,0-2 0,0-1-1,1-2 1,0-1 0,1-1 0,-1-2-1,1-1 1,31-3 344,19-7-2629</inkml:trace>
-  <inkml:trace contextRef="#ctx0" brushRef="#br0" timeOffset="-6286.122">10180 2379 6912,'-1'-9'3434,"29"1"-3204,-26 9-145,1-1 0,-1 0 1,0 0-1,0 1 0,0 0 1,0-1-1,1 1 0,-1 0 1,0 0-1,0 0 0,-1 0 1,1 0-1,0 0 0,0 1 1,0-1-1,-1 1 0,1-1 1,-1 1-1,1-1 0,-1 1 1,0 0-1,1 0 0,-1 0 1,0 0-1,0 0 0,-1 0 1,1 0-1,0 0 0,-1 0 1,1 0-1,-1 1 0,1-1 1,-1 1-86,7 16 11,0 0 0,2 0 1,0-1-1,1 0 1,1-1-1,1 0 1,3 2-12,-12-14-38,1-1 1,0 0 0,0 0 0,0 0 0,1-1 0,-1 0-1,1 1 1,0-1 0,0-1 0,0 1 0,0-1 0,1 0 0,-1 0-1,0-1 1,1 1 0,0-1 0,-1 0 0,1-1 0,0 0-1,-1 1 1,1-2 0,0 1 0,-1-1 0,1 0 0,-1 0-1,1 0 1,-1-1 0,1 0 0,-1 0 0,0 0 0,1-1 37,-1-3 14,-1 1 1,1-1 0,-1 0-1,-1-1 1,1 1 0,-1-1-1,-1 1 1,1-1 0,-1 0-1,0 0 1,0 0 0,-1 0-1,0 0 1,0-1 0,-1 1-1,0 0 1,0 0 0,-1 0-1,0-1 1,-2-5-15,2-21 1173,5-33-431,37 146-246,34 40-544,-70-114-13,-1 0 0,1-1 1,0 1-1,0-1 0,0 0 1,1 0-1,0 0 0,-1-1 1,1 0-1,0 0 1,1-1-1,-1 1 0,0-1 1,1-1-1,-1 1 0,1-1 1,-1 0-1,5-1 61,8 1-902,-1-1-1,1-1 1,-1-1-1,0 0 1,0-1-1,5-2 903,6-4-3280,-9-2 267</inkml:trace>
+  <inkml:trace contextRef="#ctx0" brushRef="#br0" timeOffset="-7236.867">9994 2073 5888,'10'-9'3123,"-25"-29"-2828,6 29-63,0 1 0,-1 0 0,0 0 0,-1 1 0,1 1 0,-1-1-1,-1 2 1,1-1 0,-1 2 0,0-1 0,0 2 0,0-1 0,0 2 0,-1 0-1,1 0 1,-1 1 0,0 1 0,1 0 0,-1 0 0,1 2 0,-6 0-232,-8 4-90,0 0 0,1 2 0,0 0 1,0 2-1,1 1 0,1 0 1,0 2-1,0 1 0,1 1 1,1 0-1,-14 15 90,26-24 7,1 0 1,1 1-1,-1 0 1,1 0-1,0 1 0,1 0 1,0 0-1,0 0 1,1 1-1,0 0 1,0 0-1,1 0 0,0 1 1,1-1-1,0 1 1,0 0-1,1 0 0,1 0 1,-1 0-1,2 0 1,-1 0-1,2 0 1,0 8-8,6-3-40,0 0 0,2 0 0,0 0 0,0-1 0,1-1 0,1 0 0,1 0 0,-1-1 0,2 0 0,0-1 0,0-1 0,1 0 0,0 0 0,1-2 0,0 0 0,0 0 0,1-2 0,6 3 40,8 3-345,1 0 1,0-2 0,0-1-1,1-2 1,0-1 0,1-1 0,-1-2-1,1-1 1,31-3 344,19-7-2629</inkml:trace>
+  <inkml:trace contextRef="#ctx0" brushRef="#br0" timeOffset="-6286.123">10180 2379 6912,'-1'-9'3434,"29"1"-3204,-26 9-145,1-1 0,-1 0 1,0 0-1,0 1 0,0 0 1,0-1-1,1 1 0,-1 0 1,0 0-1,0 0 0,-1 0 1,1 0-1,0 0 0,0 1 1,0-1-1,-1 1 0,1-1 1,-1 1-1,1-1 0,-1 1 1,0 0-1,1 0 0,-1 0 1,0 0-1,0 0 0,-1 0 1,1 0-1,0 0 0,-1 0 1,1 0-1,-1 1 0,1-1 1,-1 1-86,7 16 11,0 0 0,2 0 1,0-1-1,1 0 1,1-1-1,1 0 1,3 2-12,-12-14-38,1-1 1,0 0 0,0 0 0,0 0 0,1-1 0,-1 0-1,1 1 1,0-1 0,0-1 0,0 1 0,0-1 0,1 0 0,-1 0-1,0-1 1,1 1 0,0-1 0,-1 0 0,1-1 0,0 0-1,-1 1 1,1-2 0,0 1 0,-1-1 0,1 0 0,-1 0-1,1 0 1,-1-1 0,1 0 0,-1 0 0,0 0 0,1-1 37,-1-3 14,-1 1 1,1-1 0,-1 0-1,-1-1 1,1 1 0,-1-1-1,-1 1 1,1-1 0,-1 0-1,0 0 1,0 0 0,-1 0-1,0 0 1,0-1 0,-1 1-1,0 0 1,0 0 0,-1 0-1,0-1 1,-2-5-15,2-21 1173,5-33-431,37 146-246,34 40-544,-70-114-13,-1 0 0,1-1 1,0 1-1,0-1 0,0 0 1,1 0-1,0 0 0,-1-1 1,1 0-1,0 0 1,1-1-1,-1 1 0,0-1 1,1-1-1,-1 1 0,1-1 1,-1 0-1,5-1 61,8 1-902,-1-1-1,1-1 1,-1-1-1,0 0 1,0-1-1,5-2 903,6-4-3280,-9-2 267</inkml:trace>
   <inkml:trace contextRef="#ctx0" brushRef="#br0" timeOffset="6692.528">6422 3956 6528,'0'1'123,"1"-1"1,0 1 0,-1-1-1,1 1 1,0-1 0,0 1-1,0-1 1,-1 0 0,1 1-1,0-1 1,0 0 0,0 0-1,0 0 1,0 0 0,0 1-1,0-1 1,0 0 0,-1 0-1,1-1 1,0 1 0,0 0-1,0 0 1,0 0-1,0-1 1,0 1 0,-1 0-1,1-1 1,0 1 0,0-1-1,0 1 1,-1-1 0,1 1-1,0-1 1,-1 1 0,1-1-1,0 0 1,-1 1 0,1-1-1,-1 0 1,1 0 0,-1 0-1,1 0-123,15-41 1335,-16 36-1291,-1 0-1,0-1 1,0 1 0,0 0 0,-1 0 0,0 0 0,0 0 0,-1 0 0,1 0 0,-1 0 0,-1 1 0,1-1 0,-1 1 0,0 0 0,0 0 0,0 0 0,-1 1 0,0 0 0,0 0 0,0 0-1,0 0 1,0 1 0,-1-1 0,0 2 0,-4-3-44,-6-2 114,-1 1-1,1 0 0,-1 1 1,0 1-1,0 1 0,0 1 1,-1 0-1,-16 0-113,26 1-36,1 1 0,-1-1 0,0 2 0,0-1 0,0 1 0,1 0 0,-1 0 0,0 1 1,1 0-1,-1 0 0,1 1 0,0 0 0,0 0 0,0 1 0,0 0 0,1 0 0,-1 1 0,1-1 0,-1 2 36,6-1-21,0 0 0,1 0 1,-1 0-1,1-1 0,0 1 0,1 0 0,-1 0 0,1 0 0,0-1 0,0 1 0,0 0 1,1-1-1,0 1 0,0-1 0,0 0 0,0 1 0,0-1 0,1 0 0,0 0 0,0 0 1,0-1-1,1 1 0,-1-1 0,2 2 21,12 11 1,1 0 0,0-1 0,1-1 0,0-1 0,1-1 0,1 0 0,0-2 0,0 0 0,1-1 0,0-2 0,0 0 0,1-1 0,0-1 0,0-1 0,1-2 0,15 1-1,-17-3 24,0 0 0,-1-2 1,1 0-1,0-1 0,-1-1 0,1-2 1,-1 0-1,0-1 0,-1-1 1,0 0-1,5-5-24,-13 7 58,1-1 1,-1-1 0,0 0-1,-1-1 1,0 0 0,-1 0-1,0-2 1,0 1 0,-1-1-1,0 0 1,-1-1 0,0 0-1,-1 0 1,0-1 0,-1 0-1,-1 0 1,4-12-59,-7 14 119,0 0 1,0 0-1,-1-1 1,-1 1-1,0 0 0,0 0 1,-1-1-1,-1 1 1,0 0-1,0 0 0,-1 0 1,0 1-1,-1-1 1,-1 1-1,1 0 0,-1 0 1,-1 0-1,-3-3-119,-9-13 304,-1 1 0,-2 1 0,0 1 0,-2 1 0,0 0 0,-2 2-304,-24-20 55,-2 3 1,-1 1-1,-1 4 1,-2 1-1,-25-8-55,37 21-723,0 2 1,-1 2-1,-1 2 1,-37-6 722,68 16-594,0 1 0,-1 0 1,1 1-1,0 0 0,0 1 0,0 0 1,-11 4 593,-51 27-6750,48-9 3475</inkml:trace>
   <inkml:trace contextRef="#ctx0" brushRef="#br0" timeOffset="7807.48">7367 3116 7168,'18'13'5966,"4"5"-4658,1-5 2057,8-2-2074,-28-9-1283,-1 1-1,0-1 1,1 1-1,-1-1 1,0 1 0,-1 0-1,1 0 1,0-1-1,-1 1 1,0 0 0,0 1-1,0-1 1,0 0-1,0 0 1,0 0 0,-1 1-1,0-1 1,1 0-1,-1 0 1,-1 2-8,2 1 40,62 444-168,-37-236 107,-18-122 341,-8-92-314,0 1 0,0-1 0,-1 1 0,1-1 0,0 1 0,-1-1 0,1 1-1,0-1 1,-1 1 0,1-1 0,-1 0 0,1 1 0,-1-1 0,1 0 0,0 1 0,-1-1 0,1 0 0,-1 0 0,1 1 0,-1-1 0,0 0 0,1 0 0,-1 0 0,1 0 0,-1 0 0,1 0 0,-1 0 0,1 0 0,-1 0 0,0 0 0,1 0 0,-1 0 0,1 0 0,-1 0 0,1 0 0,-1-1 0,1 1-1,-1 0 1,1 0 0,-1-1 0,1 1 0,-1 0 0,1-1 0,-1 1 0,1 0 0,0-1 0,-1 1 0,1-1 0,-1 1 0,1 0 0,0-1 0,0 1 0,-1-1-6,-24-24 158,-36-110-120,59 134-39,0-1 1,1 0 0,-1 0 0,1-1-1,-1 1 1,1 0 0,0 0 0,0-1-1,0 1 1,0-1 0,0 1 0,0-1-1,1 1 1,0-1 0,-1 1 0,1-1-1,0 0 1,0 1 0,0-1 0,0 1-1,1-1 1,-1 0 0,1 1 0,-1-1-1,1 1 1,0-1 0,0 1 0,0 0-1,1-1 1,-1 1 0,0 0 0,1 0-1,-1 0 1,1 0 0,0 0 0,0 0-1,0 0 1,0 1 0,0-1 0,0 1-1,0-1 1,1 1 0,161-12-223,-74 10 286,2-2-106,-23 2-654,0-3 1,-1-3-1,25-8 697,-9-3-4357,-82 12 639,2-3 652</inkml:trace>
   <inkml:trace contextRef="#ctx0" brushRef="#br0" timeOffset="8201.512">8210 3287 8320,'12'-5'6159,"17"10"-3503,-16 11 950,9 48-3105,-7-15-516,-3 0 1,-1 1-1,-3 1 1,-3 0-1,-1 0 1,-3 36 14,1-13 12,25 151 15,-23-183-666,-4-32-3612,1-43-1600,3 3 2182</inkml:trace>
   <inkml:trace contextRef="#ctx0" brushRef="#br0" timeOffset="8802.758">8710 3840 9984,'-6'8'3794,"7"-19"-2783,0 6-840,0 1 0,0-1 0,0 1 0,0-1 0,1 1 0,0 0-1,0 0 1,0-1 0,0 2 0,1-1 0,-1 0 0,1 0 0,0 1 0,0-1 0,0 1 0,1 0 0,-1 0 0,1 0 0,3-1-171,-6 4 44,1 0 0,0 1 0,-1-1 0,1 1 0,0-1 0,-1 1 0,1-1 0,-1 1 1,1 0-1,-1 0 0,1 0 0,-1 0 0,0 0 0,0 0 0,1 0 0,-1 1 0,0-1 0,0 0 0,0 1 0,0-1 1,0 1-1,-1-1 0,1 1 0,0-1 0,-1 1 0,1-1 0,-1 1 0,1 0 0,-1-1 0,0 1 0,0 0 0,0 0 1,0-1-1,0 1 0,0 0 0,0-1 0,0 1 0,-1 0 0,1 0-44,1 7 57,71 294 225,-70-295-273,1 0-1,-1-1 0,1 0 0,1 1 0,-1-1 1,1 0-1,0-1 0,1 1 0,-1-1 0,2 0 1,-1 0-1,0 0 0,7 4-8,-9-9 27,0-1-1,0 1 1,0-1 0,0 0-1,0 0 1,-1 0 0,1 0-1,0 0 1,0-1 0,0 0-1,0 1 1,0-1 0,-1 0-1,1 0 1,0-1 0,-1 1-1,1 0 1,-1-1 0,1 0-1,-1 1 1,0-1 0,1 0-1,-1 0 1,0-1 0,-1 1-1,1 0 1,0 0 0,0-1-1,-1 1 1,0-1 0,1 0-1,-1 1 1,0-1 0,0-1-27,19-34 33,-2 0 1,-2-2 0,-1 0 0,1-11-34,10-26-55,23-65-2324,-44 111 368,-33 58-4362,11-5 3243</inkml:trace>
-  <inkml:trace contextRef="#ctx0" brushRef="#br0" timeOffset="9384.556">6052 4559 8448,'-34'26'4629,"32"-25"-3968,3 1-603,0-1 0,0 1 0,0-1 0,1 0 0,-1 0 0,0 1 0,0-1 0,1 0 0,-1 0 0,1 0 0,-1 0 0,1 0-1,-1-1 1,1 1 0,-1 0 0,1-1 0,0 1 0,-1-1 0,1 0 0,0 1 0,-1-1 0,1 0 0,0 0 0,0 0 0,-1 0 0,1 0 0,0-1 0,0 1-1,-1 0 1,1-1 0,0 1 0,0-2-58,2 2 66,139-28 158,155-7-416,2 13 0,77 12 192,414 26 321,-282-1-2546,127-27 2225,-624 12-144,70-5-2771,-1-3 1,33-10 2914,-65 6-2629</inkml:trace>
+  <inkml:trace contextRef="#ctx0" brushRef="#br0" timeOffset="9384.555">6052 4559 8448,'-34'26'4629,"32"-25"-3968,3 1-603,0-1 0,0 1 0,0-1 0,1 0 0,-1 0 0,0 1 0,0-1 0,1 0 0,-1 0 0,1 0 0,-1 0 0,1 0-1,-1-1 1,1 1 0,-1 0 0,1-1 0,0 1 0,-1-1 0,1 0 0,0 1 0,-1-1 0,1 0 0,0 0 0,0 0 0,-1 0 0,1 0 0,0-1 0,0 1-1,-1 0 1,1-1 0,0 1 0,0-2-58,2 2 66,139-28 158,155-7-416,2 13 0,77 12 192,414 26 321,-282-1-2546,127-27 2225,-624 12-144,70-5-2771,-1-3 1,33-10 2914,-65 6-2629</inkml:trace>
   <inkml:trace contextRef="#ctx0" brushRef="#br0" timeOffset="11365.783">6695 5363 6656,'-15'-6'3536,"-9"-14"-3644,17 14 504,-121-104 494,120 102-910,0 0-1,0 1 0,-1 0 0,1 0 0,-2 1 1,1 0-1,-1 0 0,0 1 0,0 1 0,-7-3 21,16 7 2,0-1 0,0 1-1,0 0 1,0 0 0,1 0 0,-1 0-1,0 1 1,0-1 0,0 0-1,1 0 1,-1 0 0,0 1 0,0-1-1,1 0 1,-1 1 0,0-1-1,1 1 1,-1-1 0,0 1 0,1-1-1,-1 1 1,0-1 0,1 1-1,-1 0 1,1-1 0,-1 1 0,1 0-1,0-1 1,-1 1 0,1 0-1,0-1 1,-1 1 0,1 0 0,0 0-1,0 0 1,0-1 0,-1 1-1,1 0 1,0 0 0,0 0 0,0-1-1,1 1 1,-1 1-2,5 35-308,4-20 395,1 0 1,1 0-1,1-1 1,0-1-1,1 0 1,0 0 0,2-1-1,-1-1 1,2-1-1,0 0 1,0 0-1,1-2 1,0 0-1,1-1 1,0-1 0,0-1-1,1 0 1,0-2-1,0 0 1,1-1-1,-1 0 1,1-2-1,0-1 1,3 0-88,-12-1-28,1 0-1,-1 0 1,0-1-1,0-1 1,0 0 0,0-1-1,0 0 1,0 0-1,-1-1 1,0-1 0,1 1-1,-1-2 1,-1 0 0,1 0-1,-1 0 1,0-1-1,-1 0 1,0-1 0,0 0-1,0-1 1,-1 1-1,0-1 1,-1 0 0,0-1-1,-1 0 1,0 0 0,0 0-1,-1-1 1,0 1-1,-1-1 1,1-3 28,-2 2 90,-1 0 0,0-1 0,-1 1 0,0 0-1,-1-1 1,0 1 0,-1 0 0,-1 0 0,0 0 0,0 0 0,-1 0 0,0 1 0,-1 0 0,-1 0-1,0 0 1,0 0 0,-1 1 0,0 0 0,-1 1 0,-1-2-90,-11-10 43,0 1-1,-1 1 1,-1 1-1,-1 0 1,0 2-1,-1 1 1,-1 1 0,-5-1-43,-4-2 156,0 2 0,-1 1 0,-1 2 0,0 1 0,0 2 0,-1 2 0,0 1 1,0 2-1,-1 1 0,1 2 0,-25 3-156,17 2-253,-1 2-1,1 2 1,0 2 0,-22 9 253,-50 20-6224,93-27 3152</inkml:trace>
   <inkml:trace contextRef="#ctx0" brushRef="#br0" timeOffset="12188.61">7835 4765 4864,'-2'-2'282,"-1"0"0,1 0 0,-1 0 0,1 0 0,-1 1 0,0-1 0,0 1 0,0 0 0,0 0 0,0 0 0,0 0 0,0 0 0,0 1 0,0-1 0,0 1 0,0 0 0,-3 0-282,-22 1 1072,0 0 0,0 2 0,0 2 0,-20 5-1072,-52 14 1435,33-9-1016,0 3-1,-45 19-418,104-34-52,1-1 0,1 1 0,-1 0 0,0 0 0,1 1 0,-1 0 0,1 0 0,0 1 0,1 0 0,-1 0 0,1 0 0,0 0 0,0 1 0,0 0 0,1 0 0,0 0 0,0 1 0,1-1 0,0 1 0,0 0 0,0 0 0,1 0 0,0 0 0,0 1 0,1-1 0,0 0 0,0 1 0,1 0 52,2 2-38,1-1 0,0 1 0,0 0 0,1-1 0,0 1 0,1-1 0,0 0 0,0-1 0,1 1 0,0-1 0,1 0 0,0-1 0,0 1 0,0-1 0,1-1 0,3 3 38,143 84-405,-140-86 238,1 0 0,-1-1 1,1-1-1,0 0 0,1-1 1,-1-1-1,1 0 0,0-1 0,0-1 167,-7-1-594,0 0 0,0-1 0,0 0-1,-1 0 1,1-1 0,0 0 0,-1-1 0,0 0-1,0 0 1,1-1 0,-2 0 594,29-19-3312</inkml:trace>
   <inkml:trace contextRef="#ctx0" brushRef="#br0" timeOffset="12901.21">7737 5110 5504,'26'-19'3104,"-25"18"-2571,-1 1-42,0 0-6,0 23 1179,23 57 128,-9-37-1720,-13-38-72,-1 0-1,1-1 1,0 1 0,0 0 0,1-1 0,0 1 0,-1-1 0,2 0 0,-1 1 0,0-1-1,1 0 1,0 0 0,-1-1 0,2 1 0,-1 0 0,0-1 0,1 0 0,-1 0 0,1 0 0,0 0-1,0-1 1,0 1 0,1-1 0,4 0-103,1-1 0,0 0 0,-1-1-1,1 0 1,-1-1 0,1 0 0,0 0-1,-1-1 1,1 0 0,-1 0 0,0-1-1,0-1 1,0 1 0,0-2 0,-1 1-1,1-1 1,-1 0 0,0-1 0,-1 0-1,1 0 1,-1-1 0,0 0 0,-1 0-1,0 0 1,5-7 103,-7 5 340,1 0 1,-2-1-1,1 1 1,-1-1-1,0 1 1,-1-1-1,0 0 0,-1 0 1,0 0-1,0 0 1,-1 0-1,-1-2-340,-12 25 1355,10-5-1246,0-1 0,0 1 0,0 0 0,1 0 0,0 0 0,1 0-1,0 0 1,0 0 0,1 0 0,0 0 0,1 7-109,-1-14-9,0 7-47,0 0 0,1 0 0,0-1 0,0 1 0,1-1 0,0 1 1,0-1-1,1 0 0,0 1 0,0-1 0,1-1 0,0 1 0,0 0 0,1-1 0,-1 0 0,1 0 0,1 0 0,-1-1 0,4 3 56,-5-5-238,1 0 0,0 0-1,0 0 1,0-1 0,0 1-1,0-1 1,1 0 0,-1-1-1,1 1 1,-1-1 0,1 0-1,0-1 1,-1 1 0,1-1-1,0 0 1,-1-1 0,6 0 238,52-15-3846,-24 5 1036</inkml:trace>
@@ -1331,7 +1332,7 @@
     </inkml:brush>
   </inkml:definitions>
   <inkml:trace contextRef="#ctx0" brushRef="#br0">1025 650 5120,'-8'-8'4719,"-5"-4"-4153,5 7-464,0 0 0,0 0 1,0 1-1,0 0 0,-1 0 0,1 1 0,-1 0 0,0 0 0,0 1 1,0 0-1,-1 1 0,1 0 0,0 1 0,0-1 0,-1 2 1,1-1-1,-4 2-102,-8-2 231,2 2-131,1 1 0,0 1 1,0 0-1,0 2 0,0 0 0,1 0 0,0 2 0,1 0 1,-1 1-1,2 1 0,-1 0 0,1 1 0,1 1 1,-9 8-101,15-12-24,1 0 0,-1 1 1,2 0-1,-1 0 1,1 0-1,1 0 0,-1 1 1,2 0-1,-1 0 0,1 1 1,1-1-1,0 1 1,1 0-1,0 0 0,0 0 1,0 10 23,1 10-15,2 0 0,1 0-1,1 0 1,1 0 0,5 13 15,35 118 112,-42-153-109,1 0 0,1 0 0,-1 0 0,1-1 0,1 1 0,0-1 0,0 0 0,1-1 0,-1 1 0,2-1 0,-1 0 0,1-1 0,0 0 0,0 0 0,1 0 0,0-1 0,0 0 0,0 0 0,1-1 0,-1 0 0,1-1 0,0 0 0,0 0 0,0-1 0,8 1-3,-7-2 78,-1-1 0,1-1 0,-1 0-1,1 0 1,0-1 0,-1 0 0,0 0 0,0-1 0,1-1 0,-2 1-1,1-1 1,0-1 0,-1 0 0,0 0 0,1-2-78,-1 3 22,-1-1 1,0-1-1,0 1 0,0-1 1,-1 0-1,0-1 0,0 0 1,-1 0-1,0 0 0,0 0 1,0-1-1,-1 0 0,0 0 1,-1 0-1,0 0 0,0-1 1,-1 1-1,0-1 1,0 0-1,-1 1 0,0-7-22,-41-76 1264,40 59-1402,-4 60 116,3-12 11,1 0 0,1 0 0,1 0 1,0 0-1,1 0 0,0-1 0,2 0 0,0 1 0,0-1 0,1-1 0,1 1 0,1-1 0,0-1 1,0 1-1,2-1 0,-1-1 0,2 1 0,0-2 0,0 0 0,1 0 0,0-1 0,1 0 1,1 0 10,-11-8 6,0 0 0,0 0 1,0 0-1,1-1 1,-1 1-1,0-1 1,1 0-1,-1 0 1,1 0-1,-1 0 1,1-1-1,-1 1 0,1-1 1,0 0-1,-1 0 1,1 0-1,0-1 1,-1 1-1,1-1 1,-1 0-1,1 0 1,-1 0-1,1 0 0,-1-1 1,0 0-1,0 1 1,0-1-1,0 0 1,0 0-1,0-1 1,0 1-1,0-1 1,-1 1-1,1-1 0,-1 0 1,0 0-1,0 0 1,2-3-7,0-8 29,-1-1 0,0 1 0,-1-1 0,-1 1 0,0-1 0,-1 0 0,-1 0 0,0 1-1,0-1 1,-2 1 0,0-1 0,-2-4-29,0-7 293,-1-2 74,4 21-348,0-1-1,0 1 1,1-1 0,0 1 0,0-1-1,1 0 1,0 0 0,0 1 0,1-1-1,0 0-18,-1 8-2,1 1-1,-1-1 1,0 0-1,0 1 0,0-1 1,0 0-1,1 1 0,-1-1 1,0 0-1,0 0 0,1 1 1,-1-1-1,0 0 0,0 0 1,1 0-1,-1 0 0,0 1 1,1-1-1,-1 0 1,0 0-1,1 0 0,-1 0 1,0 0-1,1 0 0,-1 0 1,0 0-1,1 0 0,-1 0 1,0 0-1,1 0 0,-1 0 1,0 0-1,1 0 0,-1 0 1,0 0-1,1 0 1,-1 0-1,0 0 0,1-1 1,-1 1-1,0 0 0,0 0 1,1 0-1,-1 0 0,0-1 1,0 1-1,1 0 0,-1 0 1,0-1-1,0 1 1,0 0-1,1-1 0,-1 1 1,0 0-1,0-1 0,0 1 1,0 0-1,0-1 0,0 1 1,1 0-1,-1-1 3,11 32 1,-2 126 85,-9-149-117,0 0 0,0 1 0,0-1 1,1 0-1,0 1 0,1-1 0,-1 0 0,2 0 0,-1 1 0,1-2 1,0 1-1,1 0 0,0-1 0,0 1 0,0-1 0,1 0 1,0-1-1,1 1 0,-1-1 0,1 0 0,0 0 0,1-1 0,1 2 31,0-4-428,1 1-1,-1-1 0,0-1 0,1 1 0,-1-1 0,1-1 0,0 0 0,0 0 0,0-1 0,-1 0 0,1 0 0,0-1 0,0 0 0,3-2 429,16-4-3354</inkml:trace>
-  <inkml:trace contextRef="#ctx0" brushRef="#br0" timeOffset="10654.351">423 16 3584,'14'-14'1994,"-14"13"-1802,-4 0-78,-1 2-1,1-1 0,0 0 0,0 1 0,-1 0 0,1 0 0,0 0 0,0 0 0,0 1 0,0 0 0,0-1 0,1 1 0,-1 1 0,1-1 0,-3 3-113,-13 35 980,10-8-664,-89 87 1498,37-28-636,48-69-961,0 2 1,2 0-1,0 0 0,2 1 0,1 0 0,1 1 0,-3 18-217,-21 86 107,1-22 474,-2 59 171,24 37-741,7-56 16,19 30 298,-13 80 491,-3-214-757,1 1-1,3-1 1,2 0 0,8 24-59,1 20 0,73 213 613,-36-88-169,-28-93-136,87 217 305,-23-130-654,-16-46-62,23 48-2569,-87-191 694</inkml:trace>
+  <inkml:trace contextRef="#ctx0" brushRef="#br0" timeOffset="10654.35">423 16 3584,'14'-14'1994,"-14"13"-1802,-4 0-78,-1 2-1,1-1 0,0 0 0,0 1 0,-1 0 0,1 0 0,0 0 0,0 0 0,0 1 0,0 0 0,0-1 0,1 1 0,-1 1 0,1-1 0,-3 3-113,-13 35 980,10-8-664,-89 87 1498,37-28-636,48-69-961,0 2 1,2 0-1,0 0 0,2 1 0,1 0 0,1 1 0,-3 18-217,-21 86 107,1-22 474,-2 59 171,24 37-741,7-56 16,19 30 298,-13 80 491,-3-214-757,1 1-1,3-1 1,2 0 0,8 24-59,1 20 0,73 213 613,-36-88-169,-28-93-136,87 217 305,-23-130-654,-16-46-62,23 48-2569,-87-191 694</inkml:trace>
 </inkml:ink>
 </file>
 
@@ -1530,7 +1531,7 @@
   </inkml:definitions>
   <inkml:trace contextRef="#ctx0" brushRef="#br0">347 23 3072,'81'-22'5520,"-35"22"-1035,-55 12-2661,-73 58 2245,-86 55-4069,150-111-14,0 1 0,0 0-1,1 1 1,1 0 0,1 2 0,0 0 0,2 1-1,0 0 1,1 1 0,0 0 0,2 1-1,1 0 1,0 0 0,2 1 0,-4 15 14,10-28-23,1-1 0,-1 0 0,1 0 1,1 1-1,0-1 0,0 0 0,0 0 1,1 0-1,0 0 0,1 0 0,0 0 0,0-1 1,1 1-1,0-1 0,0 0 0,0 0 0,1 0 1,1 0 22,5 7 6,1 0 1,1-1 0,0 0 0,1-1 0,0-1-1,0 0 1,12 6-7,-16-12-85,-1-1-1,1 0 0,0 0 1,0-1-1,0 0 1,0-1-1,0 0 0,1 0 1,-1-1-1,1-1 1,-1 0-1,1 0 0,-1-1 1,1 0-1,-1-1 1,0 0-1,0-1 0,0 0 1,0 0-1,3-3 86,45-13-5856,-43 16 2294</inkml:trace>
   <inkml:trace contextRef="#ctx0" brushRef="#br0" timeOffset="1436.71">688 1097 3840,'18'5'6365,"-4"-13"-5706,-8 1-335,0-1 1,-1 0-1,1-1 1,-1 1-1,-1-1 1,0 0-1,0 0 0,-1-1 1,0 1-1,-1-1 1,0 1-1,0-1 1,-1 0-1,0-2-324,-6-141 2892,3 132-2753,-23-172 250,10 160-416,14 53-261,29 422-2533,7-108 1397,-28-254 1995,-14-90 389,1-14-861,0 0 0,1 0 0,2 0 1,0-1-1,2 0 0,1 1 0,1-1 0,0 1 1,2-1-1,4-11-99,-7 33-31,0 0 1,0 1-1,1-1 0,-1 0 1,1 1-1,0-1 0,0 1 1,0-1-1,0 1 0,0 0 1,1-1-1,-1 1 1,1 0-1,-1 0 0,1 0 1,0 0-1,0 0 0,0 0 1,0 0-1,0 1 0,0-1 1,1 1-1,-1-1 1,0 1-1,1 0 0,-1 0 1,1 0-1,-1 0 0,1 1 1,0-1-1,-1 1 0,1-1 1,0 1-1,-1 0 1,1 0-1,0 0 0,-1 0 1,1 1-1,0-1 0,-1 1 1,1-1-1,-1 1 1,1 0 30,3 2-137,0-1 0,-1 1 0,1 0 0,-1 0 0,1 0 0,-1 1 0,0 0 0,-1 0 1,1 0-1,-1 0 0,0 1 0,0 0 0,0 0 0,1 3 137,-3-6 4,-1-1-1,0 1 1,0 0-1,0 0 1,0 0-1,0 1 1,0-1-1,-1 0 1,1 0-1,-1 0 1,0 1-1,1-1 1,-1 0-1,0 0 1,0 1-1,-1-1 1,1 0-1,0 0 1,-1 0-1,1 1 1,-1-1-1,0 0 1,1 0-1,-1 0 1,0 0-1,-1 0 1,1 0-1,0 0 1,0 0-1,-1-1 1,1 1-1,-1 0 1,0-1 0,1 1-1,-1-1 1,0 0-1,0 1 1,0-1-1,0 0 1,-1 0-4,-87 25 3189,89-25-3198,1 0 1,-1-1-1,1 1 0,0 0 1,0 0-1,-1 0 1,1 0-1,0 0 0,0-1 1,0 1-1,0 0 1,0 0-1,0 0 0,0 0 1,0 0-1,0 0 1,1 0-1,-1-1 1,0 1-1,0 0 0,1 0 1,-1 0-1,1-1 1,-1 1-1,0 0 0,1 0 1,0-1-1,-1 1 1,1 0-1,-1-1 0,1 1 1,0 0-1,0-1 1,-1 1-1,1-1 0,0 0 1,0 1-1,-1-1 1,1 1-1,0-1 9,3 3-19,159 134-34,-103-71-1088,-48-66-7942,-5-5 5398</inkml:trace>
-  <inkml:trace contextRef="#ctx0" brushRef="#br0" timeOffset="1920.123">1278 995 5760,'-1'3'7951,"-1"21"-7385,15 162 442,-4-46-1936,-8-134-505,4-7-6515,-1-4 4956</inkml:trace>
+  <inkml:trace contextRef="#ctx0" brushRef="#br0" timeOffset="1920.122">1278 995 5760,'-1'3'7951,"-1"21"-7385,15 162 442,-4-46-1936,-8-134-505,4-7-6515,-1-4 4956</inkml:trace>
   <inkml:trace contextRef="#ctx0" brushRef="#br0" timeOffset="2291.259">1184 1223 5376,'-1'-1'8605,"8"2"-8464,38 0 1088,70-8-1786,-93 2-2915,-12 5 86</inkml:trace>
   <inkml:trace contextRef="#ctx0" brushRef="#br0" timeOffset="2985.082">1579 1161 4480,'3'-13'6864,"26"-63"-3078,2-15-3039,-30 90-746,-1 1-1,1 0 1,-1 0 0,1 0-1,-1 0 1,1 0 0,-1 0-1,1 0 1,-1 0 0,1 0 0,-1 0-1,1 0 1,-1 0 0,1 0-1,-1 0 1,1 0 0,-1 1-1,1-1 1,-1 0 0,1 0 0,-1 1-1,1-1 1,-1 0 0,1 1-1,-1-1 1,0 0 0,1 1 0,-1-1-1,0 0 1,1 1 0,-1-1-1,0 1 1,0-1 0,1 1-1,-1-1 1,0 1 0,0-1 0,0 1-1,0-1 1,1 1 0,-1-1-1,0 1 1,0-1 0,0 1-1,0-1 1,0 1 0,0-1 0,0 1-1,-1-1 1,1 1 0,0-1-1,0 1 0,0 0-9,3 114 83,-22 271-2426,26-344-1829,-1-35 1296</inkml:trace>
 </inkml:ink>
@@ -1645,7 +1646,7 @@
   </inkml:definitions>
   <inkml:trace contextRef="#ctx0" brushRef="#br0">1 920 3968,'14'-1'7505,"19"-35"-4514,16-38-1653,-47 70-1255,1 0-1,-1 0 1,0 0-1,0-1 1,-1 1 0,1 0-1,-1-1 1,0 1-1,0-1 1,0 1-1,-1-1 1,1 0 0,-1 1-1,-1-1 1,1 0-1,0 1 1,-1-1-1,0 1 1,0-1 0,-1 1-1,1-1 1,-1 1-1,0 0 1,0 0-1,0 0 1,0 0 0,-1 0-1,0 0 1,-1-1-83,-68-64 1200,72 68-1307,13 1-336,12-1 492,0-2 0,0-1 0,-1-1 0,1-1 0,-1-1 0,12-5-49,24-8 64,-57 20-77,-1 1 1,1 0 0,-1 0 0,1 0-1,-1 0 1,1 0 0,-1 1 0,0-1-1,1 1 1,-1 0 0,0-1 0,0 1-1,0 0 1,-1 0 0,1 0 0,0 1-1,-1-1 1,1 0 0,-1 0-1,0 1 1,0-1 0,0 1 0,0 0-1,0-1 1,0 3 12,1-2-61,19 57-1488,-1 1 0,-4 1 0,-2 0 0,-3 1 0,-3 0 0,-3 1 0,-2 46 1549,-1-75-176,-1 192 366,-21-79 3818,20-145-3848,0 0 0,-1 0 0,1 0 0,-1 0 1,0 0-1,0 0 0,0 0 0,0-1 0,0 1 0,-1 0 1,1-1-1,-1 1 0,0-1 0,0 1 0,1-1 1,-2 0-1,1 0 0,0 0 0,0 0 0,-1 0 1,1 0-1,-1-1 0,1 1 0,-1-1 0,0 0 0,1 0 1,-1 0-1,-1 0-160,-9 0 580,0-1 1,0 0-1,0-1 1,0-1-1,0 0 1,0-1-1,0 0 1,0-1-581,6 2 188,-8 0-125,0-1 1,0-1 0,0 0-1,1-1 1,-1-1-1,1 0 1,1-1 0,-1 0-1,1-1 1,1-1-1,-1 0 1,1 0 0,1-1-1,-8-9-63,17 15-245,0 0-1,0 0 0,1 0 1,-1-1-1,1 1 0,0 0 1,0-1-1,0 1 1,1-1-1,-1 1 0,1-1 1,0 1-1,1-1 0,-1 1 1,1-1-1,0 1 0,0-1 1,0 1-1,1 0 1,-1-1-1,3-2 246,55-80-10431,-29 59 6485</inkml:trace>
   <inkml:trace contextRef="#ctx0" brushRef="#br0" timeOffset="687.226">481 279 5504,'6'2'8519,"1"-1"-8505,38-1 876,-15 0-4127,-24 0-101</inkml:trace>
-  <inkml:trace contextRef="#ctx0" brushRef="#br0" timeOffset="1204.182">810 170 5632,'1'-28'5481,"2"0"-3520,0-28-1041,9-1 403,0 74-715,-6 30-270,-2 0 0,-1 0 1,-3 0-1,-2 0 0,-5 19-338,0 40 21,5-75-179,0 29-1022,9-22-3013,3-30-2068,-1-12 2880</inkml:trace>
+  <inkml:trace contextRef="#ctx0" brushRef="#br0" timeOffset="1204.181">810 170 5632,'1'-28'5481,"2"0"-3520,0-28-1041,9-1 403,0 74-715,-6 30-270,-2 0 0,-1 0 1,-3 0-1,-2 0 0,-5 19-338,0 40 21,5-75-179,0 29-1022,9-22-3013,3-30-2068,-1-12 2880</inkml:trace>
 </inkml:ink>
 </file>
 
@@ -1843,7 +1844,7 @@
   </inkml:definitions>
   <inkml:trace contextRef="#ctx0" brushRef="#br0">464 64 3712,'2'-2'322,"1"1"-1,-1 0 1,1 0 0,-1 0 0,1 0 0,0 0-1,-1 1 1,1-1 0,0 1 0,0-1-1,-1 1 1,1 0 0,0 0 0,0 1-1,0-1 1,-1 0 0,1 1 0,0 0-322,16 0 896,-7 0-380,32-11 6146,-43 10-6596,-1-1 1,1 1-1,0-1 1,-1 1-1,1-1 0,-1 1 1,1-1-1,0 1 0,-1-1 1,1 1-1,-1-1 0,0 0 1,1 1-1,-1-1 0,1 0 1,-1 0-1,0 1 1,0-1-1,1 0 0,-1 0 1,0 1-1,0-1 0,0 0 1,0 0-1,0 1 0,0-1 1,0 0-1,0 0 0,0 0 1,0 1-1,0-1 1,-1 0-1,1 0 0,0 1 1,0-1-1,-1 0 0,1 0 1,-1 1-1,1-1 0,-1 0 1,1 1-1,-1-1 0,0 0-66,-2-1 43,0 0-1,-1 0 1,1 0-1,-1 0 1,1 1-1,-1-1 1,0 1-1,0 0 1,1 0-1,-1 1 1,0-1-1,0 1 1,0-1-1,0 1 1,0 1-1,-1-1-42,-8-1 110,-17 0 131,1 1 0,-1 2 0,1 0 0,-1 2 0,1 2-1,0 0 1,1 2 0,0 1 0,0 1 0,0 1 0,-23 15-241,40-19-3,0 1 1,0 0-1,1 1 0,0 1 0,0-1 0,1 2 0,0-1 1,1 1-1,0 0 0,1 1 0,1 0 0,-1 0 0,2 0 0,0 1 1,0 0-1,1 0 0,1 0 0,0 1 0,1-1 0,0 1 1,1-1-1,0 1 0,2 0 0,-1-1 0,2 1 0,0-1 0,0 1 1,1-1-1,1 0 0,1 2 3,-2-5-28,2 0 1,-1 0-1,2 0 0,-1 0 1,1-1-1,1 0 0,-1 0 1,2-1-1,-1 0 0,1 0 1,0-1-1,1 0 0,0 0 0,0-1 1,0 0-1,1 0 0,0-1 1,0-1-1,0 1 0,0-2 1,5 2 27,10 2-827,1-2 0,-1 0 1,1-2-1,0 0 0,0-2 1,0-1-1,0-1 1,15-3 825,20-4-4910</inkml:trace>
   <inkml:trace contextRef="#ctx0" brushRef="#br0" timeOffset="870.55">733 431 5888,'11'-19'9386,"-28"24"-4181,14 2-5179,0-1 0,0 1 0,1 1 0,0-1 0,0 0 0,1 0-1,0 1 1,0-1 0,0 1 0,1-1 0,1 1 0,-1-1 0,1 1-26,-1 12 58,15 106-113,-14-120 34,1 1 0,0-1 0,0 0 0,1 1 0,0-1 0,0-1 0,0 1 1,1 0-1,0-1 0,0 1 0,0-1 0,1 0 0,0-1 0,0 1 0,0-1 0,0 0 0,4 2 21,-5-4-89,-1-1 0,1 1 0,0-1 0,0 0 0,0 0 0,1 0 0,-1 0 0,0-1 0,0 0-1,0 1 1,0-2 0,0 1 0,1 0 0,-1-1 0,0 0 0,0 0 0,0 0 0,0-1 0,0 1 0,0-1 0,-1 0-1,1 0 1,-1 0 0,1 0 0,2-3 89,2-1-168,0-1 0,-1 0 0,1 0 0,-1-1 1,-1 0-1,0 0 0,0-1 0,0 1 0,3-10 168,-3 6 144,-1-1 0,0 0 1,-1 0-1,0 0 0,-1-1 1,-1 1-1,0-1 0,-1 1 1,0-1-1,-1 0 0,-1 0 1,0 1-1,-1-1 0,0 0 1,-1 1-1,-4-13-144,1-2 1296,12 33-1141,16 93 362,-13-42-339,3-1 0,2 0-1,7 14-177,-19-63-70,0 0 0,0 0-1,1-1 1,0 1 0,0-1-1,0 1 1,0-1 0,1 0-1,0 0 1,0-1 0,0 1 0,1-1-1,-1 0 1,1 0 0,0 0-1,1-1 1,-1 0 0,0 0-1,1 0 1,0-1 0,-1 1-1,1-1 1,0-1 0,0 1-1,0-1 1,1 0 0,4 0 70,71-21-4517,-38-3 53</inkml:trace>
-  <inkml:trace contextRef="#ctx0" brushRef="#br0" timeOffset="1379.891">1549 685 6400,'-33'0'3925,"32"0"-2810,1 0-27,0 0-27,0 0-298,0 0-198,0 0-197,0 6 922,2 49 2657,7 28-2790,46 130-1242,-52-206-28,0 1-306,-2-3-3790,-1-15-1284</inkml:trace>
+  <inkml:trace contextRef="#ctx0" brushRef="#br0" timeOffset="1379.89">1549 685 6400,'-33'0'3925,"32"0"-2810,1 0-27,0 0-27,0 0-298,0 0-198,0 0-197,0 6 922,2 49 2657,7 28-2790,46 130-1242,-52-206-28,0 1-306,-2-3-3790,-1-15-1284</inkml:trace>
 </inkml:ink>
 </file>
 
@@ -2041,7 +2042,7 @@
     </inkml:brush>
   </inkml:definitions>
   <inkml:trace contextRef="#ctx0" brushRef="#br0">143 7 6400,'10'-5'4352,"-9"4"-2902,4 1 794,-6 1 3704,-7 3-5646,1 1 0,0-1-1,0 1 1,0 1 0,1-1 0,0 1-1,0 1 1,0-1 0,1 1 0,0 0 0,0 0-1,-4 7-301,0 7 14,0 1-1,1 0 0,1 0 1,1 0-1,1 1 0,-2 22-13,1 17-555,3 0-1,3-1 1,2 1 0,4-1-1,2 0 1,2 0-1,12 35 556,-18-78-905,0 0-1,2 0 1,0 0-1,0-1 1,2 0-1,0 0 0,1-1 1,1 0-1,0-1 1,2 2 905,31 24-3920</inkml:trace>
-  <inkml:trace contextRef="#ctx0" brushRef="#br0" timeOffset="550.82">657 329 7040,'5'-23'4517,"-4"11"3583,-1 20-5742,22 100-1824,49 242-289,-44-252-133,-27-98-148,1 0 1,-1 1-1,1-1 0,-1 0 1,1 0-1,-1 0 1,1 0-1,-1 0 0,1 0 1,-1 0-1,1 0 1,-1 0-1,1 0 0,-1 0 1,1 0-1,-1 0 0,0 0 1,1 0-1,-1 0 1,1-1-1,-1 1 0,1 0 1,-1 0-1,1 0 1,-1-1-1,0 1 0,1 0 1,-1-1-1,0 1 0,1 0 1,-1-1-1,0 1 1,1 0-1,-1-1 0,0 1 1,0-1-1,1 1 0,-1-1 1,0 1-1,0 0 1,0-1-1,0 1 0,0-1 1,1 1-1,-1-1 1,0 1-1,0-1 0,0 1 1,0-1-1,0 1 0,-1-1 1,1 1-1,0-1 1,0 1-1,0-1 0,0 1 36,-5-118-12127,5 90 8431</inkml:trace>
+  <inkml:trace contextRef="#ctx0" brushRef="#br0" timeOffset="550.819">657 329 7040,'5'-23'4517,"-4"11"3583,-1 20-5742,22 100-1824,49 242-289,-44-252-133,-27-98-148,1 0 1,-1 1-1,1-1 0,-1 0 1,1 0-1,-1 0 1,1 0-1,-1 0 0,1 0 1,-1 0-1,1 0 1,-1 0-1,1 0 0,-1 0 1,1 0-1,-1 0 0,0 0 1,1 0-1,-1 0 1,1-1-1,-1 1 0,1 0 1,-1 0-1,1 0 1,-1-1-1,0 1 0,1 0 1,-1-1-1,0 1 0,1 0 1,-1-1-1,0 1 1,1 0-1,-1-1 0,0 1 1,0-1-1,1 1 0,-1-1 1,0 1-1,0 0 1,0-1-1,0 1 0,0-1 1,1 1-1,-1-1 1,0 1-1,0-1 0,0 1 1,0-1-1,0 1 0,-1-1 1,1 1-1,0-1 1,0 1-1,0-1 0,0 1 36,-5-118-12127,5 90 8431</inkml:trace>
   <inkml:trace contextRef="#ctx0" brushRef="#br0" timeOffset="975.05">1108 531 6272,'39'-5'8618,"55"11"-3306,175-3-4144,-131-7-2779,-89-6-3407,-33 6-3366,-9 4 4555</inkml:trace>
   <inkml:trace contextRef="#ctx0" brushRef="#br0" timeOffset="2418.297">2432 287 5888,'0'0'1978,"0"-2"-1055,0-6 202,0 6 203,0-17 3670,0 18-4917,0 0 0,0 0 0,0-1 0,-1 1 0,1 0 0,0 0 0,-1 0 0,1 0 0,0 0 1,-1 0-1,1 0 0,-1 0 0,0 0 0,1 0 0,-1 0 0,0 0 0,0 0 0,1 0 1,-1 0-1,0 1 0,0-1 0,0 0 0,0 1 0,0-1 0,0 1 0,0-1 0,0 1 0,0-1 1,0 1-1,0 0 0,-1-1 0,1 1 0,-1 0-81,-2-2 129,-6 0-28,0 0 0,-1 1 0,1 0 0,-1 1 0,1 0 0,-1 1 0,1 0 0,-1 0 0,1 1 1,0 1-1,0 0 0,0 0 0,0 1 0,0 0 0,1 0 0,0 1 0,0 1 0,0-1 0,0 2 0,1-1 0,-4 5-101,7-6-7,0 0-1,1 1 1,-1 0-1,1 0 1,0 0 0,1 0-1,0 1 1,0-1-1,0 1 1,0 0-1,1 0 1,1 0-1,-1 0 1,1 0-1,0 1 1,0-1-1,1 0 1,0 0-1,1 1 1,-1-1 0,1 0-1,1 0 1,-1 1-1,1-1 1,1-1-1,-1 1 1,1 0-1,0 0 1,1-1-1,-1 0 1,1 0-1,1 0 1,-1 0-1,1 0 1,2 1 7,-5-4-2,0-1 0,1 1-1,-1-1 1,0 0 0,1 0 0,-1 0 0,1 0 0,0 0-1,-1-1 1,1 1 0,0-1 0,0 0 0,0 1-1,0-2 1,0 1 0,0 0 0,1 0 0,-1-1 0,0 0-1,0 0 1,0 0 0,1 0 0,-1 0 0,0 0-1,0-1 1,0 0 0,1 1 0,-1-1 0,0-1 0,0 1-1,0 0 1,-1-1 0,1 1 0,0-1 0,0 0-1,-1 0 1,1 0 0,-1 0 0,0 0 0,0-1 0,0 1-1,0-1 1,0 1 0,2-4 2,-4 6 18,0 0 0,0-1 0,1 1 1,-1 0-1,0-1 0,1 1 0,-1 0 0,0-1 0,0 1 1,0 0-1,0-1 0,1 1 0,-1 0 0,0-1 0,0 1 0,0-1 1,0 1-1,0 0 0,0-1 0,0 1 0,0-1 0,0 1 0,0-1 1,0 1-1,0 0 0,0-1 0,0 1 0,-1 0 0,1-1 0,0 1 1,0-1-1,0 1 0,0 0 0,-1-1 0,1 1 0,0 0 1,0-1-1,-1 1 0,1 0 0,0 0 0,-1-1 0,1 1 0,0 0 1,-1 0-1,1-1 0,0 1 0,-1 0 0,1 0 0,-1 0 0,1 0 1,0 0-1,-1 0 0,1 0 0,-1 0 0,1 0 0,0 0 0,-1 0 1,1 0-1,-1 0 0,1 0 0,0 0 0,-1 0 0,1 0 1,-1 0-1,1 0 0,0 0 0,-1 1 0,1-1 0,0 0 0,-1 0-18,-25 15 1045,-44 62 875,58-38-2246,33-24 540,-20-15-182,-1 0 32,0 0 32,0 0 37,-6 30 608,-16 53-570,22-79-169,0 4-21,-1 0 0,1 1 0,0-1 1,1 0-1,0 0 0,0 0 0,1 0 0,0 0 1,0 0-1,1 0 0,0-1 0,0 1 0,1-1 1,3 5 18,-3-9-3,0-1-1,1 0 1,-1 0 0,1 0 0,-1-1 0,1 1 0,-1-1 0,1 0 0,0-1 0,-1 1 0,1-1 0,0 0 0,0 0 0,0 0 0,-1-1 0,1 1 0,1-2 3,3 2-2,6-2-66,0 0 1,0 0-1,-1-2 0,1 0 0,-1-1 0,1 0 1,4-3 67,-9 4-18,-8 3 31,-1 1 0,0 0 0,0-1 0,1 1 0,-1 0 0,0-1 0,0 0 0,1 1 0,-1-1 0,0 0 0,0 1 1,0-1-1,0 0 0,0 0 0,0 0 0,0 0 0,0 0 0,0 0 0,-1 0 0,1 0 0,0-1 0,-1 1 0,1 0 0,-1 0 0,1-1 0,-1 1 0,1 0 0,-1-1 0,0 1 0,0 0 0,0-1 1,0 1-14,0 0 53,0 1 32,0 0 27,0 0 80,0 11 368,-15 79 533,3 89-886,7 1 0,8 0-1,11 35-206,-9-141-12,17 161-617,-17-212-539,-5-23 1075,0 0-1,0 0 0,0-1 1,0 1-1,0 0 0,1 0 1,-1 0-1,0-1 1,0 1-1,0 0 0,0 0 1,0 0-1,0-1 0,1 1 1,-1 0-1,0 0 1,0 0-1,0 0 0,1-1 1,-1 1-1,0 0 1,0 0-1,0 0 0,1 0 1,-1 0-1,0 0 0,0 0 1,1 0-1,-1 0 1,0 0-1,0 0 0,0 0 1,1 0-1,-1 0 0,0 0 1,0 0-1,1 0 1,-1 0-1,0 0 0,0 0 1,1 0-1,-1 0 0,0 0 1,0 0-1,0 0 1,1 0-1,-1 1 0,0-1 1,0 0-1,0 0 0,1 0 1,-1 0-1,0 1 1,0-1-1,0 0 0,0 0 1,0 0-1,1 1 0,-1-1 1,0 0-1,0 0 1,0 0-1,0 1 0,0-1 94,0-1-264,6-9-5863</inkml:trace>
   <inkml:trace contextRef="#ctx0" brushRef="#br0" timeOffset="3303.94">3027 589 6784,'-6'0'-846,"-4"0"7994,8 0 1251,10 0-7021,74-4-1042,306 4-2026,-387 0 1550,-1 0 0,0 0 0,0 0 0,1 0 0,-1 0 0,0 0 0,1 0 0,-1 0 0,0 0 0,1 0 0,-1 0 1,0 0-1,0 0 0,1 0 0,-1 0 0,0 0 0,1-1 0,-1 1 0,0 0 0,0 0 0,1 0 0,-1 0 0,0-1 0,0 1 0,0 0 1,1 0-1,-1-1 0,0 1 0,0 0 0,0 0 0,0-1 0,0 1 0,1 0 0,-1-1 0,0 1 0,0 0 0,0 0 0,0-1 1,0 1-1,0 0 0,0-1 0,0 1 0,0 0 0,0-1 0,0 1 0,0 0 0,0 0 0,0-1 0,-1 1 0,1 0 0,0-1 0,0 1 1,0 0-1,0 0 0,0-1 0,-1 1 0,1 0 0,0 0 0,0-1 140,-5-7-4485</inkml:trace>
@@ -2080,7 +2081,7 @@
   <inkml:trace contextRef="#ctx0" brushRef="#br0">393 236 6912,'5'-11'2032,"0"-3"117,-4 1 2448,-1 12-3200,0 1-143,0 0-449,0 0 75,-5 41 2096,3-3-2860,2 0 0,1 0 0,2 0 0,6 28-116,-6-38-82,-2-15 81,1 0 0,0 0-1,0 0 1,1 0-1,1 0 1,0-1-1,1 1 1,0-1-1,1 0 1,1 0 1,-7-12-81,0 0 0,-1-1 0,1 1 1,0 0-1,0-1 0,0 1 0,-1 0 0,1-1 1,0 1-1,0-1 0,0 1 0,0 0 0,0-1 0,0 1 1,0-1-1,0 1 0,0 0 0,0-1 0,0 1 0,0-1 1,0 1-1,0 0 0,0-1 0,0 1 0,0-1 0,0 1 1,1 0-1,-1-1 0,0 1 0,0 0 0,1-1 1,-1 1-1,0 0 0,0-1 0,1 1 0,-1 0 0,0 0 1,1-1-1,-1 1 0,0 0 0,1 0 0,-1 0 0,0-1 1,1 1-1,-1 0 0,0 0 0,1 0 0,-1 0 1,1 0-1,-1 0 0,0 0 0,1 0 0,-1 0 0,1 0 1,-1 0-1,0 0 0,1 0 0,-1 0 81,-59-101-13082,39 75 9626</inkml:trace>
   <inkml:trace contextRef="#ctx0" brushRef="#br0" timeOffset="263.823">200 359 8320,'-9'11'3168,"9"-8"-2464,3-3 576,-3 0 64,6 6-288,5-2-1,0 1-159,6 5-96,5 1-416,6-2-160,5 0-96,6 2-64,10-1-64,6-1-608,6-9-256,-1-6-1823,12-3-801,0-9-640</inkml:trace>
   <inkml:trace contextRef="#ctx0" brushRef="#br0" timeOffset="983.984">1799 104 6656,'5'-13'4378,"-5"12"-3034,0 1-117,0-25 3690,1 23-4849,-1-1 1,-1 1-1,1-1 0,0 0 1,-1 1-1,1-1 1,-1 1-1,1 0 0,-1-1 1,0 1-1,0-1 0,-1 1 1,1 0-1,0 0 0,-1 0 1,1 0-1,-1 0 0,1 0 1,-1 0-1,0 0 0,0 1 1,0-1-1,0 1 0,0-1 1,-1 1-1,1 0 0,-2-1-68,-84-5 1275,68 9-1144,-1 1-1,1 0 1,0 2 0,0 0-1,0 2 1,1 0 0,0 1-1,0 1 1,1 0 0,-12 10-131,17-12-11,1 1 0,0 1 1,1 0-1,0 1 0,1 0 1,-1 1-1,2 0 0,0 0 1,0 1-1,1 0 0,1 1 1,0 0-1,0 0 0,1 0 1,1 1-1,0 0 0,1 0 1,1 0-1,0 0 0,1 1 1,0-1-1,1 1 0,1 0 1,1-1-1,0 1 0,0-1 1,2 6 10,2-6-13,1 1 0,0-1 0,1-1 0,0 1 0,1-1 0,0 0 0,4 3 13,-2-4-422,1-1-1,0 0 1,1 0-1,0-1 1,0-1 0,1 0-1,0-1 1,0 0 0,3 0 422,-6-4-929,-1 0 1,1-1 0,-1 0 0,1 0 0,0-1 0,0-1 0,0 1 0,9-1 928,15-1-3856</inkml:trace>
-  <inkml:trace contextRef="#ctx0" brushRef="#br0" timeOffset="1506.151">1777 516 6912,'-17'-20'7440,"1"26"2006,15 6-7302,1-6-2871,3 14 767,1-1 0,0 1 0,1-1 0,1 0 0,1-1 0,8 14-40,-9-18-156,0-1 0,1 0 0,1 0-1,0 0 1,0-1 0,2-1 0,-1 1 0,1-2 0,7 6 156,-13-12-172,1 0 1,-1-1 0,1 0 0,0 0 0,0 0-1,0-1 1,0 1 0,1-1 0,-1 0 0,1-1 0,-1 1-1,1-1 1,-1 0 0,1-1 0,0 1 0,-1-1-1,1 0 1,0-1 0,0 1 0,-1-1 0,1 0 0,-1-1-1,1 1 1,-1-1 0,6-2 171,-5 1-31,0 0 0,0 0-1,0-1 1,-1 0 0,1 0-1,-1 0 1,0 0 0,0-1 0,0 0-1,-1 0 1,0 0 0,0-1 0,0 1-1,0-1 1,-1 0 0,0 0-1,0-1 1,-1 1 0,0 0 0,0-1-1,0 1 1,0-8 31,-3 1 485,0-1 1,-1 0-1,-1 1 0,0-1 1,-1 1-1,0 0 0,-1 0 1,-4-8-486,9 21 19,0 1 1,0-1-1,0 0 1,1 0-1,-1 0 1,0 0-1,0 0 1,0 0-1,0 0 1,1 0-1,-1 0 1,0 0-1,0 0 1,0 0-1,1 0 1,-1 0-1,0 0 1,0 0-1,0 0 1,0 0-1,1-1 1,-1 1-1,0 0 1,0 0-1,0 0 1,0 0-1,1 0 1,-1 0-1,0 0 1,0-1-1,0 1 1,0 0-1,0 0 1,0 0-1,0 0 1,1 0-1,-1-1 1,0 1-20,14 16 453,60 118-15,-60-116-800,0-1 0,1 0 0,1-1 0,0 0 0,1-2 0,17 12 362,-22-18-998,1-1-1,0 0 0,0-1 0,0 0 1,1-1-1,0 0 0,6 0 999,36 2-4506,-6-2 202</inkml:trace>
+  <inkml:trace contextRef="#ctx0" brushRef="#br0" timeOffset="1506.15">1777 516 6912,'-17'-20'7440,"1"26"2006,15 6-7302,1-6-2871,3 14 767,1-1 0,0 1 0,1-1 0,1 0 0,1-1 0,8 14-40,-9-18-156,0-1 0,1 0 0,1 0-1,0 0 1,0-1 0,2-1 0,-1 1 0,1-2 0,7 6 156,-13-12-172,1 0 1,-1-1 0,1 0 0,0 0 0,0 0-1,0-1 1,0 1 0,1-1 0,-1 0 0,1-1 0,-1 1-1,1-1 1,-1 0 0,1-1 0,0 1 0,-1-1-1,1 0 1,0-1 0,0 1 0,-1-1 0,1 0 0,-1-1-1,1 1 1,-1-1 0,6-2 171,-5 1-31,0 0 0,0 0-1,0-1 1,-1 0 0,1 0-1,-1 0 1,0 0 0,0-1 0,0 0-1,-1 0 1,0 0 0,0-1 0,0 1-1,0-1 1,-1 0 0,0 0-1,0-1 1,-1 1 0,0 0 0,0-1-1,0 1 1,0-8 31,-3 1 485,0-1 1,-1 0-1,-1 1 0,0-1 1,-1 1-1,0 0 0,-1 0 1,-4-8-486,9 21 19,0 1 1,0-1-1,0 0 1,1 0-1,-1 0 1,0 0-1,0 0 1,0 0-1,0 0 1,1 0-1,-1 0 1,0 0-1,0 0 1,0 0-1,1 0 1,-1 0-1,0 0 1,0 0-1,0 0 1,0 0-1,1-1 1,-1 1-1,0 0 1,0 0-1,0 0 1,0 0-1,1 0 1,-1 0-1,0 0 1,0-1-1,0 1 1,0 0-1,0 0 1,0 0-1,0 0 1,1 0-1,-1-1 1,0 1-20,14 16 453,60 118-15,-60-116-800,0-1 0,1 0 0,1-1 0,0 0 0,1-2 0,17 12 362,-22-18-998,1-1-1,0 0 0,0-1 0,0 0 1,1-1-1,0 0 0,6 0 999,36 2-4506,-6-2 202</inkml:trace>
   <inkml:trace contextRef="#ctx0" brushRef="#br0" timeOffset="2433.397">2620 756 7296,'22'-12'8923,"11"5"-7212,13 6-1558,-30-1-71,-1 2 1,1-1 0,0 2-1,-1 0 1,1 1-1,-1 0 1,1 1 0,-1 1-1,0 1 1,0 0-1,6 3-82,-20-7 52,1-1 0,-1 1 0,0 0 0,0-1 0,1 1-1,-1 0 1,0-1 0,0 1 0,0 0 0,0 0 0,0 0-1,0 0 1,0 0 0,0 0 0,0 1 0,-1-1-1,1 0 1,0 0 0,-1 0 0,1 1 0,-1-1 0,1 0-1,-1 1 1,1-1 0,-1 1 0,0-1 0,0 0 0,0 1-1,0-1 1,0 1 0,0-1 0,0 0 0,0 1 0,-1-1-1,1 0 1,-1 1 0,1-1 0,-1 0 0,0 2-52,-6 9 163,-1-1 0,0 0 1,-1 0-1,0-1 1,-1 0-1,0-1 0,-1 0 1,0 0-1,0-1 1,-1-1-1,-11 6-163,16-9 76,0 1-1,0-2 1,-1 1 0,0-1 0,1 0-1,-1-1 1,0 0 0,0 0 0,-1-1-1,-2 0-75,11 0-4,0-1-1,1 0 0,-1 0 0,1 0 1,-1 0-1,1 0 0,-1 1 1,0-1-1,1 0 0,-1 0 1,1 0-1,-1 0 0,1 0 0,-1-1 1,1 1-1,-1 0 0,1 0 1,-1 0-1,0 0 0,1 0 0,-1-1 1,1 1-1,-1 0 0,0 0 1,1-1-1,-1 1 0,0 0 1,1 0-1,-1-1 0,0 1 0,1 0 1,-1-1-1,0 1 0,0-1 1,1 1-1,-1 0 0,0-1 0,0 1 1,0-1-1,1 1 0,-1-1 1,0 1-1,0 0 0,0-1 1,0 1-1,0-1 0,0 1 0,0-1 1,0 1-1,0-1 0,0 1 1,0-1-1,-1 1 0,1 0 1,0-1-1,0 1 0,0-1 0,0 1 1,-1 0-1,1-1 0,0 1 1,-1-1-1,1 1 0,0 0 0,0-1 1,-1 1-1,1 0 0,-1-1 5,15 2-13,-1-1 0,0 2 0,1 0 0,-1 0 0,0 1 0,0 1 0,-1 0 0,1 1 0,-1 0 0,0 1 0,0 1 0,-1-1 0,1 2 0,-2 0 0,1 0 0,6 7 13,5 0 8,-1 1-1,-1 1 0,-1 1 1,0 0-1,-1 2 0,-1 0 1,-1 1-1,3 7-7,-17-27 4,-1 0 0,0 1 1,-1-1-1,1 1 0,0-1 0,0 1 1,-1-1-1,1 1 0,-1 0 0,1-1 0,-1 1 1,0 0-1,1 0 0,-1-1 0,0 1 1,0 0-1,0 0 0,-1-1 0,1 1 1,0 0-1,-1-1 0,1 1 0,-1 0 0,1-1 1,-1 1-1,0-1 0,1 1 0,-1-1 1,-1 2-5,-4 4 15,-1 1 0,0-1 0,0 0 0,-1-1 0,0 0 0,0 0 0,0 0 1,-1-1-1,1-1 0,-1 1 0,-1-1 0,1-1 0,0 0 0,-1 0 0,0-1 1,0 0-1,-5 0-15,9 0 9,-221 41-110,108-23-1784,-4-5-4288,55-11 957</inkml:trace>
   <inkml:trace contextRef="#ctx0" brushRef="#br0" timeOffset="4101.452">3314 520 3840,'-16'-25'3509,"16"2"-1701,6 10-1326,-1 0 0,2 0 0,-1 1 0,2 0 0,0 0 0,0 1 0,1 0 0,0 0-482,0 0 236,1 0 0,0 1 0,0 0 0,1 0 0,0 1-1,1 1 1,0 0 0,0 0 0,0 1 0,1 1 0,0 0 0,1 1 0,-1 1 0,1 0 0,0 0 0,0 1-1,2 1-235,-11 2 57,-1 1 0,1 0 0,-1 0 0,1 0 0,-1 0-1,0 1 1,1-1 0,-1 1 0,0 0 0,0 1-1,0-1 1,0 1 0,-1-1 0,1 1 0,-1 0 0,1 1-1,-1-1 1,0 0 0,0 1 0,-1 0 0,1 0-1,-1 0-56,44 92 494,-1 61-190,-34-99 64,-9-91-242,1 1-1,1-1 0,2 1 0,1 0 0,2 0 0,0 1 0,3 0 0,0 1 1,2 1-1,1 0 0,2 0 0,0 2 0,4-2-125,-15 21 201,0 0 0,1 0 1,0 1-1,0 0 0,1 0 0,-1 1 0,2 0 1,-1 0-1,3-1-201,-8 6 25,0-1 0,1 0 0,-1 1 0,1 0 0,0-1 0,-1 1 0,1 1 0,0-1 0,-1 1 0,1-1 0,0 1 0,0 0 1,0 0-1,0 1 0,-1-1 0,1 1 0,0 0 0,-1 0 0,1 0 0,0 0 0,-1 1 0,1-1 0,-1 1 0,0 0 0,3 2-25,1 2 99,1 2-1,-1-1 0,0 1 1,0 0-1,-1 1 0,0-1 1,-1 1-1,0 0 1,2 6-99,-1-4 95,-1 0 0,-1 0 0,0 1 0,-1 0 0,0 0 0,0 0 0,-1 0 0,-1 0 0,0 1 0,-1-1 0,0 2-95,-4 97 245,-5 0 1,-4 0-1,-15 49-245,-29 107-1467,-11-2 1,-16 10 1466,79-259-241,-27 72-1446,0-36-2428,20-39-919</inkml:trace>
   <inkml:trace contextRef="#ctx0" brushRef="#br0" timeOffset="29734.952">521 1907 6656,'49'-35'6101,"-11"2"-3392,-37 31-2611,0 0 0,0 1 0,0-1 0,-1 0 0,1 0 0,0 0 0,-1 0 1,0 1-1,1-1 0,-1 0 0,0 0 0,0 0 0,0 0 0,0 0 0,0 0 0,0 0 0,-1 0 0,1 0 0,-1 0 0,1 1 0,-1-1 0,0 0 0,0 0 0,0 1 0,0-1 0,0 0 0,0 1 0,0-1 0,0 1 0,-1-1 0,1 1 0,0 0 1,-1-1-1,1 1 0,-1 0 0,0 0 0,1 0 0,-1 0 0,0 1 0,0-1 0,0 0 0,1 1 0,-1-1 0,0 1 0,0 0 0,0-1 0,-1 1-98,-10-3 211,0 0 0,0 1 0,-1 1 0,1 0 0,0 0 0,0 2 0,-1-1 0,1 2 0,-6 1-211,-8 2 102,1 2 0,-1 0 1,2 2-1,-1 1 1,1 1-1,1 1 0,0 1 1,1 1-1,0 1 1,-8 9-103,16-13-38,0 2 1,1-1 0,0 2-1,1 0 1,0 1 0,1 0-1,-8 15 38,15-21-16,0 0 0,0-1 0,1 1 0,1 1 0,-1-1 0,1 0 0,1 1 0,0 0 0,0 0 0,1-1 0,0 1 0,1 0 0,0 0 0,2 7 16,-1-6-33,1 0 0,0 0 0,1-1 0,1 1-1,-1-1 1,2 0 0,-1 0 0,1 0 0,4 4 33,-2-2-86,1-1-1,0 1 1,1-2 0,0 1 0,1-1 0,0 0 0,11 7 86,-11-8-279,1-1 0,0-1-1,1 0 1,-1-1 0,1 0 0,0 0-1,1-1 1,-1-1 0,1 0 0,0-1-1,0-1 1,0 0 0,0 0 0,10-1 279,53-2-2965,-6 0-1563</inkml:trace>
@@ -2114,10 +2115,10 @@
     </inkml:brush>
   </inkml:definitions>
   <inkml:trace contextRef="#ctx0" brushRef="#br0">3163 325 6400,'12'-10'1250,"-12"10"-986,1 0-1,0-1 1,-1 1-1,1-1 0,0 1 1,-1-1-1,1 1 1,0-1-1,-1 0 1,1 1-1,-1-1 0,0 0 1,1 0-1,-1 1 1,1-1-1,-1 0 1,0 0-1,0 1 0,1-1 1,-1 0-1,0 0 1,0 0-1,0 0 0,0 1 1,0-1-1,0 0 1,0 0-1,0 0 1,0 0-1,0 1 0,-1-1 1,1 0-1,0 0 1,0 0-1,-1 1 1,1-1-1,-1 0 0,1 1 1,-1-1-1,1 0 1,-1 1-1,0-2-263,-38-31 2576,21 27-2394,1 2 1,-1 0-1,0 1 0,0 0 0,-1 2 1,1 0-1,0 1 0,0 1 0,0 1 1,-1 0-1,1 2 0,1 0 1,-1 0-1,1 2 0,0 0 0,0 1 1,-3 3-183,9-7 8,0 1 1,0 0 0,1 1 0,0 0 0,-1 1 0,2 0 0,-1 0 0,1 1 0,0 0-1,1 1 1,-1 0 0,1 0 0,1 1 0,0 0 0,0 0 0,1 0 0,0 1 0,0 0-1,1 1 1,1-1 0,-3 10-9,3 1-38,2-1 0,0 1-1,1 0 1,1 0 0,1 0-1,1 0 1,1 0-1,1 0 1,0 0 0,2-1-1,0 0 1,2 0 0,0-1-1,1 0 1,1 0 0,0-1-1,2 0 1,0-1 0,1-1-1,0 0 1,11 9 38,-14-13-353,1-1 0,1 0 0,0 0 0,0-1 0,1-1 1,0 0-1,1-1 0,0 0 0,0-1 0,1 0 0,0-1 353,1-1-1395,-1-1 1,1 0-1,0-1 0,0-1 0,0 0 1,14-1 1394,-1-1-3968</inkml:trace>
-  <inkml:trace contextRef="#ctx0" brushRef="#br0" timeOffset="629.367">3168 790 5888,'21'-11'6016,"-20"11"-4672,-1 0-96,6 6 3519,0 53-1583,11 14-3104,-15-65-203,1 0 0,-1-1 0,1 1 0,1-1 0,0 0 0,0 0 0,0 0 0,1 0 0,-1-1 0,2 0 0,-1 0 0,1 0 0,0-1 0,0 0 0,0 0 0,1 0 0,0-1 0,0 0 0,0 0 0,0-1 0,0 0 0,1 0 0,0-1 0,-1 1 0,1-2 0,0 1 0,0-1 0,0-1 0,0 1 0,0-1 0,7-1 123,-9-1-79,-1 1 0,1-1 0,0 0 0,0-1 0,-1 1-1,0-1 1,1 0 0,-1-1 0,0 1 0,0-1 0,-1 0 0,1 0 0,-1 0 0,0-1-1,0 0 1,0 0 0,-1 0 0,2-3 79,1-6 339,-1-1-1,0 0 0,-1 0 1,-1 0-1,-1 0 1,0 0-1,0-1 1,-2 1-1,0 0 1,-1-1-1,0 1 1,-1 0-1,-2-6-338,-6 1 811,10 19-689,0 4-26,4 8-103,5 29-60,2 0-1,2-2 1,2 0 0,1 0 0,2-1 0,9 12 67,-22-42-345,0 0 0,1-1 1,0 1-1,1-1 1,-1 0-1,1 0 0,0-1 1,1 0-1,-1 0 0,1-1 1,0 0-1,0 0 1,0-1-1,1 0 0,-1-1 1,1 0-1,0 0 0,-1 0 1,1-1-1,0-1 1,2 1 344,66-5-6806,-44-2 3468</inkml:trace>
-  <inkml:trace contextRef="#ctx0" brushRef="#br0" timeOffset="1332.613">4029 1128 6656,'-3'-1'366,"3"1"-173,-1 0-1,0 0 1,0 0-1,0 0 1,1 0-1,-1-1 1,0 1-1,0 0 1,1 0-1,-1-1 1,0 1-1,1 0 1,-1-1-1,0 1 1,1 0-1,-1-1 1,0 1-1,1-1 1,-1 1-1,1-1 1,-1 0-1,1 1 1,-1-1 0,1 0-1,0 1 1,-1-1-1,1 0 1,0 1-1,-1-1 1,1 0-1,0 1 1,0-1-1,0 0 1,0 0-1,-1 1 1,1-1-1,0 0 1,0 0-1,0 0 1,1 1-1,-1-1 1,0 0-1,0 0 1,0 1-193,113-54 2032,-107 51-1919,-1 1-1,1 0 1,0 0 0,0 0 0,1 1-1,-1 0 1,0 0 0,0 1 0,1-1-1,-1 1 1,0 1 0,0-1 0,1 1-1,-1 0 1,0 1 0,0-1 0,0 1-1,0 1 1,0-1 0,-1 1 0,1 0-113,-4 0 67,0 0 1,0 0 0,0 0-1,-1 0 1,1 0-1,-1 1 1,0-1 0,0 0-1,0 1 1,-1-1-1,1 1 1,-1-1 0,0 1-1,0-1 1,0 1 0,0-1-1,0 1 1,-1-1-1,0 1 1,0-1 0,0 1-1,0-1 1,0 0-1,-1 1 1,1-1 0,-1 0-1,0 0 1,0 0-1,0 0 1,0-1 0,-2 3-68,-17 27 96,-1-1 1,-2-1-1,-1-2 1,-1 0 0,-1-1-1,-2-2 1,0-1-1,-2-1 1,-2 0-97,31-22 4,-32 27-23,33-27 18,1-1-1,-1 1 1,0 0 0,1-1 0,-1 1-1,1 0 1,-1-1 0,1 1-1,-1 0 1,1 0 0,-1-1 0,1 1-1,0 0 1,0 0 0,-1 0 0,1 0-1,0 0 1,0-1 0,0 1-1,0 0 1,0 0 0,0 0 0,0 0-1,0 0 1,0 0 0,1-1 0,-1 1-1,0 0 1,0 0 0,1 0 0,-1 0-1,1-1 1,-1 1 0,1 0-1,-1 0 1,1-1 0,-1 1 0,1 0-1,-1-1 1,1 1 0,0-1 0,0 1-1,-1-1 1,1 1 0,0-1 0,0 1-1,0-1 2,15 7-15,0-2 0,1 0 0,-1-1 0,1 0-1,0-1 1,0-1 0,0-1 0,2-1 15,11 3-23,63 7-286,-1 1-1495,0-6-3362,-58-5 622</inkml:trace>
+  <inkml:trace contextRef="#ctx0" brushRef="#br0" timeOffset="629.366">3168 790 5888,'21'-11'6016,"-20"11"-4672,-1 0-96,6 6 3519,0 53-1583,11 14-3104,-15-65-203,1 0 0,-1-1 0,1 1 0,1-1 0,0 0 0,0 0 0,0 0 0,1 0 0,-1-1 0,2 0 0,-1 0 0,1 0 0,0-1 0,0 0 0,0 0 0,1 0 0,0-1 0,0 0 0,0 0 0,0-1 0,0 0 0,1 0 0,0-1 0,-1 1 0,1-2 0,0 1 0,0-1 0,0-1 0,0 1 0,0-1 0,7-1 123,-9-1-79,-1 1 0,1-1 0,0 0 0,0-1 0,-1 1-1,0-1 1,1 0 0,-1-1 0,0 1 0,0-1 0,-1 0 0,1 0 0,-1 0 0,0-1-1,0 0 1,0 0 0,-1 0 0,2-3 79,1-6 339,-1-1-1,0 0 0,-1 0 1,-1 0-1,-1 0 1,0 0-1,0-1 1,-2 1-1,0 0 1,-1-1-1,0 1 1,-1 0-1,-2-6-338,-6 1 811,10 19-689,0 4-26,4 8-103,5 29-60,2 0-1,2-2 1,2 0 0,1 0 0,2-1 0,9 12 67,-22-42-345,0 0 0,1-1 1,0 1-1,1-1 1,-1 0-1,1 0 0,0-1 1,1 0-1,-1 0 0,1-1 1,0 0-1,0 0 1,0-1-1,1 0 0,-1-1 1,1 0-1,0 0 0,-1 0 1,1-1-1,0-1 1,2 1 344,66-5-6806,-44-2 3468</inkml:trace>
+  <inkml:trace contextRef="#ctx0" brushRef="#br0" timeOffset="1332.612">4029 1128 6656,'-3'-1'366,"3"1"-173,-1 0-1,0 0 1,0 0-1,0 0 1,1 0-1,-1-1 1,0 1-1,0 0 1,1 0-1,-1-1 1,0 1-1,1 0 1,-1-1-1,0 1 1,1 0-1,-1-1 1,0 1-1,1-1 1,-1 1-1,1-1 1,-1 0-1,1 1 1,-1-1 0,1 0-1,0 1 1,-1-1-1,1 0 1,0 1-1,-1-1 1,1 0-1,0 1 1,0-1-1,0 0 1,0 0-1,-1 1 1,1-1-1,0 0 1,0 0-1,0 0 1,1 1-1,-1-1 1,0 0-1,0 0 1,0 1-193,113-54 2032,-107 51-1919,-1 1-1,1 0 1,0 0 0,0 0 0,1 1-1,-1 0 1,0 0 0,0 1 0,1-1-1,-1 1 1,0 1 0,0-1 0,1 1-1,-1 0 1,0 1 0,0-1 0,0 1-1,0 1 1,0-1 0,-1 1 0,1 0-113,-4 0 67,0 0 1,0 0 0,0 0-1,-1 0 1,1 0-1,-1 1 1,0-1 0,0 0-1,0 1 1,-1-1-1,1 1 1,-1-1 0,0 1-1,0-1 1,0 1 0,0-1-1,0 1 1,-1-1-1,0 1 1,0-1 0,0 1-1,0-1 1,0 0-1,-1 1 1,1-1 0,-1 0-1,0 0 1,0 0-1,0 0 1,0-1 0,-2 3-68,-17 27 96,-1-1 1,-2-1-1,-1-2 1,-1 0 0,-1-1-1,-2-2 1,0-1-1,-2-1 1,-2 0-97,31-22 4,-32 27-23,33-27 18,1-1-1,-1 1 1,0 0 0,1-1 0,-1 1-1,1 0 1,-1-1 0,1 1-1,-1 0 1,1 0 0,-1-1 0,1 1-1,0 0 1,0 0 0,-1 0 0,1 0-1,0 0 1,0-1 0,0 1-1,0 0 1,0 0 0,0 0 0,0 0-1,0 0 1,0 0 0,1-1 0,-1 1-1,0 0 1,0 0 0,1 0 0,-1 0-1,1-1 1,-1 1 0,1 0-1,-1 0 1,1-1 0,-1 1 0,1 0-1,-1-1 1,1 1 0,0-1 0,0 1-1,-1-1 1,1 1 0,0-1 0,0 1-1,0-1 2,15 7-15,0-2 0,1 0 0,-1-1 0,1 0-1,0-1 1,0-1 0,0-1 0,2-1 15,11 3-23,63 7-286,-1 1-1495,0-6-3362,-58-5 622</inkml:trace>
   <inkml:trace contextRef="#ctx0" brushRef="#br0" timeOffset="2786.62">4845 432 3712,'-3'-2'586,"12"-11"4518,43-21-704,-73 14-1691,14 15-2469,0 0 0,0 1-1,-1 0 1,1 0 0,-1 1-1,0 0 1,0 1-1,0-1 1,-1 2 0,1-1-1,0 1 1,-1 0-1,1 1 1,-3 0-240,-1 0 127,0 1 0,-1 1 0,1 0-1,0 1 1,0 0 0,0 1 0,0 0 0,1 0 0,0 2 0,0-1-1,0 2 1,0-1 0,1 1 0,-8 8-127,15-12-6,0 0-1,1 0 1,0 0-1,-1 1 1,1-1 0,1 1-1,-1-1 1,0 1-1,1 0 1,0-1 0,0 1-1,0 0 1,0 0-1,0 0 1,1 0 0,0 0-1,0 0 1,0 0-1,0 0 1,1-1 0,-1 1-1,1 0 1,0 0-1,0 0 1,1 0 0,-1-1-1,1 1 1,0-1-1,0 1 1,0-1 0,0 1-1,0-1 1,1 0-1,0 0 1,2 2 6,0 2-6,0 0 1,0 0-1,1 0 1,0-1-1,0 0 1,1 0-1,-1-1 1,1 0-1,0 0 0,1 0 1,-1-1-1,1 0 1,0-1-1,0 1 1,0-2-1,0 1 0,1-1 1,-1 0-1,1-1 1,-1 0-1,1 0 1,0-1-1,0 0 6,6 0-100,0 0 0,-1-1 1,1-1-1,-1-1 0,0 0 0,1 0 0,9-5 100,-23 8 8,-1 0 1,1 0-1,-1 1 0,1-1 0,0 0 0,-1 0 0,1 0 0,0-1 0,-1 1 0,1 0 0,0 0 0,-1 0 0,1 0 0,0-1 1,-1 1-1,1 0 0,-1 0 0,1-1 0,-1 1 0,1 0 0,-1-1 0,1 1 0,-1-1 0,1 1 0,-1-1 0,1 1 1,-1-1-1,0 1 0,1-1 0,-1 1 0,0-1 0,1 0 0,-1 1 0,0-1 0,0 1 0,0-1 0,1 0 0,-1 1 0,0-1 1,0 0-1,0 1 0,0-1 0,0 0 0,0 1 0,0-1 0,0 0 0,-1 1 0,1-1 0,0 1 0,0-1 0,-1 0 1,1 1-1,0-1 0,0 1 0,-1-1 0,1 1 0,-1-1 0,1 0 0,-1 1 0,1 0 0,0-1 0,-1 1 0,0-1 0,1 1 1,-1 0-1,1-1-8,-17 0 189,0 1 0,0 0 0,0 1 0,0 1 0,0 1 0,1 0 1,-1 1-1,1 1 0,0 0 0,0 1 0,0 1 0,1 1 0,-5 3-189,13-7 5,1 1-1,-1-1 0,1 1 1,1 0-1,-1 1 0,1 0 1,0-1-1,0 2 1,0-1-1,1 0 0,0 1 1,0 0-1,-1 4-4,4-8-17,-1 0 0,1 1 0,0-1-1,0 0 1,0 1 0,1-1 0,-1 1 0,1-1 0,0 1 0,0-1-1,0 0 1,0 1 0,1-1 0,-1 1 0,1-1 0,0 1 0,0-1-1,0 0 1,0 0 0,1 0 0,-1 1 0,1-1 0,0-1 0,0 1-1,0 0 1,0 0 0,0-1 0,1 1 0,-1-1 0,1 0 0,1 1 17,8 4-56,0 0 1,1-1 0,-1-1 0,1 0 0,1-1-1,-1-1 1,1 0 0,-1 0 0,1-1-1,0-1 1,0 0 0,-1-1 0,1-1 0,0 0-1,0-1 1,-1 0 0,12-4 55,-18 4 106,1 0-1,-1 0 1,1-1-1,-1 0 1,0 0 0,0 0-1,-1-1 1,1-1-1,-1 1 1,0-1 0,0 0-1,0 0 1,-1 0-1,1-1 1,-1 0-106,7 52 2128,0 46-1742,-4 2 0,-4-1 1,-5 39-387,0-47 62,-15 379-339,15-450 136,-9 100-1285,-7-41-2543,6-45-1993</inkml:trace>
-  <inkml:trace contextRef="#ctx0" brushRef="#br0" timeOffset="-2552.335">0 657 3456,'1'-2'794,"8"-10"-438,-2 7 6568,-6-16-4518,1 9-2099,1 1 0,0 0 1,1-1-1,0 1 0,1 0 1,1 1-1,-1 0 0,1-1 0,1 2 1,0-1-1,0 1 0,1 0 1,0 0-1,1 1 0,0 1 1,1-1-308,-7 6 22,0 0-1,0 1 1,0-1 0,1 1 0,-1 0-1,1 0 1,-1 0 0,1 0 0,-1 1-1,1 0 1,-1-1 0,1 1 0,-1 0-1,1 1 1,0-1 0,-1 1 0,1-1-1,-1 1 1,0 0 0,1 1 0,-1-1-1,0 0 1,1 1 0,-1 0 0,0 0-1,0 0 1,0 0 0,-1 0 0,1 0-1,1 3-21,6 4 79,-1 1-1,0 1 0,-1 0 0,0 0 0,-1 0 1,0 1-1,1 5-78,-2-6 61,-1 0 0,0 1 0,-1 0 0,-1 0 0,0 0 0,0 0 0,-1 0 0,-1 1 0,0-1 0,-1 1 0,0-1 1,-1 0-1,0 1 0,-1-1 0,0 0 0,-1 1 0,0-1 0,-1-1 0,-1 1 0,-5 10-61,-1 2 251,6-34-150,12-27-135,2 1 0,1 1 1,2-1-1,2 2 0,1 0 0,1 0 1,2 2-1,2 0 0,7-8 34,-21 33 13,-1 0 0,1 0 0,0 1-1,1 0 1,-1 0 0,1 1 0,0 0 0,1 0 0,-1 0 0,1 1 0,0 0-1,0 1 1,0 0 0,0 0 0,1 1 0,-1 0 0,8-1-13,-13 3 24,0 1 0,0-1 1,0 1-1,0 0 0,0-1 1,0 1-1,0 1 1,0-1-1,-1 0 0,1 1 1,0-1-1,-1 1 0,0 0 1,1 0-1,-1 0 0,0 0 1,0 0-1,0 1 0,0-1 1,0 0-1,0 1 1,-1 0-1,1-1 0,-1 1 1,1 2-25,22 79 585,-17-24-361,-3 1 0,-2 0 0,-3 0 0,-3 0 0,-3 0 0,-6 21-224,-16 88 68,-8-1 0,-8-1 0,-6-3 0,-31 56-68,38-138-944,43-82 806,0 0-1,0 0 1,0 0-1,0 0 1,0 0-1,-1-1 1,1 1-1,0 0 1,0-1 0,-1 1-1,1-1 1,0 1-1,-1-1 1,1 0-1,0 0 1,-1 1-1,1-1 1,-1 0-1,1 0 1,0 0-1,-1 0 1,1-1-1,-1 1 1,1 0-1,0-1 1,-1 1-1,1 0 1,0-1-1,-1 0 1,1 1-1,0-1 1,0 0 0,0 0-1,0 1 1,-1-1-1,1 0 1,0 0-1,1 0 1,-1 0-1,0-1 1,0 1-1,0 0 1,1 0-1,-1 0 1,0-1-1,1 1 1,-1 0-1,1-1 1,0 1-1,-1 0 1,1-1-1,0 1 1,0-1-1,0 1 1,0 0 0,0-1-1,0 1 1,0-2 138,-6-30-3552,0-5-528</inkml:trace>
+  <inkml:trace contextRef="#ctx0" brushRef="#br0" timeOffset="-2552.336">0 657 3456,'1'-2'794,"8"-10"-438,-2 7 6568,-6-16-4518,1 9-2099,1 1 0,0 0 1,1-1-1,0 1 0,1 0 1,1 1-1,-1 0 0,1-1 0,1 2 1,0-1-1,0 1 0,1 0 1,0 0-1,1 1 0,0 1 1,1-1-308,-7 6 22,0 0-1,0 1 1,0-1 0,1 1 0,-1 0-1,1 0 1,-1 0 0,1 0 0,-1 1-1,1 0 1,-1-1 0,1 1 0,-1 0-1,1 1 1,0-1 0,-1 1 0,1-1-1,-1 1 1,0 0 0,1 1 0,-1-1-1,0 0 1,1 1 0,-1 0 0,0 0-1,0 0 1,0 0 0,-1 0 0,1 0-1,1 3-21,6 4 79,-1 1-1,0 1 0,-1 0 0,0 0 0,-1 0 1,0 1-1,1 5-78,-2-6 61,-1 0 0,0 1 0,-1 0 0,-1 0 0,0 0 0,0 0 0,-1 0 0,-1 1 0,0-1 0,-1 1 0,0-1 1,-1 0-1,0 1 0,-1-1 0,0 0 0,-1 1 0,0-1 0,-1-1 0,-1 1 0,-5 10-61,-1 2 251,6-34-150,12-27-135,2 1 0,1 1 1,2-1-1,2 2 0,1 0 0,1 0 1,2 2-1,2 0 0,7-8 34,-21 33 13,-1 0 0,1 0 0,0 1-1,1 0 1,-1 0 0,1 1 0,0 0 0,1 0 0,-1 0 0,1 1 0,0 0-1,0 1 1,0 0 0,0 0 0,1 1 0,-1 0 0,8-1-13,-13 3 24,0 1 0,0-1 1,0 1-1,0 0 0,0-1 1,0 1-1,0 1 1,0-1-1,-1 0 0,1 1 1,0-1-1,-1 1 0,0 0 1,1 0-1,-1 0 0,0 0 1,0 0-1,0 1 0,0-1 1,0 0-1,0 1 1,-1 0-1,1-1 0,-1 1 1,1 2-25,22 79 585,-17-24-361,-3 1 0,-2 0 0,-3 0 0,-3 0 0,-3 0 0,-6 21-224,-16 88 68,-8-1 0,-8-1 0,-6-3 0,-31 56-68,38-138-944,43-82 806,0 0-1,0 0 1,0 0-1,0 0 1,0 0-1,-1-1 1,1 1-1,0 0 1,0-1 0,-1 1-1,1-1 1,0 1-1,-1-1 1,1 0-1,0 0 1,-1 1-1,1-1 1,-1 0-1,1 0 1,0 0-1,-1 0 1,1-1-1,-1 1 1,1 0-1,0-1 1,-1 1-1,1 0 1,0-1-1,-1 0 1,1 1-1,0-1 1,0 0 0,0 0-1,0 1 1,-1-1-1,1 0 1,0 0-1,1 0 1,-1 0-1,0-1 1,0 1-1,0 0 1,1 0-1,-1 0 1,0-1-1,1 1 1,-1 0-1,1-1 1,0 1-1,-1 0 1,1-1-1,0 1 1,0-1-1,0 1 1,0 0 0,0-1-1,0 1 1,0-2 138,-6-30-3552,0-5-528</inkml:trace>
   <inkml:trace contextRef="#ctx0" brushRef="#br0" timeOffset="-2030.919">865 39 5888,'4'-3'994,"-3"2"-677,1 0 0,0-1 0,-1 1 1,1 0-1,0-1 0,-1 1 0,0-1 1,1 1-1,-1-1 0,0 0 0,0 0 0,0 1 1,0-1-1,0 0 0,0 0 0,-1 0 1,1 0-1,0 0 0,-1 0 0,0 0-317,12 13 5019,75 127-2251,-11-11-2214,20 90-186,-70-141-442,-4 0-1,4 35 75,-2 38-464,-19-100-572,-1 1 0,-2-1 0,-3 1 0,-3 18 1036,-1-23-2569,-2 0 0,-2-1-1,-2 1 1,-11 26 2569,-17 41-4277</inkml:trace>
   <inkml:trace contextRef="#ctx0" brushRef="#br0" timeOffset="-909.329">1796 367 5888,'13'-13'2390,"-5"3"5401,4 16-490,-1 257-6138,-9-245-1170,1 20 28,1 1 1,3-1 0,0 0 0,9 21-22,11 34-107,-28-93-18,0 1-1,0-1 1,0 0-1,1 0 1,-1 0-1,0 0 1,0 0 0,0 0-1,0 0 1,0 0-1,0 0 1,0 0 0,0 0-1,0-1 1,1 1-1,-1 0 1,0-1 0,0 1-1,0 0 1,0-1-1,1 1 1,-1-1 0,0 1-1,1-1 1,-1 0-1,0 1 1,1-1-1,-1 0 1,0 1 0,1-1-1,-1 0 1,1 0-1,0 0 1,-1 1 0,1-1-1,0 0 1,-1 0-1,1 0 1,0 0 0,0 0-1,0 0 126,-5-5-698,-39-42-5275,22 23 1856</inkml:trace>
   <inkml:trace contextRef="#ctx0" brushRef="#br0" timeOffset="-625.033">1614 653 6784,'-71'19'8394,"27"-10"-2901,51 2-4565,66-7-554,363-4-1048,-248 0-7212,-165 0 3785</inkml:trace>
@@ -2836,7 +2837,7 @@
           <a:p>
             <a:fld id="{23C66214-DB21-4647-B5DA-0D17CA592867}" type="datetimeFigureOut">
               <a:rPr lang="nl-NL" smtClean="0"/>
-              <a:t>8-4-2019</a:t>
+              <a:t>9-4-2019</a:t>
             </a:fld>
             <a:endParaRPr lang="nl-NL"/>
           </a:p>
@@ -7896,8 +7897,8 @@
         </p:nvSpPr>
         <p:spPr>
           <a:xfrm>
-            <a:off x="849050" y="1789250"/>
-            <a:ext cx="5012000" cy="3665400"/>
+            <a:off x="849049" y="1789250"/>
+            <a:ext cx="5099687" cy="3665400"/>
           </a:xfrm>
         </p:spPr>
         <p:txBody>
@@ -7927,6 +7928,27 @@
             <a:r>
               <a:rPr lang="fr-BE" dirty="0" err="1"/>
               <a:t>result</a:t>
+            </a:r>
+            <a:r>
+              <a:rPr lang="fr-BE" dirty="0"/>
+              <a:t> </a:t>
+            </a:r>
+          </a:p>
+          <a:p>
+            <a:pPr marL="0" indent="0">
+              <a:buNone/>
+            </a:pPr>
+            <a:r>
+              <a:rPr lang="fr-BE" dirty="0"/>
+              <a:t>-&gt;values </a:t>
+            </a:r>
+            <a:r>
+              <a:rPr lang="fr-BE" dirty="0" err="1"/>
+              <a:t>near</a:t>
+            </a:r>
+            <a:r>
+              <a:rPr lang="fr-BE" dirty="0"/>
+              <a:t> the ambient O2 and CO2 concentration</a:t>
             </a:r>
             <a:endParaRPr lang="en-BE" dirty="0"/>
           </a:p>
@@ -9503,6 +9525,14 @@
             </a:r>
             <a:r>
               <a:rPr lang="nl-BE" dirty="0"/>
+              <a:t> and </a:t>
+            </a:r>
+            <a:r>
+              <a:rPr lang="nl-BE" dirty="0" err="1"/>
+              <a:t>H_v</a:t>
+            </a:r>
+            <a:r>
+              <a:rPr lang="nl-BE" dirty="0"/>
               <a:t> </a:t>
             </a:r>
             <a:r>
@@ -9511,11 +9541,82 @@
             </a:r>
             <a:r>
               <a:rPr lang="nl-BE" dirty="0"/>
+              <a:t> Cu =0 (no </a:t>
+            </a:r>
+            <a:r>
+              <a:rPr lang="nl-BE" dirty="0" err="1"/>
+              <a:t>oxygen</a:t>
+            </a:r>
+            <a:r>
+              <a:rPr lang="nl-BE" dirty="0"/>
+              <a:t> within </a:t>
+            </a:r>
+            <a:r>
+              <a:rPr lang="nl-BE" dirty="0" err="1"/>
+              <a:t>pear</a:t>
+            </a:r>
+            <a:r>
+              <a:rPr lang="nl-BE" dirty="0"/>
+              <a:t>, because </a:t>
+            </a:r>
+            <a:r>
+              <a:rPr lang="nl-BE" dirty="0" err="1"/>
+              <a:t>it</a:t>
+            </a:r>
+            <a:r>
+              <a:rPr lang="nl-BE" dirty="0"/>
+              <a:t> is </a:t>
+            </a:r>
+            <a:r>
+              <a:rPr lang="nl-BE" dirty="0" err="1"/>
+              <a:t>turned</a:t>
+            </a:r>
+            <a:r>
+              <a:rPr lang="nl-BE" dirty="0"/>
+              <a:t> into CO2 real </a:t>
+            </a:r>
+            <a:r>
+              <a:rPr lang="nl-BE" dirty="0" err="1"/>
+              <a:t>fast</a:t>
+            </a:r>
+            <a:r>
+              <a:rPr lang="nl-BE" dirty="0"/>
+              <a:t>). </a:t>
+            </a:r>
+            <a:br>
+              <a:rPr lang="nl-BE" dirty="0"/>
+            </a:br>
+            <a:r>
+              <a:rPr lang="nl-BE" dirty="0"/>
+              <a:t>	-&gt; This leads to a </a:t>
+            </a:r>
+            <a:r>
+              <a:rPr lang="nl-BE" dirty="0" err="1"/>
+              <a:t>simple</a:t>
+            </a:r>
+            <a:r>
+              <a:rPr lang="nl-BE" dirty="0"/>
               <a:t> </a:t>
             </a:r>
             <a:r>
               <a:rPr lang="nl-BE" dirty="0" err="1"/>
-              <a:t>C_uamb</a:t>
+              <a:t>expression</a:t>
+            </a:r>
+            <a:r>
+              <a:rPr lang="nl-BE" dirty="0"/>
+              <a:t> </a:t>
+            </a:r>
+            <a:r>
+              <a:rPr lang="nl-BE" dirty="0" err="1"/>
+              <a:t>for</a:t>
+            </a:r>
+            <a:r>
+              <a:rPr lang="nl-BE" dirty="0"/>
+              <a:t> </a:t>
+            </a:r>
+            <a:r>
+              <a:rPr lang="nl-BE" dirty="0" err="1"/>
+              <a:t>R_u</a:t>
             </a:r>
             <a:r>
               <a:rPr lang="nl-BE" dirty="0"/>
@@ -9523,66 +9624,9 @@
             </a:r>
             <a:r>
               <a:rPr lang="nl-BE" dirty="0" err="1"/>
-              <a:t>H_v</a:t>
-            </a:r>
-            <a:r>
-              <a:rPr lang="nl-BE" dirty="0"/>
-              <a:t> </a:t>
-            </a:r>
-            <a:r>
-              <a:rPr lang="nl-BE" dirty="0" err="1"/>
-              <a:t>around</a:t>
-            </a:r>
-            <a:r>
-              <a:rPr lang="nl-BE" dirty="0"/>
-              <a:t> </a:t>
-            </a:r>
-            <a:r>
-              <a:rPr lang="nl-BE" dirty="0" err="1"/>
-              <a:t>C_vamb</a:t>
+              <a:t>R_v</a:t>
             </a:r>
             <a:endParaRPr lang="nl-BE" dirty="0"/>
-          </a:p>
-          <a:p>
-            <a:r>
-              <a:rPr lang="nl-BE" dirty="0"/>
-              <a:t>This </a:t>
-            </a:r>
-            <a:r>
-              <a:rPr lang="nl-BE" dirty="0" err="1"/>
-              <a:t>comes</a:t>
-            </a:r>
-            <a:r>
-              <a:rPr lang="nl-BE" dirty="0"/>
-              <a:t> down to </a:t>
-            </a:r>
-            <a:r>
-              <a:rPr lang="nl-BE" dirty="0" err="1"/>
-              <a:t>linearizing</a:t>
-            </a:r>
-            <a:r>
-              <a:rPr lang="nl-BE" dirty="0"/>
-              <a:t> </a:t>
-            </a:r>
-            <a:r>
-              <a:rPr lang="nl-BE" dirty="0" err="1"/>
-              <a:t>R_u</a:t>
-            </a:r>
-            <a:r>
-              <a:rPr lang="nl-BE" dirty="0"/>
-              <a:t> and </a:t>
-            </a:r>
-            <a:r>
-              <a:rPr lang="nl-BE" dirty="0" err="1"/>
-              <a:t>R_v</a:t>
-            </a:r>
-            <a:br>
-              <a:rPr lang="nl-BE" dirty="0"/>
-            </a:br>
-            <a:r>
-              <a:rPr lang="nl-BE" dirty="0"/>
-              <a:t>	-&gt; Taylor: </a:t>
-            </a:r>
           </a:p>
           <a:p>
             <a:r>
@@ -9712,36 +9756,6 @@
           </a:p>
         </p:txBody>
       </p:sp>
-      <p:pic>
-        <p:nvPicPr>
-          <p:cNvPr id="5" name="Picture 4">
-            <a:extLst>
-              <a:ext uri="{FF2B5EF4-FFF2-40B4-BE49-F238E27FC236}">
-                <a16:creationId xmlns:a16="http://schemas.microsoft.com/office/drawing/2014/main" id="{61FD72F2-979C-4842-B298-2CED1CFCE7FC}"/>
-              </a:ext>
-            </a:extLst>
-          </p:cNvPr>
-          <p:cNvPicPr>
-            <a:picLocks noChangeAspect="1"/>
-          </p:cNvPicPr>
-          <p:nvPr/>
-        </p:nvPicPr>
-        <p:blipFill>
-          <a:blip r:embed="rId2"/>
-          <a:stretch>
-            <a:fillRect/>
-          </a:stretch>
-        </p:blipFill>
-        <p:spPr>
-          <a:xfrm>
-            <a:off x="2784012" y="3429001"/>
-            <a:ext cx="4886788" cy="566076"/>
-          </a:xfrm>
-          <a:prstGeom prst="rect">
-            <a:avLst/>
-          </a:prstGeom>
-        </p:spPr>
-      </p:pic>
     </p:spTree>
     <p:extLst>
       <p:ext uri="{BB962C8B-B14F-4D97-AF65-F5344CB8AC3E}">
@@ -9772,35 +9786,6 @@
           <a:chExt cx="0" cy="0"/>
         </a:xfrm>
       </p:grpSpPr>
-      <p:pic>
-        <p:nvPicPr>
-          <p:cNvPr id="6" name="Content Placeholder 5">
-            <a:extLst>
-              <a:ext uri="{FF2B5EF4-FFF2-40B4-BE49-F238E27FC236}">
-                <a16:creationId xmlns:a16="http://schemas.microsoft.com/office/drawing/2014/main" id="{549ECB39-C2A3-4F4D-9725-DBB4CFAFAC77}"/>
-              </a:ext>
-            </a:extLst>
-          </p:cNvPr>
-          <p:cNvPicPr>
-            <a:picLocks noGrp="1" noChangeAspect="1"/>
-          </p:cNvPicPr>
-          <p:nvPr>
-            <p:ph idx="1"/>
-          </p:nvPr>
-        </p:nvPicPr>
-        <p:blipFill>
-          <a:blip r:embed="rId2"/>
-          <a:stretch>
-            <a:fillRect/>
-          </a:stretch>
-        </p:blipFill>
-        <p:spPr>
-          <a:xfrm>
-            <a:off x="5425810" y="1007763"/>
-            <a:ext cx="6936315" cy="5202237"/>
-          </a:xfrm>
-        </p:spPr>
-      </p:pic>
       <p:sp>
         <p:nvSpPr>
           <p:cNvPr id="3" name="Slide Number Placeholder 2">
@@ -9874,7 +9859,7 @@
         <p:spPr>
           <a:xfrm>
             <a:off x="576000" y="1359036"/>
-            <a:ext cx="5729550" cy="2308324"/>
+            <a:ext cx="5729550" cy="2862322"/>
           </a:xfrm>
           <a:prstGeom prst="rect">
             <a:avLst/>
@@ -9917,47 +9902,23 @@
             </a:r>
             <a:r>
               <a:rPr lang="nl-BE" dirty="0"/>
-              <a:t> </a:t>
-            </a:r>
-            <a:r>
-              <a:rPr lang="nl-BE" dirty="0" err="1"/>
-              <a:t>diagonal</a:t>
-            </a:r>
-            <a:r>
-              <a:rPr lang="nl-BE" dirty="0"/>
-              <a:t> </a:t>
-            </a:r>
-            <a:r>
-              <a:rPr lang="nl-BE" dirty="0" err="1"/>
-              <a:t>elements</a:t>
-            </a:r>
-            <a:r>
-              <a:rPr lang="nl-BE" dirty="0"/>
-              <a:t> of </a:t>
-            </a:r>
-            <a:r>
-              <a:rPr lang="nl-BE" dirty="0" err="1"/>
-              <a:t>the</a:t>
-            </a:r>
-            <a:r>
-              <a:rPr lang="nl-BE" dirty="0"/>
-              <a:t> </a:t>
-            </a:r>
-            <a:r>
-              <a:rPr lang="nl-BE" dirty="0" err="1"/>
-              <a:t>blocks</a:t>
-            </a:r>
-            <a:r>
-              <a:rPr lang="nl-BE" dirty="0"/>
-              <a:t> of </a:t>
-            </a:r>
-            <a:r>
-              <a:rPr lang="nl-BE" dirty="0" err="1"/>
-              <a:t>the</a:t>
-            </a:r>
-            <a:r>
-              <a:rPr lang="nl-BE" dirty="0"/>
-              <a:t> K-matrix</a:t>
+              <a:t> K-matrix; </a:t>
+            </a:r>
+            <a:r>
+              <a:rPr lang="nl-BE" dirty="0" err="1"/>
+              <a:t>it’s</a:t>
+            </a:r>
+            <a:r>
+              <a:rPr lang="nl-BE" dirty="0"/>
+              <a:t> form thus </a:t>
+            </a:r>
+            <a:r>
+              <a:rPr lang="nl-BE" dirty="0" err="1"/>
+              <a:t>becoms</a:t>
+            </a:r>
+            <a:r>
+              <a:rPr lang="nl-BE" dirty="0"/>
+              <a:t>: </a:t>
             </a:r>
             <a:br>
               <a:rPr lang="nl-BE" dirty="0"/>
@@ -10002,7 +9963,54 @@
             </a:r>
             <a:r>
               <a:rPr lang="fr-BE" dirty="0"/>
-              <a:t>c0 = K\f</a:t>
+              <a:t>c0 = K\f.</a:t>
+            </a:r>
+            <a:br>
+              <a:rPr lang="fr-BE" dirty="0"/>
+            </a:br>
+            <a:r>
+              <a:rPr lang="fr-BE" dirty="0"/>
+              <a:t>In FORTRAN, </a:t>
+            </a:r>
+            <a:r>
+              <a:rPr lang="fr-BE" dirty="0" err="1"/>
+              <a:t>this</a:t>
+            </a:r>
+            <a:r>
+              <a:rPr lang="fr-BE" dirty="0"/>
+              <a:t> </a:t>
+            </a:r>
+            <a:r>
+              <a:rPr lang="fr-BE" dirty="0" err="1"/>
+              <a:t>is</a:t>
+            </a:r>
+            <a:r>
+              <a:rPr lang="fr-BE" dirty="0"/>
+              <a:t> </a:t>
+            </a:r>
+            <a:r>
+              <a:rPr lang="fr-BE" dirty="0" err="1"/>
+              <a:t>solved</a:t>
+            </a:r>
+            <a:r>
+              <a:rPr lang="fr-BE" dirty="0"/>
+              <a:t> by </a:t>
+            </a:r>
+            <a:r>
+              <a:rPr lang="fr-BE" dirty="0" err="1"/>
+              <a:t>using</a:t>
+            </a:r>
+            <a:r>
+              <a:rPr lang="fr-BE" dirty="0"/>
+              <a:t> a pivot-version of the Gauss </a:t>
+            </a:r>
+            <a:r>
+              <a:rPr lang="fr-BE" dirty="0" err="1"/>
+              <a:t>algorithm</a:t>
+            </a:r>
+            <a:r>
+              <a:rPr lang="fr-BE" dirty="0"/>
+              <a:t>.</a:t>
             </a:r>
             <a:br>
               <a:rPr lang="fr-BE" dirty="0"/>
@@ -10017,6 +10025,35 @@
           </a:p>
         </p:txBody>
       </p:sp>
+      <p:pic>
+        <p:nvPicPr>
+          <p:cNvPr id="9" name="Content Placeholder 8" descr="A screenshot of a cell phone&#10;&#10;Description generated with very high confidence">
+            <a:extLst>
+              <a:ext uri="{FF2B5EF4-FFF2-40B4-BE49-F238E27FC236}">
+                <a16:creationId xmlns:a16="http://schemas.microsoft.com/office/drawing/2014/main" id="{7241156F-1A44-4BD0-BD68-6730C72B1804}"/>
+              </a:ext>
+            </a:extLst>
+          </p:cNvPr>
+          <p:cNvPicPr>
+            <a:picLocks noGrp="1" noChangeAspect="1"/>
+          </p:cNvPicPr>
+          <p:nvPr>
+            <p:ph idx="1"/>
+          </p:nvPr>
+        </p:nvPicPr>
+        <p:blipFill>
+          <a:blip r:embed="rId2"/>
+          <a:stretch>
+            <a:fillRect/>
+          </a:stretch>
+        </p:blipFill>
+        <p:spPr>
+          <a:xfrm>
+            <a:off x="6629386" y="1553021"/>
+            <a:ext cx="5952066" cy="4464050"/>
+          </a:xfrm>
+        </p:spPr>
+      </p:pic>
     </p:spTree>
     <p:extLst>
       <p:ext uri="{BB962C8B-B14F-4D97-AF65-F5344CB8AC3E}">
@@ -10153,7 +10190,7 @@
         <p:spPr>
           <a:xfrm>
             <a:off x="319314" y="1553029"/>
-            <a:ext cx="5297715" cy="646331"/>
+            <a:ext cx="5297715" cy="2308324"/>
           </a:xfrm>
           <a:prstGeom prst="rect">
             <a:avLst/>
@@ -10172,7 +10209,7 @@
             </a:pPr>
             <a:r>
               <a:rPr lang="nl-BE" dirty="0"/>
-              <a:t>Using Fortran or Matlab we get </a:t>
+              <a:t>Using FORTRAN and MATLAB we get </a:t>
             </a:r>
             <a:r>
               <a:rPr lang="nl-BE" dirty="0" err="1"/>
@@ -10193,6 +10230,122 @@
             <a:r>
               <a:rPr lang="nl-BE" dirty="0" err="1"/>
               <a:t>results</a:t>
+            </a:r>
+            <a:r>
+              <a:rPr lang="nl-BE" dirty="0"/>
+              <a:t>.</a:t>
+            </a:r>
+            <a:br>
+              <a:rPr lang="nl-BE" dirty="0"/>
+            </a:br>
+            <a:endParaRPr lang="nl-BE" dirty="0"/>
+          </a:p>
+          <a:p>
+            <a:pPr marL="285750" indent="-285750">
+              <a:buFont typeface="Arial" panose="020B0604020202020204" pitchFamily="34" charset="0"/>
+              <a:buChar char="•"/>
+            </a:pPr>
+            <a:r>
+              <a:rPr lang="nl-BE" dirty="0"/>
+              <a:t>Both </a:t>
+            </a:r>
+            <a:r>
+              <a:rPr lang="nl-BE" dirty="0" err="1"/>
+              <a:t>concentrations</a:t>
+            </a:r>
+            <a:r>
+              <a:rPr lang="nl-BE" dirty="0"/>
+              <a:t> show </a:t>
+            </a:r>
+            <a:r>
+              <a:rPr lang="nl-BE" dirty="0" err="1"/>
+              <a:t>expected</a:t>
+            </a:r>
+            <a:r>
+              <a:rPr lang="nl-BE" dirty="0"/>
+              <a:t> </a:t>
+            </a:r>
+            <a:r>
+              <a:rPr lang="nl-BE" dirty="0" err="1"/>
+              <a:t>evolution</a:t>
+            </a:r>
+            <a:r>
+              <a:rPr lang="nl-BE" dirty="0"/>
+              <a:t> pattern. </a:t>
+            </a:r>
+            <a:br>
+              <a:rPr lang="nl-BE" dirty="0"/>
+            </a:br>
+            <a:endParaRPr lang="nl-BE" dirty="0"/>
+          </a:p>
+          <a:p>
+            <a:pPr marL="285750" indent="-285750">
+              <a:buFont typeface="Arial" panose="020B0604020202020204" pitchFamily="34" charset="0"/>
+              <a:buChar char="•"/>
+            </a:pPr>
+            <a:r>
+              <a:rPr lang="nl-BE" dirty="0"/>
+              <a:t>O2 </a:t>
+            </a:r>
+            <a:r>
+              <a:rPr lang="nl-BE" dirty="0" err="1"/>
+              <a:t>concentration</a:t>
+            </a:r>
+            <a:r>
+              <a:rPr lang="nl-BE" dirty="0"/>
+              <a:t> </a:t>
+            </a:r>
+            <a:r>
+              <a:rPr lang="nl-BE" dirty="0" err="1"/>
+              <a:t>distribution</a:t>
+            </a:r>
+            <a:r>
+              <a:rPr lang="nl-BE" dirty="0"/>
+              <a:t> is </a:t>
+            </a:r>
+            <a:r>
+              <a:rPr lang="nl-BE" dirty="0" err="1"/>
+              <a:t>too</a:t>
+            </a:r>
+            <a:r>
+              <a:rPr lang="nl-BE" dirty="0"/>
+              <a:t> </a:t>
+            </a:r>
+            <a:r>
+              <a:rPr lang="nl-BE" dirty="0" err="1"/>
+              <a:t>heavily</a:t>
+            </a:r>
+            <a:r>
+              <a:rPr lang="nl-BE" dirty="0"/>
+              <a:t> </a:t>
+            </a:r>
+            <a:r>
+              <a:rPr lang="nl-BE" dirty="0" err="1"/>
+              <a:t>concentrated</a:t>
+            </a:r>
+            <a:r>
+              <a:rPr lang="nl-BE" dirty="0"/>
+              <a:t> </a:t>
+            </a:r>
+            <a:r>
+              <a:rPr lang="nl-BE" dirty="0" err="1"/>
+              <a:t>near</a:t>
+            </a:r>
+            <a:r>
+              <a:rPr lang="nl-BE" dirty="0"/>
+              <a:t> </a:t>
+            </a:r>
+            <a:r>
+              <a:rPr lang="nl-BE" dirty="0" err="1"/>
+              <a:t>the</a:t>
+            </a:r>
+            <a:r>
+              <a:rPr lang="nl-BE" dirty="0"/>
+              <a:t> </a:t>
+            </a:r>
+            <a:r>
+              <a:rPr lang="nl-BE" dirty="0" err="1"/>
+              <a:t>edges</a:t>
             </a:r>
             <a:endParaRPr lang="en-BE" dirty="0"/>
           </a:p>
@@ -13146,106 +13299,35 @@
           <a:chExt cx="0" cy="0"/>
         </a:xfrm>
       </p:grpSpPr>
-      <p:sp>
-        <p:nvSpPr>
-          <p:cNvPr id="2" name="Content Placeholder 1">
+      <p:pic>
+        <p:nvPicPr>
+          <p:cNvPr id="6" name="Content Placeholder 5">
             <a:extLst>
               <a:ext uri="{FF2B5EF4-FFF2-40B4-BE49-F238E27FC236}">
-                <a16:creationId xmlns:a16="http://schemas.microsoft.com/office/drawing/2014/main" id="{7B81B8CC-1256-4F0C-A0D5-4977E0859234}"/>
+                <a16:creationId xmlns:a16="http://schemas.microsoft.com/office/drawing/2014/main" id="{3B5EB3C2-0BC8-4B61-B454-11F4EC2D7BB9}"/>
               </a:ext>
             </a:extLst>
           </p:cNvPr>
-          <p:cNvSpPr>
-            <a:spLocks noGrp="1"/>
-          </p:cNvSpPr>
+          <p:cNvPicPr>
+            <a:picLocks noGrp="1" noChangeAspect="1"/>
+          </p:cNvPicPr>
           <p:nvPr>
             <p:ph idx="1"/>
           </p:nvPr>
-        </p:nvSpPr>
-        <p:spPr/>
-        <p:txBody>
-          <a:bodyPr/>
-          <a:lstStyle/>
-          <a:p>
-            <a:r>
-              <a:rPr lang="en-US" dirty="0"/>
-              <a:t>We used the wrong starting values from the previous slide, so we expect of course that the solution will be wrong</a:t>
-            </a:r>
-          </a:p>
-          <a:p>
-            <a:r>
-              <a:rPr lang="en-US" dirty="0"/>
-              <a:t>But even starting from ‘close’ values (e.g. all zero) we get wrong results</a:t>
-            </a:r>
-            <a:br>
-              <a:rPr lang="nl-BE" dirty="0"/>
-            </a:br>
-            <a:endParaRPr lang="nl-BE" dirty="0"/>
-          </a:p>
-          <a:p>
-            <a:r>
-              <a:rPr lang="nl-BE" u="sng" dirty="0" err="1"/>
-              <a:t>Expected</a:t>
-            </a:r>
-            <a:r>
-              <a:rPr lang="nl-BE" dirty="0"/>
-              <a:t>: </a:t>
-            </a:r>
-            <a:r>
-              <a:rPr lang="nl-BE" dirty="0" err="1"/>
-              <a:t>Concentrations</a:t>
-            </a:r>
-            <a:r>
-              <a:rPr lang="nl-BE" dirty="0"/>
-              <a:t> to </a:t>
-            </a:r>
-            <a:r>
-              <a:rPr lang="nl-BE" dirty="0" err="1"/>
-              <a:t>be</a:t>
-            </a:r>
-            <a:endParaRPr lang="nl-BE" dirty="0"/>
-          </a:p>
-          <a:p>
-            <a:pPr marL="0" indent="0">
-              <a:buNone/>
-            </a:pPr>
-            <a:r>
-              <a:rPr lang="nl-BE" dirty="0"/>
-              <a:t>   </a:t>
-            </a:r>
-            <a:r>
-              <a:rPr lang="nl-BE" dirty="0" err="1"/>
-              <a:t>highest</a:t>
-            </a:r>
-            <a:r>
-              <a:rPr lang="nl-BE" dirty="0"/>
-              <a:t> at </a:t>
-            </a:r>
-            <a:r>
-              <a:rPr lang="nl-BE" dirty="0" err="1"/>
-              <a:t>the</a:t>
-            </a:r>
-            <a:r>
-              <a:rPr lang="nl-BE" dirty="0"/>
-              <a:t> </a:t>
-            </a:r>
-            <a:r>
-              <a:rPr lang="nl-BE" dirty="0" err="1"/>
-              <a:t>edge</a:t>
-            </a:r>
-            <a:br>
-              <a:rPr lang="nl-BE" dirty="0"/>
-            </a:br>
-            <a:endParaRPr lang="nl-BE" dirty="0"/>
-          </a:p>
-          <a:p>
-            <a:pPr marL="0" indent="0">
-              <a:buNone/>
-            </a:pPr>
-            <a:endParaRPr lang="en-US" dirty="0"/>
-          </a:p>
-        </p:txBody>
-      </p:sp>
+        </p:nvPicPr>
+        <p:blipFill>
+          <a:blip r:embed="rId2"/>
+          <a:stretch>
+            <a:fillRect/>
+          </a:stretch>
+        </p:blipFill>
+        <p:spPr>
+          <a:xfrm>
+            <a:off x="6429442" y="984757"/>
+            <a:ext cx="4429057" cy="5873243"/>
+          </a:xfrm>
+        </p:spPr>
+      </p:pic>
       <p:sp>
         <p:nvSpPr>
           <p:cNvPr id="3" name="Slide Number Placeholder 2">
@@ -13291,7 +13373,12 @@
             <p:ph type="title"/>
           </p:nvPr>
         </p:nvSpPr>
-        <p:spPr/>
+        <p:spPr>
+          <a:xfrm>
+            <a:off x="222709" y="0"/>
+            <a:ext cx="11041200" cy="1152000"/>
+          </a:xfrm>
+        </p:spPr>
         <p:txBody>
           <a:bodyPr/>
           <a:lstStyle/>
@@ -13325,6 +13412,143 @@
               <a:t> problem</a:t>
             </a:r>
             <a:endParaRPr lang="en-BE" dirty="0"/>
+          </a:p>
+        </p:txBody>
+      </p:sp>
+      <p:sp>
+        <p:nvSpPr>
+          <p:cNvPr id="7" name="TextBox 6">
+            <a:extLst>
+              <a:ext uri="{FF2B5EF4-FFF2-40B4-BE49-F238E27FC236}">
+                <a16:creationId xmlns:a16="http://schemas.microsoft.com/office/drawing/2014/main" id="{FADAE620-DF12-4C5D-B707-912139C3701E}"/>
+              </a:ext>
+            </a:extLst>
+          </p:cNvPr>
+          <p:cNvSpPr txBox="1"/>
+          <p:nvPr/>
+        </p:nvSpPr>
+        <p:spPr>
+          <a:xfrm>
+            <a:off x="222709" y="2054948"/>
+            <a:ext cx="5679327" cy="1754326"/>
+          </a:xfrm>
+          <a:prstGeom prst="rect">
+            <a:avLst/>
+          </a:prstGeom>
+          <a:noFill/>
+        </p:spPr>
+        <p:txBody>
+          <a:bodyPr wrap="square" rtlCol="0">
+            <a:spAutoFit/>
+          </a:bodyPr>
+          <a:lstStyle/>
+          <a:p>
+            <a:pPr marL="285750" indent="-285750">
+              <a:buFont typeface="Arial" panose="020B0604020202020204" pitchFamily="34" charset="0"/>
+              <a:buChar char="•"/>
+            </a:pPr>
+            <a:r>
+              <a:rPr lang="nl-BE" dirty="0"/>
+              <a:t>The </a:t>
+            </a:r>
+            <a:r>
+              <a:rPr lang="nl-BE" dirty="0" err="1"/>
+              <a:t>distribution</a:t>
+            </a:r>
+            <a:r>
+              <a:rPr lang="nl-BE" dirty="0"/>
+              <a:t> of </a:t>
+            </a:r>
+            <a:r>
+              <a:rPr lang="nl-BE" dirty="0" err="1"/>
+              <a:t>the</a:t>
+            </a:r>
+            <a:r>
+              <a:rPr lang="nl-BE" dirty="0"/>
+              <a:t> CO2 </a:t>
+            </a:r>
+            <a:r>
+              <a:rPr lang="nl-BE" dirty="0" err="1"/>
+              <a:t>concentration</a:t>
+            </a:r>
+            <a:r>
+              <a:rPr lang="nl-BE" dirty="0"/>
+              <a:t> is as we would </a:t>
+            </a:r>
+            <a:r>
+              <a:rPr lang="nl-BE" dirty="0" err="1"/>
+              <a:t>expect</a:t>
+            </a:r>
+            <a:r>
+              <a:rPr lang="nl-BE" dirty="0"/>
+              <a:t> it. </a:t>
+            </a:r>
+            <a:br>
+              <a:rPr lang="nl-BE" dirty="0"/>
+            </a:br>
+            <a:endParaRPr lang="nl-BE" dirty="0"/>
+          </a:p>
+          <a:p>
+            <a:pPr marL="285750" indent="-285750">
+              <a:buFont typeface="Arial" panose="020B0604020202020204" pitchFamily="34" charset="0"/>
+              <a:buChar char="•"/>
+            </a:pPr>
+            <a:r>
+              <a:rPr lang="nl-BE" dirty="0"/>
+              <a:t>The </a:t>
+            </a:r>
+            <a:r>
+              <a:rPr lang="nl-BE" dirty="0" err="1"/>
+              <a:t>distribution</a:t>
+            </a:r>
+            <a:r>
+              <a:rPr lang="nl-BE" dirty="0"/>
+              <a:t> of </a:t>
+            </a:r>
+            <a:r>
+              <a:rPr lang="nl-BE" dirty="0" err="1"/>
+              <a:t>the</a:t>
+            </a:r>
+            <a:r>
+              <a:rPr lang="nl-BE" dirty="0"/>
+              <a:t> O2 has </a:t>
+            </a:r>
+            <a:r>
+              <a:rPr lang="nl-BE" dirty="0" err="1"/>
+              <a:t>not</a:t>
+            </a:r>
+            <a:r>
+              <a:rPr lang="nl-BE" dirty="0"/>
+              <a:t> </a:t>
+            </a:r>
+            <a:r>
+              <a:rPr lang="nl-BE" dirty="0" err="1"/>
+              <a:t>changed</a:t>
+            </a:r>
+            <a:r>
+              <a:rPr lang="nl-BE" dirty="0"/>
+              <a:t> much from </a:t>
+            </a:r>
+            <a:r>
+              <a:rPr lang="nl-BE" dirty="0" err="1"/>
+              <a:t>the</a:t>
+            </a:r>
+            <a:r>
+              <a:rPr lang="nl-BE" dirty="0"/>
+              <a:t> initial </a:t>
+            </a:r>
+            <a:r>
+              <a:rPr lang="nl-BE" dirty="0" err="1"/>
+              <a:t>values</a:t>
+            </a:r>
+            <a:r>
+              <a:rPr lang="nl-BE" dirty="0"/>
+              <a:t>.</a:t>
+            </a:r>
+            <a:br>
+              <a:rPr lang="nl-BE" dirty="0"/>
+            </a:br>
+            <a:endParaRPr lang="nl-BE" dirty="0"/>
           </a:p>
         </p:txBody>
       </p:sp>
@@ -13360,7 +13584,13 @@
       </p:grpSpPr>
       <p:sp>
         <p:nvSpPr>
-          <p:cNvPr id="2" name="Content Placeholder 1"/>
+          <p:cNvPr id="2" name="Content Placeholder 1">
+            <a:extLst>
+              <a:ext uri="{FF2B5EF4-FFF2-40B4-BE49-F238E27FC236}">
+                <a16:creationId xmlns:a16="http://schemas.microsoft.com/office/drawing/2014/main" id="{B6BFEC96-AA08-41ED-99E0-DAF60F64FB11}"/>
+              </a:ext>
+            </a:extLst>
+          </p:cNvPr>
           <p:cNvSpPr>
             <a:spLocks noGrp="1"/>
           </p:cNvSpPr>
@@ -13368,82 +13598,23 @@
             <p:ph idx="1"/>
           </p:nvPr>
         </p:nvSpPr>
-        <p:spPr/>
+        <p:spPr>
+          <a:xfrm>
+            <a:off x="575999" y="1656000"/>
+            <a:ext cx="11113773" cy="4557764"/>
+          </a:xfrm>
+        </p:spPr>
         <p:txBody>
-          <a:bodyPr>
-            <a:normAutofit/>
-          </a:bodyPr>
+          <a:bodyPr/>
           <a:lstStyle/>
           <a:p>
             <a:r>
-              <a:rPr lang="nl-BE" u="sng" dirty="0" err="1"/>
-              <a:t>Problems</a:t>
-            </a:r>
-            <a:r>
-              <a:rPr lang="nl-BE" dirty="0"/>
-              <a:t>:</a:t>
-            </a:r>
-          </a:p>
-          <a:p>
-            <a:pPr lvl="1"/>
-            <a:r>
-              <a:rPr lang="nl-BE" dirty="0"/>
-              <a:t>Incorrect initial </a:t>
-            </a:r>
-            <a:r>
-              <a:rPr lang="nl-BE" dirty="0" err="1"/>
-              <a:t>concentrations</a:t>
-            </a:r>
-            <a:r>
-              <a:rPr lang="nl-BE" dirty="0"/>
-              <a:t> (</a:t>
-            </a:r>
-            <a:r>
-              <a:rPr lang="nl-BE" dirty="0" err="1"/>
-              <a:t>mistake</a:t>
-            </a:r>
-            <a:r>
-              <a:rPr lang="nl-BE" dirty="0"/>
-              <a:t> in </a:t>
-            </a:r>
-            <a:r>
-              <a:rPr lang="nl-BE" dirty="0" err="1"/>
-              <a:t>linearisation</a:t>
-            </a:r>
-            <a:r>
-              <a:rPr lang="nl-BE" dirty="0"/>
-              <a:t>?)</a:t>
-            </a:r>
-          </a:p>
-          <a:p>
-            <a:pPr lvl="1"/>
-            <a:r>
-              <a:rPr lang="nl-BE" dirty="0" err="1"/>
-              <a:t>Divergence</a:t>
-            </a:r>
-            <a:r>
-              <a:rPr lang="nl-BE" dirty="0"/>
-              <a:t> (</a:t>
-            </a:r>
-            <a:r>
-              <a:rPr lang="nl-BE" dirty="0" err="1"/>
-              <a:t>mistake</a:t>
-            </a:r>
-            <a:r>
-              <a:rPr lang="nl-BE" dirty="0"/>
-              <a:t> in Newton </a:t>
-            </a:r>
-            <a:r>
-              <a:rPr lang="nl-BE" dirty="0" err="1"/>
-              <a:t>method</a:t>
-            </a:r>
-            <a:r>
-              <a:rPr lang="nl-BE" dirty="0"/>
-              <a:t>/</a:t>
-            </a:r>
-            <a:r>
-              <a:rPr lang="nl-BE" dirty="0" err="1"/>
-              <a:t>Jacobian</a:t>
+              <a:rPr lang="nl-BE" dirty="0"/>
+              <a:t>Using a maximum of 100 </a:t>
+            </a:r>
+            <a:r>
+              <a:rPr lang="nl-BE" dirty="0" err="1"/>
+              <a:t>iterations</a:t>
             </a:r>
             <a:r>
               <a:rPr lang="nl-BE" dirty="0"/>
@@ -13451,66 +13622,7 @@
             </a:r>
             <a:r>
               <a:rPr lang="nl-BE" dirty="0" err="1"/>
-              <a:t>calculation</a:t>
-            </a:r>
-            <a:r>
-              <a:rPr lang="nl-BE" dirty="0"/>
-              <a:t>?)</a:t>
-            </a:r>
-          </a:p>
-          <a:p>
-            <a:pPr lvl="1"/>
-            <a:r>
-              <a:rPr lang="nl-BE" dirty="0"/>
-              <a:t>No </a:t>
-            </a:r>
-            <a:r>
-              <a:rPr lang="nl-BE" dirty="0" err="1"/>
-              <a:t>library</a:t>
-            </a:r>
-            <a:r>
-              <a:rPr lang="nl-BE" dirty="0"/>
-              <a:t> used to handle </a:t>
-            </a:r>
-            <a:r>
-              <a:rPr lang="nl-BE" dirty="0" err="1"/>
-              <a:t>sparse</a:t>
-            </a:r>
-            <a:r>
-              <a:rPr lang="nl-BE" dirty="0"/>
-              <a:t> matrices</a:t>
-            </a:r>
-          </a:p>
-          <a:p>
-            <a:pPr lvl="1"/>
-            <a:r>
-              <a:rPr lang="nl-BE" dirty="0"/>
-              <a:t>No C++</a:t>
-            </a:r>
-          </a:p>
-          <a:p>
-            <a:pPr lvl="1"/>
-            <a:r>
-              <a:rPr lang="nl-BE" dirty="0"/>
-              <a:t>…</a:t>
-            </a:r>
-          </a:p>
-          <a:p>
-            <a:r>
-              <a:rPr lang="nl-BE" u="sng" dirty="0" err="1"/>
-              <a:t>Insights</a:t>
-            </a:r>
-            <a:endParaRPr lang="nl-BE" u="sng" dirty="0"/>
-          </a:p>
-          <a:p>
-            <a:pPr lvl="1"/>
-            <a:r>
-              <a:rPr lang="nl-BE" dirty="0"/>
-              <a:t>More </a:t>
-            </a:r>
-            <a:r>
-              <a:rPr lang="nl-BE" dirty="0" err="1"/>
-              <a:t>detailed</a:t>
+              <a:t>for</a:t>
             </a:r>
             <a:r>
               <a:rPr lang="nl-BE" dirty="0"/>
@@ -13518,7 +13630,15 @@
             </a:r>
             <a:r>
               <a:rPr lang="nl-BE" dirty="0" err="1"/>
-              <a:t>understanding</a:t>
+              <a:t>both</a:t>
+            </a:r>
+            <a:r>
+              <a:rPr lang="nl-BE" dirty="0"/>
+              <a:t> </a:t>
+            </a:r>
+            <a:r>
+              <a:rPr lang="nl-BE" dirty="0" err="1"/>
+              <a:t>ways</a:t>
             </a:r>
             <a:r>
               <a:rPr lang="nl-BE" dirty="0"/>
@@ -13526,22 +13646,7 @@
             </a:r>
             <a:r>
               <a:rPr lang="nl-BE" dirty="0" err="1"/>
-              <a:t>Finite</a:t>
-            </a:r>
-            <a:r>
-              <a:rPr lang="nl-BE" dirty="0"/>
-              <a:t> Element Method</a:t>
-            </a:r>
-          </a:p>
-          <a:p>
-            <a:pPr lvl="1"/>
-            <a:r>
-              <a:rPr lang="nl-BE" dirty="0"/>
-              <a:t>Use of </a:t>
-            </a:r>
-            <a:r>
-              <a:rPr lang="nl-BE" dirty="0" err="1"/>
-              <a:t>quadrature</a:t>
+              <a:t>solving</a:t>
             </a:r>
             <a:r>
               <a:rPr lang="nl-BE" dirty="0"/>
@@ -13549,42 +13654,117 @@
             </a:r>
             <a:r>
               <a:rPr lang="nl-BE" dirty="0" err="1"/>
-              <a:t>rules</a:t>
-            </a:r>
-            <a:r>
-              <a:rPr lang="nl-BE" dirty="0"/>
-              <a:t> in </a:t>
-            </a:r>
-            <a:r>
-              <a:rPr lang="nl-BE" dirty="0" err="1"/>
-              <a:t>practice</a:t>
-            </a:r>
+              <a:t>the</a:t>
+            </a:r>
+            <a:r>
+              <a:rPr lang="nl-BE" dirty="0"/>
+              <a:t> non-</a:t>
+            </a:r>
+            <a:r>
+              <a:rPr lang="nl-BE" dirty="0" err="1"/>
+              <a:t>linear</a:t>
+            </a:r>
+            <a:r>
+              <a:rPr lang="nl-BE" dirty="0"/>
+              <a:t> system, we </a:t>
+            </a:r>
+            <a:r>
+              <a:rPr lang="nl-BE" dirty="0" err="1"/>
+              <a:t>got</a:t>
+            </a:r>
+            <a:r>
+              <a:rPr lang="nl-BE" dirty="0"/>
+              <a:t> following </a:t>
+            </a:r>
+            <a:r>
+              <a:rPr lang="nl-BE" dirty="0" err="1"/>
+              <a:t>timings</a:t>
+            </a:r>
+            <a:r>
+              <a:rPr lang="nl-BE" dirty="0"/>
+              <a:t> </a:t>
+            </a:r>
+            <a:r>
+              <a:rPr lang="nl-BE" dirty="0" err="1"/>
+              <a:t>for</a:t>
+            </a:r>
+            <a:r>
+              <a:rPr lang="nl-BE" dirty="0"/>
+              <a:t> </a:t>
+            </a:r>
+            <a:r>
+              <a:rPr lang="nl-BE" dirty="0" err="1"/>
+              <a:t>the</a:t>
+            </a:r>
+            <a:r>
+              <a:rPr lang="nl-BE" dirty="0"/>
+              <a:t> </a:t>
+            </a:r>
+            <a:r>
+              <a:rPr lang="nl-BE" dirty="0" err="1"/>
+              <a:t>same</a:t>
+            </a:r>
+            <a:r>
+              <a:rPr lang="nl-BE" dirty="0"/>
+              <a:t> </a:t>
+            </a:r>
+            <a:r>
+              <a:rPr lang="nl-BE" dirty="0" err="1"/>
+              <a:t>pear</a:t>
+            </a:r>
+            <a:r>
+              <a:rPr lang="nl-BE" dirty="0"/>
+              <a:t>: </a:t>
+            </a:r>
+          </a:p>
+          <a:p>
             <a:endParaRPr lang="nl-BE" dirty="0"/>
           </a:p>
           <a:p>
-            <a:pPr lvl="1"/>
-            <a:r>
-              <a:rPr lang="nl-BE" dirty="0" err="1"/>
-              <a:t>Structured</a:t>
-            </a:r>
-            <a:r>
-              <a:rPr lang="nl-BE" dirty="0"/>
-              <a:t> MATLAB-</a:t>
-            </a:r>
-            <a:r>
-              <a:rPr lang="nl-BE" dirty="0" err="1"/>
-              <a:t>programming</a:t>
-            </a:r>
             <a:endParaRPr lang="nl-BE" dirty="0"/>
           </a:p>
           <a:p>
-            <a:endParaRPr lang="nl-BE" dirty="0"/>
+            <a:pPr lvl="3"/>
+            <a:r>
+              <a:rPr lang="nl-BE" dirty="0"/>
+              <a:t>FORTRAN: 0.3948s (</a:t>
+            </a:r>
+            <a:r>
+              <a:rPr lang="nl-BE" dirty="0" err="1"/>
+              <a:t>average</a:t>
+            </a:r>
+            <a:r>
+              <a:rPr lang="nl-BE" dirty="0"/>
+              <a:t>)</a:t>
+            </a:r>
+          </a:p>
+          <a:p>
+            <a:pPr lvl="3"/>
+            <a:r>
+              <a:rPr lang="nl-BE" dirty="0"/>
+              <a:t>MATLAB: 5.3906s (</a:t>
+            </a:r>
+            <a:r>
+              <a:rPr lang="nl-BE" dirty="0" err="1"/>
+              <a:t>average</a:t>
+            </a:r>
+            <a:r>
+              <a:rPr lang="nl-BE" dirty="0"/>
+              <a:t>)</a:t>
+            </a:r>
+            <a:endParaRPr lang="en-BE" dirty="0"/>
           </a:p>
         </p:txBody>
       </p:sp>
       <p:sp>
         <p:nvSpPr>
-          <p:cNvPr id="4" name="Slide Number Placeholder 3"/>
+          <p:cNvPr id="3" name="Slide Number Placeholder 2">
+            <a:extLst>
+              <a:ext uri="{FF2B5EF4-FFF2-40B4-BE49-F238E27FC236}">
+                <a16:creationId xmlns:a16="http://schemas.microsoft.com/office/drawing/2014/main" id="{6D87B02B-0F86-43E5-8BC1-5DFF71ABAEE4}"/>
+              </a:ext>
+            </a:extLst>
+          </p:cNvPr>
           <p:cNvSpPr>
             <a:spLocks noGrp="1"/>
           </p:cNvSpPr>
@@ -13607,7 +13787,13 @@
       </p:sp>
       <p:sp>
         <p:nvSpPr>
-          <p:cNvPr id="5" name="Title 4"/>
+          <p:cNvPr id="4" name="Title 3">
+            <a:extLst>
+              <a:ext uri="{FF2B5EF4-FFF2-40B4-BE49-F238E27FC236}">
+                <a16:creationId xmlns:a16="http://schemas.microsoft.com/office/drawing/2014/main" id="{CABEC529-4C24-4D4A-AD09-51F74FB27336}"/>
+              </a:ext>
+            </a:extLst>
+          </p:cNvPr>
           <p:cNvSpPr>
             <a:spLocks noGrp="1"/>
           </p:cNvSpPr>
@@ -13622,15 +13808,32 @@
           <a:p>
             <a:r>
               <a:rPr lang="nl-BE" dirty="0"/>
-              <a:t>Conclusion</a:t>
-            </a:r>
+              <a:t>Timing </a:t>
+            </a:r>
+            <a:r>
+              <a:rPr lang="nl-BE" dirty="0" err="1"/>
+              <a:t>comparison</a:t>
+            </a:r>
+            <a:r>
+              <a:rPr lang="nl-BE" dirty="0"/>
+              <a:t>: Fortran </a:t>
+            </a:r>
+            <a:r>
+              <a:rPr lang="nl-BE" dirty="0" err="1"/>
+              <a:t>vs</a:t>
+            </a:r>
+            <a:r>
+              <a:rPr lang="nl-BE" dirty="0"/>
+              <a:t> Matlab</a:t>
+            </a:r>
+            <a:endParaRPr lang="en-BE" dirty="0"/>
           </a:p>
         </p:txBody>
       </p:sp>
     </p:spTree>
     <p:extLst>
       <p:ext uri="{BB962C8B-B14F-4D97-AF65-F5344CB8AC3E}">
-        <p14:creationId xmlns:p14="http://schemas.microsoft.com/office/powerpoint/2010/main" val="4174491204"/>
+        <p14:creationId xmlns:p14="http://schemas.microsoft.com/office/powerpoint/2010/main" val="755320541"/>
       </p:ext>
     </p:extLst>
   </p:cSld>
@@ -14044,6 +14247,331 @@
     <p:extLst>
       <p:ext uri="{BB962C8B-B14F-4D97-AF65-F5344CB8AC3E}">
         <p14:creationId xmlns:p14="http://schemas.microsoft.com/office/powerpoint/2010/main" val="2006917097"/>
+      </p:ext>
+    </p:extLst>
+  </p:cSld>
+  <p:clrMapOvr>
+    <a:masterClrMapping/>
+  </p:clrMapOvr>
+</p:sld>
+</file>
+
+<file path=ppt/slides/slide20.xml><?xml version="1.0" encoding="utf-8"?>
+<p:sld xmlns:a="http://schemas.openxmlformats.org/drawingml/2006/main" xmlns:r="http://schemas.openxmlformats.org/officeDocument/2006/relationships" xmlns:p="http://schemas.openxmlformats.org/presentationml/2006/main">
+  <p:cSld>
+    <p:spTree>
+      <p:nvGrpSpPr>
+        <p:cNvPr id="1" name=""/>
+        <p:cNvGrpSpPr/>
+        <p:nvPr/>
+      </p:nvGrpSpPr>
+      <p:grpSpPr>
+        <a:xfrm>
+          <a:off x="0" y="0"/>
+          <a:ext cx="0" cy="0"/>
+          <a:chOff x="0" y="0"/>
+          <a:chExt cx="0" cy="0"/>
+        </a:xfrm>
+      </p:grpSpPr>
+      <p:sp>
+        <p:nvSpPr>
+          <p:cNvPr id="2" name="Content Placeholder 1"/>
+          <p:cNvSpPr>
+            <a:spLocks noGrp="1"/>
+          </p:cNvSpPr>
+          <p:nvPr>
+            <p:ph idx="1"/>
+          </p:nvPr>
+        </p:nvSpPr>
+        <p:spPr/>
+        <p:txBody>
+          <a:bodyPr>
+            <a:normAutofit/>
+          </a:bodyPr>
+          <a:lstStyle/>
+          <a:p>
+            <a:r>
+              <a:rPr lang="nl-BE" u="sng" dirty="0" err="1"/>
+              <a:t>Problems</a:t>
+            </a:r>
+            <a:r>
+              <a:rPr lang="nl-BE" dirty="0"/>
+              <a:t>:</a:t>
+            </a:r>
+          </a:p>
+          <a:p>
+            <a:pPr lvl="1"/>
+            <a:r>
+              <a:rPr lang="nl-BE" dirty="0" err="1"/>
+              <a:t>Not</a:t>
+            </a:r>
+            <a:r>
+              <a:rPr lang="nl-BE" dirty="0"/>
+              <a:t> </a:t>
+            </a:r>
+            <a:r>
+              <a:rPr lang="nl-BE" dirty="0" err="1"/>
+              <a:t>completly</a:t>
+            </a:r>
+            <a:r>
+              <a:rPr lang="nl-BE" dirty="0"/>
+              <a:t> correct initial </a:t>
+            </a:r>
+            <a:r>
+              <a:rPr lang="nl-BE" dirty="0" err="1"/>
+              <a:t>concentration</a:t>
+            </a:r>
+            <a:r>
+              <a:rPr lang="nl-BE" dirty="0"/>
+              <a:t> (</a:t>
+            </a:r>
+            <a:r>
+              <a:rPr lang="nl-BE" dirty="0" err="1"/>
+              <a:t>linearisation</a:t>
+            </a:r>
+            <a:r>
+              <a:rPr lang="nl-BE" dirty="0"/>
+              <a:t> </a:t>
+            </a:r>
+            <a:r>
+              <a:rPr lang="nl-BE" dirty="0" err="1"/>
+              <a:t>assumptions</a:t>
+            </a:r>
+            <a:r>
+              <a:rPr lang="nl-BE" dirty="0"/>
+              <a:t>?)</a:t>
+            </a:r>
+          </a:p>
+          <a:p>
+            <a:pPr lvl="1"/>
+            <a:r>
+              <a:rPr lang="nl-BE" dirty="0" err="1"/>
+              <a:t>Convergence</a:t>
+            </a:r>
+            <a:r>
+              <a:rPr lang="nl-BE" dirty="0"/>
+              <a:t> to wrong </a:t>
+            </a:r>
+            <a:r>
+              <a:rPr lang="nl-BE" dirty="0" err="1"/>
+              <a:t>solutions</a:t>
+            </a:r>
+            <a:r>
+              <a:rPr lang="nl-BE" dirty="0"/>
+              <a:t> when </a:t>
+            </a:r>
+            <a:r>
+              <a:rPr lang="nl-BE" dirty="0" err="1"/>
+              <a:t>solving</a:t>
+            </a:r>
+            <a:r>
+              <a:rPr lang="nl-BE" dirty="0"/>
+              <a:t> non-</a:t>
+            </a:r>
+            <a:r>
+              <a:rPr lang="nl-BE" dirty="0" err="1"/>
+              <a:t>linear</a:t>
+            </a:r>
+            <a:r>
+              <a:rPr lang="nl-BE" dirty="0"/>
+              <a:t> system</a:t>
+            </a:r>
+            <a:br>
+              <a:rPr lang="nl-BE" dirty="0"/>
+            </a:br>
+            <a:endParaRPr lang="nl-BE" dirty="0"/>
+          </a:p>
+          <a:p>
+            <a:r>
+              <a:rPr lang="nl-BE" u="sng" dirty="0" err="1"/>
+              <a:t>Insights</a:t>
+            </a:r>
+            <a:endParaRPr lang="nl-BE" u="sng" dirty="0"/>
+          </a:p>
+          <a:p>
+            <a:pPr lvl="1"/>
+            <a:r>
+              <a:rPr lang="nl-BE" dirty="0"/>
+              <a:t>More </a:t>
+            </a:r>
+            <a:r>
+              <a:rPr lang="nl-BE" dirty="0" err="1"/>
+              <a:t>detailed</a:t>
+            </a:r>
+            <a:r>
+              <a:rPr lang="nl-BE" dirty="0"/>
+              <a:t> </a:t>
+            </a:r>
+            <a:r>
+              <a:rPr lang="nl-BE" dirty="0" err="1"/>
+              <a:t>understanding</a:t>
+            </a:r>
+            <a:r>
+              <a:rPr lang="nl-BE" dirty="0"/>
+              <a:t> of </a:t>
+            </a:r>
+            <a:r>
+              <a:rPr lang="nl-BE" dirty="0" err="1"/>
+              <a:t>Finite</a:t>
+            </a:r>
+            <a:r>
+              <a:rPr lang="nl-BE" dirty="0"/>
+              <a:t> Element Method</a:t>
+            </a:r>
+          </a:p>
+          <a:p>
+            <a:pPr lvl="1"/>
+            <a:r>
+              <a:rPr lang="nl-BE" dirty="0"/>
+              <a:t>Use of </a:t>
+            </a:r>
+            <a:r>
+              <a:rPr lang="nl-BE" dirty="0" err="1"/>
+              <a:t>quadrature</a:t>
+            </a:r>
+            <a:r>
+              <a:rPr lang="nl-BE" dirty="0"/>
+              <a:t> </a:t>
+            </a:r>
+            <a:r>
+              <a:rPr lang="nl-BE" dirty="0" err="1"/>
+              <a:t>rules</a:t>
+            </a:r>
+            <a:r>
+              <a:rPr lang="nl-BE" dirty="0"/>
+              <a:t> in </a:t>
+            </a:r>
+            <a:r>
+              <a:rPr lang="nl-BE" dirty="0" err="1"/>
+              <a:t>practice</a:t>
+            </a:r>
+            <a:endParaRPr lang="nl-BE" dirty="0"/>
+          </a:p>
+          <a:p>
+            <a:pPr lvl="1"/>
+            <a:r>
+              <a:rPr lang="nl-BE" dirty="0" err="1"/>
+              <a:t>Structured</a:t>
+            </a:r>
+            <a:r>
+              <a:rPr lang="nl-BE" dirty="0"/>
+              <a:t> MATLAB-</a:t>
+            </a:r>
+            <a:r>
+              <a:rPr lang="nl-BE" dirty="0" err="1"/>
+              <a:t>programming</a:t>
+            </a:r>
+            <a:endParaRPr lang="nl-BE" dirty="0"/>
+          </a:p>
+          <a:p>
+            <a:pPr lvl="1"/>
+            <a:r>
+              <a:rPr lang="nl-BE" dirty="0" err="1"/>
+              <a:t>Structured</a:t>
+            </a:r>
+            <a:r>
+              <a:rPr lang="nl-BE" dirty="0"/>
+              <a:t> FORTRAN-</a:t>
+            </a:r>
+            <a:r>
+              <a:rPr lang="nl-BE" dirty="0" err="1"/>
+              <a:t>programming</a:t>
+            </a:r>
+            <a:r>
+              <a:rPr lang="nl-BE" dirty="0"/>
+              <a:t> and </a:t>
+            </a:r>
+            <a:r>
+              <a:rPr lang="nl-BE" dirty="0" err="1"/>
+              <a:t>working</a:t>
+            </a:r>
+            <a:r>
+              <a:rPr lang="nl-BE" dirty="0"/>
+              <a:t> with online </a:t>
+            </a:r>
+            <a:r>
+              <a:rPr lang="nl-BE" dirty="0" err="1"/>
+              <a:t>libraries</a:t>
+            </a:r>
+            <a:endParaRPr lang="nl-BE" dirty="0"/>
+          </a:p>
+          <a:p>
+            <a:pPr lvl="1"/>
+            <a:r>
+              <a:rPr lang="nl-BE" dirty="0"/>
+              <a:t>FORTRAN is much </a:t>
+            </a:r>
+            <a:r>
+              <a:rPr lang="nl-BE" dirty="0" err="1"/>
+              <a:t>faster</a:t>
+            </a:r>
+            <a:r>
+              <a:rPr lang="nl-BE" dirty="0"/>
+              <a:t> than MATLAB (also because of efficient </a:t>
+            </a:r>
+            <a:r>
+              <a:rPr lang="nl-BE" dirty="0" err="1"/>
+              <a:t>solver</a:t>
+            </a:r>
+            <a:r>
+              <a:rPr lang="nl-BE" dirty="0"/>
+              <a:t>)</a:t>
+            </a:r>
+          </a:p>
+          <a:p>
+            <a:endParaRPr lang="nl-BE" dirty="0"/>
+          </a:p>
+        </p:txBody>
+      </p:sp>
+      <p:sp>
+        <p:nvSpPr>
+          <p:cNvPr id="4" name="Slide Number Placeholder 3"/>
+          <p:cNvSpPr>
+            <a:spLocks noGrp="1"/>
+          </p:cNvSpPr>
+          <p:nvPr>
+            <p:ph type="sldNum" sz="quarter" idx="12"/>
+          </p:nvPr>
+        </p:nvSpPr>
+        <p:spPr/>
+        <p:txBody>
+          <a:bodyPr/>
+          <a:lstStyle/>
+          <a:p>
+            <a:fld id="{0A297500-7527-634B-90F4-69D0994C32B4}" type="slidenum">
+              <a:rPr lang="nl-NL" smtClean="0"/>
+              <a:t>20</a:t>
+            </a:fld>
+            <a:endParaRPr lang="nl-NL"/>
+          </a:p>
+        </p:txBody>
+      </p:sp>
+      <p:sp>
+        <p:nvSpPr>
+          <p:cNvPr id="5" name="Title 4"/>
+          <p:cNvSpPr>
+            <a:spLocks noGrp="1"/>
+          </p:cNvSpPr>
+          <p:nvPr>
+            <p:ph type="title"/>
+          </p:nvPr>
+        </p:nvSpPr>
+        <p:spPr/>
+        <p:txBody>
+          <a:bodyPr/>
+          <a:lstStyle/>
+          <a:p>
+            <a:r>
+              <a:rPr lang="nl-BE" dirty="0"/>
+              <a:t>Conclusion</a:t>
+            </a:r>
+          </a:p>
+        </p:txBody>
+      </p:sp>
+    </p:spTree>
+    <p:extLst>
+      <p:ext uri="{BB962C8B-B14F-4D97-AF65-F5344CB8AC3E}">
+        <p14:creationId xmlns:p14="http://schemas.microsoft.com/office/powerpoint/2010/main" val="4174491204"/>
       </p:ext>
     </p:extLst>
   </p:cSld>

</xml_diff>